<commit_message>
[doc] add cascading dissector table
</commit_message>
<xml_diff>
--- a/Lua Wireshark Dissectors.pptx
+++ b/Lua Wireshark Dissectors.pptx
@@ -5,10 +5,10 @@
     <p:sldMasterId id="2147483648" r:id="rId1"/>
   </p:sldMasterIdLst>
   <p:notesMasterIdLst>
-    <p:notesMasterId r:id="rId14"/>
+    <p:notesMasterId r:id="rId15"/>
   </p:notesMasterIdLst>
   <p:handoutMasterIdLst>
-    <p:handoutMasterId r:id="rId15"/>
+    <p:handoutMasterId r:id="rId16"/>
   </p:handoutMasterIdLst>
   <p:sldIdLst>
     <p:sldId id="259" r:id="rId2"/>
@@ -16,13 +16,14 @@
     <p:sldId id="262" r:id="rId4"/>
     <p:sldId id="263" r:id="rId5"/>
     <p:sldId id="268" r:id="rId6"/>
-    <p:sldId id="266" r:id="rId7"/>
-    <p:sldId id="267" r:id="rId8"/>
-    <p:sldId id="269" r:id="rId9"/>
-    <p:sldId id="265" r:id="rId10"/>
-    <p:sldId id="264" r:id="rId11"/>
-    <p:sldId id="258" r:id="rId12"/>
-    <p:sldId id="260" r:id="rId13"/>
+    <p:sldId id="270" r:id="rId7"/>
+    <p:sldId id="266" r:id="rId8"/>
+    <p:sldId id="267" r:id="rId9"/>
+    <p:sldId id="269" r:id="rId10"/>
+    <p:sldId id="265" r:id="rId11"/>
+    <p:sldId id="264" r:id="rId12"/>
+    <p:sldId id="258" r:id="rId13"/>
+    <p:sldId id="260" r:id="rId14"/>
   </p:sldIdLst>
   <p:sldSz cx="9144000" cy="5143500" type="screen16x9"/>
   <p:notesSz cx="6858000" cy="9144000"/>
@@ -825,7 +826,7 @@
               <a:buChar char="•"/>
             </a:pPr>
             <a:r>
-              <a:rPr lang="en-US" baseline="0" smtClean="0"/>
+              <a:rPr lang="en-US" baseline="0" dirty="0" smtClean="0"/>
               <a:t>Tree structure</a:t>
             </a:r>
             <a:endParaRPr lang="en-US" dirty="0"/>
@@ -971,7 +972,7 @@
             <a:fld id="{559C4A52-4ACF-44E6-B7A9-3756997F58DA}" type="slidenum">
               <a:rPr lang="en-US" smtClean="0"/>
               <a:pPr/>
-              <a:t>8</a:t>
+              <a:t>9</a:t>
             </a:fld>
             <a:endParaRPr lang="en-US"/>
           </a:p>
@@ -1058,7 +1059,7 @@
             <a:fld id="{559C4A52-4ACF-44E6-B7A9-3756997F58DA}" type="slidenum">
               <a:rPr lang="en-US" smtClean="0"/>
               <a:pPr/>
-              <a:t>12</a:t>
+              <a:t>13</a:t>
             </a:fld>
             <a:endParaRPr lang="en-US"/>
           </a:p>
@@ -4749,6 +4750,10 @@
           <a:bodyPr/>
           <a:lstStyle/>
           <a:p>
+            <a:r>
+              <a:rPr lang="en-US" dirty="0" smtClean="0"/>
+              <a:t>Links</a:t>
+            </a:r>
             <a:endParaRPr lang="en-US" dirty="0"/>
           </a:p>
         </p:txBody>
@@ -4769,9 +4774,64 @@
           <a:lstStyle/>
           <a:p>
             <a:r>
+              <a:rPr lang="en-US" dirty="0"/>
+              <a:t>Getting started: </a:t>
+            </a:r>
+            <a:endParaRPr lang="en-US" dirty="0" smtClean="0"/>
+          </a:p>
+          <a:p>
+            <a:pPr marL="704850" lvl="2" indent="-342900"/>
+            <a:r>
+              <a:rPr lang="en-US" dirty="0">
+                <a:hlinkClick r:id="rId2"/>
+              </a:rPr>
+              <a:t>http://</a:t>
+            </a:r>
+            <a:r>
+              <a:rPr lang="en-US" dirty="0" smtClean="0">
+                <a:hlinkClick r:id="rId2"/>
+              </a:rPr>
+              <a:t>wiki.wireshark.org/Lua</a:t>
+            </a:r>
+            <a:endParaRPr lang="en-US" dirty="0"/>
+          </a:p>
+          <a:p>
+            <a:r>
               <a:rPr lang="en-US" dirty="0" smtClean="0"/>
-              <a:t>Finding your entry point</a:t>
-            </a:r>
+              <a:t>Details</a:t>
+            </a:r>
+          </a:p>
+          <a:p>
+            <a:pPr lvl="1"/>
+            <a:r>
+              <a:rPr lang="en-US" dirty="0" smtClean="0">
+                <a:hlinkClick r:id="rId3"/>
+              </a:rPr>
+              <a:t>http</a:t>
+            </a:r>
+            <a:r>
+              <a:rPr lang="en-US" dirty="0">
+                <a:hlinkClick r:id="rId3"/>
+              </a:rPr>
+              <a:t>://ask.wireshark.org/</a:t>
+            </a:r>
+            <a:endParaRPr lang="en-US" dirty="0"/>
+          </a:p>
+          <a:p>
+            <a:pPr lvl="1"/>
+            <a:r>
+              <a:rPr lang="en-US" dirty="0">
+                <a:hlinkClick r:id="rId4"/>
+              </a:rPr>
+              <a:t>http://stackoverflow.com/</a:t>
+            </a:r>
+            <a:endParaRPr lang="en-US" dirty="0"/>
+          </a:p>
+          <a:p>
+            <a:endParaRPr lang="en-US" dirty="0" smtClean="0"/>
+          </a:p>
+          <a:p>
+            <a:pPr lvl="1"/>
             <a:endParaRPr lang="en-US" dirty="0"/>
           </a:p>
         </p:txBody>
@@ -4818,6 +4878,125 @@
               <a:rPr lang="en-US" smtClean="0"/>
               <a:pPr/>
               <a:t>10</a:t>
+            </a:fld>
+            <a:endParaRPr lang="en-US"/>
+          </a:p>
+        </p:txBody>
+      </p:sp>
+    </p:spTree>
+    <p:extLst>
+      <p:ext uri="{BB962C8B-B14F-4D97-AF65-F5344CB8AC3E}">
+        <p14:creationId xmlns:p14="http://schemas.microsoft.com/office/powerpoint/2010/main" val="2861604159"/>
+      </p:ext>
+    </p:extLst>
+  </p:cSld>
+  <p:clrMapOvr>
+    <a:masterClrMapping/>
+  </p:clrMapOvr>
+</p:sld>
+</file>
+
+<file path=ppt/slides/slide11.xml><?xml version="1.0" encoding="utf-8"?>
+<p:sld xmlns:a="http://schemas.openxmlformats.org/drawingml/2006/main" xmlns:r="http://schemas.openxmlformats.org/officeDocument/2006/relationships" xmlns:p="http://schemas.openxmlformats.org/presentationml/2006/main">
+  <p:cSld>
+    <p:spTree>
+      <p:nvGrpSpPr>
+        <p:cNvPr id="1" name=""/>
+        <p:cNvGrpSpPr/>
+        <p:nvPr/>
+      </p:nvGrpSpPr>
+      <p:grpSpPr>
+        <a:xfrm>
+          <a:off x="0" y="0"/>
+          <a:ext cx="0" cy="0"/>
+          <a:chOff x="0" y="0"/>
+          <a:chExt cx="0" cy="0"/>
+        </a:xfrm>
+      </p:grpSpPr>
+      <p:sp>
+        <p:nvSpPr>
+          <p:cNvPr id="2" name="Titel 1"/>
+          <p:cNvSpPr>
+            <a:spLocks noGrp="1"/>
+          </p:cNvSpPr>
+          <p:nvPr>
+            <p:ph type="title"/>
+          </p:nvPr>
+        </p:nvSpPr>
+        <p:spPr/>
+        <p:txBody>
+          <a:bodyPr/>
+          <a:lstStyle/>
+          <a:p>
+            <a:endParaRPr lang="en-US" dirty="0"/>
+          </a:p>
+        </p:txBody>
+      </p:sp>
+      <p:sp>
+        <p:nvSpPr>
+          <p:cNvPr id="3" name="Tijdelijke aanduiding voor inhoud 2"/>
+          <p:cNvSpPr>
+            <a:spLocks noGrp="1"/>
+          </p:cNvSpPr>
+          <p:nvPr>
+            <p:ph idx="1"/>
+          </p:nvPr>
+        </p:nvSpPr>
+        <p:spPr/>
+        <p:txBody>
+          <a:bodyPr/>
+          <a:lstStyle/>
+          <a:p>
+            <a:r>
+              <a:rPr lang="en-US" dirty="0" smtClean="0"/>
+              <a:t>Finding your entry point</a:t>
+            </a:r>
+            <a:endParaRPr lang="en-US" dirty="0"/>
+          </a:p>
+        </p:txBody>
+      </p:sp>
+      <p:sp>
+        <p:nvSpPr>
+          <p:cNvPr id="4" name="Tijdelijke aanduiding voor voettekst 3"/>
+          <p:cNvSpPr>
+            <a:spLocks noGrp="1"/>
+          </p:cNvSpPr>
+          <p:nvPr>
+            <p:ph type="ftr" sz="quarter" idx="11"/>
+          </p:nvPr>
+        </p:nvSpPr>
+        <p:spPr/>
+        <p:txBody>
+          <a:bodyPr/>
+          <a:lstStyle/>
+          <a:p>
+            <a:r>
+              <a:rPr lang="en-US" smtClean="0"/>
+              <a:t>© Sioux 2013 | Confidential | </a:t>
+            </a:r>
+            <a:endParaRPr lang="en-US"/>
+          </a:p>
+        </p:txBody>
+      </p:sp>
+      <p:sp>
+        <p:nvSpPr>
+          <p:cNvPr id="5" name="Tijdelijke aanduiding voor dianummer 4"/>
+          <p:cNvSpPr>
+            <a:spLocks noGrp="1"/>
+          </p:cNvSpPr>
+          <p:nvPr>
+            <p:ph type="sldNum" sz="quarter" idx="12"/>
+          </p:nvPr>
+        </p:nvSpPr>
+        <p:spPr/>
+        <p:txBody>
+          <a:bodyPr/>
+          <a:lstStyle/>
+          <a:p>
+            <a:fld id="{B60E6772-B9F1-4672-903F-323A7A0E6EBD}" type="slidenum">
+              <a:rPr lang="en-US" smtClean="0"/>
+              <a:pPr/>
+              <a:t>11</a:t>
             </a:fld>
             <a:endParaRPr lang="en-US"/>
           </a:p>
@@ -4944,7 +5123,7 @@
 </p:sld>
 </file>
 
-<file path=ppt/slides/slide11.xml><?xml version="1.0" encoding="utf-8"?>
+<file path=ppt/slides/slide12.xml><?xml version="1.0" encoding="utf-8"?>
 <p:sld xmlns:a="http://schemas.openxmlformats.org/drawingml/2006/main" xmlns:r="http://schemas.openxmlformats.org/officeDocument/2006/relationships" xmlns:p="http://schemas.openxmlformats.org/presentationml/2006/main">
   <p:cSld>
     <p:spTree>
@@ -5072,7 +5251,7 @@
             <a:fld id="{B60E6772-B9F1-4672-903F-323A7A0E6EBD}" type="slidenum">
               <a:rPr lang="en-GB" smtClean="0"/>
               <a:pPr/>
-              <a:t>11</a:t>
+              <a:t>12</a:t>
             </a:fld>
             <a:endParaRPr lang="en-GB"/>
           </a:p>
@@ -5208,7 +5387,7 @@
                 <a:tabLst/>
                 <a:defRPr/>
               </a:pPr>
-              <a:t>11</a:t>
+              <a:t>12</a:t>
             </a:fld>
             <a:endParaRPr kumimoji="0" lang="en-GB" sz="800" b="0" i="0" u="none" strike="noStrike" kern="1200" cap="none" spc="0" normalizeH="0" baseline="0" noProof="0" smtClean="0">
               <a:ln>
@@ -5262,7 +5441,7 @@
                 </a:solidFill>
               </a:rPr>
               <a:pPr/>
-              <a:t>11</a:t>
+              <a:t>12</a:t>
             </a:fld>
             <a:endParaRPr lang="en-GB" sz="900">
               <a:solidFill>
@@ -6309,7 +6488,7 @@
 </p:sld>
 </file>
 
-<file path=ppt/slides/slide12.xml><?xml version="1.0" encoding="utf-8"?>
+<file path=ppt/slides/slide13.xml><?xml version="1.0" encoding="utf-8"?>
 <p:sld xmlns:a="http://schemas.openxmlformats.org/drawingml/2006/main" xmlns:r="http://schemas.openxmlformats.org/officeDocument/2006/relationships" xmlns:p="http://schemas.openxmlformats.org/presentationml/2006/main">
   <p:cSld>
     <p:spTree>
@@ -6344,7 +6523,7 @@
             <a:fld id="{B60E6772-B9F1-4672-903F-323A7A0E6EBD}" type="slidenum">
               <a:rPr lang="en-GB" smtClean="0"/>
               <a:pPr/>
-              <a:t>12</a:t>
+              <a:t>13</a:t>
             </a:fld>
             <a:endParaRPr lang="en-GB"/>
           </a:p>
@@ -8148,72 +8327,32 @@
           <a:bodyPr/>
           <a:lstStyle/>
           <a:p>
+            <a:endParaRPr lang="en-US" dirty="0"/>
+          </a:p>
+        </p:txBody>
+      </p:sp>
+      <p:sp>
+        <p:nvSpPr>
+          <p:cNvPr id="3" name="Tijdelijke aanduiding voor inhoud 2"/>
+          <p:cNvSpPr>
+            <a:spLocks noGrp="1"/>
+          </p:cNvSpPr>
+          <p:nvPr>
+            <p:ph idx="1"/>
+          </p:nvPr>
+        </p:nvSpPr>
+        <p:spPr/>
+        <p:txBody>
+          <a:bodyPr/>
+          <a:lstStyle/>
+          <a:p>
             <a:r>
               <a:rPr lang="en-US" dirty="0" smtClean="0"/>
-              <a:t>Dissector </a:t>
-            </a:r>
-            <a:r>
-              <a:rPr lang="en-US" dirty="0" smtClean="0"/>
-              <a:t>Architecture</a:t>
-            </a:r>
+              <a:t>Cascading dissector table</a:t>
+            </a:r>
+          </a:p>
+          <a:p>
             <a:endParaRPr lang="en-US" dirty="0"/>
-          </a:p>
-        </p:txBody>
-      </p:sp>
-      <p:sp>
-        <p:nvSpPr>
-          <p:cNvPr id="3" name="Tijdelijke aanduiding voor inhoud 2"/>
-          <p:cNvSpPr>
-            <a:spLocks noGrp="1"/>
-          </p:cNvSpPr>
-          <p:nvPr>
-            <p:ph idx="1"/>
-          </p:nvPr>
-        </p:nvSpPr>
-        <p:spPr/>
-        <p:txBody>
-          <a:bodyPr>
-            <a:normAutofit/>
-          </a:bodyPr>
-          <a:lstStyle/>
-          <a:p>
-            <a:r>
-              <a:rPr lang="en-US" smtClean="0"/>
-              <a:t>Plugins</a:t>
-            </a:r>
-          </a:p>
-          <a:p>
-            <a:pPr lvl="1"/>
-            <a:r>
-              <a:rPr lang="en-US" smtClean="0"/>
-              <a:t>Compiled (C)</a:t>
-            </a:r>
-          </a:p>
-          <a:p>
-            <a:pPr lvl="1"/>
-            <a:r>
-              <a:rPr lang="en-US" smtClean="0"/>
-              <a:t>Dynamic (.so, .dll)</a:t>
-            </a:r>
-          </a:p>
-          <a:p>
-            <a:pPr lvl="1"/>
-            <a:r>
-              <a:rPr lang="en-US" smtClean="0"/>
-              <a:t>Python </a:t>
-            </a:r>
-            <a:r>
-              <a:rPr lang="en-US" sz="1600" smtClean="0"/>
-              <a:t>(broken on current windows version)</a:t>
-            </a:r>
-          </a:p>
-          <a:p>
-            <a:pPr lvl="1"/>
-            <a:r>
-              <a:rPr lang="en-US" smtClean="0"/>
-              <a:t>Lua</a:t>
-            </a:r>
-            <a:endParaRPr lang="en-US" smtClean="0"/>
           </a:p>
         </p:txBody>
       </p:sp>
@@ -8264,10 +8403,1109 @@
           </a:p>
         </p:txBody>
       </p:sp>
+      <p:grpSp>
+        <p:nvGrpSpPr>
+          <p:cNvPr id="6" name="Groep 5"/>
+          <p:cNvGrpSpPr/>
+          <p:nvPr/>
+        </p:nvGrpSpPr>
+        <p:grpSpPr>
+          <a:xfrm>
+            <a:off x="483965" y="1799673"/>
+            <a:ext cx="1219200" cy="914400"/>
+            <a:chOff x="609600" y="1535335"/>
+            <a:chExt cx="1219200" cy="914400"/>
+          </a:xfrm>
+        </p:grpSpPr>
+        <p:sp>
+          <p:nvSpPr>
+            <p:cNvPr id="7" name="Rechthoek 6"/>
+            <p:cNvSpPr/>
+            <p:nvPr/>
+          </p:nvSpPr>
+          <p:spPr>
+            <a:xfrm>
+              <a:off x="609600" y="1535335"/>
+              <a:ext cx="1219200" cy="914400"/>
+            </a:xfrm>
+            <a:prstGeom prst="rect">
+              <a:avLst/>
+            </a:prstGeom>
+          </p:spPr>
+          <p:style>
+            <a:lnRef idx="2">
+              <a:schemeClr val="accent2">
+                <a:shade val="50000"/>
+              </a:schemeClr>
+            </a:lnRef>
+            <a:fillRef idx="1">
+              <a:schemeClr val="accent2"/>
+            </a:fillRef>
+            <a:effectRef idx="0">
+              <a:schemeClr val="accent2"/>
+            </a:effectRef>
+            <a:fontRef idx="minor">
+              <a:schemeClr val="lt1"/>
+            </a:fontRef>
+          </p:style>
+          <p:txBody>
+            <a:bodyPr rtlCol="0" anchor="ctr"/>
+            <a:lstStyle/>
+            <a:p>
+              <a:pPr algn="ctr"/>
+              <a:endParaRPr lang="en-US"/>
+            </a:p>
+          </p:txBody>
+        </p:sp>
+        <p:sp>
+          <p:nvSpPr>
+            <p:cNvPr id="8" name="Rechthoek 7"/>
+            <p:cNvSpPr/>
+            <p:nvPr/>
+          </p:nvSpPr>
+          <p:spPr>
+            <a:xfrm>
+              <a:off x="923846" y="1588706"/>
+              <a:ext cx="523954" cy="152400"/>
+            </a:xfrm>
+            <a:prstGeom prst="rect">
+              <a:avLst/>
+            </a:prstGeom>
+          </p:spPr>
+          <p:style>
+            <a:lnRef idx="2">
+              <a:schemeClr val="accent1">
+                <a:shade val="50000"/>
+              </a:schemeClr>
+            </a:lnRef>
+            <a:fillRef idx="1">
+              <a:schemeClr val="accent1"/>
+            </a:fillRef>
+            <a:effectRef idx="0">
+              <a:schemeClr val="accent1"/>
+            </a:effectRef>
+            <a:fontRef idx="minor">
+              <a:schemeClr val="lt1"/>
+            </a:fontRef>
+          </p:style>
+          <p:txBody>
+            <a:bodyPr rtlCol="0" anchor="ctr"/>
+            <a:lstStyle/>
+            <a:p>
+              <a:pPr algn="ctr"/>
+              <a:r>
+                <a:rPr lang="en-US" sz="1100" dirty="0" smtClean="0"/>
+                <a:t>2014</a:t>
+              </a:r>
+              <a:endParaRPr lang="en-US" sz="1100" dirty="0"/>
+            </a:p>
+          </p:txBody>
+        </p:sp>
+        <p:grpSp>
+          <p:nvGrpSpPr>
+            <p:cNvPr id="9" name="Groep 8"/>
+            <p:cNvGrpSpPr/>
+            <p:nvPr/>
+          </p:nvGrpSpPr>
+          <p:grpSpPr>
+            <a:xfrm>
+              <a:off x="762000" y="1796522"/>
+              <a:ext cx="914400" cy="609600"/>
+              <a:chOff x="835995" y="2800350"/>
+              <a:chExt cx="914400" cy="609600"/>
+            </a:xfrm>
+          </p:grpSpPr>
+          <p:sp>
+            <p:nvSpPr>
+              <p:cNvPr id="10" name="Rechthoek 9"/>
+              <p:cNvSpPr/>
+              <p:nvPr/>
+            </p:nvSpPr>
+            <p:spPr>
+              <a:xfrm>
+                <a:off x="835995" y="2800350"/>
+                <a:ext cx="914400" cy="609600"/>
+              </a:xfrm>
+              <a:prstGeom prst="rect">
+                <a:avLst/>
+              </a:prstGeom>
+            </p:spPr>
+            <p:style>
+              <a:lnRef idx="2">
+                <a:schemeClr val="accent1">
+                  <a:shade val="50000"/>
+                </a:schemeClr>
+              </a:lnRef>
+              <a:fillRef idx="1">
+                <a:schemeClr val="accent1"/>
+              </a:fillRef>
+              <a:effectRef idx="0">
+                <a:schemeClr val="accent1"/>
+              </a:effectRef>
+              <a:fontRef idx="minor">
+                <a:schemeClr val="lt1"/>
+              </a:fontRef>
+            </p:style>
+            <p:txBody>
+              <a:bodyPr rtlCol="0" anchor="ctr"/>
+              <a:lstStyle/>
+              <a:p>
+                <a:pPr algn="ctr"/>
+                <a:endParaRPr lang="en-US"/>
+              </a:p>
+            </p:txBody>
+          </p:sp>
+          <p:sp>
+            <p:nvSpPr>
+              <p:cNvPr id="11" name="Rechthoek 10"/>
+              <p:cNvSpPr/>
+              <p:nvPr/>
+            </p:nvSpPr>
+            <p:spPr>
+              <a:xfrm>
+                <a:off x="845441" y="2853721"/>
+                <a:ext cx="523954" cy="152400"/>
+              </a:xfrm>
+              <a:prstGeom prst="rect">
+                <a:avLst/>
+              </a:prstGeom>
+            </p:spPr>
+            <p:style>
+              <a:lnRef idx="2">
+                <a:schemeClr val="accent5">
+                  <a:shade val="50000"/>
+                </a:schemeClr>
+              </a:lnRef>
+              <a:fillRef idx="1">
+                <a:schemeClr val="accent5"/>
+              </a:fillRef>
+              <a:effectRef idx="0">
+                <a:schemeClr val="accent5"/>
+              </a:effectRef>
+              <a:fontRef idx="minor">
+                <a:schemeClr val="lt1"/>
+              </a:fontRef>
+            </p:style>
+            <p:txBody>
+              <a:bodyPr rtlCol="0" anchor="ctr"/>
+              <a:lstStyle/>
+              <a:p>
+                <a:pPr algn="ctr"/>
+                <a:r>
+                  <a:rPr lang="en-US" dirty="0" smtClean="0"/>
+                  <a:t>2</a:t>
+                </a:r>
+                <a:endParaRPr lang="en-US" dirty="0"/>
+              </a:p>
+            </p:txBody>
+          </p:sp>
+          <p:sp>
+            <p:nvSpPr>
+              <p:cNvPr id="12" name="Ovaal 11"/>
+              <p:cNvSpPr/>
+              <p:nvPr/>
+            </p:nvSpPr>
+            <p:spPr>
+              <a:xfrm>
+                <a:off x="1167560" y="3016272"/>
+                <a:ext cx="533401" cy="358171"/>
+              </a:xfrm>
+              <a:prstGeom prst="ellipse">
+                <a:avLst/>
+              </a:prstGeom>
+            </p:spPr>
+            <p:style>
+              <a:lnRef idx="2">
+                <a:schemeClr val="accent3">
+                  <a:shade val="50000"/>
+                </a:schemeClr>
+              </a:lnRef>
+              <a:fillRef idx="1">
+                <a:schemeClr val="accent3"/>
+              </a:fillRef>
+              <a:effectRef idx="0">
+                <a:schemeClr val="accent3"/>
+              </a:effectRef>
+              <a:fontRef idx="minor">
+                <a:schemeClr val="lt1"/>
+              </a:fontRef>
+            </p:style>
+            <p:txBody>
+              <a:bodyPr rtlCol="0" anchor="ctr"/>
+              <a:lstStyle/>
+              <a:p>
+                <a:pPr algn="ctr"/>
+                <a:endParaRPr lang="en-US"/>
+              </a:p>
+            </p:txBody>
+          </p:sp>
+        </p:grpSp>
+      </p:grpSp>
+      <p:grpSp>
+        <p:nvGrpSpPr>
+          <p:cNvPr id="13" name="Groep 12"/>
+          <p:cNvGrpSpPr/>
+          <p:nvPr/>
+        </p:nvGrpSpPr>
+        <p:grpSpPr>
+          <a:xfrm>
+            <a:off x="2262385" y="2044487"/>
+            <a:ext cx="523954" cy="609600"/>
+            <a:chOff x="2362200" y="1387185"/>
+            <a:chExt cx="523954" cy="609600"/>
+          </a:xfrm>
+        </p:grpSpPr>
+        <p:sp>
+          <p:nvSpPr>
+            <p:cNvPr id="14" name="Rechthoek 13"/>
+            <p:cNvSpPr/>
+            <p:nvPr/>
+          </p:nvSpPr>
+          <p:spPr>
+            <a:xfrm>
+              <a:off x="2362200" y="1387185"/>
+              <a:ext cx="523954" cy="152400"/>
+            </a:xfrm>
+            <a:prstGeom prst="rect">
+              <a:avLst/>
+            </a:prstGeom>
+            <a:ln>
+              <a:solidFill>
+                <a:schemeClr val="tx1"/>
+              </a:solidFill>
+            </a:ln>
+          </p:spPr>
+          <p:style>
+            <a:lnRef idx="2">
+              <a:schemeClr val="accent1"/>
+            </a:lnRef>
+            <a:fillRef idx="1">
+              <a:schemeClr val="lt1"/>
+            </a:fillRef>
+            <a:effectRef idx="0">
+              <a:schemeClr val="accent1"/>
+            </a:effectRef>
+            <a:fontRef idx="minor">
+              <a:schemeClr val="dk1"/>
+            </a:fontRef>
+          </p:style>
+          <p:txBody>
+            <a:bodyPr rtlCol="0" anchor="ctr"/>
+            <a:lstStyle/>
+            <a:p>
+              <a:pPr algn="ctr"/>
+              <a:r>
+                <a:rPr lang="en-US" sz="1100" dirty="0" smtClean="0"/>
+                <a:t>10</a:t>
+              </a:r>
+              <a:endParaRPr lang="en-US" sz="1100" dirty="0"/>
+            </a:p>
+          </p:txBody>
+        </p:sp>
+        <p:sp>
+          <p:nvSpPr>
+            <p:cNvPr id="15" name="Rechthoek 14"/>
+            <p:cNvSpPr/>
+            <p:nvPr/>
+          </p:nvSpPr>
+          <p:spPr>
+            <a:xfrm>
+              <a:off x="2362200" y="1539585"/>
+              <a:ext cx="523954" cy="152400"/>
+            </a:xfrm>
+            <a:prstGeom prst="rect">
+              <a:avLst/>
+            </a:prstGeom>
+            <a:ln>
+              <a:solidFill>
+                <a:schemeClr val="tx1"/>
+              </a:solidFill>
+            </a:ln>
+          </p:spPr>
+          <p:style>
+            <a:lnRef idx="2">
+              <a:schemeClr val="accent1"/>
+            </a:lnRef>
+            <a:fillRef idx="1">
+              <a:schemeClr val="lt1"/>
+            </a:fillRef>
+            <a:effectRef idx="0">
+              <a:schemeClr val="accent1"/>
+            </a:effectRef>
+            <a:fontRef idx="minor">
+              <a:schemeClr val="dk1"/>
+            </a:fontRef>
+          </p:style>
+          <p:txBody>
+            <a:bodyPr rtlCol="0" anchor="ctr"/>
+            <a:lstStyle/>
+            <a:p>
+              <a:pPr algn="ctr"/>
+              <a:r>
+                <a:rPr lang="en-US" sz="1100" dirty="0" smtClean="0"/>
+                <a:t>23</a:t>
+              </a:r>
+              <a:endParaRPr lang="en-US" sz="1100" dirty="0"/>
+            </a:p>
+          </p:txBody>
+        </p:sp>
+        <p:sp>
+          <p:nvSpPr>
+            <p:cNvPr id="16" name="Rechthoek 15"/>
+            <p:cNvSpPr/>
+            <p:nvPr/>
+          </p:nvSpPr>
+          <p:spPr>
+            <a:xfrm>
+              <a:off x="2362200" y="1691985"/>
+              <a:ext cx="523954" cy="152400"/>
+            </a:xfrm>
+            <a:prstGeom prst="rect">
+              <a:avLst/>
+            </a:prstGeom>
+            <a:solidFill>
+              <a:srgbClr val="FF6633"/>
+            </a:solidFill>
+            <a:ln>
+              <a:solidFill>
+                <a:schemeClr val="tx1"/>
+              </a:solidFill>
+            </a:ln>
+          </p:spPr>
+          <p:style>
+            <a:lnRef idx="2">
+              <a:schemeClr val="accent1"/>
+            </a:lnRef>
+            <a:fillRef idx="1">
+              <a:schemeClr val="lt1"/>
+            </a:fillRef>
+            <a:effectRef idx="0">
+              <a:schemeClr val="accent1"/>
+            </a:effectRef>
+            <a:fontRef idx="minor">
+              <a:schemeClr val="dk1"/>
+            </a:fontRef>
+          </p:style>
+          <p:txBody>
+            <a:bodyPr rtlCol="0" anchor="ctr"/>
+            <a:lstStyle/>
+            <a:p>
+              <a:pPr algn="ctr"/>
+              <a:r>
+                <a:rPr lang="en-US" sz="1100" dirty="0"/>
+                <a:t>8000</a:t>
+              </a:r>
+              <a:endParaRPr lang="en-US" sz="1100" dirty="0"/>
+            </a:p>
+          </p:txBody>
+        </p:sp>
+        <p:sp>
+          <p:nvSpPr>
+            <p:cNvPr id="17" name="Rechthoek 16"/>
+            <p:cNvSpPr/>
+            <p:nvPr/>
+          </p:nvSpPr>
+          <p:spPr>
+            <a:xfrm>
+              <a:off x="2362200" y="1844385"/>
+              <a:ext cx="523954" cy="152400"/>
+            </a:xfrm>
+            <a:prstGeom prst="rect">
+              <a:avLst/>
+            </a:prstGeom>
+            <a:ln>
+              <a:solidFill>
+                <a:schemeClr val="tx1"/>
+              </a:solidFill>
+            </a:ln>
+          </p:spPr>
+          <p:style>
+            <a:lnRef idx="2">
+              <a:schemeClr val="accent1"/>
+            </a:lnRef>
+            <a:fillRef idx="1">
+              <a:schemeClr val="lt1"/>
+            </a:fillRef>
+            <a:effectRef idx="0">
+              <a:schemeClr val="accent1"/>
+            </a:effectRef>
+            <a:fontRef idx="minor">
+              <a:schemeClr val="dk1"/>
+            </a:fontRef>
+          </p:style>
+          <p:txBody>
+            <a:bodyPr rtlCol="0" anchor="ctr"/>
+            <a:lstStyle/>
+            <a:p>
+              <a:pPr algn="ctr"/>
+              <a:r>
+                <a:rPr lang="en-US" sz="1100" dirty="0" smtClean="0"/>
+                <a:t>8080</a:t>
+              </a:r>
+              <a:endParaRPr lang="en-US" sz="1100" dirty="0"/>
+            </a:p>
+          </p:txBody>
+        </p:sp>
+      </p:grpSp>
+      <p:cxnSp>
+        <p:nvCxnSpPr>
+          <p:cNvPr id="18" name="Rechte verbindingslijn met pijl 17"/>
+          <p:cNvCxnSpPr>
+            <a:stCxn id="16" idx="3"/>
+            <a:endCxn id="21" idx="1"/>
+          </p:cNvCxnSpPr>
+          <p:nvPr/>
+        </p:nvCxnSpPr>
+        <p:spPr>
+          <a:xfrm flipV="1">
+            <a:off x="2786339" y="2351135"/>
+            <a:ext cx="515766" cy="74352"/>
+          </a:xfrm>
+          <a:prstGeom prst="straightConnector1">
+            <a:avLst/>
+          </a:prstGeom>
+          <a:ln>
+            <a:tailEnd type="arrow"/>
+          </a:ln>
+        </p:spPr>
+        <p:style>
+          <a:lnRef idx="1">
+            <a:schemeClr val="accent1"/>
+          </a:lnRef>
+          <a:fillRef idx="0">
+            <a:schemeClr val="accent1"/>
+          </a:fillRef>
+          <a:effectRef idx="0">
+            <a:schemeClr val="accent1"/>
+          </a:effectRef>
+          <a:fontRef idx="minor">
+            <a:schemeClr val="tx1"/>
+          </a:fontRef>
+        </p:style>
+      </p:cxnSp>
+      <p:sp>
+        <p:nvSpPr>
+          <p:cNvPr id="19" name="Afgeronde rechthoek 18"/>
+          <p:cNvSpPr/>
+          <p:nvPr/>
+        </p:nvSpPr>
+        <p:spPr>
+          <a:xfrm>
+            <a:off x="3481585" y="1755346"/>
+            <a:ext cx="914400" cy="914400"/>
+          </a:xfrm>
+          <a:prstGeom prst="roundRect">
+            <a:avLst/>
+          </a:prstGeom>
+        </p:spPr>
+        <p:style>
+          <a:lnRef idx="3">
+            <a:schemeClr val="lt1"/>
+          </a:lnRef>
+          <a:fillRef idx="1">
+            <a:schemeClr val="accent3"/>
+          </a:fillRef>
+          <a:effectRef idx="1">
+            <a:schemeClr val="accent3"/>
+          </a:effectRef>
+          <a:fontRef idx="minor">
+            <a:schemeClr val="lt1"/>
+          </a:fontRef>
+        </p:style>
+        <p:txBody>
+          <a:bodyPr rtlCol="0" anchor="t"/>
+          <a:lstStyle/>
+          <a:p>
+            <a:pPr algn="ctr"/>
+            <a:r>
+              <a:rPr lang="en-US" dirty="0" smtClean="0"/>
+              <a:t>telnet</a:t>
+            </a:r>
+            <a:endParaRPr lang="en-US" dirty="0"/>
+          </a:p>
+        </p:txBody>
+      </p:sp>
+      <p:sp>
+        <p:nvSpPr>
+          <p:cNvPr id="20" name="Afgeronde rechthoek 19"/>
+          <p:cNvSpPr/>
+          <p:nvPr/>
+        </p:nvSpPr>
+        <p:spPr>
+          <a:xfrm>
+            <a:off x="3150965" y="2455088"/>
+            <a:ext cx="914400" cy="498765"/>
+          </a:xfrm>
+          <a:prstGeom prst="roundRect">
+            <a:avLst/>
+          </a:prstGeom>
+        </p:spPr>
+        <p:style>
+          <a:lnRef idx="3">
+            <a:schemeClr val="lt1"/>
+          </a:lnRef>
+          <a:fillRef idx="1">
+            <a:schemeClr val="accent3"/>
+          </a:fillRef>
+          <a:effectRef idx="1">
+            <a:schemeClr val="accent3"/>
+          </a:effectRef>
+          <a:fontRef idx="minor">
+            <a:schemeClr val="lt1"/>
+          </a:fontRef>
+        </p:style>
+        <p:txBody>
+          <a:bodyPr rtlCol="0" anchor="b"/>
+          <a:lstStyle/>
+          <a:p>
+            <a:pPr algn="ctr"/>
+            <a:r>
+              <a:rPr lang="en-US" dirty="0" smtClean="0"/>
+              <a:t>ftp</a:t>
+            </a:r>
+            <a:endParaRPr lang="en-US" dirty="0"/>
+          </a:p>
+        </p:txBody>
+      </p:sp>
+      <p:sp>
+        <p:nvSpPr>
+          <p:cNvPr id="21" name="Afgeronde rechthoek 20"/>
+          <p:cNvSpPr/>
+          <p:nvPr/>
+        </p:nvSpPr>
+        <p:spPr>
+          <a:xfrm>
+            <a:off x="3302105" y="2032523"/>
+            <a:ext cx="914400" cy="637223"/>
+          </a:xfrm>
+          <a:prstGeom prst="roundRect">
+            <a:avLst/>
+          </a:prstGeom>
+        </p:spPr>
+        <p:style>
+          <a:lnRef idx="2">
+            <a:schemeClr val="accent1">
+              <a:shade val="50000"/>
+            </a:schemeClr>
+          </a:lnRef>
+          <a:fillRef idx="1">
+            <a:schemeClr val="accent1"/>
+          </a:fillRef>
+          <a:effectRef idx="0">
+            <a:schemeClr val="accent1"/>
+          </a:effectRef>
+          <a:fontRef idx="minor">
+            <a:schemeClr val="lt1"/>
+          </a:fontRef>
+        </p:style>
+        <p:txBody>
+          <a:bodyPr rtlCol="0" anchor="t"/>
+          <a:lstStyle/>
+          <a:p>
+            <a:pPr algn="ctr"/>
+            <a:r>
+              <a:rPr lang="en-US" dirty="0" smtClean="0"/>
+              <a:t>demo</a:t>
+            </a:r>
+            <a:endParaRPr lang="en-US" dirty="0"/>
+          </a:p>
+        </p:txBody>
+      </p:sp>
+      <p:grpSp>
+        <p:nvGrpSpPr>
+          <p:cNvPr id="22" name="Groep 21"/>
+          <p:cNvGrpSpPr/>
+          <p:nvPr/>
+        </p:nvGrpSpPr>
+        <p:grpSpPr>
+          <a:xfrm>
+            <a:off x="2698305" y="3454461"/>
+            <a:ext cx="914400" cy="609600"/>
+            <a:chOff x="835995" y="2800350"/>
+            <a:chExt cx="914400" cy="609600"/>
+          </a:xfrm>
+        </p:grpSpPr>
+        <p:sp>
+          <p:nvSpPr>
+            <p:cNvPr id="23" name="Rechthoek 22"/>
+            <p:cNvSpPr/>
+            <p:nvPr/>
+          </p:nvSpPr>
+          <p:spPr>
+            <a:xfrm>
+              <a:off x="835995" y="2800350"/>
+              <a:ext cx="914400" cy="609600"/>
+            </a:xfrm>
+            <a:prstGeom prst="rect">
+              <a:avLst/>
+            </a:prstGeom>
+          </p:spPr>
+          <p:style>
+            <a:lnRef idx="2">
+              <a:schemeClr val="accent1">
+                <a:shade val="50000"/>
+              </a:schemeClr>
+            </a:lnRef>
+            <a:fillRef idx="1">
+              <a:schemeClr val="accent1"/>
+            </a:fillRef>
+            <a:effectRef idx="0">
+              <a:schemeClr val="accent1"/>
+            </a:effectRef>
+            <a:fontRef idx="minor">
+              <a:schemeClr val="lt1"/>
+            </a:fontRef>
+          </p:style>
+          <p:txBody>
+            <a:bodyPr rtlCol="0" anchor="ctr"/>
+            <a:lstStyle/>
+            <a:p>
+              <a:pPr algn="ctr"/>
+              <a:endParaRPr lang="en-US"/>
+            </a:p>
+          </p:txBody>
+        </p:sp>
+        <p:sp>
+          <p:nvSpPr>
+            <p:cNvPr id="24" name="Rechthoek 23"/>
+            <p:cNvSpPr/>
+            <p:nvPr/>
+          </p:nvSpPr>
+          <p:spPr>
+            <a:xfrm>
+              <a:off x="845441" y="2853721"/>
+              <a:ext cx="523954" cy="152400"/>
+            </a:xfrm>
+            <a:prstGeom prst="rect">
+              <a:avLst/>
+            </a:prstGeom>
+          </p:spPr>
+          <p:style>
+            <a:lnRef idx="2">
+              <a:schemeClr val="accent5">
+                <a:shade val="50000"/>
+              </a:schemeClr>
+            </a:lnRef>
+            <a:fillRef idx="1">
+              <a:schemeClr val="accent5"/>
+            </a:fillRef>
+            <a:effectRef idx="0">
+              <a:schemeClr val="accent5"/>
+            </a:effectRef>
+            <a:fontRef idx="minor">
+              <a:schemeClr val="lt1"/>
+            </a:fontRef>
+          </p:style>
+          <p:txBody>
+            <a:bodyPr rtlCol="0" anchor="ctr"/>
+            <a:lstStyle/>
+            <a:p>
+              <a:pPr algn="ctr"/>
+              <a:r>
+                <a:rPr lang="en-US" dirty="0" smtClean="0"/>
+                <a:t>2</a:t>
+              </a:r>
+              <a:endParaRPr lang="en-US" dirty="0"/>
+            </a:p>
+          </p:txBody>
+        </p:sp>
+        <p:sp>
+          <p:nvSpPr>
+            <p:cNvPr id="25" name="Ovaal 24"/>
+            <p:cNvSpPr/>
+            <p:nvPr/>
+          </p:nvSpPr>
+          <p:spPr>
+            <a:xfrm>
+              <a:off x="1167560" y="3016272"/>
+              <a:ext cx="533401" cy="358171"/>
+            </a:xfrm>
+            <a:prstGeom prst="ellipse">
+              <a:avLst/>
+            </a:prstGeom>
+          </p:spPr>
+          <p:style>
+            <a:lnRef idx="2">
+              <a:schemeClr val="accent3">
+                <a:shade val="50000"/>
+              </a:schemeClr>
+            </a:lnRef>
+            <a:fillRef idx="1">
+              <a:schemeClr val="accent3"/>
+            </a:fillRef>
+            <a:effectRef idx="0">
+              <a:schemeClr val="accent3"/>
+            </a:effectRef>
+            <a:fontRef idx="minor">
+              <a:schemeClr val="lt1"/>
+            </a:fontRef>
+          </p:style>
+          <p:txBody>
+            <a:bodyPr rtlCol="0" anchor="ctr"/>
+            <a:lstStyle/>
+            <a:p>
+              <a:pPr algn="ctr"/>
+              <a:endParaRPr lang="en-US"/>
+            </a:p>
+          </p:txBody>
+        </p:sp>
+      </p:grpSp>
+      <p:cxnSp>
+        <p:nvCxnSpPr>
+          <p:cNvPr id="26" name="Rechte verbindingslijn met pijl 25"/>
+          <p:cNvCxnSpPr>
+            <a:stCxn id="21" idx="2"/>
+            <a:endCxn id="23" idx="0"/>
+          </p:cNvCxnSpPr>
+          <p:nvPr/>
+        </p:nvCxnSpPr>
+        <p:spPr>
+          <a:xfrm flipH="1">
+            <a:off x="3155505" y="2669746"/>
+            <a:ext cx="603800" cy="784715"/>
+          </a:xfrm>
+          <a:prstGeom prst="straightConnector1">
+            <a:avLst/>
+          </a:prstGeom>
+          <a:ln w="28575">
+            <a:solidFill>
+              <a:schemeClr val="tx1"/>
+            </a:solidFill>
+            <a:tailEnd type="arrow"/>
+          </a:ln>
+        </p:spPr>
+        <p:style>
+          <a:lnRef idx="1">
+            <a:schemeClr val="accent1"/>
+          </a:lnRef>
+          <a:fillRef idx="0">
+            <a:schemeClr val="accent1"/>
+          </a:fillRef>
+          <a:effectRef idx="0">
+            <a:schemeClr val="accent1"/>
+          </a:effectRef>
+          <a:fontRef idx="minor">
+            <a:schemeClr val="tx1"/>
+          </a:fontRef>
+        </p:style>
+      </p:cxnSp>
+      <p:grpSp>
+        <p:nvGrpSpPr>
+          <p:cNvPr id="32" name="Groep 31"/>
+          <p:cNvGrpSpPr/>
+          <p:nvPr/>
+        </p:nvGrpSpPr>
+        <p:grpSpPr>
+          <a:xfrm>
+            <a:off x="5029200" y="1907746"/>
+            <a:ext cx="523954" cy="304800"/>
+            <a:chOff x="5029200" y="1907746"/>
+            <a:chExt cx="523954" cy="304800"/>
+          </a:xfrm>
+        </p:grpSpPr>
+        <p:sp>
+          <p:nvSpPr>
+            <p:cNvPr id="28" name="Rechthoek 27"/>
+            <p:cNvSpPr/>
+            <p:nvPr/>
+          </p:nvSpPr>
+          <p:spPr>
+            <a:xfrm>
+              <a:off x="5029200" y="1907746"/>
+              <a:ext cx="523954" cy="152400"/>
+            </a:xfrm>
+            <a:prstGeom prst="rect">
+              <a:avLst/>
+            </a:prstGeom>
+            <a:ln>
+              <a:solidFill>
+                <a:schemeClr val="tx1"/>
+              </a:solidFill>
+            </a:ln>
+          </p:spPr>
+          <p:style>
+            <a:lnRef idx="2">
+              <a:schemeClr val="accent1"/>
+            </a:lnRef>
+            <a:fillRef idx="1">
+              <a:schemeClr val="lt1"/>
+            </a:fillRef>
+            <a:effectRef idx="0">
+              <a:schemeClr val="accent1"/>
+            </a:effectRef>
+            <a:fontRef idx="minor">
+              <a:schemeClr val="dk1"/>
+            </a:fontRef>
+          </p:style>
+          <p:txBody>
+            <a:bodyPr rtlCol="0" anchor="ctr"/>
+            <a:lstStyle/>
+            <a:p>
+              <a:pPr algn="ctr"/>
+              <a:r>
+                <a:rPr lang="en-US" sz="1100" dirty="0" smtClean="0"/>
+                <a:t>0x01</a:t>
+              </a:r>
+              <a:endParaRPr lang="en-US" sz="1100" dirty="0"/>
+            </a:p>
+          </p:txBody>
+        </p:sp>
+        <p:sp>
+          <p:nvSpPr>
+            <p:cNvPr id="29" name="Rechthoek 28"/>
+            <p:cNvSpPr/>
+            <p:nvPr/>
+          </p:nvSpPr>
+          <p:spPr>
+            <a:xfrm>
+              <a:off x="5029200" y="2060146"/>
+              <a:ext cx="523954" cy="152400"/>
+            </a:xfrm>
+            <a:prstGeom prst="rect">
+              <a:avLst/>
+            </a:prstGeom>
+            <a:ln>
+              <a:solidFill>
+                <a:schemeClr val="tx1"/>
+              </a:solidFill>
+            </a:ln>
+          </p:spPr>
+          <p:style>
+            <a:lnRef idx="2">
+              <a:schemeClr val="accent1"/>
+            </a:lnRef>
+            <a:fillRef idx="1">
+              <a:schemeClr val="lt1"/>
+            </a:fillRef>
+            <a:effectRef idx="0">
+              <a:schemeClr val="accent1"/>
+            </a:effectRef>
+            <a:fontRef idx="minor">
+              <a:schemeClr val="dk1"/>
+            </a:fontRef>
+          </p:style>
+          <p:txBody>
+            <a:bodyPr rtlCol="0" anchor="ctr"/>
+            <a:lstStyle/>
+            <a:p>
+              <a:pPr algn="ctr"/>
+              <a:r>
+                <a:rPr lang="en-US" sz="1100" dirty="0" smtClean="0"/>
+                <a:t>0x02</a:t>
+              </a:r>
+              <a:endParaRPr lang="en-US" sz="1100" dirty="0"/>
+            </a:p>
+          </p:txBody>
+        </p:sp>
+      </p:grpSp>
+      <p:cxnSp>
+        <p:nvCxnSpPr>
+          <p:cNvPr id="33" name="Rechte verbindingslijn met pijl 32"/>
+          <p:cNvCxnSpPr>
+            <a:stCxn id="21" idx="3"/>
+            <a:endCxn id="29" idx="1"/>
+          </p:cNvCxnSpPr>
+          <p:nvPr/>
+        </p:nvCxnSpPr>
+        <p:spPr>
+          <a:xfrm flipV="1">
+            <a:off x="4216505" y="2136346"/>
+            <a:ext cx="812695" cy="214789"/>
+          </a:xfrm>
+          <a:prstGeom prst="straightConnector1">
+            <a:avLst/>
+          </a:prstGeom>
+          <a:ln>
+            <a:tailEnd type="arrow"/>
+          </a:ln>
+        </p:spPr>
+        <p:style>
+          <a:lnRef idx="1">
+            <a:schemeClr val="accent1"/>
+          </a:lnRef>
+          <a:fillRef idx="0">
+            <a:schemeClr val="accent1"/>
+          </a:fillRef>
+          <a:effectRef idx="0">
+            <a:schemeClr val="accent1"/>
+          </a:effectRef>
+          <a:fontRef idx="minor">
+            <a:schemeClr val="tx1"/>
+          </a:fontRef>
+        </p:style>
+      </p:cxnSp>
+      <p:sp>
+        <p:nvSpPr>
+          <p:cNvPr id="40" name="Afgeronde rechthoek 39"/>
+          <p:cNvSpPr/>
+          <p:nvPr/>
+        </p:nvSpPr>
+        <p:spPr>
+          <a:xfrm>
+            <a:off x="6019800" y="1494396"/>
+            <a:ext cx="914400" cy="637223"/>
+          </a:xfrm>
+          <a:prstGeom prst="roundRect">
+            <a:avLst/>
+          </a:prstGeom>
+        </p:spPr>
+        <p:style>
+          <a:lnRef idx="2">
+            <a:schemeClr val="accent1">
+              <a:shade val="50000"/>
+            </a:schemeClr>
+          </a:lnRef>
+          <a:fillRef idx="1">
+            <a:schemeClr val="accent1"/>
+          </a:fillRef>
+          <a:effectRef idx="0">
+            <a:schemeClr val="accent1"/>
+          </a:effectRef>
+          <a:fontRef idx="minor">
+            <a:schemeClr val="lt1"/>
+          </a:fontRef>
+        </p:style>
+        <p:txBody>
+          <a:bodyPr rtlCol="0" anchor="t"/>
+          <a:lstStyle/>
+          <a:p>
+            <a:pPr algn="ctr"/>
+            <a:r>
+              <a:rPr lang="en-US" dirty="0" err="1"/>
+              <a:t>d</a:t>
+            </a:r>
+            <a:r>
+              <a:rPr lang="en-US" dirty="0" err="1" smtClean="0"/>
+              <a:t>emo.short</a:t>
+            </a:r>
+            <a:endParaRPr lang="en-US" dirty="0"/>
+          </a:p>
+        </p:txBody>
+      </p:sp>
+      <p:sp>
+        <p:nvSpPr>
+          <p:cNvPr id="41" name="Afgeronde rechthoek 40"/>
+          <p:cNvSpPr/>
+          <p:nvPr/>
+        </p:nvSpPr>
+        <p:spPr>
+          <a:xfrm>
+            <a:off x="6030506" y="2351848"/>
+            <a:ext cx="914400" cy="637223"/>
+          </a:xfrm>
+          <a:prstGeom prst="roundRect">
+            <a:avLst/>
+          </a:prstGeom>
+        </p:spPr>
+        <p:style>
+          <a:lnRef idx="2">
+            <a:schemeClr val="accent1">
+              <a:shade val="50000"/>
+            </a:schemeClr>
+          </a:lnRef>
+          <a:fillRef idx="1">
+            <a:schemeClr val="accent1"/>
+          </a:fillRef>
+          <a:effectRef idx="0">
+            <a:schemeClr val="accent1"/>
+          </a:effectRef>
+          <a:fontRef idx="minor">
+            <a:schemeClr val="lt1"/>
+          </a:fontRef>
+        </p:style>
+        <p:txBody>
+          <a:bodyPr rtlCol="0" anchor="t"/>
+          <a:lstStyle/>
+          <a:p>
+            <a:pPr algn="ctr"/>
+            <a:r>
+              <a:rPr lang="en-US" dirty="0" err="1" smtClean="0"/>
+              <a:t>d</a:t>
+            </a:r>
+            <a:r>
+              <a:rPr lang="en-US" dirty="0" err="1" smtClean="0"/>
+              <a:t>emo.large</a:t>
+            </a:r>
+            <a:endParaRPr lang="en-US" dirty="0"/>
+          </a:p>
+        </p:txBody>
+      </p:sp>
+      <p:cxnSp>
+        <p:nvCxnSpPr>
+          <p:cNvPr id="42" name="Rechte verbindingslijn met pijl 41"/>
+          <p:cNvCxnSpPr>
+            <a:stCxn id="28" idx="3"/>
+            <a:endCxn id="40" idx="1"/>
+          </p:cNvCxnSpPr>
+          <p:nvPr/>
+        </p:nvCxnSpPr>
+        <p:spPr>
+          <a:xfrm flipV="1">
+            <a:off x="5553154" y="1813008"/>
+            <a:ext cx="466646" cy="170938"/>
+          </a:xfrm>
+          <a:prstGeom prst="straightConnector1">
+            <a:avLst/>
+          </a:prstGeom>
+          <a:ln>
+            <a:tailEnd type="arrow"/>
+          </a:ln>
+        </p:spPr>
+        <p:style>
+          <a:lnRef idx="1">
+            <a:schemeClr val="accent1"/>
+          </a:lnRef>
+          <a:fillRef idx="0">
+            <a:schemeClr val="accent1"/>
+          </a:fillRef>
+          <a:effectRef idx="0">
+            <a:schemeClr val="accent1"/>
+          </a:effectRef>
+          <a:fontRef idx="minor">
+            <a:schemeClr val="tx1"/>
+          </a:fontRef>
+        </p:style>
+      </p:cxnSp>
+      <p:cxnSp>
+        <p:nvCxnSpPr>
+          <p:cNvPr id="43" name="Rechte verbindingslijn met pijl 42"/>
+          <p:cNvCxnSpPr>
+            <a:stCxn id="29" idx="3"/>
+            <a:endCxn id="41" idx="1"/>
+          </p:cNvCxnSpPr>
+          <p:nvPr/>
+        </p:nvCxnSpPr>
+        <p:spPr>
+          <a:xfrm>
+            <a:off x="5553154" y="2136346"/>
+            <a:ext cx="477352" cy="534114"/>
+          </a:xfrm>
+          <a:prstGeom prst="straightConnector1">
+            <a:avLst/>
+          </a:prstGeom>
+          <a:ln>
+            <a:tailEnd type="arrow"/>
+          </a:ln>
+        </p:spPr>
+        <p:style>
+          <a:lnRef idx="1">
+            <a:schemeClr val="accent1"/>
+          </a:lnRef>
+          <a:fillRef idx="0">
+            <a:schemeClr val="accent1"/>
+          </a:fillRef>
+          <a:effectRef idx="0">
+            <a:schemeClr val="accent1"/>
+          </a:effectRef>
+          <a:fontRef idx="minor">
+            <a:schemeClr val="tx1"/>
+          </a:fontRef>
+        </p:style>
+      </p:cxnSp>
     </p:spTree>
     <p:extLst>
       <p:ext uri="{BB962C8B-B14F-4D97-AF65-F5344CB8AC3E}">
-        <p14:creationId xmlns:p14="http://schemas.microsoft.com/office/powerpoint/2010/main" val="2202936259"/>
+        <p14:creationId xmlns:p14="http://schemas.microsoft.com/office/powerpoint/2010/main" val="1109380603"/>
       </p:ext>
     </p:extLst>
   </p:cSld>
@@ -8333,102 +9571,48 @@
         </p:nvSpPr>
         <p:spPr/>
         <p:txBody>
-          <a:bodyPr/>
-          <a:lstStyle/>
-          <a:p>
-            <a:r>
-              <a:rPr lang="en-US" dirty="0"/>
-              <a:t>Entry </a:t>
-            </a:r>
-            <a:r>
-              <a:rPr lang="en-US" dirty="0" smtClean="0"/>
-              <a:t>points (</a:t>
-            </a:r>
-            <a:r>
-              <a:rPr lang="en-US" dirty="0" smtClean="0">
-                <a:hlinkClick r:id="rId2"/>
-              </a:rPr>
-              <a:t>link</a:t>
-            </a:r>
-            <a:r>
-              <a:rPr lang="en-US" dirty="0" smtClean="0"/>
-              <a:t>)</a:t>
-            </a:r>
-            <a:endParaRPr lang="en-US" dirty="0"/>
+          <a:bodyPr>
+            <a:normAutofit/>
+          </a:bodyPr>
+          <a:lstStyle/>
+          <a:p>
+            <a:r>
+              <a:rPr lang="en-US" smtClean="0"/>
+              <a:t>Plugins</a:t>
+            </a:r>
           </a:p>
           <a:p>
             <a:pPr lvl="1"/>
             <a:r>
-              <a:rPr lang="en-US" i="1" dirty="0"/>
-              <a:t>&lt;personal </a:t>
-            </a:r>
-            <a:r>
-              <a:rPr lang="en-US" i="1" dirty="0" err="1"/>
-              <a:t>config</a:t>
-            </a:r>
-            <a:r>
-              <a:rPr lang="en-US" i="1" dirty="0"/>
-              <a:t> </a:t>
-            </a:r>
-            <a:r>
-              <a:rPr lang="en-US" i="1" dirty="0" err="1"/>
-              <a:t>dir</a:t>
-            </a:r>
-            <a:r>
-              <a:rPr lang="en-US" i="1" dirty="0"/>
-              <a:t>&gt;</a:t>
-            </a:r>
-            <a:r>
-              <a:rPr lang="en-US" dirty="0"/>
-              <a:t>/</a:t>
-            </a:r>
-            <a:r>
-              <a:rPr lang="en-US" dirty="0" err="1" smtClean="0"/>
-              <a:t>init.lua</a:t>
-            </a:r>
-            <a:endParaRPr lang="en-US" dirty="0"/>
+              <a:rPr lang="en-US" smtClean="0"/>
+              <a:t>Compiled (C)</a:t>
+            </a:r>
           </a:p>
           <a:p>
             <a:pPr lvl="1"/>
             <a:r>
-              <a:rPr lang="en-US" dirty="0" err="1" smtClean="0"/>
-              <a:t>Wireshark</a:t>
-            </a:r>
-            <a:r>
-              <a:rPr lang="en-US" dirty="0" smtClean="0"/>
-              <a:t>/plugins</a:t>
+              <a:rPr lang="en-US" smtClean="0"/>
+              <a:t>Dynamic (.so, .dll)</a:t>
             </a:r>
           </a:p>
           <a:p>
             <a:pPr lvl="1"/>
             <a:r>
-              <a:rPr lang="en-US" dirty="0" err="1" smtClean="0"/>
-              <a:t>cmdline</a:t>
-            </a:r>
-            <a:r>
-              <a:rPr lang="en-US" dirty="0" smtClean="0"/>
-              <a:t>:</a:t>
-            </a:r>
-            <a:r>
-              <a:rPr lang="en-US" dirty="0"/>
-              <a:t> </a:t>
-            </a:r>
-            <a:r>
-              <a:rPr lang="en-US" b="1" dirty="0"/>
-              <a:t>-X </a:t>
-            </a:r>
-            <a:r>
-              <a:rPr lang="en-US" b="1" dirty="0" err="1"/>
-              <a:t>lua_script:</a:t>
-            </a:r>
-            <a:r>
-              <a:rPr lang="en-US" i="1" dirty="0" err="1"/>
-              <a:t>xxx.lua</a:t>
-            </a:r>
-            <a:endParaRPr lang="en-US" dirty="0"/>
-          </a:p>
-          <a:p>
-            <a:endParaRPr lang="en-US" dirty="0"/>
+              <a:rPr lang="en-US" smtClean="0"/>
+              <a:t>Python </a:t>
+            </a:r>
+            <a:r>
+              <a:rPr lang="en-US" sz="1600" smtClean="0"/>
+              <a:t>(broken on current windows version)</a:t>
+            </a:r>
+          </a:p>
+          <a:p>
+            <a:pPr lvl="1"/>
+            <a:r>
+              <a:rPr lang="en-US" smtClean="0"/>
+              <a:t>Lua</a:t>
+            </a:r>
+            <a:endParaRPr lang="en-US" smtClean="0"/>
           </a:p>
         </p:txBody>
       </p:sp>
@@ -8482,7 +9666,7 @@
     </p:spTree>
     <p:extLst>
       <p:ext uri="{BB962C8B-B14F-4D97-AF65-F5344CB8AC3E}">
-        <p14:creationId xmlns:p14="http://schemas.microsoft.com/office/powerpoint/2010/main" val="731832516"/>
+        <p14:creationId xmlns:p14="http://schemas.microsoft.com/office/powerpoint/2010/main" val="2202936259"/>
       </p:ext>
     </p:extLst>
   </p:cSld>
@@ -8526,7 +9710,11 @@
           <a:p>
             <a:r>
               <a:rPr lang="en-US" dirty="0" smtClean="0"/>
-              <a:t>Example Dissector Dissected</a:t>
+              <a:t>Dissector </a:t>
+            </a:r>
+            <a:r>
+              <a:rPr lang="en-US" dirty="0" smtClean="0"/>
+              <a:t>Architecture</a:t>
             </a:r>
             <a:endParaRPr lang="en-US" dirty="0"/>
           </a:p>
@@ -8546,6 +9734,98 @@
         <p:txBody>
           <a:bodyPr/>
           <a:lstStyle/>
+          <a:p>
+            <a:r>
+              <a:rPr lang="en-US" dirty="0"/>
+              <a:t>Entry </a:t>
+            </a:r>
+            <a:r>
+              <a:rPr lang="en-US" dirty="0" smtClean="0"/>
+              <a:t>points (</a:t>
+            </a:r>
+            <a:r>
+              <a:rPr lang="en-US" dirty="0" smtClean="0">
+                <a:hlinkClick r:id="rId2"/>
+              </a:rPr>
+              <a:t>link</a:t>
+            </a:r>
+            <a:r>
+              <a:rPr lang="en-US" dirty="0" smtClean="0"/>
+              <a:t>)</a:t>
+            </a:r>
+            <a:endParaRPr lang="en-US" dirty="0"/>
+          </a:p>
+          <a:p>
+            <a:pPr lvl="1"/>
+            <a:r>
+              <a:rPr lang="en-US" i="1" dirty="0"/>
+              <a:t>&lt;personal </a:t>
+            </a:r>
+            <a:r>
+              <a:rPr lang="en-US" i="1" dirty="0" err="1"/>
+              <a:t>config</a:t>
+            </a:r>
+            <a:r>
+              <a:rPr lang="en-US" i="1" dirty="0"/>
+              <a:t> </a:t>
+            </a:r>
+            <a:r>
+              <a:rPr lang="en-US" i="1" dirty="0" err="1"/>
+              <a:t>dir</a:t>
+            </a:r>
+            <a:r>
+              <a:rPr lang="en-US" i="1" dirty="0"/>
+              <a:t>&gt;</a:t>
+            </a:r>
+            <a:r>
+              <a:rPr lang="en-US" dirty="0"/>
+              <a:t>/</a:t>
+            </a:r>
+            <a:r>
+              <a:rPr lang="en-US" dirty="0" err="1" smtClean="0"/>
+              <a:t>init.lua</a:t>
+            </a:r>
+            <a:endParaRPr lang="en-US" dirty="0"/>
+          </a:p>
+          <a:p>
+            <a:pPr lvl="1"/>
+            <a:r>
+              <a:rPr lang="en-US" dirty="0" err="1" smtClean="0"/>
+              <a:t>Wireshark</a:t>
+            </a:r>
+            <a:r>
+              <a:rPr lang="en-US" dirty="0" smtClean="0"/>
+              <a:t>/plugins</a:t>
+            </a:r>
+          </a:p>
+          <a:p>
+            <a:pPr lvl="1"/>
+            <a:r>
+              <a:rPr lang="en-US" dirty="0" err="1" smtClean="0"/>
+              <a:t>cmdline</a:t>
+            </a:r>
+            <a:r>
+              <a:rPr lang="en-US" dirty="0" smtClean="0"/>
+              <a:t>:</a:t>
+            </a:r>
+            <a:r>
+              <a:rPr lang="en-US" dirty="0"/>
+              <a:t> </a:t>
+            </a:r>
+            <a:r>
+              <a:rPr lang="en-US" b="1" dirty="0"/>
+              <a:t>-X </a:t>
+            </a:r>
+            <a:r>
+              <a:rPr lang="en-US" b="1" dirty="0" err="1"/>
+              <a:t>lua_script:</a:t>
+            </a:r>
+            <a:r>
+              <a:rPr lang="en-US" i="1" dirty="0" err="1"/>
+              <a:t>xxx.lua</a:t>
+            </a:r>
+            <a:endParaRPr lang="en-US" dirty="0"/>
+          </a:p>
           <a:p>
             <a:endParaRPr lang="en-US" dirty="0"/>
           </a:p>
@@ -8601,7 +9881,7 @@
     </p:spTree>
     <p:extLst>
       <p:ext uri="{BB962C8B-B14F-4D97-AF65-F5344CB8AC3E}">
-        <p14:creationId xmlns:p14="http://schemas.microsoft.com/office/powerpoint/2010/main" val="1936644907"/>
+        <p14:creationId xmlns:p14="http://schemas.microsoft.com/office/powerpoint/2010/main" val="731832516"/>
       </p:ext>
     </p:extLst>
   </p:cSld>
@@ -8645,7 +9925,7 @@
           <a:p>
             <a:r>
               <a:rPr lang="en-US" dirty="0" smtClean="0"/>
-              <a:t>Links</a:t>
+              <a:t>Example Dissector Dissected</a:t>
             </a:r>
             <a:endParaRPr lang="en-US" dirty="0"/>
           </a:p>
@@ -8666,65 +9946,6 @@
           <a:bodyPr/>
           <a:lstStyle/>
           <a:p>
-            <a:r>
-              <a:rPr lang="en-US" dirty="0"/>
-              <a:t>Getting started: </a:t>
-            </a:r>
-            <a:endParaRPr lang="en-US" dirty="0" smtClean="0"/>
-          </a:p>
-          <a:p>
-            <a:pPr marL="704850" lvl="2" indent="-342900"/>
-            <a:r>
-              <a:rPr lang="en-US" dirty="0">
-                <a:hlinkClick r:id="rId2"/>
-              </a:rPr>
-              <a:t>http://</a:t>
-            </a:r>
-            <a:r>
-              <a:rPr lang="en-US" dirty="0" smtClean="0">
-                <a:hlinkClick r:id="rId2"/>
-              </a:rPr>
-              <a:t>wiki.wireshark.org/Lua</a:t>
-            </a:r>
-            <a:endParaRPr lang="en-US" dirty="0"/>
-          </a:p>
-          <a:p>
-            <a:r>
-              <a:rPr lang="en-US" dirty="0" smtClean="0"/>
-              <a:t>Details</a:t>
-            </a:r>
-          </a:p>
-          <a:p>
-            <a:pPr lvl="1"/>
-            <a:r>
-              <a:rPr lang="en-US" dirty="0" smtClean="0">
-                <a:hlinkClick r:id="rId3"/>
-              </a:rPr>
-              <a:t>http</a:t>
-            </a:r>
-            <a:r>
-              <a:rPr lang="en-US" dirty="0">
-                <a:hlinkClick r:id="rId3"/>
-              </a:rPr>
-              <a:t>://ask.wireshark.org/</a:t>
-            </a:r>
-            <a:endParaRPr lang="en-US" dirty="0"/>
-          </a:p>
-          <a:p>
-            <a:pPr lvl="1"/>
-            <a:r>
-              <a:rPr lang="en-US" dirty="0">
-                <a:hlinkClick r:id="rId4"/>
-              </a:rPr>
-              <a:t>http://stackoverflow.com/</a:t>
-            </a:r>
-            <a:endParaRPr lang="en-US" dirty="0"/>
-          </a:p>
-          <a:p>
-            <a:endParaRPr lang="en-US" dirty="0" smtClean="0"/>
-          </a:p>
-          <a:p>
-            <a:pPr lvl="1"/>
             <a:endParaRPr lang="en-US" dirty="0"/>
           </a:p>
         </p:txBody>
@@ -8779,7 +10000,7 @@
     </p:spTree>
     <p:extLst>
       <p:ext uri="{BB962C8B-B14F-4D97-AF65-F5344CB8AC3E}">
-        <p14:creationId xmlns:p14="http://schemas.microsoft.com/office/powerpoint/2010/main" val="2861604159"/>
+        <p14:creationId xmlns:p14="http://schemas.microsoft.com/office/powerpoint/2010/main" val="1936644907"/>
       </p:ext>
     </p:extLst>
   </p:cSld>

</xml_diff>

<commit_message>
[doc] declaring the protocol
</commit_message>
<xml_diff>
--- a/Lua Wireshark Dissectors.pptx
+++ b/Lua Wireshark Dissectors.pptx
@@ -5,10 +5,10 @@
     <p:sldMasterId id="2147483648" r:id="rId1"/>
   </p:sldMasterIdLst>
   <p:notesMasterIdLst>
-    <p:notesMasterId r:id="rId15"/>
+    <p:notesMasterId r:id="rId16"/>
   </p:notesMasterIdLst>
   <p:handoutMasterIdLst>
-    <p:handoutMasterId r:id="rId16"/>
+    <p:handoutMasterId r:id="rId17"/>
   </p:handoutMasterIdLst>
   <p:sldIdLst>
     <p:sldId id="259" r:id="rId2"/>
@@ -19,11 +19,12 @@
     <p:sldId id="270" r:id="rId7"/>
     <p:sldId id="266" r:id="rId8"/>
     <p:sldId id="267" r:id="rId9"/>
-    <p:sldId id="269" r:id="rId10"/>
-    <p:sldId id="265" r:id="rId11"/>
-    <p:sldId id="264" r:id="rId12"/>
-    <p:sldId id="258" r:id="rId13"/>
-    <p:sldId id="260" r:id="rId14"/>
+    <p:sldId id="271" r:id="rId10"/>
+    <p:sldId id="269" r:id="rId11"/>
+    <p:sldId id="265" r:id="rId12"/>
+    <p:sldId id="264" r:id="rId13"/>
+    <p:sldId id="258" r:id="rId14"/>
+    <p:sldId id="260" r:id="rId15"/>
   </p:sldIdLst>
   <p:sldSz cx="9144000" cy="5143500" type="screen16x9"/>
   <p:notesSz cx="6858000" cy="9144000"/>
@@ -914,42 +915,6 @@
           <a:bodyPr/>
           <a:lstStyle/>
           <a:p>
-            <a:r>
-              <a:rPr lang="en-US" dirty="0" smtClean="0"/>
-              <a:t>alias </a:t>
-            </a:r>
-            <a:r>
-              <a:rPr lang="en-US" dirty="0" err="1" smtClean="0"/>
-              <a:t>wireshark</a:t>
-            </a:r>
-            <a:r>
-              <a:rPr lang="en-US" dirty="0" smtClean="0"/>
-              <a:t>="/c/Program\ Files/</a:t>
-            </a:r>
-            <a:r>
-              <a:rPr lang="en-US" dirty="0" err="1" smtClean="0"/>
-              <a:t>Wireshark</a:t>
-            </a:r>
-            <a:r>
-              <a:rPr lang="en-US" dirty="0" smtClean="0"/>
-              <a:t>/wireshark.exe -</a:t>
-            </a:r>
-            <a:r>
-              <a:rPr lang="en-US" dirty="0" err="1" smtClean="0"/>
-              <a:t>Xlua_script</a:t>
-            </a:r>
-            <a:r>
-              <a:rPr lang="en-US" dirty="0" smtClean="0"/>
-              <a:t>:../</a:t>
-            </a:r>
-            <a:r>
-              <a:rPr lang="en-US" dirty="0" err="1" smtClean="0"/>
-              <a:t>demo.lua</a:t>
-            </a:r>
-            <a:r>
-              <a:rPr lang="en-US" dirty="0" smtClean="0"/>
-              <a:t>"</a:t>
-            </a:r>
             <a:endParaRPr lang="en-US" dirty="0"/>
           </a:p>
         </p:txBody>
@@ -972,7 +937,7 @@
             <a:fld id="{559C4A52-4ACF-44E6-B7A9-3756997F58DA}" type="slidenum">
               <a:rPr lang="en-US" smtClean="0"/>
               <a:pPr/>
-              <a:t>9</a:t>
+              <a:t>10</a:t>
             </a:fld>
             <a:endParaRPr lang="en-US"/>
           </a:p>
@@ -1059,7 +1024,7 @@
             <a:fld id="{559C4A52-4ACF-44E6-B7A9-3756997F58DA}" type="slidenum">
               <a:rPr lang="en-US" smtClean="0"/>
               <a:pPr/>
-              <a:t>13</a:t>
+              <a:t>14</a:t>
             </a:fld>
             <a:endParaRPr lang="en-US"/>
           </a:p>
@@ -4752,7 +4717,7 @@
           <a:p>
             <a:r>
               <a:rPr lang="en-US" dirty="0" smtClean="0"/>
-              <a:t>Links</a:t>
+              <a:t>Example Dissector Dissected</a:t>
             </a:r>
             <a:endParaRPr lang="en-US" dirty="0"/>
           </a:p>
@@ -4773,65 +4738,9 @@
           <a:bodyPr/>
           <a:lstStyle/>
           <a:p>
-            <a:r>
-              <a:rPr lang="en-US" dirty="0"/>
-              <a:t>Getting started: </a:t>
-            </a:r>
             <a:endParaRPr lang="en-US" dirty="0" smtClean="0"/>
           </a:p>
           <a:p>
-            <a:pPr marL="704850" lvl="2" indent="-342900"/>
-            <a:r>
-              <a:rPr lang="en-US" dirty="0">
-                <a:hlinkClick r:id="rId2"/>
-              </a:rPr>
-              <a:t>http://</a:t>
-            </a:r>
-            <a:r>
-              <a:rPr lang="en-US" dirty="0" smtClean="0">
-                <a:hlinkClick r:id="rId2"/>
-              </a:rPr>
-              <a:t>wiki.wireshark.org/Lua</a:t>
-            </a:r>
-            <a:endParaRPr lang="en-US" dirty="0"/>
-          </a:p>
-          <a:p>
-            <a:r>
-              <a:rPr lang="en-US" dirty="0" smtClean="0"/>
-              <a:t>Details</a:t>
-            </a:r>
-          </a:p>
-          <a:p>
-            <a:pPr lvl="1"/>
-            <a:r>
-              <a:rPr lang="en-US" dirty="0" smtClean="0">
-                <a:hlinkClick r:id="rId3"/>
-              </a:rPr>
-              <a:t>http</a:t>
-            </a:r>
-            <a:r>
-              <a:rPr lang="en-US" dirty="0">
-                <a:hlinkClick r:id="rId3"/>
-              </a:rPr>
-              <a:t>://ask.wireshark.org/</a:t>
-            </a:r>
-            <a:endParaRPr lang="en-US" dirty="0"/>
-          </a:p>
-          <a:p>
-            <a:pPr lvl="1"/>
-            <a:r>
-              <a:rPr lang="en-US" dirty="0">
-                <a:hlinkClick r:id="rId4"/>
-              </a:rPr>
-              <a:t>http://stackoverflow.com/</a:t>
-            </a:r>
-            <a:endParaRPr lang="en-US" dirty="0"/>
-          </a:p>
-          <a:p>
-            <a:endParaRPr lang="en-US" dirty="0" smtClean="0"/>
-          </a:p>
-          <a:p>
-            <a:pPr lvl="1"/>
             <a:endParaRPr lang="en-US" dirty="0"/>
           </a:p>
         </p:txBody>
@@ -4886,7 +4795,7 @@
     </p:spTree>
     <p:extLst>
       <p:ext uri="{BB962C8B-B14F-4D97-AF65-F5344CB8AC3E}">
-        <p14:creationId xmlns:p14="http://schemas.microsoft.com/office/powerpoint/2010/main" val="2861604159"/>
+        <p14:creationId xmlns:p14="http://schemas.microsoft.com/office/powerpoint/2010/main" val="1936644907"/>
       </p:ext>
     </p:extLst>
   </p:cSld>
@@ -4928,6 +4837,10 @@
           <a:bodyPr/>
           <a:lstStyle/>
           <a:p>
+            <a:r>
+              <a:rPr lang="en-US" dirty="0" smtClean="0"/>
+              <a:t>Links</a:t>
+            </a:r>
             <a:endParaRPr lang="en-US" dirty="0"/>
           </a:p>
         </p:txBody>
@@ -4948,9 +4861,64 @@
           <a:lstStyle/>
           <a:p>
             <a:r>
+              <a:rPr lang="en-US" dirty="0"/>
+              <a:t>Getting started: </a:t>
+            </a:r>
+            <a:endParaRPr lang="en-US" dirty="0" smtClean="0"/>
+          </a:p>
+          <a:p>
+            <a:pPr marL="704850" lvl="2" indent="-342900"/>
+            <a:r>
+              <a:rPr lang="en-US" dirty="0">
+                <a:hlinkClick r:id="rId2"/>
+              </a:rPr>
+              <a:t>http://</a:t>
+            </a:r>
+            <a:r>
+              <a:rPr lang="en-US" dirty="0" smtClean="0">
+                <a:hlinkClick r:id="rId2"/>
+              </a:rPr>
+              <a:t>wiki.wireshark.org/Lua</a:t>
+            </a:r>
+            <a:endParaRPr lang="en-US" dirty="0"/>
+          </a:p>
+          <a:p>
+            <a:r>
               <a:rPr lang="en-US" dirty="0" smtClean="0"/>
-              <a:t>Finding your entry point</a:t>
-            </a:r>
+              <a:t>Details</a:t>
+            </a:r>
+          </a:p>
+          <a:p>
+            <a:pPr lvl="1"/>
+            <a:r>
+              <a:rPr lang="en-US" dirty="0" smtClean="0">
+                <a:hlinkClick r:id="rId3"/>
+              </a:rPr>
+              <a:t>http</a:t>
+            </a:r>
+            <a:r>
+              <a:rPr lang="en-US" dirty="0">
+                <a:hlinkClick r:id="rId3"/>
+              </a:rPr>
+              <a:t>://ask.wireshark.org/</a:t>
+            </a:r>
+            <a:endParaRPr lang="en-US" dirty="0"/>
+          </a:p>
+          <a:p>
+            <a:pPr lvl="1"/>
+            <a:r>
+              <a:rPr lang="en-US" dirty="0">
+                <a:hlinkClick r:id="rId4"/>
+              </a:rPr>
+              <a:t>http://stackoverflow.com/</a:t>
+            </a:r>
+            <a:endParaRPr lang="en-US" dirty="0"/>
+          </a:p>
+          <a:p>
+            <a:endParaRPr lang="en-US" dirty="0" smtClean="0"/>
+          </a:p>
+          <a:p>
+            <a:pPr lvl="1"/>
             <a:endParaRPr lang="en-US" dirty="0"/>
           </a:p>
         </p:txBody>
@@ -4997,6 +4965,125 @@
               <a:rPr lang="en-US" smtClean="0"/>
               <a:pPr/>
               <a:t>11</a:t>
+            </a:fld>
+            <a:endParaRPr lang="en-US"/>
+          </a:p>
+        </p:txBody>
+      </p:sp>
+    </p:spTree>
+    <p:extLst>
+      <p:ext uri="{BB962C8B-B14F-4D97-AF65-F5344CB8AC3E}">
+        <p14:creationId xmlns:p14="http://schemas.microsoft.com/office/powerpoint/2010/main" val="2861604159"/>
+      </p:ext>
+    </p:extLst>
+  </p:cSld>
+  <p:clrMapOvr>
+    <a:masterClrMapping/>
+  </p:clrMapOvr>
+</p:sld>
+</file>
+
+<file path=ppt/slides/slide12.xml><?xml version="1.0" encoding="utf-8"?>
+<p:sld xmlns:a="http://schemas.openxmlformats.org/drawingml/2006/main" xmlns:r="http://schemas.openxmlformats.org/officeDocument/2006/relationships" xmlns:p="http://schemas.openxmlformats.org/presentationml/2006/main">
+  <p:cSld>
+    <p:spTree>
+      <p:nvGrpSpPr>
+        <p:cNvPr id="1" name=""/>
+        <p:cNvGrpSpPr/>
+        <p:nvPr/>
+      </p:nvGrpSpPr>
+      <p:grpSpPr>
+        <a:xfrm>
+          <a:off x="0" y="0"/>
+          <a:ext cx="0" cy="0"/>
+          <a:chOff x="0" y="0"/>
+          <a:chExt cx="0" cy="0"/>
+        </a:xfrm>
+      </p:grpSpPr>
+      <p:sp>
+        <p:nvSpPr>
+          <p:cNvPr id="2" name="Titel 1"/>
+          <p:cNvSpPr>
+            <a:spLocks noGrp="1"/>
+          </p:cNvSpPr>
+          <p:nvPr>
+            <p:ph type="title"/>
+          </p:nvPr>
+        </p:nvSpPr>
+        <p:spPr/>
+        <p:txBody>
+          <a:bodyPr/>
+          <a:lstStyle/>
+          <a:p>
+            <a:endParaRPr lang="en-US" dirty="0"/>
+          </a:p>
+        </p:txBody>
+      </p:sp>
+      <p:sp>
+        <p:nvSpPr>
+          <p:cNvPr id="3" name="Tijdelijke aanduiding voor inhoud 2"/>
+          <p:cNvSpPr>
+            <a:spLocks noGrp="1"/>
+          </p:cNvSpPr>
+          <p:nvPr>
+            <p:ph idx="1"/>
+          </p:nvPr>
+        </p:nvSpPr>
+        <p:spPr/>
+        <p:txBody>
+          <a:bodyPr/>
+          <a:lstStyle/>
+          <a:p>
+            <a:r>
+              <a:rPr lang="en-US" dirty="0" smtClean="0"/>
+              <a:t>Finding your entry point</a:t>
+            </a:r>
+            <a:endParaRPr lang="en-US" dirty="0"/>
+          </a:p>
+        </p:txBody>
+      </p:sp>
+      <p:sp>
+        <p:nvSpPr>
+          <p:cNvPr id="4" name="Tijdelijke aanduiding voor voettekst 3"/>
+          <p:cNvSpPr>
+            <a:spLocks noGrp="1"/>
+          </p:cNvSpPr>
+          <p:nvPr>
+            <p:ph type="ftr" sz="quarter" idx="11"/>
+          </p:nvPr>
+        </p:nvSpPr>
+        <p:spPr/>
+        <p:txBody>
+          <a:bodyPr/>
+          <a:lstStyle/>
+          <a:p>
+            <a:r>
+              <a:rPr lang="en-US" smtClean="0"/>
+              <a:t>© Sioux 2013 | Confidential | </a:t>
+            </a:r>
+            <a:endParaRPr lang="en-US"/>
+          </a:p>
+        </p:txBody>
+      </p:sp>
+      <p:sp>
+        <p:nvSpPr>
+          <p:cNvPr id="5" name="Tijdelijke aanduiding voor dianummer 4"/>
+          <p:cNvSpPr>
+            <a:spLocks noGrp="1"/>
+          </p:cNvSpPr>
+          <p:nvPr>
+            <p:ph type="sldNum" sz="quarter" idx="12"/>
+          </p:nvPr>
+        </p:nvSpPr>
+        <p:spPr/>
+        <p:txBody>
+          <a:bodyPr/>
+          <a:lstStyle/>
+          <a:p>
+            <a:fld id="{B60E6772-B9F1-4672-903F-323A7A0E6EBD}" type="slidenum">
+              <a:rPr lang="en-US" smtClean="0"/>
+              <a:pPr/>
+              <a:t>12</a:t>
             </a:fld>
             <a:endParaRPr lang="en-US"/>
           </a:p>
@@ -5123,7 +5210,7 @@
 </p:sld>
 </file>
 
-<file path=ppt/slides/slide12.xml><?xml version="1.0" encoding="utf-8"?>
+<file path=ppt/slides/slide13.xml><?xml version="1.0" encoding="utf-8"?>
 <p:sld xmlns:a="http://schemas.openxmlformats.org/drawingml/2006/main" xmlns:r="http://schemas.openxmlformats.org/officeDocument/2006/relationships" xmlns:p="http://schemas.openxmlformats.org/presentationml/2006/main">
   <p:cSld>
     <p:spTree>
@@ -5251,7 +5338,7 @@
             <a:fld id="{B60E6772-B9F1-4672-903F-323A7A0E6EBD}" type="slidenum">
               <a:rPr lang="en-GB" smtClean="0"/>
               <a:pPr/>
-              <a:t>12</a:t>
+              <a:t>13</a:t>
             </a:fld>
             <a:endParaRPr lang="en-GB"/>
           </a:p>
@@ -5387,7 +5474,7 @@
                 <a:tabLst/>
                 <a:defRPr/>
               </a:pPr>
-              <a:t>12</a:t>
+              <a:t>13</a:t>
             </a:fld>
             <a:endParaRPr kumimoji="0" lang="en-GB" sz="800" b="0" i="0" u="none" strike="noStrike" kern="1200" cap="none" spc="0" normalizeH="0" baseline="0" noProof="0" smtClean="0">
               <a:ln>
@@ -5441,7 +5528,7 @@
                 </a:solidFill>
               </a:rPr>
               <a:pPr/>
-              <a:t>12</a:t>
+              <a:t>13</a:t>
             </a:fld>
             <a:endParaRPr lang="en-GB" sz="900">
               <a:solidFill>
@@ -6488,7 +6575,7 @@
 </p:sld>
 </file>
 
-<file path=ppt/slides/slide13.xml><?xml version="1.0" encoding="utf-8"?>
+<file path=ppt/slides/slide14.xml><?xml version="1.0" encoding="utf-8"?>
 <p:sld xmlns:a="http://schemas.openxmlformats.org/drawingml/2006/main" xmlns:r="http://schemas.openxmlformats.org/officeDocument/2006/relationships" xmlns:p="http://schemas.openxmlformats.org/presentationml/2006/main">
   <p:cSld>
     <p:spTree>
@@ -6523,7 +6610,7 @@
             <a:fld id="{B60E6772-B9F1-4672-903F-323A7A0E6EBD}" type="slidenum">
               <a:rPr lang="en-GB" smtClean="0"/>
               <a:pPr/>
-              <a:t>13</a:t>
+              <a:t>14</a:t>
             </a:fld>
             <a:endParaRPr lang="en-GB"/>
           </a:p>
@@ -8327,7 +8414,10 @@
           <a:bodyPr/>
           <a:lstStyle/>
           <a:p>
-            <a:endParaRPr lang="en-US" dirty="0"/>
+            <a:r>
+              <a:rPr lang="en-US" dirty="0"/>
+              <a:t>Dissector Architecture</a:t>
+            </a:r>
           </a:p>
         </p:txBody>
       </p:sp>
@@ -9923,29 +10013,51 @@
           <a:bodyPr/>
           <a:lstStyle/>
           <a:p>
+            <a:endParaRPr lang="en-US" dirty="0"/>
+          </a:p>
+        </p:txBody>
+      </p:sp>
+      <p:sp>
+        <p:nvSpPr>
+          <p:cNvPr id="3" name="Tijdelijke aanduiding voor inhoud 2"/>
+          <p:cNvSpPr>
+            <a:spLocks noGrp="1"/>
+          </p:cNvSpPr>
+          <p:nvPr>
+            <p:ph idx="1"/>
+          </p:nvPr>
+        </p:nvSpPr>
+        <p:spPr/>
+        <p:txBody>
+          <a:bodyPr/>
+          <a:lstStyle/>
+          <a:p>
             <a:r>
               <a:rPr lang="en-US" dirty="0" smtClean="0"/>
-              <a:t>Example Dissector Dissected</a:t>
-            </a:r>
+              <a:t>Declare the protocol</a:t>
+            </a:r>
+          </a:p>
+          <a:p>
+            <a:pPr lvl="1"/>
+            <a:endParaRPr lang="en-US" dirty="0" smtClean="0"/>
+          </a:p>
+          <a:p>
+            <a:r>
+              <a:rPr lang="en-US" dirty="0" smtClean="0"/>
+              <a:t>Declare the dissector function</a:t>
+            </a:r>
+          </a:p>
+          <a:p>
             <a:endParaRPr lang="en-US" dirty="0"/>
           </a:p>
-        </p:txBody>
-      </p:sp>
-      <p:sp>
-        <p:nvSpPr>
-          <p:cNvPr id="3" name="Tijdelijke aanduiding voor inhoud 2"/>
-          <p:cNvSpPr>
-            <a:spLocks noGrp="1"/>
-          </p:cNvSpPr>
-          <p:nvPr>
-            <p:ph idx="1"/>
-          </p:nvPr>
-        </p:nvSpPr>
-        <p:spPr/>
-        <p:txBody>
-          <a:bodyPr/>
-          <a:lstStyle/>
-          <a:p>
+          <a:p>
+            <a:r>
+              <a:rPr lang="en-US" dirty="0" smtClean="0"/>
+              <a:t>Bind to a dissector table</a:t>
+            </a:r>
+          </a:p>
+          <a:p>
+            <a:pPr lvl="1"/>
             <a:endParaRPr lang="en-US" dirty="0"/>
           </a:p>
         </p:txBody>
@@ -9997,10 +10109,172 @@
           </a:p>
         </p:txBody>
       </p:sp>
+      <p:pic>
+        <p:nvPicPr>
+          <p:cNvPr id="3075" name="Picture 3"/>
+          <p:cNvPicPr>
+            <a:picLocks noChangeAspect="1" noChangeArrowheads="1"/>
+          </p:cNvPicPr>
+          <p:nvPr/>
+        </p:nvPicPr>
+        <p:blipFill>
+          <a:blip r:embed="rId2">
+            <a:extLst>
+              <a:ext uri="{28A0092B-C50C-407E-A947-70E740481C1C}">
+                <a14:useLocalDpi xmlns:a14="http://schemas.microsoft.com/office/drawing/2010/main" val="0"/>
+              </a:ext>
+            </a:extLst>
+          </a:blip>
+          <a:srcRect/>
+          <a:stretch>
+            <a:fillRect/>
+          </a:stretch>
+        </p:blipFill>
+        <p:spPr bwMode="auto">
+          <a:xfrm>
+            <a:off x="1295400" y="1838561"/>
+            <a:ext cx="4548554" cy="304800"/>
+          </a:xfrm>
+          <a:prstGeom prst="rect">
+            <a:avLst/>
+          </a:prstGeom>
+          <a:noFill/>
+          <a:ln>
+            <a:noFill/>
+          </a:ln>
+          <a:extLst>
+            <a:ext uri="{909E8E84-426E-40DD-AFC4-6F175D3DCCD1}">
+              <a14:hiddenFill xmlns:a14="http://schemas.microsoft.com/office/drawing/2010/main">
+                <a:solidFill>
+                  <a:schemeClr val="accent1"/>
+                </a:solidFill>
+              </a14:hiddenFill>
+            </a:ext>
+            <a:ext uri="{91240B29-F687-4F45-9708-019B960494DF}">
+              <a14:hiddenLine xmlns:a14="http://schemas.microsoft.com/office/drawing/2010/main" w="9525">
+                <a:solidFill>
+                  <a:schemeClr val="tx1"/>
+                </a:solidFill>
+                <a:miter lim="800000"/>
+                <a:headEnd/>
+                <a:tailEnd/>
+              </a14:hiddenLine>
+            </a:ext>
+          </a:extLst>
+        </p:spPr>
+      </p:pic>
+      <p:pic>
+        <p:nvPicPr>
+          <p:cNvPr id="3076" name="Picture 4"/>
+          <p:cNvPicPr>
+            <a:picLocks noChangeAspect="1" noChangeArrowheads="1"/>
+          </p:cNvPicPr>
+          <p:nvPr/>
+        </p:nvPicPr>
+        <p:blipFill>
+          <a:blip r:embed="rId3">
+            <a:extLst>
+              <a:ext uri="{28A0092B-C50C-407E-A947-70E740481C1C}">
+                <a14:useLocalDpi xmlns:a14="http://schemas.microsoft.com/office/drawing/2010/main" val="0"/>
+              </a:ext>
+            </a:extLst>
+          </a:blip>
+          <a:srcRect/>
+          <a:stretch>
+            <a:fillRect/>
+          </a:stretch>
+        </p:blipFill>
+        <p:spPr bwMode="auto">
+          <a:xfrm>
+            <a:off x="1318071" y="2866710"/>
+            <a:ext cx="4086225" cy="552450"/>
+          </a:xfrm>
+          <a:prstGeom prst="rect">
+            <a:avLst/>
+          </a:prstGeom>
+          <a:noFill/>
+          <a:ln>
+            <a:noFill/>
+          </a:ln>
+          <a:extLst>
+            <a:ext uri="{909E8E84-426E-40DD-AFC4-6F175D3DCCD1}">
+              <a14:hiddenFill xmlns:a14="http://schemas.microsoft.com/office/drawing/2010/main">
+                <a:solidFill>
+                  <a:schemeClr val="accent1"/>
+                </a:solidFill>
+              </a14:hiddenFill>
+            </a:ext>
+            <a:ext uri="{91240B29-F687-4F45-9708-019B960494DF}">
+              <a14:hiddenLine xmlns:a14="http://schemas.microsoft.com/office/drawing/2010/main" w="9525">
+                <a:solidFill>
+                  <a:schemeClr val="tx1"/>
+                </a:solidFill>
+                <a:miter lim="800000"/>
+                <a:headEnd/>
+                <a:tailEnd/>
+              </a14:hiddenLine>
+            </a:ext>
+          </a:extLst>
+        </p:spPr>
+      </p:pic>
+      <p:pic>
+        <p:nvPicPr>
+          <p:cNvPr id="3077" name="Picture 5"/>
+          <p:cNvPicPr>
+            <a:picLocks noChangeAspect="1" noChangeArrowheads="1"/>
+          </p:cNvPicPr>
+          <p:nvPr/>
+        </p:nvPicPr>
+        <p:blipFill>
+          <a:blip r:embed="rId4">
+            <a:extLst>
+              <a:ext uri="{28A0092B-C50C-407E-A947-70E740481C1C}">
+                <a14:useLocalDpi xmlns:a14="http://schemas.microsoft.com/office/drawing/2010/main" val="0"/>
+              </a:ext>
+            </a:extLst>
+          </a:blip>
+          <a:srcRect/>
+          <a:stretch>
+            <a:fillRect/>
+          </a:stretch>
+        </p:blipFill>
+        <p:spPr bwMode="auto">
+          <a:xfrm>
+            <a:off x="1269580" y="4019550"/>
+            <a:ext cx="4206240" cy="457200"/>
+          </a:xfrm>
+          <a:prstGeom prst="rect">
+            <a:avLst/>
+          </a:prstGeom>
+          <a:noFill/>
+          <a:ln>
+            <a:noFill/>
+          </a:ln>
+          <a:extLst>
+            <a:ext uri="{909E8E84-426E-40DD-AFC4-6F175D3DCCD1}">
+              <a14:hiddenFill xmlns:a14="http://schemas.microsoft.com/office/drawing/2010/main">
+                <a:solidFill>
+                  <a:schemeClr val="accent1"/>
+                </a:solidFill>
+              </a14:hiddenFill>
+            </a:ext>
+            <a:ext uri="{91240B29-F687-4F45-9708-019B960494DF}">
+              <a14:hiddenLine xmlns:a14="http://schemas.microsoft.com/office/drawing/2010/main" w="9525">
+                <a:solidFill>
+                  <a:schemeClr val="tx1"/>
+                </a:solidFill>
+                <a:miter lim="800000"/>
+                <a:headEnd/>
+                <a:tailEnd/>
+              </a14:hiddenLine>
+            </a:ext>
+          </a:extLst>
+        </p:spPr>
+      </p:pic>
     </p:spTree>
     <p:extLst>
       <p:ext uri="{BB962C8B-B14F-4D97-AF65-F5344CB8AC3E}">
-        <p14:creationId xmlns:p14="http://schemas.microsoft.com/office/powerpoint/2010/main" val="1936644907"/>
+        <p14:creationId xmlns:p14="http://schemas.microsoft.com/office/powerpoint/2010/main" val="1469939123"/>
       </p:ext>
     </p:extLst>
   </p:cSld>

</xml_diff>

<commit_message>
[doc] populating the tree
</commit_message>
<xml_diff>
--- a/Lua Wireshark Dissectors.pptx
+++ b/Lua Wireshark Dissectors.pptx
@@ -5,10 +5,10 @@
     <p:sldMasterId id="2147483648" r:id="rId1"/>
   </p:sldMasterIdLst>
   <p:notesMasterIdLst>
-    <p:notesMasterId r:id="rId16"/>
+    <p:notesMasterId r:id="rId18"/>
   </p:notesMasterIdLst>
   <p:handoutMasterIdLst>
-    <p:handoutMasterId r:id="rId17"/>
+    <p:handoutMasterId r:id="rId19"/>
   </p:handoutMasterIdLst>
   <p:sldIdLst>
     <p:sldId id="259" r:id="rId2"/>
@@ -20,11 +20,13 @@
     <p:sldId id="266" r:id="rId8"/>
     <p:sldId id="267" r:id="rId9"/>
     <p:sldId id="271" r:id="rId10"/>
-    <p:sldId id="269" r:id="rId11"/>
-    <p:sldId id="265" r:id="rId12"/>
-    <p:sldId id="264" r:id="rId13"/>
-    <p:sldId id="258" r:id="rId14"/>
-    <p:sldId id="260" r:id="rId15"/>
+    <p:sldId id="272" r:id="rId11"/>
+    <p:sldId id="273" r:id="rId12"/>
+    <p:sldId id="274" r:id="rId13"/>
+    <p:sldId id="265" r:id="rId14"/>
+    <p:sldId id="264" r:id="rId15"/>
+    <p:sldId id="258" r:id="rId16"/>
+    <p:sldId id="260" r:id="rId17"/>
   </p:sldIdLst>
   <p:sldSz cx="9144000" cy="5143500" type="screen16x9"/>
   <p:notesSz cx="6858000" cy="9144000"/>
@@ -890,7 +892,7 @@
       </p:grpSpPr>
       <p:sp>
         <p:nvSpPr>
-          <p:cNvPr id="2" name="Tijdelijke aanduiding voor dia-afbeelding 1"/>
+          <p:cNvPr id="2" name="Slide Image Placeholder 1"/>
           <p:cNvSpPr>
             <a:spLocks noGrp="1" noRot="1" noChangeAspect="1"/>
           </p:cNvSpPr>
@@ -902,7 +904,7 @@
       </p:sp>
       <p:sp>
         <p:nvSpPr>
-          <p:cNvPr id="3" name="Tijdelijke aanduiding voor notities 2"/>
+          <p:cNvPr id="3" name="Notes Placeholder 2"/>
           <p:cNvSpPr>
             <a:spLocks noGrp="1"/>
           </p:cNvSpPr>
@@ -912,7 +914,9 @@
         </p:nvSpPr>
         <p:spPr/>
         <p:txBody>
-          <a:bodyPr/>
+          <a:bodyPr>
+            <a:normAutofit/>
+          </a:bodyPr>
           <a:lstStyle/>
           <a:p>
             <a:endParaRPr lang="en-US" dirty="0"/>
@@ -921,7 +925,7 @@
       </p:sp>
       <p:sp>
         <p:nvSpPr>
-          <p:cNvPr id="4" name="Tijdelijke aanduiding voor dianummer 3"/>
+          <p:cNvPr id="4" name="Slide Number Placeholder 3"/>
           <p:cNvSpPr>
             <a:spLocks noGrp="1"/>
           </p:cNvSpPr>
@@ -937,94 +941,7 @@
             <a:fld id="{559C4A52-4ACF-44E6-B7A9-3756997F58DA}" type="slidenum">
               <a:rPr lang="en-US" smtClean="0"/>
               <a:pPr/>
-              <a:t>10</a:t>
-            </a:fld>
-            <a:endParaRPr lang="en-US"/>
-          </a:p>
-        </p:txBody>
-      </p:sp>
-    </p:spTree>
-    <p:extLst>
-      <p:ext uri="{BB962C8B-B14F-4D97-AF65-F5344CB8AC3E}">
-        <p14:creationId xmlns:p14="http://schemas.microsoft.com/office/powerpoint/2010/main" val="3694406322"/>
-      </p:ext>
-    </p:extLst>
-  </p:cSld>
-  <p:clrMapOvr>
-    <a:masterClrMapping/>
-  </p:clrMapOvr>
-</p:notes>
-</file>
-
-<file path=ppt/notesSlides/notesSlide4.xml><?xml version="1.0" encoding="utf-8"?>
-<p:notes xmlns:a="http://schemas.openxmlformats.org/drawingml/2006/main" xmlns:r="http://schemas.openxmlformats.org/officeDocument/2006/relationships" xmlns:p="http://schemas.openxmlformats.org/presentationml/2006/main">
-  <p:cSld>
-    <p:spTree>
-      <p:nvGrpSpPr>
-        <p:cNvPr id="1" name=""/>
-        <p:cNvGrpSpPr/>
-        <p:nvPr/>
-      </p:nvGrpSpPr>
-      <p:grpSpPr>
-        <a:xfrm>
-          <a:off x="0" y="0"/>
-          <a:ext cx="0" cy="0"/>
-          <a:chOff x="0" y="0"/>
-          <a:chExt cx="0" cy="0"/>
-        </a:xfrm>
-      </p:grpSpPr>
-      <p:sp>
-        <p:nvSpPr>
-          <p:cNvPr id="2" name="Slide Image Placeholder 1"/>
-          <p:cNvSpPr>
-            <a:spLocks noGrp="1" noRot="1" noChangeAspect="1"/>
-          </p:cNvSpPr>
-          <p:nvPr>
-            <p:ph type="sldImg"/>
-          </p:nvPr>
-        </p:nvSpPr>
-        <p:spPr/>
-      </p:sp>
-      <p:sp>
-        <p:nvSpPr>
-          <p:cNvPr id="3" name="Notes Placeholder 2"/>
-          <p:cNvSpPr>
-            <a:spLocks noGrp="1"/>
-          </p:cNvSpPr>
-          <p:nvPr>
-            <p:ph type="body" idx="1"/>
-          </p:nvPr>
-        </p:nvSpPr>
-        <p:spPr/>
-        <p:txBody>
-          <a:bodyPr>
-            <a:normAutofit/>
-          </a:bodyPr>
-          <a:lstStyle/>
-          <a:p>
-            <a:endParaRPr lang="en-US" dirty="0"/>
-          </a:p>
-        </p:txBody>
-      </p:sp>
-      <p:sp>
-        <p:nvSpPr>
-          <p:cNvPr id="4" name="Slide Number Placeholder 3"/>
-          <p:cNvSpPr>
-            <a:spLocks noGrp="1"/>
-          </p:cNvSpPr>
-          <p:nvPr>
-            <p:ph type="sldNum" sz="quarter" idx="10"/>
-          </p:nvPr>
-        </p:nvSpPr>
-        <p:spPr/>
-        <p:txBody>
-          <a:bodyPr/>
-          <a:lstStyle/>
-          <a:p>
-            <a:fld id="{559C4A52-4ACF-44E6-B7A9-3756997F58DA}" type="slidenum">
-              <a:rPr lang="en-US" smtClean="0"/>
-              <a:pPr/>
-              <a:t>14</a:t>
+              <a:t>16</a:t>
             </a:fld>
             <a:endParaRPr lang="en-US"/>
           </a:p>
@@ -4717,7 +4634,7 @@
           <a:p>
             <a:r>
               <a:rPr lang="en-US" dirty="0" smtClean="0"/>
-              <a:t>Example Dissector Dissected</a:t>
+              <a:t>Dissecting a dissector</a:t>
             </a:r>
             <a:endParaRPr lang="en-US" dirty="0"/>
           </a:p>
@@ -4738,9 +4655,26 @@
           <a:bodyPr/>
           <a:lstStyle/>
           <a:p>
+            <a:r>
+              <a:rPr lang="en-US" dirty="0" smtClean="0"/>
+              <a:t>Declare the fields</a:t>
+            </a:r>
+          </a:p>
+          <a:p>
+            <a:pPr lvl="1"/>
             <a:endParaRPr lang="en-US" dirty="0" smtClean="0"/>
           </a:p>
           <a:p>
+            <a:r>
+              <a:rPr lang="en-US" dirty="0" smtClean="0"/>
+              <a:t>Enumeration fields:</a:t>
+            </a:r>
+          </a:p>
+          <a:p>
+            <a:endParaRPr lang="en-US" dirty="0"/>
+          </a:p>
+          <a:p>
+            <a:pPr lvl="1"/>
             <a:endParaRPr lang="en-US" dirty="0"/>
           </a:p>
         </p:txBody>
@@ -4792,10 +4726,118 @@
           </a:p>
         </p:txBody>
       </p:sp>
+      <p:pic>
+        <p:nvPicPr>
+          <p:cNvPr id="4098" name="Picture 2"/>
+          <p:cNvPicPr>
+            <a:picLocks noChangeAspect="1" noChangeArrowheads="1"/>
+          </p:cNvPicPr>
+          <p:nvPr/>
+        </p:nvPicPr>
+        <p:blipFill>
+          <a:blip r:embed="rId2">
+            <a:extLst>
+              <a:ext uri="{28A0092B-C50C-407E-A947-70E740481C1C}">
+                <a14:useLocalDpi xmlns:a14="http://schemas.microsoft.com/office/drawing/2010/main" val="0"/>
+              </a:ext>
+            </a:extLst>
+          </a:blip>
+          <a:srcRect/>
+          <a:stretch>
+            <a:fillRect/>
+          </a:stretch>
+        </p:blipFill>
+        <p:spPr bwMode="auto">
+          <a:xfrm>
+            <a:off x="990600" y="1885950"/>
+            <a:ext cx="6886575" cy="304800"/>
+          </a:xfrm>
+          <a:prstGeom prst="rect">
+            <a:avLst/>
+          </a:prstGeom>
+          <a:noFill/>
+          <a:ln>
+            <a:noFill/>
+          </a:ln>
+          <a:extLst>
+            <a:ext uri="{909E8E84-426E-40DD-AFC4-6F175D3DCCD1}">
+              <a14:hiddenFill xmlns:a14="http://schemas.microsoft.com/office/drawing/2010/main">
+                <a:solidFill>
+                  <a:schemeClr val="accent1"/>
+                </a:solidFill>
+              </a14:hiddenFill>
+            </a:ext>
+            <a:ext uri="{91240B29-F687-4F45-9708-019B960494DF}">
+              <a14:hiddenLine xmlns:a14="http://schemas.microsoft.com/office/drawing/2010/main" w="9525">
+                <a:solidFill>
+                  <a:schemeClr val="tx1"/>
+                </a:solidFill>
+                <a:miter lim="800000"/>
+                <a:headEnd/>
+                <a:tailEnd/>
+              </a14:hiddenLine>
+            </a:ext>
+          </a:extLst>
+        </p:spPr>
+      </p:pic>
+      <p:pic>
+        <p:nvPicPr>
+          <p:cNvPr id="4099" name="Picture 3"/>
+          <p:cNvPicPr>
+            <a:picLocks noChangeAspect="1" noChangeArrowheads="1"/>
+          </p:cNvPicPr>
+          <p:nvPr/>
+        </p:nvPicPr>
+        <p:blipFill>
+          <a:blip r:embed="rId3">
+            <a:extLst>
+              <a:ext uri="{28A0092B-C50C-407E-A947-70E740481C1C}">
+                <a14:useLocalDpi xmlns:a14="http://schemas.microsoft.com/office/drawing/2010/main" val="0"/>
+              </a:ext>
+            </a:extLst>
+          </a:blip>
+          <a:srcRect/>
+          <a:stretch>
+            <a:fillRect/>
+          </a:stretch>
+        </p:blipFill>
+        <p:spPr bwMode="auto">
+          <a:xfrm>
+            <a:off x="1219200" y="2876550"/>
+            <a:ext cx="7781925" cy="695325"/>
+          </a:xfrm>
+          <a:prstGeom prst="rect">
+            <a:avLst/>
+          </a:prstGeom>
+          <a:noFill/>
+          <a:ln>
+            <a:noFill/>
+          </a:ln>
+          <a:extLst>
+            <a:ext uri="{909E8E84-426E-40DD-AFC4-6F175D3DCCD1}">
+              <a14:hiddenFill xmlns:a14="http://schemas.microsoft.com/office/drawing/2010/main">
+                <a:solidFill>
+                  <a:schemeClr val="accent1"/>
+                </a:solidFill>
+              </a14:hiddenFill>
+            </a:ext>
+            <a:ext uri="{91240B29-F687-4F45-9708-019B960494DF}">
+              <a14:hiddenLine xmlns:a14="http://schemas.microsoft.com/office/drawing/2010/main" w="9525">
+                <a:solidFill>
+                  <a:schemeClr val="tx1"/>
+                </a:solidFill>
+                <a:miter lim="800000"/>
+                <a:headEnd/>
+                <a:tailEnd/>
+              </a14:hiddenLine>
+            </a:ext>
+          </a:extLst>
+        </p:spPr>
+      </p:pic>
     </p:spTree>
     <p:extLst>
       <p:ext uri="{BB962C8B-B14F-4D97-AF65-F5344CB8AC3E}">
-        <p14:creationId xmlns:p14="http://schemas.microsoft.com/office/powerpoint/2010/main" val="1936644907"/>
+        <p14:creationId xmlns:p14="http://schemas.microsoft.com/office/powerpoint/2010/main" val="3836101011"/>
       </p:ext>
     </p:extLst>
   </p:cSld>
@@ -4839,7 +4881,7 @@
           <a:p>
             <a:r>
               <a:rPr lang="en-US" dirty="0" smtClean="0"/>
-              <a:t>Links</a:t>
+              <a:t>Dissecting a dissector</a:t>
             </a:r>
             <a:endParaRPr lang="en-US" dirty="0"/>
           </a:p>
@@ -4861,61 +4903,22 @@
           <a:lstStyle/>
           <a:p>
             <a:r>
-              <a:rPr lang="en-US" dirty="0"/>
-              <a:t>Getting started: </a:t>
-            </a:r>
+              <a:rPr lang="en-US" dirty="0" smtClean="0"/>
+              <a:t>Populate the tree and info</a:t>
+            </a:r>
+          </a:p>
+          <a:p>
+            <a:pPr lvl="1"/>
             <a:endParaRPr lang="en-US" dirty="0" smtClean="0"/>
           </a:p>
           <a:p>
-            <a:pPr marL="704850" lvl="2" indent="-342900"/>
-            <a:r>
-              <a:rPr lang="en-US" dirty="0">
-                <a:hlinkClick r:id="rId2"/>
-              </a:rPr>
-              <a:t>http://</a:t>
-            </a:r>
-            <a:r>
-              <a:rPr lang="en-US" dirty="0" smtClean="0">
-                <a:hlinkClick r:id="rId2"/>
-              </a:rPr>
-              <a:t>wiki.wireshark.org/Lua</a:t>
-            </a:r>
+            <a:endParaRPr lang="en-US" dirty="0" smtClean="0"/>
+          </a:p>
+          <a:p>
+            <a:pPr marL="0" indent="0">
+              <a:buNone/>
+            </a:pPr>
             <a:endParaRPr lang="en-US" dirty="0"/>
-          </a:p>
-          <a:p>
-            <a:r>
-              <a:rPr lang="en-US" dirty="0" smtClean="0"/>
-              <a:t>Details</a:t>
-            </a:r>
-          </a:p>
-          <a:p>
-            <a:pPr lvl="1"/>
-            <a:r>
-              <a:rPr lang="en-US" dirty="0" smtClean="0">
-                <a:hlinkClick r:id="rId3"/>
-              </a:rPr>
-              <a:t>http</a:t>
-            </a:r>
-            <a:r>
-              <a:rPr lang="en-US" dirty="0">
-                <a:hlinkClick r:id="rId3"/>
-              </a:rPr>
-              <a:t>://ask.wireshark.org/</a:t>
-            </a:r>
-            <a:endParaRPr lang="en-US" dirty="0"/>
-          </a:p>
-          <a:p>
-            <a:pPr lvl="1"/>
-            <a:r>
-              <a:rPr lang="en-US" dirty="0">
-                <a:hlinkClick r:id="rId4"/>
-              </a:rPr>
-              <a:t>http://stackoverflow.com/</a:t>
-            </a:r>
-            <a:endParaRPr lang="en-US" dirty="0"/>
-          </a:p>
-          <a:p>
-            <a:endParaRPr lang="en-US" dirty="0" smtClean="0"/>
           </a:p>
           <a:p>
             <a:pPr lvl="1"/>
@@ -4970,10 +4973,64 @@
           </a:p>
         </p:txBody>
       </p:sp>
+      <p:pic>
+        <p:nvPicPr>
+          <p:cNvPr id="5122" name="Picture 2"/>
+          <p:cNvPicPr>
+            <a:picLocks noChangeAspect="1" noChangeArrowheads="1"/>
+          </p:cNvPicPr>
+          <p:nvPr/>
+        </p:nvPicPr>
+        <p:blipFill>
+          <a:blip r:embed="rId2">
+            <a:extLst>
+              <a:ext uri="{28A0092B-C50C-407E-A947-70E740481C1C}">
+                <a14:useLocalDpi xmlns:a14="http://schemas.microsoft.com/office/drawing/2010/main" val="0"/>
+              </a:ext>
+            </a:extLst>
+          </a:blip>
+          <a:srcRect/>
+          <a:stretch>
+            <a:fillRect/>
+          </a:stretch>
+        </p:blipFill>
+        <p:spPr bwMode="auto">
+          <a:xfrm>
+            <a:off x="2081213" y="1909763"/>
+            <a:ext cx="4981575" cy="1323975"/>
+          </a:xfrm>
+          <a:prstGeom prst="rect">
+            <a:avLst/>
+          </a:prstGeom>
+          <a:noFill/>
+          <a:ln>
+            <a:noFill/>
+          </a:ln>
+          <a:extLst>
+            <a:ext uri="{909E8E84-426E-40DD-AFC4-6F175D3DCCD1}">
+              <a14:hiddenFill xmlns:a14="http://schemas.microsoft.com/office/drawing/2010/main">
+                <a:solidFill>
+                  <a:schemeClr val="accent1"/>
+                </a:solidFill>
+              </a14:hiddenFill>
+            </a:ext>
+            <a:ext uri="{91240B29-F687-4F45-9708-019B960494DF}">
+              <a14:hiddenLine xmlns:a14="http://schemas.microsoft.com/office/drawing/2010/main" w="9525">
+                <a:solidFill>
+                  <a:schemeClr val="tx1"/>
+                </a:solidFill>
+                <a:miter lim="800000"/>
+                <a:headEnd/>
+                <a:tailEnd/>
+              </a14:hiddenLine>
+            </a:ext>
+          </a:extLst>
+        </p:spPr>
+      </p:pic>
     </p:spTree>
     <p:extLst>
       <p:ext uri="{BB962C8B-B14F-4D97-AF65-F5344CB8AC3E}">
-        <p14:creationId xmlns:p14="http://schemas.microsoft.com/office/powerpoint/2010/main" val="2861604159"/>
+        <p14:creationId xmlns:p14="http://schemas.microsoft.com/office/powerpoint/2010/main" val="4131659176"/>
       </p:ext>
     </p:extLst>
   </p:cSld>
@@ -5015,7 +5072,10 @@
           <a:bodyPr/>
           <a:lstStyle/>
           <a:p>
-            <a:endParaRPr lang="en-US" dirty="0"/>
+            <a:r>
+              <a:rPr lang="en-US" dirty="0"/>
+              <a:t>Dissecting a dissector</a:t>
+            </a:r>
           </a:p>
         </p:txBody>
       </p:sp>
@@ -5036,7 +5096,14 @@
           <a:p>
             <a:r>
               <a:rPr lang="en-US" dirty="0" smtClean="0"/>
-              <a:t>Finding your entry point</a:t>
+              <a:t>Delegating to sub-protocols:</a:t>
+            </a:r>
+          </a:p>
+          <a:p>
+            <a:pPr lvl="1"/>
+            <a:r>
+              <a:rPr lang="en-US" dirty="0" smtClean="0"/>
+              <a:t>Declare a dissector table</a:t>
             </a:r>
             <a:endParaRPr lang="en-US" dirty="0"/>
           </a:p>
@@ -5084,6 +5151,357 @@
               <a:rPr lang="en-US" smtClean="0"/>
               <a:pPr/>
               <a:t>12</a:t>
+            </a:fld>
+            <a:endParaRPr lang="en-US"/>
+          </a:p>
+        </p:txBody>
+      </p:sp>
+      <p:pic>
+        <p:nvPicPr>
+          <p:cNvPr id="6146" name="Picture 2"/>
+          <p:cNvPicPr>
+            <a:picLocks noChangeAspect="1" noChangeArrowheads="1"/>
+          </p:cNvPicPr>
+          <p:nvPr/>
+        </p:nvPicPr>
+        <p:blipFill>
+          <a:blip r:embed="rId2">
+            <a:extLst>
+              <a:ext uri="{28A0092B-C50C-407E-A947-70E740481C1C}">
+                <a14:useLocalDpi xmlns:a14="http://schemas.microsoft.com/office/drawing/2010/main" val="0"/>
+              </a:ext>
+            </a:extLst>
+          </a:blip>
+          <a:srcRect/>
+          <a:stretch>
+            <a:fillRect/>
+          </a:stretch>
+        </p:blipFill>
+        <p:spPr bwMode="auto">
+          <a:xfrm>
+            <a:off x="1676400" y="2338268"/>
+            <a:ext cx="6000462" cy="233481"/>
+          </a:xfrm>
+          <a:prstGeom prst="rect">
+            <a:avLst/>
+          </a:prstGeom>
+          <a:noFill/>
+          <a:ln>
+            <a:noFill/>
+          </a:ln>
+          <a:extLst>
+            <a:ext uri="{909E8E84-426E-40DD-AFC4-6F175D3DCCD1}">
+              <a14:hiddenFill xmlns:a14="http://schemas.microsoft.com/office/drawing/2010/main">
+                <a:solidFill>
+                  <a:schemeClr val="accent1"/>
+                </a:solidFill>
+              </a14:hiddenFill>
+            </a:ext>
+            <a:ext uri="{91240B29-F687-4F45-9708-019B960494DF}">
+              <a14:hiddenLine xmlns:a14="http://schemas.microsoft.com/office/drawing/2010/main" w="9525">
+                <a:solidFill>
+                  <a:schemeClr val="tx1"/>
+                </a:solidFill>
+                <a:miter lim="800000"/>
+                <a:headEnd/>
+                <a:tailEnd/>
+              </a14:hiddenLine>
+            </a:ext>
+          </a:extLst>
+        </p:spPr>
+      </p:pic>
+    </p:spTree>
+    <p:extLst>
+      <p:ext uri="{BB962C8B-B14F-4D97-AF65-F5344CB8AC3E}">
+        <p14:creationId xmlns:p14="http://schemas.microsoft.com/office/powerpoint/2010/main" val="2789518950"/>
+      </p:ext>
+    </p:extLst>
+  </p:cSld>
+  <p:clrMapOvr>
+    <a:masterClrMapping/>
+  </p:clrMapOvr>
+</p:sld>
+</file>
+
+<file path=ppt/slides/slide13.xml><?xml version="1.0" encoding="utf-8"?>
+<p:sld xmlns:a="http://schemas.openxmlformats.org/drawingml/2006/main" xmlns:r="http://schemas.openxmlformats.org/officeDocument/2006/relationships" xmlns:p="http://schemas.openxmlformats.org/presentationml/2006/main">
+  <p:cSld>
+    <p:spTree>
+      <p:nvGrpSpPr>
+        <p:cNvPr id="1" name=""/>
+        <p:cNvGrpSpPr/>
+        <p:nvPr/>
+      </p:nvGrpSpPr>
+      <p:grpSpPr>
+        <a:xfrm>
+          <a:off x="0" y="0"/>
+          <a:ext cx="0" cy="0"/>
+          <a:chOff x="0" y="0"/>
+          <a:chExt cx="0" cy="0"/>
+        </a:xfrm>
+      </p:grpSpPr>
+      <p:sp>
+        <p:nvSpPr>
+          <p:cNvPr id="2" name="Titel 1"/>
+          <p:cNvSpPr>
+            <a:spLocks noGrp="1"/>
+          </p:cNvSpPr>
+          <p:nvPr>
+            <p:ph type="title"/>
+          </p:nvPr>
+        </p:nvSpPr>
+        <p:spPr/>
+        <p:txBody>
+          <a:bodyPr/>
+          <a:lstStyle/>
+          <a:p>
+            <a:r>
+              <a:rPr lang="en-US" dirty="0" smtClean="0"/>
+              <a:t>Links</a:t>
+            </a:r>
+            <a:endParaRPr lang="en-US" dirty="0"/>
+          </a:p>
+        </p:txBody>
+      </p:sp>
+      <p:sp>
+        <p:nvSpPr>
+          <p:cNvPr id="3" name="Tijdelijke aanduiding voor inhoud 2"/>
+          <p:cNvSpPr>
+            <a:spLocks noGrp="1"/>
+          </p:cNvSpPr>
+          <p:nvPr>
+            <p:ph idx="1"/>
+          </p:nvPr>
+        </p:nvSpPr>
+        <p:spPr/>
+        <p:txBody>
+          <a:bodyPr/>
+          <a:lstStyle/>
+          <a:p>
+            <a:r>
+              <a:rPr lang="en-US" dirty="0"/>
+              <a:t>Getting started: </a:t>
+            </a:r>
+            <a:endParaRPr lang="en-US" dirty="0" smtClean="0"/>
+          </a:p>
+          <a:p>
+            <a:pPr marL="704850" lvl="2" indent="-342900"/>
+            <a:r>
+              <a:rPr lang="en-US" dirty="0">
+                <a:hlinkClick r:id="rId2"/>
+              </a:rPr>
+              <a:t>http://</a:t>
+            </a:r>
+            <a:r>
+              <a:rPr lang="en-US" dirty="0" smtClean="0">
+                <a:hlinkClick r:id="rId2"/>
+              </a:rPr>
+              <a:t>wiki.wireshark.org/Lua</a:t>
+            </a:r>
+            <a:endParaRPr lang="en-US" dirty="0"/>
+          </a:p>
+          <a:p>
+            <a:r>
+              <a:rPr lang="en-US" dirty="0" smtClean="0"/>
+              <a:t>Details</a:t>
+            </a:r>
+          </a:p>
+          <a:p>
+            <a:pPr lvl="1"/>
+            <a:r>
+              <a:rPr lang="en-US" dirty="0" smtClean="0">
+                <a:hlinkClick r:id="rId3"/>
+              </a:rPr>
+              <a:t>http</a:t>
+            </a:r>
+            <a:r>
+              <a:rPr lang="en-US" dirty="0">
+                <a:hlinkClick r:id="rId3"/>
+              </a:rPr>
+              <a:t>://ask.wireshark.org/</a:t>
+            </a:r>
+            <a:endParaRPr lang="en-US" dirty="0"/>
+          </a:p>
+          <a:p>
+            <a:pPr lvl="1"/>
+            <a:r>
+              <a:rPr lang="en-US" dirty="0">
+                <a:hlinkClick r:id="rId4"/>
+              </a:rPr>
+              <a:t>http://stackoverflow.com/</a:t>
+            </a:r>
+            <a:endParaRPr lang="en-US" dirty="0"/>
+          </a:p>
+          <a:p>
+            <a:endParaRPr lang="en-US" dirty="0" smtClean="0"/>
+          </a:p>
+          <a:p>
+            <a:pPr lvl="1"/>
+            <a:endParaRPr lang="en-US" dirty="0"/>
+          </a:p>
+        </p:txBody>
+      </p:sp>
+      <p:sp>
+        <p:nvSpPr>
+          <p:cNvPr id="4" name="Tijdelijke aanduiding voor voettekst 3"/>
+          <p:cNvSpPr>
+            <a:spLocks noGrp="1"/>
+          </p:cNvSpPr>
+          <p:nvPr>
+            <p:ph type="ftr" sz="quarter" idx="11"/>
+          </p:nvPr>
+        </p:nvSpPr>
+        <p:spPr/>
+        <p:txBody>
+          <a:bodyPr/>
+          <a:lstStyle/>
+          <a:p>
+            <a:r>
+              <a:rPr lang="en-US" smtClean="0"/>
+              <a:t>© Sioux 2013 | Confidential | </a:t>
+            </a:r>
+            <a:endParaRPr lang="en-US"/>
+          </a:p>
+        </p:txBody>
+      </p:sp>
+      <p:sp>
+        <p:nvSpPr>
+          <p:cNvPr id="5" name="Tijdelijke aanduiding voor dianummer 4"/>
+          <p:cNvSpPr>
+            <a:spLocks noGrp="1"/>
+          </p:cNvSpPr>
+          <p:nvPr>
+            <p:ph type="sldNum" sz="quarter" idx="12"/>
+          </p:nvPr>
+        </p:nvSpPr>
+        <p:spPr/>
+        <p:txBody>
+          <a:bodyPr/>
+          <a:lstStyle/>
+          <a:p>
+            <a:fld id="{B60E6772-B9F1-4672-903F-323A7A0E6EBD}" type="slidenum">
+              <a:rPr lang="en-US" smtClean="0"/>
+              <a:pPr/>
+              <a:t>13</a:t>
+            </a:fld>
+            <a:endParaRPr lang="en-US"/>
+          </a:p>
+        </p:txBody>
+      </p:sp>
+    </p:spTree>
+    <p:extLst>
+      <p:ext uri="{BB962C8B-B14F-4D97-AF65-F5344CB8AC3E}">
+        <p14:creationId xmlns:p14="http://schemas.microsoft.com/office/powerpoint/2010/main" val="2861604159"/>
+      </p:ext>
+    </p:extLst>
+  </p:cSld>
+  <p:clrMapOvr>
+    <a:masterClrMapping/>
+  </p:clrMapOvr>
+</p:sld>
+</file>
+
+<file path=ppt/slides/slide14.xml><?xml version="1.0" encoding="utf-8"?>
+<p:sld xmlns:a="http://schemas.openxmlformats.org/drawingml/2006/main" xmlns:r="http://schemas.openxmlformats.org/officeDocument/2006/relationships" xmlns:p="http://schemas.openxmlformats.org/presentationml/2006/main">
+  <p:cSld>
+    <p:spTree>
+      <p:nvGrpSpPr>
+        <p:cNvPr id="1" name=""/>
+        <p:cNvGrpSpPr/>
+        <p:nvPr/>
+      </p:nvGrpSpPr>
+      <p:grpSpPr>
+        <a:xfrm>
+          <a:off x="0" y="0"/>
+          <a:ext cx="0" cy="0"/>
+          <a:chOff x="0" y="0"/>
+          <a:chExt cx="0" cy="0"/>
+        </a:xfrm>
+      </p:grpSpPr>
+      <p:sp>
+        <p:nvSpPr>
+          <p:cNvPr id="2" name="Titel 1"/>
+          <p:cNvSpPr>
+            <a:spLocks noGrp="1"/>
+          </p:cNvSpPr>
+          <p:nvPr>
+            <p:ph type="title"/>
+          </p:nvPr>
+        </p:nvSpPr>
+        <p:spPr/>
+        <p:txBody>
+          <a:bodyPr/>
+          <a:lstStyle/>
+          <a:p>
+            <a:endParaRPr lang="en-US" dirty="0"/>
+          </a:p>
+        </p:txBody>
+      </p:sp>
+      <p:sp>
+        <p:nvSpPr>
+          <p:cNvPr id="3" name="Tijdelijke aanduiding voor inhoud 2"/>
+          <p:cNvSpPr>
+            <a:spLocks noGrp="1"/>
+          </p:cNvSpPr>
+          <p:nvPr>
+            <p:ph idx="1"/>
+          </p:nvPr>
+        </p:nvSpPr>
+        <p:spPr/>
+        <p:txBody>
+          <a:bodyPr/>
+          <a:lstStyle/>
+          <a:p>
+            <a:r>
+              <a:rPr lang="en-US" dirty="0" smtClean="0"/>
+              <a:t>Finding your entry point</a:t>
+            </a:r>
+            <a:endParaRPr lang="en-US" dirty="0"/>
+          </a:p>
+        </p:txBody>
+      </p:sp>
+      <p:sp>
+        <p:nvSpPr>
+          <p:cNvPr id="4" name="Tijdelijke aanduiding voor voettekst 3"/>
+          <p:cNvSpPr>
+            <a:spLocks noGrp="1"/>
+          </p:cNvSpPr>
+          <p:nvPr>
+            <p:ph type="ftr" sz="quarter" idx="11"/>
+          </p:nvPr>
+        </p:nvSpPr>
+        <p:spPr/>
+        <p:txBody>
+          <a:bodyPr/>
+          <a:lstStyle/>
+          <a:p>
+            <a:r>
+              <a:rPr lang="en-US" smtClean="0"/>
+              <a:t>© Sioux 2013 | Confidential | </a:t>
+            </a:r>
+            <a:endParaRPr lang="en-US"/>
+          </a:p>
+        </p:txBody>
+      </p:sp>
+      <p:sp>
+        <p:nvSpPr>
+          <p:cNvPr id="5" name="Tijdelijke aanduiding voor dianummer 4"/>
+          <p:cNvSpPr>
+            <a:spLocks noGrp="1"/>
+          </p:cNvSpPr>
+          <p:nvPr>
+            <p:ph type="sldNum" sz="quarter" idx="12"/>
+          </p:nvPr>
+        </p:nvSpPr>
+        <p:spPr/>
+        <p:txBody>
+          <a:bodyPr/>
+          <a:lstStyle/>
+          <a:p>
+            <a:fld id="{B60E6772-B9F1-4672-903F-323A7A0E6EBD}" type="slidenum">
+              <a:rPr lang="en-US" smtClean="0"/>
+              <a:pPr/>
+              <a:t>14</a:t>
             </a:fld>
             <a:endParaRPr lang="en-US"/>
           </a:p>
@@ -5210,7 +5628,7 @@
 </p:sld>
 </file>
 
-<file path=ppt/slides/slide13.xml><?xml version="1.0" encoding="utf-8"?>
+<file path=ppt/slides/slide15.xml><?xml version="1.0" encoding="utf-8"?>
 <p:sld xmlns:a="http://schemas.openxmlformats.org/drawingml/2006/main" xmlns:r="http://schemas.openxmlformats.org/officeDocument/2006/relationships" xmlns:p="http://schemas.openxmlformats.org/presentationml/2006/main">
   <p:cSld>
     <p:spTree>
@@ -5338,7 +5756,7 @@
             <a:fld id="{B60E6772-B9F1-4672-903F-323A7A0E6EBD}" type="slidenum">
               <a:rPr lang="en-GB" smtClean="0"/>
               <a:pPr/>
-              <a:t>13</a:t>
+              <a:t>15</a:t>
             </a:fld>
             <a:endParaRPr lang="en-GB"/>
           </a:p>
@@ -5474,7 +5892,7 @@
                 <a:tabLst/>
                 <a:defRPr/>
               </a:pPr>
-              <a:t>13</a:t>
+              <a:t>15</a:t>
             </a:fld>
             <a:endParaRPr kumimoji="0" lang="en-GB" sz="800" b="0" i="0" u="none" strike="noStrike" kern="1200" cap="none" spc="0" normalizeH="0" baseline="0" noProof="0" smtClean="0">
               <a:ln>
@@ -5528,7 +5946,7 @@
                 </a:solidFill>
               </a:rPr>
               <a:pPr/>
-              <a:t>13</a:t>
+              <a:t>15</a:t>
             </a:fld>
             <a:endParaRPr lang="en-GB" sz="900">
               <a:solidFill>
@@ -6575,7 +6993,7 @@
 </p:sld>
 </file>
 
-<file path=ppt/slides/slide14.xml><?xml version="1.0" encoding="utf-8"?>
+<file path=ppt/slides/slide16.xml><?xml version="1.0" encoding="utf-8"?>
 <p:sld xmlns:a="http://schemas.openxmlformats.org/drawingml/2006/main" xmlns:r="http://schemas.openxmlformats.org/officeDocument/2006/relationships" xmlns:p="http://schemas.openxmlformats.org/presentationml/2006/main">
   <p:cSld>
     <p:spTree>
@@ -6610,7 +7028,7 @@
             <a:fld id="{B60E6772-B9F1-4672-903F-323A7A0E6EBD}" type="slidenum">
               <a:rPr lang="en-GB" smtClean="0"/>
               <a:pPr/>
-              <a:t>14</a:t>
+              <a:t>16</a:t>
             </a:fld>
             <a:endParaRPr lang="en-GB"/>
           </a:p>
@@ -10013,6 +10431,10 @@
           <a:bodyPr/>
           <a:lstStyle/>
           <a:p>
+            <a:r>
+              <a:rPr lang="en-US" dirty="0" smtClean="0"/>
+              <a:t>Dissecting a dissector</a:t>
+            </a:r>
             <a:endParaRPr lang="en-US" dirty="0"/>
           </a:p>
         </p:txBody>

</xml_diff>

<commit_message>
[doc] move slide around
</commit_message>
<xml_diff>
--- a/Lua Wireshark Dissectors.pptx
+++ b/Lua Wireshark Dissectors.pptx
@@ -5,10 +5,10 @@
     <p:sldMasterId id="2147483648" r:id="rId1"/>
   </p:sldMasterIdLst>
   <p:notesMasterIdLst>
-    <p:notesMasterId r:id="rId18"/>
+    <p:notesMasterId r:id="rId19"/>
   </p:notesMasterIdLst>
   <p:handoutMasterIdLst>
-    <p:handoutMasterId r:id="rId19"/>
+    <p:handoutMasterId r:id="rId20"/>
   </p:handoutMasterIdLst>
   <p:sldIdLst>
     <p:sldId id="259" r:id="rId2"/>
@@ -19,14 +19,15 @@
     <p:sldId id="270" r:id="rId7"/>
     <p:sldId id="266" r:id="rId8"/>
     <p:sldId id="267" r:id="rId9"/>
-    <p:sldId id="271" r:id="rId10"/>
-    <p:sldId id="272" r:id="rId11"/>
-    <p:sldId id="273" r:id="rId12"/>
-    <p:sldId id="274" r:id="rId13"/>
-    <p:sldId id="265" r:id="rId14"/>
-    <p:sldId id="264" r:id="rId15"/>
-    <p:sldId id="258" r:id="rId16"/>
-    <p:sldId id="260" r:id="rId17"/>
+    <p:sldId id="264" r:id="rId10"/>
+    <p:sldId id="271" r:id="rId11"/>
+    <p:sldId id="272" r:id="rId12"/>
+    <p:sldId id="273" r:id="rId13"/>
+    <p:sldId id="274" r:id="rId14"/>
+    <p:sldId id="275" r:id="rId15"/>
+    <p:sldId id="276" r:id="rId16"/>
+    <p:sldId id="265" r:id="rId17"/>
+    <p:sldId id="260" r:id="rId18"/>
   </p:sldIdLst>
   <p:sldSz cx="9144000" cy="5143500" type="screen16x9"/>
   <p:notesSz cx="6858000" cy="9144000"/>
@@ -125,6 +126,40 @@
       </a:defRPr>
     </a:lvl9pPr>
   </p:defaultTextStyle>
+  <p:extLst>
+    <p:ext uri="{521415D9-36F7-43E2-AB2F-B90AF26B5E84}">
+      <p14:sectionLst xmlns:p14="http://schemas.microsoft.com/office/powerpoint/2010/main">
+        <p14:section name="Standaardsectie" id="{6DFCAA08-B615-48B9-A55F-F277298D24F9}">
+          <p14:sldIdLst>
+            <p14:sldId id="259"/>
+            <p14:sldId id="261"/>
+            <p14:sldId id="262"/>
+            <p14:sldId id="263"/>
+            <p14:sldId id="268"/>
+            <p14:sldId id="270"/>
+            <p14:sldId id="266"/>
+            <p14:sldId id="267"/>
+            <p14:sldId id="264"/>
+            <p14:sldId id="271"/>
+            <p14:sldId id="272"/>
+            <p14:sldId id="273"/>
+          </p14:sldIdLst>
+        </p14:section>
+        <p14:section name="Naamloze sectie" id="{0A15FF24-BCDA-41BA-AFBA-ED0352ADECBC}">
+          <p14:sldIdLst/>
+        </p14:section>
+        <p14:section name="Naamloze sectie" id="{4C877596-24D6-42BC-8590-5D91782CE8EC}">
+          <p14:sldIdLst>
+            <p14:sldId id="274"/>
+            <p14:sldId id="275"/>
+            <p14:sldId id="276"/>
+            <p14:sldId id="265"/>
+            <p14:sldId id="260"/>
+          </p14:sldIdLst>
+        </p14:section>
+      </p14:sectionLst>
+    </p:ext>
+  </p:extLst>
 </p:presentation>
 </file>
 
@@ -941,7 +976,7 @@
             <a:fld id="{559C4A52-4ACF-44E6-B7A9-3756997F58DA}" type="slidenum">
               <a:rPr lang="en-US" smtClean="0"/>
               <a:pPr/>
-              <a:t>16</a:t>
+              <a:t>17</a:t>
             </a:fld>
             <a:endParaRPr lang="en-US"/>
           </a:p>
@@ -4657,7 +4692,7 @@
           <a:p>
             <a:r>
               <a:rPr lang="en-US" dirty="0" smtClean="0"/>
-              <a:t>Declare the fields</a:t>
+              <a:t>Declare the protocol</a:t>
             </a:r>
           </a:p>
           <a:p>
@@ -4667,11 +4702,17 @@
           <a:p>
             <a:r>
               <a:rPr lang="en-US" dirty="0" smtClean="0"/>
-              <a:t>Enumeration fields:</a:t>
+              <a:t>Declare the dissector function</a:t>
             </a:r>
           </a:p>
           <a:p>
             <a:endParaRPr lang="en-US" dirty="0"/>
+          </a:p>
+          <a:p>
+            <a:r>
+              <a:rPr lang="en-US" dirty="0" smtClean="0"/>
+              <a:t>Bind to a dissector table</a:t>
+            </a:r>
           </a:p>
           <a:p>
             <a:pPr lvl="1"/>
@@ -4721,6 +4762,307 @@
               <a:rPr lang="en-US" smtClean="0"/>
               <a:pPr/>
               <a:t>10</a:t>
+            </a:fld>
+            <a:endParaRPr lang="en-US"/>
+          </a:p>
+        </p:txBody>
+      </p:sp>
+      <p:pic>
+        <p:nvPicPr>
+          <p:cNvPr id="3075" name="Picture 3"/>
+          <p:cNvPicPr>
+            <a:picLocks noChangeAspect="1" noChangeArrowheads="1"/>
+          </p:cNvPicPr>
+          <p:nvPr/>
+        </p:nvPicPr>
+        <p:blipFill>
+          <a:blip r:embed="rId2">
+            <a:extLst>
+              <a:ext uri="{28A0092B-C50C-407E-A947-70E740481C1C}">
+                <a14:useLocalDpi xmlns:a14="http://schemas.microsoft.com/office/drawing/2010/main" val="0"/>
+              </a:ext>
+            </a:extLst>
+          </a:blip>
+          <a:srcRect/>
+          <a:stretch>
+            <a:fillRect/>
+          </a:stretch>
+        </p:blipFill>
+        <p:spPr bwMode="auto">
+          <a:xfrm>
+            <a:off x="1295400" y="1838561"/>
+            <a:ext cx="4548554" cy="304800"/>
+          </a:xfrm>
+          <a:prstGeom prst="rect">
+            <a:avLst/>
+          </a:prstGeom>
+          <a:noFill/>
+          <a:ln>
+            <a:noFill/>
+          </a:ln>
+          <a:extLst>
+            <a:ext uri="{909E8E84-426E-40DD-AFC4-6F175D3DCCD1}">
+              <a14:hiddenFill xmlns:a14="http://schemas.microsoft.com/office/drawing/2010/main">
+                <a:solidFill>
+                  <a:schemeClr val="accent1"/>
+                </a:solidFill>
+              </a14:hiddenFill>
+            </a:ext>
+            <a:ext uri="{91240B29-F687-4F45-9708-019B960494DF}">
+              <a14:hiddenLine xmlns:a14="http://schemas.microsoft.com/office/drawing/2010/main" w="9525">
+                <a:solidFill>
+                  <a:schemeClr val="tx1"/>
+                </a:solidFill>
+                <a:miter lim="800000"/>
+                <a:headEnd/>
+                <a:tailEnd/>
+              </a14:hiddenLine>
+            </a:ext>
+          </a:extLst>
+        </p:spPr>
+      </p:pic>
+      <p:pic>
+        <p:nvPicPr>
+          <p:cNvPr id="3076" name="Picture 4"/>
+          <p:cNvPicPr>
+            <a:picLocks noChangeAspect="1" noChangeArrowheads="1"/>
+          </p:cNvPicPr>
+          <p:nvPr/>
+        </p:nvPicPr>
+        <p:blipFill>
+          <a:blip r:embed="rId3">
+            <a:extLst>
+              <a:ext uri="{28A0092B-C50C-407E-A947-70E740481C1C}">
+                <a14:useLocalDpi xmlns:a14="http://schemas.microsoft.com/office/drawing/2010/main" val="0"/>
+              </a:ext>
+            </a:extLst>
+          </a:blip>
+          <a:srcRect/>
+          <a:stretch>
+            <a:fillRect/>
+          </a:stretch>
+        </p:blipFill>
+        <p:spPr bwMode="auto">
+          <a:xfrm>
+            <a:off x="1318071" y="2866710"/>
+            <a:ext cx="4086225" cy="552450"/>
+          </a:xfrm>
+          <a:prstGeom prst="rect">
+            <a:avLst/>
+          </a:prstGeom>
+          <a:noFill/>
+          <a:ln>
+            <a:noFill/>
+          </a:ln>
+          <a:extLst>
+            <a:ext uri="{909E8E84-426E-40DD-AFC4-6F175D3DCCD1}">
+              <a14:hiddenFill xmlns:a14="http://schemas.microsoft.com/office/drawing/2010/main">
+                <a:solidFill>
+                  <a:schemeClr val="accent1"/>
+                </a:solidFill>
+              </a14:hiddenFill>
+            </a:ext>
+            <a:ext uri="{91240B29-F687-4F45-9708-019B960494DF}">
+              <a14:hiddenLine xmlns:a14="http://schemas.microsoft.com/office/drawing/2010/main" w="9525">
+                <a:solidFill>
+                  <a:schemeClr val="tx1"/>
+                </a:solidFill>
+                <a:miter lim="800000"/>
+                <a:headEnd/>
+                <a:tailEnd/>
+              </a14:hiddenLine>
+            </a:ext>
+          </a:extLst>
+        </p:spPr>
+      </p:pic>
+      <p:pic>
+        <p:nvPicPr>
+          <p:cNvPr id="3077" name="Picture 5"/>
+          <p:cNvPicPr>
+            <a:picLocks noChangeAspect="1" noChangeArrowheads="1"/>
+          </p:cNvPicPr>
+          <p:nvPr/>
+        </p:nvPicPr>
+        <p:blipFill>
+          <a:blip r:embed="rId4">
+            <a:extLst>
+              <a:ext uri="{28A0092B-C50C-407E-A947-70E740481C1C}">
+                <a14:useLocalDpi xmlns:a14="http://schemas.microsoft.com/office/drawing/2010/main" val="0"/>
+              </a:ext>
+            </a:extLst>
+          </a:blip>
+          <a:srcRect/>
+          <a:stretch>
+            <a:fillRect/>
+          </a:stretch>
+        </p:blipFill>
+        <p:spPr bwMode="auto">
+          <a:xfrm>
+            <a:off x="1269580" y="4019550"/>
+            <a:ext cx="4206240" cy="457200"/>
+          </a:xfrm>
+          <a:prstGeom prst="rect">
+            <a:avLst/>
+          </a:prstGeom>
+          <a:noFill/>
+          <a:ln>
+            <a:noFill/>
+          </a:ln>
+          <a:extLst>
+            <a:ext uri="{909E8E84-426E-40DD-AFC4-6F175D3DCCD1}">
+              <a14:hiddenFill xmlns:a14="http://schemas.microsoft.com/office/drawing/2010/main">
+                <a:solidFill>
+                  <a:schemeClr val="accent1"/>
+                </a:solidFill>
+              </a14:hiddenFill>
+            </a:ext>
+            <a:ext uri="{91240B29-F687-4F45-9708-019B960494DF}">
+              <a14:hiddenLine xmlns:a14="http://schemas.microsoft.com/office/drawing/2010/main" w="9525">
+                <a:solidFill>
+                  <a:schemeClr val="tx1"/>
+                </a:solidFill>
+                <a:miter lim="800000"/>
+                <a:headEnd/>
+                <a:tailEnd/>
+              </a14:hiddenLine>
+            </a:ext>
+          </a:extLst>
+        </p:spPr>
+      </p:pic>
+    </p:spTree>
+    <p:extLst>
+      <p:ext uri="{BB962C8B-B14F-4D97-AF65-F5344CB8AC3E}">
+        <p14:creationId xmlns:p14="http://schemas.microsoft.com/office/powerpoint/2010/main" val="1469939123"/>
+      </p:ext>
+    </p:extLst>
+  </p:cSld>
+  <p:clrMapOvr>
+    <a:masterClrMapping/>
+  </p:clrMapOvr>
+</p:sld>
+</file>
+
+<file path=ppt/slides/slide11.xml><?xml version="1.0" encoding="utf-8"?>
+<p:sld xmlns:a="http://schemas.openxmlformats.org/drawingml/2006/main" xmlns:r="http://schemas.openxmlformats.org/officeDocument/2006/relationships" xmlns:p="http://schemas.openxmlformats.org/presentationml/2006/main">
+  <p:cSld>
+    <p:spTree>
+      <p:nvGrpSpPr>
+        <p:cNvPr id="1" name=""/>
+        <p:cNvGrpSpPr/>
+        <p:nvPr/>
+      </p:nvGrpSpPr>
+      <p:grpSpPr>
+        <a:xfrm>
+          <a:off x="0" y="0"/>
+          <a:ext cx="0" cy="0"/>
+          <a:chOff x="0" y="0"/>
+          <a:chExt cx="0" cy="0"/>
+        </a:xfrm>
+      </p:grpSpPr>
+      <p:sp>
+        <p:nvSpPr>
+          <p:cNvPr id="2" name="Titel 1"/>
+          <p:cNvSpPr>
+            <a:spLocks noGrp="1"/>
+          </p:cNvSpPr>
+          <p:nvPr>
+            <p:ph type="title"/>
+          </p:nvPr>
+        </p:nvSpPr>
+        <p:spPr/>
+        <p:txBody>
+          <a:bodyPr/>
+          <a:lstStyle/>
+          <a:p>
+            <a:r>
+              <a:rPr lang="en-US" dirty="0" smtClean="0"/>
+              <a:t>Dissecting a dissector</a:t>
+            </a:r>
+            <a:endParaRPr lang="en-US" dirty="0"/>
+          </a:p>
+        </p:txBody>
+      </p:sp>
+      <p:sp>
+        <p:nvSpPr>
+          <p:cNvPr id="3" name="Tijdelijke aanduiding voor inhoud 2"/>
+          <p:cNvSpPr>
+            <a:spLocks noGrp="1"/>
+          </p:cNvSpPr>
+          <p:nvPr>
+            <p:ph idx="1"/>
+          </p:nvPr>
+        </p:nvSpPr>
+        <p:spPr/>
+        <p:txBody>
+          <a:bodyPr/>
+          <a:lstStyle/>
+          <a:p>
+            <a:r>
+              <a:rPr lang="en-US" dirty="0" smtClean="0"/>
+              <a:t>Declare the fields</a:t>
+            </a:r>
+          </a:p>
+          <a:p>
+            <a:pPr lvl="1"/>
+            <a:endParaRPr lang="en-US" dirty="0" smtClean="0"/>
+          </a:p>
+          <a:p>
+            <a:r>
+              <a:rPr lang="en-US" dirty="0" smtClean="0"/>
+              <a:t>Enumeration fields:</a:t>
+            </a:r>
+          </a:p>
+          <a:p>
+            <a:endParaRPr lang="en-US" dirty="0"/>
+          </a:p>
+          <a:p>
+            <a:pPr lvl="1"/>
+            <a:endParaRPr lang="en-US" dirty="0"/>
+          </a:p>
+        </p:txBody>
+      </p:sp>
+      <p:sp>
+        <p:nvSpPr>
+          <p:cNvPr id="4" name="Tijdelijke aanduiding voor voettekst 3"/>
+          <p:cNvSpPr>
+            <a:spLocks noGrp="1"/>
+          </p:cNvSpPr>
+          <p:nvPr>
+            <p:ph type="ftr" sz="quarter" idx="11"/>
+          </p:nvPr>
+        </p:nvSpPr>
+        <p:spPr/>
+        <p:txBody>
+          <a:bodyPr/>
+          <a:lstStyle/>
+          <a:p>
+            <a:r>
+              <a:rPr lang="en-US" smtClean="0"/>
+              <a:t>© Sioux 2013 | Confidential | </a:t>
+            </a:r>
+            <a:endParaRPr lang="en-US"/>
+          </a:p>
+        </p:txBody>
+      </p:sp>
+      <p:sp>
+        <p:nvSpPr>
+          <p:cNvPr id="5" name="Tijdelijke aanduiding voor dianummer 4"/>
+          <p:cNvSpPr>
+            <a:spLocks noGrp="1"/>
+          </p:cNvSpPr>
+          <p:nvPr>
+            <p:ph type="sldNum" sz="quarter" idx="12"/>
+          </p:nvPr>
+        </p:nvSpPr>
+        <p:spPr/>
+        <p:txBody>
+          <a:bodyPr/>
+          <a:lstStyle/>
+          <a:p>
+            <a:fld id="{B60E6772-B9F1-4672-903F-323A7A0E6EBD}" type="slidenum">
+              <a:rPr lang="en-US" smtClean="0"/>
+              <a:pPr/>
+              <a:t>11</a:t>
             </a:fld>
             <a:endParaRPr lang="en-US"/>
           </a:p>
@@ -4847,7 +5189,7 @@
 </p:sld>
 </file>
 
-<file path=ppt/slides/slide11.xml><?xml version="1.0" encoding="utf-8"?>
+<file path=ppt/slides/slide12.xml><?xml version="1.0" encoding="utf-8"?>
 <p:sld xmlns:a="http://schemas.openxmlformats.org/drawingml/2006/main" xmlns:r="http://schemas.openxmlformats.org/officeDocument/2006/relationships" xmlns:p="http://schemas.openxmlformats.org/presentationml/2006/main">
   <p:cSld>
     <p:spTree>
@@ -4967,7 +5309,7 @@
             <a:fld id="{B60E6772-B9F1-4672-903F-323A7A0E6EBD}" type="slidenum">
               <a:rPr lang="en-US" smtClean="0"/>
               <a:pPr/>
-              <a:t>11</a:t>
+              <a:t>12</a:t>
             </a:fld>
             <a:endParaRPr lang="en-US"/>
           </a:p>
@@ -5040,7 +5382,7 @@
 </p:sld>
 </file>
 
-<file path=ppt/slides/slide12.xml><?xml version="1.0" encoding="utf-8"?>
+<file path=ppt/slides/slide13.xml><?xml version="1.0" encoding="utf-8"?>
 <p:sld xmlns:a="http://schemas.openxmlformats.org/drawingml/2006/main" xmlns:r="http://schemas.openxmlformats.org/officeDocument/2006/relationships" xmlns:p="http://schemas.openxmlformats.org/presentationml/2006/main">
   <p:cSld>
     <p:spTree>
@@ -5168,7 +5510,7 @@
             <a:fld id="{B60E6772-B9F1-4672-903F-323A7A0E6EBD}" type="slidenum">
               <a:rPr lang="en-US" smtClean="0"/>
               <a:pPr/>
-              <a:t>12</a:t>
+              <a:t>13</a:t>
             </a:fld>
             <a:endParaRPr lang="en-US"/>
           </a:p>
@@ -5349,184 +5691,6 @@
 </p:sld>
 </file>
 
-<file path=ppt/slides/slide13.xml><?xml version="1.0" encoding="utf-8"?>
-<p:sld xmlns:a="http://schemas.openxmlformats.org/drawingml/2006/main" xmlns:r="http://schemas.openxmlformats.org/officeDocument/2006/relationships" xmlns:p="http://schemas.openxmlformats.org/presentationml/2006/main">
-  <p:cSld>
-    <p:spTree>
-      <p:nvGrpSpPr>
-        <p:cNvPr id="1" name=""/>
-        <p:cNvGrpSpPr/>
-        <p:nvPr/>
-      </p:nvGrpSpPr>
-      <p:grpSpPr>
-        <a:xfrm>
-          <a:off x="0" y="0"/>
-          <a:ext cx="0" cy="0"/>
-          <a:chOff x="0" y="0"/>
-          <a:chExt cx="0" cy="0"/>
-        </a:xfrm>
-      </p:grpSpPr>
-      <p:sp>
-        <p:nvSpPr>
-          <p:cNvPr id="2" name="Titel 1"/>
-          <p:cNvSpPr>
-            <a:spLocks noGrp="1"/>
-          </p:cNvSpPr>
-          <p:nvPr>
-            <p:ph type="title"/>
-          </p:nvPr>
-        </p:nvSpPr>
-        <p:spPr/>
-        <p:txBody>
-          <a:bodyPr/>
-          <a:lstStyle/>
-          <a:p>
-            <a:r>
-              <a:rPr lang="en-US" dirty="0" smtClean="0"/>
-              <a:t>Links</a:t>
-            </a:r>
-            <a:endParaRPr lang="en-US" dirty="0"/>
-          </a:p>
-        </p:txBody>
-      </p:sp>
-      <p:sp>
-        <p:nvSpPr>
-          <p:cNvPr id="3" name="Tijdelijke aanduiding voor inhoud 2"/>
-          <p:cNvSpPr>
-            <a:spLocks noGrp="1"/>
-          </p:cNvSpPr>
-          <p:nvPr>
-            <p:ph idx="1"/>
-          </p:nvPr>
-        </p:nvSpPr>
-        <p:spPr/>
-        <p:txBody>
-          <a:bodyPr/>
-          <a:lstStyle/>
-          <a:p>
-            <a:r>
-              <a:rPr lang="en-US" dirty="0"/>
-              <a:t>Getting started: </a:t>
-            </a:r>
-            <a:endParaRPr lang="en-US" dirty="0" smtClean="0"/>
-          </a:p>
-          <a:p>
-            <a:pPr marL="704850" lvl="2" indent="-342900"/>
-            <a:r>
-              <a:rPr lang="en-US" dirty="0">
-                <a:hlinkClick r:id="rId2"/>
-              </a:rPr>
-              <a:t>http://</a:t>
-            </a:r>
-            <a:r>
-              <a:rPr lang="en-US" dirty="0" smtClean="0">
-                <a:hlinkClick r:id="rId2"/>
-              </a:rPr>
-              <a:t>wiki.wireshark.org/Lua</a:t>
-            </a:r>
-            <a:endParaRPr lang="en-US" dirty="0"/>
-          </a:p>
-          <a:p>
-            <a:r>
-              <a:rPr lang="en-US" dirty="0" smtClean="0"/>
-              <a:t>Details</a:t>
-            </a:r>
-          </a:p>
-          <a:p>
-            <a:pPr lvl="1"/>
-            <a:r>
-              <a:rPr lang="en-US" dirty="0" smtClean="0">
-                <a:hlinkClick r:id="rId3"/>
-              </a:rPr>
-              <a:t>http</a:t>
-            </a:r>
-            <a:r>
-              <a:rPr lang="en-US" dirty="0">
-                <a:hlinkClick r:id="rId3"/>
-              </a:rPr>
-              <a:t>://ask.wireshark.org/</a:t>
-            </a:r>
-            <a:endParaRPr lang="en-US" dirty="0"/>
-          </a:p>
-          <a:p>
-            <a:pPr lvl="1"/>
-            <a:r>
-              <a:rPr lang="en-US" dirty="0">
-                <a:hlinkClick r:id="rId4"/>
-              </a:rPr>
-              <a:t>http://stackoverflow.com/</a:t>
-            </a:r>
-            <a:endParaRPr lang="en-US" dirty="0"/>
-          </a:p>
-          <a:p>
-            <a:endParaRPr lang="en-US" dirty="0" smtClean="0"/>
-          </a:p>
-          <a:p>
-            <a:pPr lvl="1"/>
-            <a:endParaRPr lang="en-US" dirty="0"/>
-          </a:p>
-        </p:txBody>
-      </p:sp>
-      <p:sp>
-        <p:nvSpPr>
-          <p:cNvPr id="4" name="Tijdelijke aanduiding voor voettekst 3"/>
-          <p:cNvSpPr>
-            <a:spLocks noGrp="1"/>
-          </p:cNvSpPr>
-          <p:nvPr>
-            <p:ph type="ftr" sz="quarter" idx="11"/>
-          </p:nvPr>
-        </p:nvSpPr>
-        <p:spPr/>
-        <p:txBody>
-          <a:bodyPr/>
-          <a:lstStyle/>
-          <a:p>
-            <a:r>
-              <a:rPr lang="en-US" smtClean="0"/>
-              <a:t>© Sioux 2013 | Confidential | </a:t>
-            </a:r>
-            <a:endParaRPr lang="en-US"/>
-          </a:p>
-        </p:txBody>
-      </p:sp>
-      <p:sp>
-        <p:nvSpPr>
-          <p:cNvPr id="5" name="Tijdelijke aanduiding voor dianummer 4"/>
-          <p:cNvSpPr>
-            <a:spLocks noGrp="1"/>
-          </p:cNvSpPr>
-          <p:nvPr>
-            <p:ph type="sldNum" sz="quarter" idx="12"/>
-          </p:nvPr>
-        </p:nvSpPr>
-        <p:spPr/>
-        <p:txBody>
-          <a:bodyPr/>
-          <a:lstStyle/>
-          <a:p>
-            <a:fld id="{B60E6772-B9F1-4672-903F-323A7A0E6EBD}" type="slidenum">
-              <a:rPr lang="en-US" smtClean="0"/>
-              <a:pPr/>
-              <a:t>13</a:t>
-            </a:fld>
-            <a:endParaRPr lang="en-US"/>
-          </a:p>
-        </p:txBody>
-      </p:sp>
-    </p:spTree>
-    <p:extLst>
-      <p:ext uri="{BB962C8B-B14F-4D97-AF65-F5344CB8AC3E}">
-        <p14:creationId xmlns:p14="http://schemas.microsoft.com/office/powerpoint/2010/main" val="2861604159"/>
-      </p:ext>
-    </p:extLst>
-  </p:cSld>
-  <p:clrMapOvr>
-    <a:masterClrMapping/>
-  </p:clrMapOvr>
-</p:sld>
-</file>
-
 <file path=ppt/slides/slide14.xml><?xml version="1.0" encoding="utf-8"?>
 <p:sld xmlns:a="http://schemas.openxmlformats.org/drawingml/2006/main" xmlns:r="http://schemas.openxmlformats.org/officeDocument/2006/relationships" xmlns:p="http://schemas.openxmlformats.org/presentationml/2006/main">
   <p:cSld>
@@ -5559,6 +5723,10 @@
           <a:bodyPr/>
           <a:lstStyle/>
           <a:p>
+            <a:r>
+              <a:rPr lang="en-US" dirty="0" smtClean="0"/>
+              <a:t>Extras</a:t>
+            </a:r>
             <a:endParaRPr lang="en-US" dirty="0"/>
           </a:p>
         </p:txBody>
@@ -5580,8 +5748,36 @@
           <a:p>
             <a:r>
               <a:rPr lang="en-US" dirty="0" smtClean="0"/>
-              <a:t>Finding your entry point</a:t>
-            </a:r>
+              <a:t>Loopback on windows: </a:t>
+            </a:r>
+            <a:r>
+              <a:rPr lang="en-US" dirty="0" err="1" smtClean="0"/>
+              <a:t>rawcap</a:t>
+            </a:r>
+            <a:r>
+              <a:rPr lang="en-US" dirty="0" smtClean="0"/>
+              <a:t> needed</a:t>
+            </a:r>
+          </a:p>
+          <a:p>
+            <a:r>
+              <a:rPr lang="en-US" dirty="0" err="1" smtClean="0"/>
+              <a:t>Endianness</a:t>
+            </a:r>
+            <a:endParaRPr lang="en-US" dirty="0" smtClean="0"/>
+          </a:p>
+          <a:p>
+            <a:r>
+              <a:rPr lang="en-US" dirty="0" smtClean="0"/>
+              <a:t>Conversations, </a:t>
+            </a:r>
+            <a:r>
+              <a:rPr lang="en-US" smtClean="0"/>
+              <a:t>multi-packet messages, …</a:t>
+            </a:r>
+            <a:endParaRPr lang="en-US" dirty="0" smtClean="0"/>
+          </a:p>
+          <a:p>
             <a:endParaRPr lang="en-US" dirty="0"/>
           </a:p>
         </p:txBody>
@@ -5633,118 +5829,10 @@
           </a:p>
         </p:txBody>
       </p:sp>
-      <p:pic>
-        <p:nvPicPr>
-          <p:cNvPr id="1026" name="Picture 2"/>
-          <p:cNvPicPr>
-            <a:picLocks noChangeAspect="1" noChangeArrowheads="1"/>
-          </p:cNvPicPr>
-          <p:nvPr/>
-        </p:nvPicPr>
-        <p:blipFill>
-          <a:blip r:embed="rId2">
-            <a:extLst>
-              <a:ext uri="{28A0092B-C50C-407E-A947-70E740481C1C}">
-                <a14:useLocalDpi xmlns:a14="http://schemas.microsoft.com/office/drawing/2010/main" val="0"/>
-              </a:ext>
-            </a:extLst>
-          </a:blip>
-          <a:srcRect/>
-          <a:stretch>
-            <a:fillRect/>
-          </a:stretch>
-        </p:blipFill>
-        <p:spPr bwMode="auto">
-          <a:xfrm>
-            <a:off x="609600" y="1809750"/>
-            <a:ext cx="2590800" cy="2886075"/>
-          </a:xfrm>
-          <a:prstGeom prst="rect">
-            <a:avLst/>
-          </a:prstGeom>
-          <a:noFill/>
-          <a:ln>
-            <a:noFill/>
-          </a:ln>
-          <a:extLst>
-            <a:ext uri="{909E8E84-426E-40DD-AFC4-6F175D3DCCD1}">
-              <a14:hiddenFill xmlns:a14="http://schemas.microsoft.com/office/drawing/2010/main">
-                <a:solidFill>
-                  <a:schemeClr val="accent1"/>
-                </a:solidFill>
-              </a14:hiddenFill>
-            </a:ext>
-            <a:ext uri="{91240B29-F687-4F45-9708-019B960494DF}">
-              <a14:hiddenLine xmlns:a14="http://schemas.microsoft.com/office/drawing/2010/main" w="9525">
-                <a:solidFill>
-                  <a:schemeClr val="tx1"/>
-                </a:solidFill>
-                <a:miter lim="800000"/>
-                <a:headEnd/>
-                <a:tailEnd/>
-              </a14:hiddenLine>
-            </a:ext>
-          </a:extLst>
-        </p:spPr>
-      </p:pic>
-      <p:pic>
-        <p:nvPicPr>
-          <p:cNvPr id="1027" name="Picture 3"/>
-          <p:cNvPicPr>
-            <a:picLocks noChangeAspect="1" noChangeArrowheads="1"/>
-          </p:cNvPicPr>
-          <p:nvPr/>
-        </p:nvPicPr>
-        <p:blipFill>
-          <a:blip r:embed="rId3">
-            <a:extLst>
-              <a:ext uri="{28A0092B-C50C-407E-A947-70E740481C1C}">
-                <a14:useLocalDpi xmlns:a14="http://schemas.microsoft.com/office/drawing/2010/main" val="0"/>
-              </a:ext>
-            </a:extLst>
-          </a:blip>
-          <a:srcRect/>
-          <a:stretch>
-            <a:fillRect/>
-          </a:stretch>
-        </p:blipFill>
-        <p:spPr bwMode="auto">
-          <a:xfrm>
-            <a:off x="3621074" y="1885948"/>
-            <a:ext cx="5114925" cy="2505075"/>
-          </a:xfrm>
-          <a:prstGeom prst="rect">
-            <a:avLst/>
-          </a:prstGeom>
-          <a:noFill/>
-          <a:ln>
-            <a:noFill/>
-          </a:ln>
-          <a:extLst>
-            <a:ext uri="{909E8E84-426E-40DD-AFC4-6F175D3DCCD1}">
-              <a14:hiddenFill xmlns:a14="http://schemas.microsoft.com/office/drawing/2010/main">
-                <a:solidFill>
-                  <a:schemeClr val="accent1"/>
-                </a:solidFill>
-              </a14:hiddenFill>
-            </a:ext>
-            <a:ext uri="{91240B29-F687-4F45-9708-019B960494DF}">
-              <a14:hiddenLine xmlns:a14="http://schemas.microsoft.com/office/drawing/2010/main" w="9525">
-                <a:solidFill>
-                  <a:schemeClr val="tx1"/>
-                </a:solidFill>
-                <a:miter lim="800000"/>
-                <a:headEnd/>
-                <a:tailEnd/>
-              </a14:hiddenLine>
-            </a:ext>
-          </a:extLst>
-        </p:spPr>
-      </p:pic>
     </p:spTree>
     <p:extLst>
       <p:ext uri="{BB962C8B-B14F-4D97-AF65-F5344CB8AC3E}">
-        <p14:creationId xmlns:p14="http://schemas.microsoft.com/office/powerpoint/2010/main" val="1390328558"/>
+        <p14:creationId xmlns:p14="http://schemas.microsoft.com/office/powerpoint/2010/main" val="1586431957"/>
       </p:ext>
     </p:extLst>
   </p:cSld>
@@ -5773,7 +5861,7 @@
       </p:grpSpPr>
       <p:sp>
         <p:nvSpPr>
-          <p:cNvPr id="2" name="Title 1"/>
+          <p:cNvPr id="2" name="Titel 1"/>
           <p:cNvSpPr>
             <a:spLocks noGrp="1"/>
           </p:cNvSpPr>
@@ -5781,40 +5869,22 @@
             <p:ph type="title"/>
           </p:nvPr>
         </p:nvSpPr>
-        <p:spPr>
-          <a:xfrm>
-            <a:off x="2160000" y="0"/>
-            <a:ext cx="6624000" cy="1000114"/>
-          </a:xfrm>
-        </p:spPr>
-        <p:txBody>
-          <a:bodyPr>
-            <a:normAutofit/>
-          </a:bodyPr>
-          <a:lstStyle/>
-          <a:p>
-            <a:r>
-              <a:rPr lang="en-GB" sz="3200" noProof="1" smtClean="0"/>
-              <a:t>&lt;&lt; Colour options &gt;&gt;</a:t>
-            </a:r>
-            <a:r>
-              <a:rPr lang="en-GB" sz="1200" noProof="1" smtClean="0"/>
-              <a:t/>
-            </a:r>
-            <a:br>
-              <a:rPr lang="en-GB" sz="1200" noProof="1" smtClean="0"/>
-            </a:br>
-            <a:r>
-              <a:rPr lang="en-GB" sz="2000" noProof="1" smtClean="0"/>
-              <a:t>Remove this slide after use from the presentation.</a:t>
-            </a:r>
-            <a:endParaRPr lang="en-GB" sz="2000" dirty="0"/>
-          </a:p>
-        </p:txBody>
-      </p:sp>
-      <p:sp>
-        <p:nvSpPr>
-          <p:cNvPr id="3" name="Content Placeholder 2"/>
+        <p:spPr/>
+        <p:txBody>
+          <a:bodyPr/>
+          <a:lstStyle/>
+          <a:p>
+            <a:r>
+              <a:rPr lang="en-US" dirty="0" smtClean="0"/>
+              <a:t>Demo</a:t>
+            </a:r>
+            <a:endParaRPr lang="en-US" dirty="0"/>
+          </a:p>
+        </p:txBody>
+      </p:sp>
+      <p:sp>
+        <p:nvSpPr>
+          <p:cNvPr id="3" name="Tijdelijke aanduiding voor inhoud 2"/>
           <p:cNvSpPr>
             <a:spLocks noGrp="1"/>
           </p:cNvSpPr>
@@ -5822,28 +5892,22 @@
             <p:ph idx="1"/>
           </p:nvPr>
         </p:nvSpPr>
-        <p:spPr>
-          <a:xfrm>
-            <a:off x="360000" y="1260000"/>
-            <a:ext cx="8424000" cy="954560"/>
-          </a:xfrm>
-        </p:spPr>
-        <p:txBody>
-          <a:bodyPr>
-            <a:normAutofit lnSpcReduction="10000"/>
-          </a:bodyPr>
-          <a:lstStyle/>
-          <a:p>
-            <a:r>
-              <a:rPr lang="en-GB" noProof="1" smtClean="0"/>
-              <a:t>You can choose from the following colours for the graphic elements:</a:t>
-            </a:r>
-          </a:p>
-        </p:txBody>
-      </p:sp>
-      <p:sp>
-        <p:nvSpPr>
-          <p:cNvPr id="4" name="Footer Placeholder 3"/>
+        <p:spPr/>
+        <p:txBody>
+          <a:bodyPr/>
+          <a:lstStyle/>
+          <a:p>
+            <a:r>
+              <a:rPr lang="en-US" dirty="0" smtClean="0"/>
+              <a:t>… all goes well</a:t>
+            </a:r>
+            <a:endParaRPr lang="en-US" dirty="0"/>
+          </a:p>
+        </p:txBody>
+      </p:sp>
+      <p:sp>
+        <p:nvSpPr>
+          <p:cNvPr id="4" name="Tijdelijke aanduiding voor voettekst 3"/>
           <p:cNvSpPr>
             <a:spLocks noGrp="1"/>
           </p:cNvSpPr>
@@ -5857,16 +5921,16 @@
           <a:lstStyle/>
           <a:p>
             <a:r>
-              <a:rPr lang="en-GB" smtClean="0"/>
+              <a:rPr lang="en-US" smtClean="0"/>
               <a:t>© Sioux 2013 | Confidential | </a:t>
             </a:r>
-            <a:endParaRPr lang="en-GB"/>
-          </a:p>
-        </p:txBody>
-      </p:sp>
-      <p:sp>
-        <p:nvSpPr>
-          <p:cNvPr id="5" name="Slide Number Placeholder 4"/>
+            <a:endParaRPr lang="en-US"/>
+          </a:p>
+        </p:txBody>
+      </p:sp>
+      <p:sp>
+        <p:nvSpPr>
+          <p:cNvPr id="5" name="Tijdelijke aanduiding voor dianummer 4"/>
           <p:cNvSpPr>
             <a:spLocks noGrp="1"/>
           </p:cNvSpPr>
@@ -5880,1242 +5944,24 @@
           <a:lstStyle/>
           <a:p>
             <a:fld id="{B60E6772-B9F1-4672-903F-323A7A0E6EBD}" type="slidenum">
-              <a:rPr lang="en-GB" smtClean="0"/>
+              <a:rPr lang="en-US" smtClean="0"/>
               <a:pPr/>
               <a:t>15</a:t>
             </a:fld>
-            <a:endParaRPr lang="en-GB"/>
-          </a:p>
-        </p:txBody>
-      </p:sp>
-      <p:sp>
-        <p:nvSpPr>
-          <p:cNvPr id="26" name="Rectangle 5"/>
-          <p:cNvSpPr txBox="1">
-            <a:spLocks noChangeArrowheads="1"/>
-          </p:cNvSpPr>
-          <p:nvPr/>
-        </p:nvSpPr>
-        <p:spPr>
-          <a:xfrm>
-            <a:off x="5708650" y="6245225"/>
-            <a:ext cx="2895600" cy="476250"/>
-          </a:xfrm>
-          <a:prstGeom prst="rect">
-            <a:avLst/>
-          </a:prstGeom>
-          <a:noFill/>
-        </p:spPr>
-        <p:txBody>
-          <a:bodyPr vert="horz" lIns="91440" tIns="45720" rIns="91440" bIns="45720" rtlCol="0" anchor="ctr"/>
-          <a:lstStyle/>
-          <a:p>
-            <a:pPr marL="0" marR="0" lvl="0" indent="0" algn="r" defTabSz="914400" rtl="0" eaLnBrk="1" fontAlgn="auto" latinLnBrk="0" hangingPunct="1">
-              <a:lnSpc>
-                <a:spcPct val="100000"/>
-              </a:lnSpc>
-              <a:spcBef>
-                <a:spcPts val="0"/>
-              </a:spcBef>
-              <a:spcAft>
-                <a:spcPts val="0"/>
-              </a:spcAft>
-              <a:buClrTx/>
-              <a:buSzTx/>
-              <a:buFontTx/>
-              <a:buNone/>
-              <a:tabLst/>
-              <a:defRPr/>
-            </a:pPr>
-            <a:r>
-              <a:rPr kumimoji="0" lang="en-GB" sz="800" b="0" i="0" u="none" strike="noStrike" kern="1200" cap="none" spc="0" normalizeH="0" baseline="0" noProof="0" smtClean="0">
-                <a:ln>
-                  <a:noFill/>
-                </a:ln>
-                <a:solidFill>
-                  <a:srgbClr val="FF6633"/>
-                </a:solidFill>
-                <a:effectLst/>
-                <a:uLnTx/>
-                <a:uFillTx/>
-                <a:latin typeface="+mn-lt"/>
-                <a:ea typeface="+mn-ea"/>
-                <a:cs typeface="+mn-cs"/>
-              </a:rPr>
-              <a:t>© Sioux 2012 | Confidential |</a:t>
-            </a:r>
-          </a:p>
-        </p:txBody>
-      </p:sp>
-      <p:sp>
-        <p:nvSpPr>
-          <p:cNvPr id="27" name="Rectangle 6"/>
-          <p:cNvSpPr txBox="1">
-            <a:spLocks noChangeArrowheads="1"/>
-          </p:cNvSpPr>
-          <p:nvPr/>
-        </p:nvSpPr>
-        <p:spPr>
-          <a:xfrm>
-            <a:off x="8459788" y="6237288"/>
-            <a:ext cx="874712" cy="484187"/>
-          </a:xfrm>
-          <a:prstGeom prst="rect">
-            <a:avLst/>
-          </a:prstGeom>
-          <a:noFill/>
-        </p:spPr>
-        <p:txBody>
-          <a:bodyPr vert="horz" lIns="91440" tIns="45720" rIns="91440" bIns="45720" rtlCol="0" anchor="ctr"/>
-          <a:lstStyle/>
-          <a:p>
-            <a:pPr marL="0" marR="0" lvl="0" indent="0" algn="l" defTabSz="914400" rtl="0" eaLnBrk="1" fontAlgn="auto" latinLnBrk="0" hangingPunct="1">
-              <a:lnSpc>
-                <a:spcPct val="100000"/>
-              </a:lnSpc>
-              <a:spcBef>
-                <a:spcPts val="0"/>
-              </a:spcBef>
-              <a:spcAft>
-                <a:spcPts val="0"/>
-              </a:spcAft>
-              <a:buClrTx/>
-              <a:buSzTx/>
-              <a:buFontTx/>
-              <a:buNone/>
-              <a:tabLst/>
-              <a:defRPr/>
-            </a:pPr>
-            <a:fld id="{348B384B-53A3-40E8-B7BB-5969B76F3B35}" type="slidenum">
-              <a:rPr kumimoji="0" lang="en-GB" sz="800" b="0" i="0" u="none" strike="noStrike" kern="1200" cap="none" spc="0" normalizeH="0" baseline="0" noProof="0" smtClean="0">
-                <a:ln>
-                  <a:noFill/>
-                </a:ln>
-                <a:solidFill>
-                  <a:srgbClr val="324D5A"/>
-                </a:solidFill>
-                <a:effectLst/>
-                <a:uLnTx/>
-                <a:uFillTx/>
-                <a:latin typeface="+mn-lt"/>
-                <a:ea typeface="+mn-ea"/>
-                <a:cs typeface="+mn-cs"/>
-              </a:rPr>
-              <a:pPr marL="0" marR="0" lvl="0" indent="0" algn="l" defTabSz="914400" rtl="0" eaLnBrk="1" fontAlgn="auto" latinLnBrk="0" hangingPunct="1">
-                <a:lnSpc>
-                  <a:spcPct val="100000"/>
-                </a:lnSpc>
-                <a:spcBef>
-                  <a:spcPts val="0"/>
-                </a:spcBef>
-                <a:spcAft>
-                  <a:spcPts val="0"/>
-                </a:spcAft>
-                <a:buClrTx/>
-                <a:buSzTx/>
-                <a:buFontTx/>
-                <a:buNone/>
-                <a:tabLst/>
-                <a:defRPr/>
-              </a:pPr>
-              <a:t>15</a:t>
-            </a:fld>
-            <a:endParaRPr kumimoji="0" lang="en-GB" sz="800" b="0" i="0" u="none" strike="noStrike" kern="1200" cap="none" spc="0" normalizeH="0" baseline="0" noProof="0" smtClean="0">
-              <a:ln>
-                <a:noFill/>
-              </a:ln>
-              <a:solidFill>
-                <a:srgbClr val="324D5A"/>
-              </a:solidFill>
-              <a:effectLst/>
-              <a:uLnTx/>
-              <a:uFillTx/>
-              <a:latin typeface="+mn-lt"/>
-              <a:ea typeface="+mn-ea"/>
-              <a:cs typeface="+mn-cs"/>
-            </a:endParaRPr>
-          </a:p>
-        </p:txBody>
-      </p:sp>
-      <p:sp>
-        <p:nvSpPr>
-          <p:cNvPr id="28" name="Slide Number Placeholder 5"/>
-          <p:cNvSpPr txBox="1">
-            <a:spLocks noGrp="1"/>
-          </p:cNvSpPr>
-          <p:nvPr/>
-        </p:nvSpPr>
-        <p:spPr bwMode="auto">
-          <a:xfrm>
-            <a:off x="8459788" y="6237288"/>
-            <a:ext cx="874712" cy="484187"/>
-          </a:xfrm>
-          <a:prstGeom prst="rect">
-            <a:avLst/>
-          </a:prstGeom>
-          <a:noFill/>
-          <a:ln w="9525">
-            <a:noFill/>
-            <a:miter lim="800000"/>
-            <a:headEnd/>
-            <a:tailEnd/>
-          </a:ln>
-        </p:spPr>
-        <p:txBody>
-          <a:bodyPr anchor="b"/>
-          <a:lstStyle/>
-          <a:p>
-            <a:fld id="{BC871EA6-2DB7-4404-BDE5-68322184D52D}" type="slidenum">
-              <a:rPr lang="en-GB" sz="900" smtClean="0">
-                <a:solidFill>
-                  <a:srgbClr val="324D5A"/>
-                </a:solidFill>
-              </a:rPr>
-              <a:pPr/>
-              <a:t>15</a:t>
-            </a:fld>
-            <a:endParaRPr lang="en-GB" sz="900">
-              <a:solidFill>
-                <a:srgbClr val="324D5A"/>
-              </a:solidFill>
-            </a:endParaRPr>
-          </a:p>
-        </p:txBody>
-      </p:sp>
-      <p:sp>
-        <p:nvSpPr>
-          <p:cNvPr id="31" name="Rectangle 3"/>
-          <p:cNvSpPr txBox="1">
-            <a:spLocks noChangeArrowheads="1"/>
-          </p:cNvSpPr>
-          <p:nvPr/>
-        </p:nvSpPr>
-        <p:spPr bwMode="auto">
-          <a:xfrm>
-            <a:off x="611560" y="2211710"/>
-            <a:ext cx="3455988" cy="2664618"/>
-          </a:xfrm>
-          <a:prstGeom prst="rect">
-            <a:avLst/>
-          </a:prstGeom>
-          <a:noFill/>
-          <a:ln w="9525">
-            <a:noFill/>
-            <a:miter lim="800000"/>
-            <a:headEnd/>
-            <a:tailEnd/>
-          </a:ln>
-        </p:spPr>
-        <p:txBody>
-          <a:bodyPr/>
-          <a:lstStyle/>
-          <a:p>
-            <a:pPr marL="342900" indent="-342900" algn="r">
-              <a:lnSpc>
-                <a:spcPct val="200000"/>
-              </a:lnSpc>
-              <a:spcBef>
-                <a:spcPct val="20000"/>
-              </a:spcBef>
-              <a:buClr>
-                <a:srgbClr val="324D5A"/>
-              </a:buClr>
-              <a:defRPr/>
-            </a:pPr>
-            <a:r>
-              <a:rPr lang="en-GB" sz="1300" b="1" kern="0" noProof="1" smtClean="0">
-                <a:solidFill>
-                  <a:srgbClr val="324D5A"/>
-                </a:solidFill>
-                <a:latin typeface="+mn-lt"/>
-              </a:rPr>
-              <a:t>#7b1b67 | R:123 – G:27 – B: 103 </a:t>
-            </a:r>
-          </a:p>
-          <a:p>
-            <a:pPr marL="342900" indent="-342900" algn="r">
-              <a:lnSpc>
-                <a:spcPct val="200000"/>
-              </a:lnSpc>
-              <a:spcBef>
-                <a:spcPct val="20000"/>
-              </a:spcBef>
-              <a:buClr>
-                <a:srgbClr val="324D5A"/>
-              </a:buClr>
-              <a:defRPr/>
-            </a:pPr>
-            <a:r>
-              <a:rPr lang="en-GB" sz="1300" b="1" kern="0" noProof="1" smtClean="0">
-                <a:solidFill>
-                  <a:srgbClr val="324D5A"/>
-                </a:solidFill>
-              </a:rPr>
-              <a:t>#a61f55 | R:166 – G:31 – B: 85</a:t>
-            </a:r>
-          </a:p>
-          <a:p>
-            <a:pPr marL="342900" indent="-342900" algn="r">
-              <a:lnSpc>
-                <a:spcPct val="200000"/>
-              </a:lnSpc>
-              <a:spcBef>
-                <a:spcPct val="20000"/>
-              </a:spcBef>
-              <a:buClr>
-                <a:srgbClr val="324D5A"/>
-              </a:buClr>
-              <a:defRPr/>
-            </a:pPr>
-            <a:r>
-              <a:rPr lang="en-GB" sz="1300" b="1" kern="0" noProof="1" smtClean="0">
-                <a:solidFill>
-                  <a:srgbClr val="324D5A"/>
-                </a:solidFill>
-              </a:rPr>
-              <a:t>#be161d | R:190 – G:22 – B: 29 </a:t>
-            </a:r>
-          </a:p>
-          <a:p>
-            <a:pPr marL="342900" indent="-342900" algn="r">
-              <a:lnSpc>
-                <a:spcPct val="200000"/>
-              </a:lnSpc>
-              <a:spcBef>
-                <a:spcPct val="20000"/>
-              </a:spcBef>
-              <a:buClr>
-                <a:srgbClr val="324D5A"/>
-              </a:buClr>
-              <a:defRPr/>
-            </a:pPr>
-            <a:r>
-              <a:rPr lang="en-GB" sz="1300" b="1" kern="0" noProof="1" smtClean="0">
-                <a:solidFill>
-                  <a:srgbClr val="324D5A"/>
-                </a:solidFill>
-              </a:rPr>
-              <a:t>#f15d03 | R:241 – G:93 – B: 3 </a:t>
-            </a:r>
-          </a:p>
-          <a:p>
-            <a:pPr marL="342900" indent="-342900" algn="r">
-              <a:lnSpc>
-                <a:spcPct val="200000"/>
-              </a:lnSpc>
-              <a:spcBef>
-                <a:spcPct val="20000"/>
-              </a:spcBef>
-              <a:buClr>
-                <a:srgbClr val="324D5A"/>
-              </a:buClr>
-              <a:defRPr/>
-            </a:pPr>
-            <a:r>
-              <a:rPr lang="en-GB" sz="1300" b="1" kern="0" noProof="1" smtClean="0">
-                <a:solidFill>
-                  <a:srgbClr val="324D5A"/>
-                </a:solidFill>
-              </a:rPr>
-              <a:t>#ff9900 | R:255 – G:153 – B: 0 </a:t>
-            </a:r>
-          </a:p>
-          <a:p>
-            <a:pPr marL="342900" indent="-342900" algn="r">
-              <a:lnSpc>
-                <a:spcPct val="200000"/>
-              </a:lnSpc>
-              <a:spcBef>
-                <a:spcPct val="20000"/>
-              </a:spcBef>
-              <a:buClr>
-                <a:srgbClr val="324D5A"/>
-              </a:buClr>
-              <a:defRPr/>
-            </a:pPr>
-            <a:r>
-              <a:rPr lang="en-GB" sz="1300" b="1" kern="0" noProof="1" smtClean="0">
-                <a:solidFill>
-                  <a:srgbClr val="324D5A"/>
-                </a:solidFill>
-              </a:rPr>
-              <a:t>#ffcb05 | R:255 – G:203 – B: 5</a:t>
-            </a:r>
-          </a:p>
-          <a:p>
-            <a:pPr marL="342900" indent="-342900" algn="r">
-              <a:lnSpc>
-                <a:spcPct val="200000"/>
-              </a:lnSpc>
-              <a:spcBef>
-                <a:spcPct val="20000"/>
-              </a:spcBef>
-              <a:buClr>
-                <a:srgbClr val="324D5A"/>
-              </a:buClr>
-              <a:defRPr/>
-            </a:pPr>
-            <a:r>
-              <a:rPr lang="en-GB" sz="1300" kern="0" noProof="1" smtClean="0">
-                <a:solidFill>
-                  <a:srgbClr val="324D5A"/>
-                </a:solidFill>
-              </a:rPr>
-              <a:t> </a:t>
-            </a:r>
-          </a:p>
-          <a:p>
-            <a:pPr marL="342900" indent="-342900" algn="r">
-              <a:spcBef>
-                <a:spcPct val="20000"/>
-              </a:spcBef>
-              <a:buClr>
-                <a:srgbClr val="324D5A"/>
-              </a:buClr>
-              <a:defRPr/>
-            </a:pPr>
-            <a:r>
-              <a:rPr lang="en-GB" sz="1100" kern="0" noProof="1" smtClean="0">
-                <a:solidFill>
-                  <a:srgbClr val="324D5A"/>
-                </a:solidFill>
-                <a:latin typeface="+mn-lt"/>
-              </a:rPr>
-              <a:t> </a:t>
-            </a:r>
-            <a:endParaRPr lang="en-GB" sz="1100" kern="0" noProof="1">
-              <a:solidFill>
-                <a:srgbClr val="324D5A"/>
-              </a:solidFill>
-              <a:latin typeface="+mn-lt"/>
-            </a:endParaRPr>
-          </a:p>
-        </p:txBody>
-      </p:sp>
-      <p:sp>
-        <p:nvSpPr>
-          <p:cNvPr id="32" name="Rectangle 31"/>
-          <p:cNvSpPr/>
-          <p:nvPr/>
-        </p:nvSpPr>
-        <p:spPr>
-          <a:xfrm>
-            <a:off x="4139952" y="2355726"/>
-            <a:ext cx="287337" cy="287338"/>
-          </a:xfrm>
-          <a:prstGeom prst="rect">
-            <a:avLst/>
-          </a:prstGeom>
-          <a:solidFill>
-            <a:srgbClr val="7B1B67"/>
-          </a:solidFill>
-          <a:ln>
-            <a:solidFill>
-              <a:srgbClr val="7B1B67"/>
-            </a:solidFill>
-          </a:ln>
-        </p:spPr>
-        <p:style>
-          <a:lnRef idx="2">
-            <a:schemeClr val="accent1">
-              <a:shade val="50000"/>
-            </a:schemeClr>
-          </a:lnRef>
-          <a:fillRef idx="1">
-            <a:schemeClr val="accent1"/>
-          </a:fillRef>
-          <a:effectRef idx="0">
-            <a:schemeClr val="accent1"/>
-          </a:effectRef>
-          <a:fontRef idx="minor">
-            <a:schemeClr val="lt1"/>
-          </a:fontRef>
-        </p:style>
-        <p:txBody>
-          <a:bodyPr anchor="ctr"/>
-          <a:lstStyle/>
-          <a:p>
-            <a:pPr algn="ctr">
-              <a:defRPr/>
-            </a:pPr>
-            <a:endParaRPr lang="en-GB"/>
-          </a:p>
-        </p:txBody>
-      </p:sp>
-      <p:sp>
-        <p:nvSpPr>
-          <p:cNvPr id="33" name="Rectangle 32"/>
-          <p:cNvSpPr/>
-          <p:nvPr/>
-        </p:nvSpPr>
-        <p:spPr>
-          <a:xfrm>
-            <a:off x="4139952" y="2787774"/>
-            <a:ext cx="287337" cy="287338"/>
-          </a:xfrm>
-          <a:prstGeom prst="rect">
-            <a:avLst/>
-          </a:prstGeom>
-          <a:solidFill>
-            <a:srgbClr val="A61F55"/>
-          </a:solidFill>
-          <a:ln>
-            <a:solidFill>
-              <a:srgbClr val="A61F55"/>
-            </a:solidFill>
-          </a:ln>
-        </p:spPr>
-        <p:style>
-          <a:lnRef idx="2">
-            <a:schemeClr val="accent1">
-              <a:shade val="50000"/>
-            </a:schemeClr>
-          </a:lnRef>
-          <a:fillRef idx="1">
-            <a:schemeClr val="accent1"/>
-          </a:fillRef>
-          <a:effectRef idx="0">
-            <a:schemeClr val="accent1"/>
-          </a:effectRef>
-          <a:fontRef idx="minor">
-            <a:schemeClr val="lt1"/>
-          </a:fontRef>
-        </p:style>
-        <p:txBody>
-          <a:bodyPr anchor="ctr"/>
-          <a:lstStyle/>
-          <a:p>
-            <a:pPr algn="ctr">
-              <a:defRPr/>
-            </a:pPr>
-            <a:endParaRPr lang="en-GB"/>
-          </a:p>
-        </p:txBody>
-      </p:sp>
-      <p:sp>
-        <p:nvSpPr>
-          <p:cNvPr id="34" name="Rectangle 33"/>
-          <p:cNvSpPr/>
-          <p:nvPr/>
-        </p:nvSpPr>
-        <p:spPr>
-          <a:xfrm>
-            <a:off x="4139952" y="3219822"/>
-            <a:ext cx="287337" cy="287338"/>
-          </a:xfrm>
-          <a:prstGeom prst="rect">
-            <a:avLst/>
-          </a:prstGeom>
-          <a:solidFill>
-            <a:srgbClr val="BE161D"/>
-          </a:solidFill>
-          <a:ln>
-            <a:solidFill>
-              <a:srgbClr val="BE161D"/>
-            </a:solidFill>
-          </a:ln>
-        </p:spPr>
-        <p:style>
-          <a:lnRef idx="2">
-            <a:schemeClr val="accent1">
-              <a:shade val="50000"/>
-            </a:schemeClr>
-          </a:lnRef>
-          <a:fillRef idx="1">
-            <a:schemeClr val="accent1"/>
-          </a:fillRef>
-          <a:effectRef idx="0">
-            <a:schemeClr val="accent1"/>
-          </a:effectRef>
-          <a:fontRef idx="minor">
-            <a:schemeClr val="lt1"/>
-          </a:fontRef>
-        </p:style>
-        <p:txBody>
-          <a:bodyPr anchor="ctr"/>
-          <a:lstStyle/>
-          <a:p>
-            <a:pPr algn="ctr">
-              <a:defRPr/>
-            </a:pPr>
-            <a:endParaRPr lang="en-GB"/>
-          </a:p>
-        </p:txBody>
-      </p:sp>
-      <p:sp>
-        <p:nvSpPr>
-          <p:cNvPr id="35" name="Rectangle 34"/>
-          <p:cNvSpPr/>
-          <p:nvPr/>
-        </p:nvSpPr>
-        <p:spPr>
-          <a:xfrm>
-            <a:off x="4139952" y="3651870"/>
-            <a:ext cx="287337" cy="287338"/>
-          </a:xfrm>
-          <a:prstGeom prst="rect">
-            <a:avLst/>
-          </a:prstGeom>
-          <a:solidFill>
-            <a:srgbClr val="F15D03"/>
-          </a:solidFill>
-          <a:ln>
-            <a:solidFill>
-              <a:srgbClr val="F15D03"/>
-            </a:solidFill>
-          </a:ln>
-        </p:spPr>
-        <p:style>
-          <a:lnRef idx="2">
-            <a:schemeClr val="accent1">
-              <a:shade val="50000"/>
-            </a:schemeClr>
-          </a:lnRef>
-          <a:fillRef idx="1">
-            <a:schemeClr val="accent1"/>
-          </a:fillRef>
-          <a:effectRef idx="0">
-            <a:schemeClr val="accent1"/>
-          </a:effectRef>
-          <a:fontRef idx="minor">
-            <a:schemeClr val="lt1"/>
-          </a:fontRef>
-        </p:style>
-        <p:txBody>
-          <a:bodyPr anchor="ctr"/>
-          <a:lstStyle/>
-          <a:p>
-            <a:pPr algn="ctr">
-              <a:defRPr/>
-            </a:pPr>
-            <a:endParaRPr lang="en-GB"/>
-          </a:p>
-        </p:txBody>
-      </p:sp>
-      <p:sp>
-        <p:nvSpPr>
-          <p:cNvPr id="36" name="Rectangle 35"/>
-          <p:cNvSpPr/>
-          <p:nvPr/>
-        </p:nvSpPr>
-        <p:spPr>
-          <a:xfrm>
-            <a:off x="4139952" y="4083918"/>
-            <a:ext cx="287337" cy="287337"/>
-          </a:xfrm>
-          <a:prstGeom prst="rect">
-            <a:avLst/>
-          </a:prstGeom>
-          <a:solidFill>
-            <a:srgbClr val="FF9900"/>
-          </a:solidFill>
-          <a:ln>
-            <a:solidFill>
-              <a:srgbClr val="FF9900"/>
-            </a:solidFill>
-          </a:ln>
-        </p:spPr>
-        <p:style>
-          <a:lnRef idx="2">
-            <a:schemeClr val="accent1">
-              <a:shade val="50000"/>
-            </a:schemeClr>
-          </a:lnRef>
-          <a:fillRef idx="1">
-            <a:schemeClr val="accent1"/>
-          </a:fillRef>
-          <a:effectRef idx="0">
-            <a:schemeClr val="accent1"/>
-          </a:effectRef>
-          <a:fontRef idx="minor">
-            <a:schemeClr val="lt1"/>
-          </a:fontRef>
-        </p:style>
-        <p:txBody>
-          <a:bodyPr anchor="ctr"/>
-          <a:lstStyle/>
-          <a:p>
-            <a:pPr algn="ctr">
-              <a:defRPr/>
-            </a:pPr>
-            <a:endParaRPr lang="en-GB"/>
-          </a:p>
-        </p:txBody>
-      </p:sp>
-      <p:sp>
-        <p:nvSpPr>
-          <p:cNvPr id="37" name="Rectangle 36"/>
-          <p:cNvSpPr/>
-          <p:nvPr/>
-        </p:nvSpPr>
-        <p:spPr>
-          <a:xfrm>
-            <a:off x="4139952" y="4515966"/>
-            <a:ext cx="287337" cy="287337"/>
-          </a:xfrm>
-          <a:prstGeom prst="rect">
-            <a:avLst/>
-          </a:prstGeom>
-          <a:solidFill>
-            <a:srgbClr val="FFCB05"/>
-          </a:solidFill>
-          <a:ln>
-            <a:solidFill>
-              <a:srgbClr val="FFCB05"/>
-            </a:solidFill>
-          </a:ln>
-        </p:spPr>
-        <p:style>
-          <a:lnRef idx="2">
-            <a:schemeClr val="accent1">
-              <a:shade val="50000"/>
-            </a:schemeClr>
-          </a:lnRef>
-          <a:fillRef idx="1">
-            <a:schemeClr val="accent1"/>
-          </a:fillRef>
-          <a:effectRef idx="0">
-            <a:schemeClr val="accent1"/>
-          </a:effectRef>
-          <a:fontRef idx="minor">
-            <a:schemeClr val="lt1"/>
-          </a:fontRef>
-        </p:style>
-        <p:txBody>
-          <a:bodyPr anchor="ctr"/>
-          <a:lstStyle/>
-          <a:p>
-            <a:pPr algn="ctr">
-              <a:defRPr/>
-            </a:pPr>
-            <a:endParaRPr lang="en-GB"/>
-          </a:p>
-        </p:txBody>
-      </p:sp>
-      <p:sp>
-        <p:nvSpPr>
-          <p:cNvPr id="38" name="Rectangle 3"/>
-          <p:cNvSpPr txBox="1">
-            <a:spLocks noChangeArrowheads="1"/>
-          </p:cNvSpPr>
-          <p:nvPr/>
-        </p:nvSpPr>
-        <p:spPr bwMode="auto">
-          <a:xfrm>
-            <a:off x="5076056" y="2211710"/>
-            <a:ext cx="3455987" cy="2664618"/>
-          </a:xfrm>
-          <a:prstGeom prst="rect">
-            <a:avLst/>
-          </a:prstGeom>
-          <a:noFill/>
-          <a:ln w="9525">
-            <a:noFill/>
-            <a:miter lim="800000"/>
-            <a:headEnd/>
-            <a:tailEnd/>
-          </a:ln>
-        </p:spPr>
-        <p:txBody>
-          <a:bodyPr/>
-          <a:lstStyle/>
-          <a:p>
-            <a:pPr marL="342900" indent="-342900">
-              <a:lnSpc>
-                <a:spcPct val="200000"/>
-              </a:lnSpc>
-              <a:spcBef>
-                <a:spcPct val="20000"/>
-              </a:spcBef>
-              <a:buClr>
-                <a:srgbClr val="324D5A"/>
-              </a:buClr>
-              <a:defRPr/>
-            </a:pPr>
-            <a:r>
-              <a:rPr lang="en-GB" sz="1300" b="1" kern="0" noProof="1" smtClean="0">
-                <a:solidFill>
-                  <a:srgbClr val="324D5A"/>
-                </a:solidFill>
-                <a:latin typeface="+mn-lt"/>
-              </a:rPr>
-              <a:t>#000000 | R:0 – G:0 – B: 0</a:t>
-            </a:r>
-          </a:p>
-          <a:p>
-            <a:pPr marL="342900" indent="-342900">
-              <a:lnSpc>
-                <a:spcPct val="200000"/>
-              </a:lnSpc>
-              <a:spcBef>
-                <a:spcPct val="20000"/>
-              </a:spcBef>
-              <a:buClr>
-                <a:srgbClr val="324D5A"/>
-              </a:buClr>
-              <a:defRPr/>
-            </a:pPr>
-            <a:r>
-              <a:rPr lang="en-GB" sz="1300" b="1" kern="0" noProof="1" smtClean="0">
-                <a:solidFill>
-                  <a:srgbClr val="324D5A"/>
-                </a:solidFill>
-              </a:rPr>
-              <a:t>#324d5a | R:50 – G:77 – B: 90</a:t>
-            </a:r>
-          </a:p>
-          <a:p>
-            <a:pPr marL="342900" indent="-342900">
-              <a:lnSpc>
-                <a:spcPct val="200000"/>
-              </a:lnSpc>
-              <a:spcBef>
-                <a:spcPct val="20000"/>
-              </a:spcBef>
-              <a:buClr>
-                <a:srgbClr val="324D5A"/>
-              </a:buClr>
-              <a:defRPr/>
-            </a:pPr>
-            <a:r>
-              <a:rPr lang="en-GB" sz="1300" b="1" kern="0" noProof="1" smtClean="0">
-                <a:solidFill>
-                  <a:srgbClr val="324D5A"/>
-                </a:solidFill>
-              </a:rPr>
-              <a:t>#84949c | R:132 – G:148 – B: 156</a:t>
-            </a:r>
-          </a:p>
-          <a:p>
-            <a:pPr marL="342900" indent="-342900">
-              <a:lnSpc>
-                <a:spcPct val="200000"/>
-              </a:lnSpc>
-              <a:spcBef>
-                <a:spcPct val="20000"/>
-              </a:spcBef>
-              <a:buClr>
-                <a:srgbClr val="324D5A"/>
-              </a:buClr>
-              <a:defRPr/>
-            </a:pPr>
-            <a:r>
-              <a:rPr lang="en-GB" sz="1300" b="1" kern="0" noProof="1" smtClean="0">
-                <a:solidFill>
-                  <a:srgbClr val="324D5A"/>
-                </a:solidFill>
-              </a:rPr>
-              <a:t>#ccd2d6 | R:204 – G:210 – B: 214 </a:t>
-            </a:r>
-          </a:p>
-          <a:p>
-            <a:pPr marL="342900" indent="-342900">
-              <a:lnSpc>
-                <a:spcPct val="200000"/>
-              </a:lnSpc>
-              <a:spcBef>
-                <a:spcPct val="20000"/>
-              </a:spcBef>
-              <a:buClr>
-                <a:srgbClr val="324D5A"/>
-              </a:buClr>
-              <a:defRPr/>
-            </a:pPr>
-            <a:r>
-              <a:rPr lang="en-GB" sz="1300" b="1" kern="0" noProof="1" smtClean="0">
-                <a:solidFill>
-                  <a:srgbClr val="324D5A"/>
-                </a:solidFill>
-              </a:rPr>
-              <a:t>#e6e9eb| R:230 – G:233 – B: 235 </a:t>
-            </a:r>
-          </a:p>
-          <a:p>
-            <a:pPr marL="342900" indent="-342900">
-              <a:lnSpc>
-                <a:spcPct val="200000"/>
-              </a:lnSpc>
-              <a:spcBef>
-                <a:spcPct val="20000"/>
-              </a:spcBef>
-              <a:buClr>
-                <a:srgbClr val="324D5A"/>
-              </a:buClr>
-              <a:defRPr/>
-            </a:pPr>
-            <a:r>
-              <a:rPr lang="en-GB" sz="1300" b="1" kern="0" noProof="1" smtClean="0">
-                <a:solidFill>
-                  <a:srgbClr val="324D5A"/>
-                </a:solidFill>
-              </a:rPr>
-              <a:t>#ffffff | R:255 – G:255 – B: 255 </a:t>
-            </a:r>
-          </a:p>
-          <a:p>
-            <a:pPr marL="342900" indent="-342900" algn="r">
-              <a:lnSpc>
-                <a:spcPct val="200000"/>
-              </a:lnSpc>
-              <a:spcBef>
-                <a:spcPct val="20000"/>
-              </a:spcBef>
-              <a:buClr>
-                <a:srgbClr val="324D5A"/>
-              </a:buClr>
-              <a:defRPr/>
-            </a:pPr>
-            <a:r>
-              <a:rPr lang="en-GB" sz="1200" kern="0" noProof="1" smtClean="0">
-                <a:solidFill>
-                  <a:srgbClr val="324D5A"/>
-                </a:solidFill>
-              </a:rPr>
-              <a:t> </a:t>
-            </a:r>
-          </a:p>
-          <a:p>
-            <a:pPr marL="342900" indent="-342900" algn="r">
-              <a:spcBef>
-                <a:spcPct val="20000"/>
-              </a:spcBef>
-              <a:buClr>
-                <a:srgbClr val="324D5A"/>
-              </a:buClr>
-              <a:defRPr/>
-            </a:pPr>
-            <a:r>
-              <a:rPr lang="en-GB" sz="1100" kern="0" noProof="1" smtClean="0">
-                <a:solidFill>
-                  <a:srgbClr val="324D5A"/>
-                </a:solidFill>
-                <a:latin typeface="+mn-lt"/>
-              </a:rPr>
-              <a:t> </a:t>
-            </a:r>
-            <a:endParaRPr lang="en-GB" sz="1100" kern="0" noProof="1">
-              <a:solidFill>
-                <a:srgbClr val="324D5A"/>
-              </a:solidFill>
-              <a:latin typeface="+mn-lt"/>
-            </a:endParaRPr>
-          </a:p>
-        </p:txBody>
-      </p:sp>
-      <p:sp>
-        <p:nvSpPr>
-          <p:cNvPr id="39" name="Rectangle 38"/>
-          <p:cNvSpPr/>
-          <p:nvPr/>
-        </p:nvSpPr>
-        <p:spPr>
-          <a:xfrm>
-            <a:off x="4644008" y="2355726"/>
-            <a:ext cx="288925" cy="287338"/>
-          </a:xfrm>
-          <a:prstGeom prst="rect">
-            <a:avLst/>
-          </a:prstGeom>
-          <a:solidFill>
-            <a:srgbClr val="000000"/>
-          </a:solidFill>
-          <a:ln>
-            <a:solidFill>
-              <a:srgbClr val="000000"/>
-            </a:solidFill>
-          </a:ln>
-        </p:spPr>
-        <p:style>
-          <a:lnRef idx="2">
-            <a:schemeClr val="accent1">
-              <a:shade val="50000"/>
-            </a:schemeClr>
-          </a:lnRef>
-          <a:fillRef idx="1">
-            <a:schemeClr val="accent1"/>
-          </a:fillRef>
-          <a:effectRef idx="0">
-            <a:schemeClr val="accent1"/>
-          </a:effectRef>
-          <a:fontRef idx="minor">
-            <a:schemeClr val="lt1"/>
-          </a:fontRef>
-        </p:style>
-        <p:txBody>
-          <a:bodyPr anchor="ctr"/>
-          <a:lstStyle/>
-          <a:p>
-            <a:pPr algn="ctr">
-              <a:defRPr/>
-            </a:pPr>
-            <a:endParaRPr lang="en-GB"/>
-          </a:p>
-        </p:txBody>
-      </p:sp>
-      <p:sp>
-        <p:nvSpPr>
-          <p:cNvPr id="40" name="Rectangle 39"/>
-          <p:cNvSpPr/>
-          <p:nvPr/>
-        </p:nvSpPr>
-        <p:spPr>
-          <a:xfrm>
-            <a:off x="4644008" y="2787774"/>
-            <a:ext cx="288925" cy="287338"/>
-          </a:xfrm>
-          <a:prstGeom prst="rect">
-            <a:avLst/>
-          </a:prstGeom>
-          <a:solidFill>
-            <a:srgbClr val="324D5A"/>
-          </a:solidFill>
-          <a:ln>
-            <a:solidFill>
-              <a:srgbClr val="324D5A"/>
-            </a:solidFill>
-          </a:ln>
-        </p:spPr>
-        <p:style>
-          <a:lnRef idx="2">
-            <a:schemeClr val="accent1">
-              <a:shade val="50000"/>
-            </a:schemeClr>
-          </a:lnRef>
-          <a:fillRef idx="1">
-            <a:schemeClr val="accent1"/>
-          </a:fillRef>
-          <a:effectRef idx="0">
-            <a:schemeClr val="accent1"/>
-          </a:effectRef>
-          <a:fontRef idx="minor">
-            <a:schemeClr val="lt1"/>
-          </a:fontRef>
-        </p:style>
-        <p:txBody>
-          <a:bodyPr anchor="ctr"/>
-          <a:lstStyle/>
-          <a:p>
-            <a:pPr algn="ctr">
-              <a:defRPr/>
-            </a:pPr>
-            <a:endParaRPr lang="en-GB"/>
-          </a:p>
-        </p:txBody>
-      </p:sp>
-      <p:sp>
-        <p:nvSpPr>
-          <p:cNvPr id="41" name="Rectangle 40"/>
-          <p:cNvSpPr/>
-          <p:nvPr/>
-        </p:nvSpPr>
-        <p:spPr>
-          <a:xfrm>
-            <a:off x="4644008" y="3219822"/>
-            <a:ext cx="288925" cy="287338"/>
-          </a:xfrm>
-          <a:prstGeom prst="rect">
-            <a:avLst/>
-          </a:prstGeom>
-          <a:solidFill>
-            <a:srgbClr val="84949C"/>
-          </a:solidFill>
-          <a:ln>
-            <a:solidFill>
-              <a:srgbClr val="84949C"/>
-            </a:solidFill>
-          </a:ln>
-        </p:spPr>
-        <p:style>
-          <a:lnRef idx="2">
-            <a:schemeClr val="accent1">
-              <a:shade val="50000"/>
-            </a:schemeClr>
-          </a:lnRef>
-          <a:fillRef idx="1">
-            <a:schemeClr val="accent1"/>
-          </a:fillRef>
-          <a:effectRef idx="0">
-            <a:schemeClr val="accent1"/>
-          </a:effectRef>
-          <a:fontRef idx="minor">
-            <a:schemeClr val="lt1"/>
-          </a:fontRef>
-        </p:style>
-        <p:txBody>
-          <a:bodyPr anchor="ctr"/>
-          <a:lstStyle/>
-          <a:p>
-            <a:pPr algn="ctr">
-              <a:defRPr/>
-            </a:pPr>
-            <a:endParaRPr lang="en-GB"/>
-          </a:p>
-        </p:txBody>
-      </p:sp>
-      <p:sp>
-        <p:nvSpPr>
-          <p:cNvPr id="42" name="Rectangle 41"/>
-          <p:cNvSpPr/>
-          <p:nvPr/>
-        </p:nvSpPr>
-        <p:spPr>
-          <a:xfrm>
-            <a:off x="4644008" y="3651870"/>
-            <a:ext cx="288925" cy="288925"/>
-          </a:xfrm>
-          <a:prstGeom prst="rect">
-            <a:avLst/>
-          </a:prstGeom>
-          <a:solidFill>
-            <a:srgbClr val="CCD2D6"/>
-          </a:solidFill>
-          <a:ln>
-            <a:solidFill>
-              <a:srgbClr val="CCD2D6"/>
-            </a:solidFill>
-          </a:ln>
-        </p:spPr>
-        <p:style>
-          <a:lnRef idx="2">
-            <a:schemeClr val="accent1">
-              <a:shade val="50000"/>
-            </a:schemeClr>
-          </a:lnRef>
-          <a:fillRef idx="1">
-            <a:schemeClr val="accent1"/>
-          </a:fillRef>
-          <a:effectRef idx="0">
-            <a:schemeClr val="accent1"/>
-          </a:effectRef>
-          <a:fontRef idx="minor">
-            <a:schemeClr val="lt1"/>
-          </a:fontRef>
-        </p:style>
-        <p:txBody>
-          <a:bodyPr anchor="ctr"/>
-          <a:lstStyle/>
-          <a:p>
-            <a:pPr algn="ctr">
-              <a:defRPr/>
-            </a:pPr>
-            <a:endParaRPr lang="en-GB"/>
-          </a:p>
-        </p:txBody>
-      </p:sp>
-      <p:sp>
-        <p:nvSpPr>
-          <p:cNvPr id="43" name="Rectangle 42"/>
-          <p:cNvSpPr/>
-          <p:nvPr/>
-        </p:nvSpPr>
-        <p:spPr>
-          <a:xfrm>
-            <a:off x="4644008" y="4083918"/>
-            <a:ext cx="288925" cy="288925"/>
-          </a:xfrm>
-          <a:prstGeom prst="rect">
-            <a:avLst/>
-          </a:prstGeom>
-          <a:solidFill>
-            <a:srgbClr val="E6E9EB"/>
-          </a:solidFill>
-          <a:ln>
-            <a:solidFill>
-              <a:srgbClr val="E6E9EB"/>
-            </a:solidFill>
-          </a:ln>
-        </p:spPr>
-        <p:style>
-          <a:lnRef idx="2">
-            <a:schemeClr val="accent1">
-              <a:shade val="50000"/>
-            </a:schemeClr>
-          </a:lnRef>
-          <a:fillRef idx="1">
-            <a:schemeClr val="accent1"/>
-          </a:fillRef>
-          <a:effectRef idx="0">
-            <a:schemeClr val="accent1"/>
-          </a:effectRef>
-          <a:fontRef idx="minor">
-            <a:schemeClr val="lt1"/>
-          </a:fontRef>
-        </p:style>
-        <p:txBody>
-          <a:bodyPr anchor="ctr"/>
-          <a:lstStyle/>
-          <a:p>
-            <a:pPr algn="ctr">
-              <a:defRPr/>
-            </a:pPr>
-            <a:endParaRPr lang="en-GB"/>
-          </a:p>
-        </p:txBody>
-      </p:sp>
-      <p:sp>
-        <p:nvSpPr>
-          <p:cNvPr id="44" name="Rectangle 43"/>
-          <p:cNvSpPr/>
-          <p:nvPr/>
-        </p:nvSpPr>
-        <p:spPr>
-          <a:xfrm>
-            <a:off x="4644008" y="4515966"/>
-            <a:ext cx="288925" cy="288925"/>
-          </a:xfrm>
-          <a:prstGeom prst="rect">
-            <a:avLst/>
-          </a:prstGeom>
-          <a:solidFill>
-            <a:schemeClr val="bg1"/>
-          </a:solidFill>
-          <a:ln>
-            <a:solidFill>
-              <a:schemeClr val="bg1">
-                <a:lumMod val="85000"/>
-              </a:schemeClr>
-            </a:solidFill>
-          </a:ln>
-        </p:spPr>
-        <p:style>
-          <a:lnRef idx="2">
-            <a:schemeClr val="accent1">
-              <a:shade val="50000"/>
-            </a:schemeClr>
-          </a:lnRef>
-          <a:fillRef idx="1">
-            <a:schemeClr val="accent1"/>
-          </a:fillRef>
-          <a:effectRef idx="0">
-            <a:schemeClr val="accent1"/>
-          </a:effectRef>
-          <a:fontRef idx="minor">
-            <a:schemeClr val="lt1"/>
-          </a:fontRef>
-        </p:style>
-        <p:txBody>
-          <a:bodyPr anchor="ctr"/>
-          <a:lstStyle/>
-          <a:p>
-            <a:pPr algn="ctr">
-              <a:defRPr/>
-            </a:pPr>
-            <a:endParaRPr lang="en-GB"/>
+            <a:endParaRPr lang="en-US"/>
           </a:p>
         </p:txBody>
       </p:sp>
     </p:spTree>
+    <p:extLst>
+      <p:ext uri="{BB962C8B-B14F-4D97-AF65-F5344CB8AC3E}">
+        <p14:creationId xmlns:p14="http://schemas.microsoft.com/office/powerpoint/2010/main" val="1688658753"/>
+      </p:ext>
+    </p:extLst>
   </p:cSld>
   <p:clrMapOvr>
     <a:masterClrMapping/>
   </p:clrMapOvr>
-  <p:timing>
-    <p:tnLst>
-      <p:par>
-        <p:cTn id="1" dur="indefinite" restart="never" nodeType="tmRoot"/>
-      </p:par>
-    </p:tnLst>
-  </p:timing>
 </p:sld>
 </file>
 
@@ -7138,6 +5984,184 @@
       </p:grpSpPr>
       <p:sp>
         <p:nvSpPr>
+          <p:cNvPr id="2" name="Titel 1"/>
+          <p:cNvSpPr>
+            <a:spLocks noGrp="1"/>
+          </p:cNvSpPr>
+          <p:nvPr>
+            <p:ph type="title"/>
+          </p:nvPr>
+        </p:nvSpPr>
+        <p:spPr/>
+        <p:txBody>
+          <a:bodyPr/>
+          <a:lstStyle/>
+          <a:p>
+            <a:r>
+              <a:rPr lang="en-US" dirty="0" smtClean="0"/>
+              <a:t>Links</a:t>
+            </a:r>
+            <a:endParaRPr lang="en-US" dirty="0"/>
+          </a:p>
+        </p:txBody>
+      </p:sp>
+      <p:sp>
+        <p:nvSpPr>
+          <p:cNvPr id="3" name="Tijdelijke aanduiding voor inhoud 2"/>
+          <p:cNvSpPr>
+            <a:spLocks noGrp="1"/>
+          </p:cNvSpPr>
+          <p:nvPr>
+            <p:ph idx="1"/>
+          </p:nvPr>
+        </p:nvSpPr>
+        <p:spPr/>
+        <p:txBody>
+          <a:bodyPr/>
+          <a:lstStyle/>
+          <a:p>
+            <a:r>
+              <a:rPr lang="en-US" dirty="0"/>
+              <a:t>Getting started: </a:t>
+            </a:r>
+            <a:endParaRPr lang="en-US" dirty="0" smtClean="0"/>
+          </a:p>
+          <a:p>
+            <a:pPr marL="704850" lvl="2" indent="-342900"/>
+            <a:r>
+              <a:rPr lang="en-US" dirty="0">
+                <a:hlinkClick r:id="rId2"/>
+              </a:rPr>
+              <a:t>http://</a:t>
+            </a:r>
+            <a:r>
+              <a:rPr lang="en-US" dirty="0" smtClean="0">
+                <a:hlinkClick r:id="rId2"/>
+              </a:rPr>
+              <a:t>wiki.wireshark.org/Lua</a:t>
+            </a:r>
+            <a:endParaRPr lang="en-US" dirty="0"/>
+          </a:p>
+          <a:p>
+            <a:r>
+              <a:rPr lang="en-US" dirty="0" smtClean="0"/>
+              <a:t>Details</a:t>
+            </a:r>
+          </a:p>
+          <a:p>
+            <a:pPr lvl="1"/>
+            <a:r>
+              <a:rPr lang="en-US" dirty="0" smtClean="0">
+                <a:hlinkClick r:id="rId3"/>
+              </a:rPr>
+              <a:t>http</a:t>
+            </a:r>
+            <a:r>
+              <a:rPr lang="en-US" dirty="0">
+                <a:hlinkClick r:id="rId3"/>
+              </a:rPr>
+              <a:t>://ask.wireshark.org/</a:t>
+            </a:r>
+            <a:endParaRPr lang="en-US" dirty="0"/>
+          </a:p>
+          <a:p>
+            <a:pPr lvl="1"/>
+            <a:r>
+              <a:rPr lang="en-US" dirty="0">
+                <a:hlinkClick r:id="rId4"/>
+              </a:rPr>
+              <a:t>http://stackoverflow.com/</a:t>
+            </a:r>
+            <a:endParaRPr lang="en-US" dirty="0"/>
+          </a:p>
+          <a:p>
+            <a:endParaRPr lang="en-US" dirty="0" smtClean="0"/>
+          </a:p>
+          <a:p>
+            <a:pPr lvl="1"/>
+            <a:endParaRPr lang="en-US" dirty="0"/>
+          </a:p>
+        </p:txBody>
+      </p:sp>
+      <p:sp>
+        <p:nvSpPr>
+          <p:cNvPr id="4" name="Tijdelijke aanduiding voor voettekst 3"/>
+          <p:cNvSpPr>
+            <a:spLocks noGrp="1"/>
+          </p:cNvSpPr>
+          <p:nvPr>
+            <p:ph type="ftr" sz="quarter" idx="11"/>
+          </p:nvPr>
+        </p:nvSpPr>
+        <p:spPr/>
+        <p:txBody>
+          <a:bodyPr/>
+          <a:lstStyle/>
+          <a:p>
+            <a:r>
+              <a:rPr lang="en-US" smtClean="0"/>
+              <a:t>© Sioux 2013 | Confidential | </a:t>
+            </a:r>
+            <a:endParaRPr lang="en-US"/>
+          </a:p>
+        </p:txBody>
+      </p:sp>
+      <p:sp>
+        <p:nvSpPr>
+          <p:cNvPr id="5" name="Tijdelijke aanduiding voor dianummer 4"/>
+          <p:cNvSpPr>
+            <a:spLocks noGrp="1"/>
+          </p:cNvSpPr>
+          <p:nvPr>
+            <p:ph type="sldNum" sz="quarter" idx="12"/>
+          </p:nvPr>
+        </p:nvSpPr>
+        <p:spPr/>
+        <p:txBody>
+          <a:bodyPr/>
+          <a:lstStyle/>
+          <a:p>
+            <a:fld id="{B60E6772-B9F1-4672-903F-323A7A0E6EBD}" type="slidenum">
+              <a:rPr lang="en-US" smtClean="0"/>
+              <a:pPr/>
+              <a:t>16</a:t>
+            </a:fld>
+            <a:endParaRPr lang="en-US"/>
+          </a:p>
+        </p:txBody>
+      </p:sp>
+    </p:spTree>
+    <p:extLst>
+      <p:ext uri="{BB962C8B-B14F-4D97-AF65-F5344CB8AC3E}">
+        <p14:creationId xmlns:p14="http://schemas.microsoft.com/office/powerpoint/2010/main" val="2861604159"/>
+      </p:ext>
+    </p:extLst>
+  </p:cSld>
+  <p:clrMapOvr>
+    <a:masterClrMapping/>
+  </p:clrMapOvr>
+</p:sld>
+</file>
+
+<file path=ppt/slides/slide17.xml><?xml version="1.0" encoding="utf-8"?>
+<p:sld xmlns:a="http://schemas.openxmlformats.org/drawingml/2006/main" xmlns:r="http://schemas.openxmlformats.org/officeDocument/2006/relationships" xmlns:p="http://schemas.openxmlformats.org/presentationml/2006/main">
+  <p:cSld>
+    <p:spTree>
+      <p:nvGrpSpPr>
+        <p:cNvPr id="1" name=""/>
+        <p:cNvGrpSpPr/>
+        <p:nvPr/>
+      </p:nvGrpSpPr>
+      <p:grpSpPr>
+        <a:xfrm>
+          <a:off x="0" y="0"/>
+          <a:ext cx="0" cy="0"/>
+          <a:chOff x="0" y="0"/>
+          <a:chExt cx="0" cy="0"/>
+        </a:xfrm>
+      </p:grpSpPr>
+      <p:sp>
+        <p:nvSpPr>
           <p:cNvPr id="2" name="Slide Number Placeholder 1"/>
           <p:cNvSpPr>
             <a:spLocks noGrp="1"/>
@@ -7154,7 +6178,7 @@
             <a:fld id="{B60E6772-B9F1-4672-903F-323A7A0E6EBD}" type="slidenum">
               <a:rPr lang="en-GB" smtClean="0"/>
               <a:pPr/>
-              <a:t>16</a:t>
+              <a:t>17</a:t>
             </a:fld>
             <a:endParaRPr lang="en-GB"/>
           </a:p>
@@ -7433,6 +6457,7 @@
               <a:rPr lang="en-GB" dirty="0" smtClean="0"/>
               <a:t>Demo</a:t>
             </a:r>
+            <a:endParaRPr lang="en-GB" dirty="0" smtClean="0"/>
           </a:p>
           <a:p>
             <a:r>
@@ -10448,20 +9473,23 @@
             </a:r>
             <a:r>
               <a:rPr lang="en-US" b="1" dirty="0"/>
-              <a:t>-X </a:t>
-            </a:r>
-            <a:r>
-              <a:rPr lang="en-US" b="1" dirty="0" err="1"/>
+              <a:t>-</a:t>
+            </a:r>
+            <a:r>
+              <a:rPr lang="en-US" b="1"/>
+              <a:t>X </a:t>
+            </a:r>
+            <a:r>
+              <a:rPr lang="en-US" b="1" smtClean="0"/>
               <a:t>lua_script:</a:t>
             </a:r>
             <a:r>
-              <a:rPr lang="en-US" i="1" dirty="0" err="1"/>
+              <a:rPr lang="en-US" i="1" smtClean="0"/>
               <a:t>xxx.lua</a:t>
             </a:r>
-            <a:endParaRPr lang="en-US" dirty="0"/>
-          </a:p>
-          <a:p>
-            <a:endParaRPr lang="en-US" dirty="0"/>
+          </a:p>
+          <a:p>
+            <a:endParaRPr lang="en-US" smtClean="0"/>
           </a:p>
         </p:txBody>
       </p:sp>
@@ -10559,7 +9587,7 @@
           <a:p>
             <a:r>
               <a:rPr lang="en-US" dirty="0" smtClean="0"/>
-              <a:t>Dissecting a dissector</a:t>
+              <a:t>Dissector Architecture</a:t>
             </a:r>
             <a:endParaRPr lang="en-US" dirty="0"/>
           </a:p>
@@ -10582,31 +9610,13 @@
           <a:p>
             <a:r>
               <a:rPr lang="en-US" dirty="0" smtClean="0"/>
-              <a:t>Declare the protocol</a:t>
-            </a:r>
-          </a:p>
-          <a:p>
-            <a:pPr lvl="1"/>
+              <a:t>Finding your entry </a:t>
+            </a:r>
+            <a:r>
+              <a:rPr lang="en-US" dirty="0" smtClean="0"/>
+              <a:t>point</a:t>
+            </a:r>
             <a:endParaRPr lang="en-US" dirty="0" smtClean="0"/>
-          </a:p>
-          <a:p>
-            <a:r>
-              <a:rPr lang="en-US" dirty="0" smtClean="0"/>
-              <a:t>Declare the dissector function</a:t>
-            </a:r>
-          </a:p>
-          <a:p>
-            <a:endParaRPr lang="en-US" dirty="0"/>
-          </a:p>
-          <a:p>
-            <a:r>
-              <a:rPr lang="en-US" dirty="0" smtClean="0"/>
-              <a:t>Bind to a dissector table</a:t>
-            </a:r>
-          </a:p>
-          <a:p>
-            <a:pPr lvl="1"/>
-            <a:endParaRPr lang="en-US" dirty="0"/>
           </a:p>
         </p:txBody>
       </p:sp>
@@ -10659,7 +9669,7 @@
       </p:sp>
       <p:pic>
         <p:nvPicPr>
-          <p:cNvPr id="3075" name="Picture 3"/>
+          <p:cNvPr id="1026" name="Picture 2"/>
           <p:cNvPicPr>
             <a:picLocks noChangeAspect="1" noChangeArrowheads="1"/>
           </p:cNvPicPr>
@@ -10680,8 +9690,8 @@
         </p:blipFill>
         <p:spPr bwMode="auto">
           <a:xfrm>
-            <a:off x="1295400" y="1838561"/>
-            <a:ext cx="4548554" cy="304800"/>
+            <a:off x="609600" y="1809750"/>
+            <a:ext cx="2590800" cy="2886075"/>
           </a:xfrm>
           <a:prstGeom prst="rect">
             <a:avLst/>
@@ -10713,7 +9723,7 @@
       </p:pic>
       <p:pic>
         <p:nvPicPr>
-          <p:cNvPr id="3076" name="Picture 4"/>
+          <p:cNvPr id="1027" name="Picture 3"/>
           <p:cNvPicPr>
             <a:picLocks noChangeAspect="1" noChangeArrowheads="1"/>
           </p:cNvPicPr>
@@ -10734,62 +9744,8 @@
         </p:blipFill>
         <p:spPr bwMode="auto">
           <a:xfrm>
-            <a:off x="1318071" y="2866710"/>
-            <a:ext cx="4086225" cy="552450"/>
-          </a:xfrm>
-          <a:prstGeom prst="rect">
-            <a:avLst/>
-          </a:prstGeom>
-          <a:noFill/>
-          <a:ln>
-            <a:noFill/>
-          </a:ln>
-          <a:extLst>
-            <a:ext uri="{909E8E84-426E-40DD-AFC4-6F175D3DCCD1}">
-              <a14:hiddenFill xmlns:a14="http://schemas.microsoft.com/office/drawing/2010/main">
-                <a:solidFill>
-                  <a:schemeClr val="accent1"/>
-                </a:solidFill>
-              </a14:hiddenFill>
-            </a:ext>
-            <a:ext uri="{91240B29-F687-4F45-9708-019B960494DF}">
-              <a14:hiddenLine xmlns:a14="http://schemas.microsoft.com/office/drawing/2010/main" w="9525">
-                <a:solidFill>
-                  <a:schemeClr val="tx1"/>
-                </a:solidFill>
-                <a:miter lim="800000"/>
-                <a:headEnd/>
-                <a:tailEnd/>
-              </a14:hiddenLine>
-            </a:ext>
-          </a:extLst>
-        </p:spPr>
-      </p:pic>
-      <p:pic>
-        <p:nvPicPr>
-          <p:cNvPr id="3077" name="Picture 5"/>
-          <p:cNvPicPr>
-            <a:picLocks noChangeAspect="1" noChangeArrowheads="1"/>
-          </p:cNvPicPr>
-          <p:nvPr/>
-        </p:nvPicPr>
-        <p:blipFill>
-          <a:blip r:embed="rId4">
-            <a:extLst>
-              <a:ext uri="{28A0092B-C50C-407E-A947-70E740481C1C}">
-                <a14:useLocalDpi xmlns:a14="http://schemas.microsoft.com/office/drawing/2010/main" val="0"/>
-              </a:ext>
-            </a:extLst>
-          </a:blip>
-          <a:srcRect/>
-          <a:stretch>
-            <a:fillRect/>
-          </a:stretch>
-        </p:blipFill>
-        <p:spPr bwMode="auto">
-          <a:xfrm>
-            <a:off x="1269580" y="4019550"/>
-            <a:ext cx="4206240" cy="457200"/>
+            <a:off x="3621074" y="1885948"/>
+            <a:ext cx="5114925" cy="2505075"/>
           </a:xfrm>
           <a:prstGeom prst="rect">
             <a:avLst/>
@@ -10822,7 +9778,7 @@
     </p:spTree>
     <p:extLst>
       <p:ext uri="{BB962C8B-B14F-4D97-AF65-F5344CB8AC3E}">
-        <p14:creationId xmlns:p14="http://schemas.microsoft.com/office/powerpoint/2010/main" val="1469939123"/>
+        <p14:creationId xmlns:p14="http://schemas.microsoft.com/office/powerpoint/2010/main" val="1390328558"/>
       </p:ext>
     </p:extLst>
   </p:cSld>

</xml_diff>

<commit_message>
[doc] added navigation to slides
</commit_message>
<xml_diff>
--- a/Lua Wireshark Dissectors.pptx
+++ b/Lua Wireshark Dissectors.pptx
@@ -5,32 +5,37 @@
     <p:sldMasterId id="2147483648" r:id="rId1"/>
   </p:sldMasterIdLst>
   <p:notesMasterIdLst>
-    <p:notesMasterId r:id="rId19"/>
+    <p:notesMasterId r:id="rId24"/>
   </p:notesMasterIdLst>
   <p:handoutMasterIdLst>
-    <p:handoutMasterId r:id="rId20"/>
+    <p:handoutMasterId r:id="rId25"/>
   </p:handoutMasterIdLst>
   <p:sldIdLst>
     <p:sldId id="259" r:id="rId2"/>
     <p:sldId id="261" r:id="rId3"/>
-    <p:sldId id="262" r:id="rId4"/>
-    <p:sldId id="263" r:id="rId5"/>
-    <p:sldId id="268" r:id="rId6"/>
-    <p:sldId id="270" r:id="rId7"/>
-    <p:sldId id="266" r:id="rId8"/>
-    <p:sldId id="267" r:id="rId9"/>
-    <p:sldId id="264" r:id="rId10"/>
-    <p:sldId id="271" r:id="rId11"/>
-    <p:sldId id="272" r:id="rId12"/>
-    <p:sldId id="273" r:id="rId13"/>
-    <p:sldId id="274" r:id="rId14"/>
-    <p:sldId id="275" r:id="rId15"/>
-    <p:sldId id="276" r:id="rId16"/>
-    <p:sldId id="265" r:id="rId17"/>
-    <p:sldId id="260" r:id="rId18"/>
+    <p:sldId id="280" r:id="rId4"/>
+    <p:sldId id="262" r:id="rId5"/>
+    <p:sldId id="281" r:id="rId6"/>
+    <p:sldId id="263" r:id="rId7"/>
+    <p:sldId id="268" r:id="rId8"/>
+    <p:sldId id="270" r:id="rId9"/>
+    <p:sldId id="266" r:id="rId10"/>
+    <p:sldId id="267" r:id="rId11"/>
+    <p:sldId id="264" r:id="rId12"/>
+    <p:sldId id="282" r:id="rId13"/>
+    <p:sldId id="271" r:id="rId14"/>
+    <p:sldId id="272" r:id="rId15"/>
+    <p:sldId id="273" r:id="rId16"/>
+    <p:sldId id="274" r:id="rId17"/>
+    <p:sldId id="283" r:id="rId18"/>
+    <p:sldId id="275" r:id="rId19"/>
+    <p:sldId id="284" r:id="rId20"/>
+    <p:sldId id="276" r:id="rId21"/>
+    <p:sldId id="265" r:id="rId22"/>
+    <p:sldId id="260" r:id="rId23"/>
   </p:sldIdLst>
   <p:sldSz cx="9144000" cy="5143500" type="screen16x9"/>
-  <p:notesSz cx="6858000" cy="9144000"/>
+  <p:notesSz cx="9774238" cy="6724650"/>
   <p:defaultTextStyle>
     <a:defPPr>
       <a:defRPr lang="en-US"/>
@@ -133,13 +138,16 @@
           <p14:sldIdLst>
             <p14:sldId id="259"/>
             <p14:sldId id="261"/>
+            <p14:sldId id="280"/>
             <p14:sldId id="262"/>
+            <p14:sldId id="281"/>
             <p14:sldId id="263"/>
             <p14:sldId id="268"/>
             <p14:sldId id="270"/>
             <p14:sldId id="266"/>
             <p14:sldId id="267"/>
             <p14:sldId id="264"/>
+            <p14:sldId id="282"/>
             <p14:sldId id="271"/>
             <p14:sldId id="272"/>
             <p14:sldId id="273"/>
@@ -151,13 +159,43 @@
         <p14:section name="Naamloze sectie" id="{4C877596-24D6-42BC-8590-5D91782CE8EC}">
           <p14:sldIdLst>
             <p14:sldId id="274"/>
+            <p14:sldId id="283"/>
             <p14:sldId id="275"/>
+            <p14:sldId id="284"/>
             <p14:sldId id="276"/>
             <p14:sldId id="265"/>
             <p14:sldId id="260"/>
           </p14:sldIdLst>
         </p14:section>
       </p14:sectionLst>
+    </p:ext>
+    <p:ext uri="{EFAFB233-063F-42B5-8137-9DF3F51BA10A}">
+      <p15:sldGuideLst xmlns:p15="http://schemas.microsoft.com/office/powerpoint/2012/main">
+        <p15:guide id="1" orient="horz" pos="1620">
+          <p15:clr>
+            <a:srgbClr val="A4A3A4"/>
+          </p15:clr>
+        </p15:guide>
+        <p15:guide id="2" pos="2880">
+          <p15:clr>
+            <a:srgbClr val="A4A3A4"/>
+          </p15:clr>
+        </p15:guide>
+      </p15:sldGuideLst>
+    </p:ext>
+    <p:ext uri="{2D200454-40CA-4A62-9FC3-DE9A4176ACB9}">
+      <p15:notesGuideLst xmlns:p15="http://schemas.microsoft.com/office/powerpoint/2012/main">
+        <p15:guide id="1" orient="horz" pos="2118" userDrawn="1">
+          <p15:clr>
+            <a:srgbClr val="A4A3A4"/>
+          </p15:clr>
+        </p15:guide>
+        <p15:guide id="2" pos="3079" userDrawn="1">
+          <p15:clr>
+            <a:srgbClr val="A4A3A4"/>
+          </p15:clr>
+        </p15:guide>
+      </p15:notesGuideLst>
     </p:ext>
   </p:extLst>
 </p:presentation>
@@ -198,7 +236,7 @@
         <p:spPr>
           <a:xfrm>
             <a:off x="0" y="0"/>
-            <a:ext cx="2971800" cy="457200"/>
+            <a:ext cx="4235503" cy="336233"/>
           </a:xfrm>
           <a:prstGeom prst="rect">
             <a:avLst/>
@@ -228,8 +266,8 @@
         </p:nvSpPr>
         <p:spPr>
           <a:xfrm>
-            <a:off x="3884613" y="0"/>
-            <a:ext cx="2971800" cy="457200"/>
+            <a:off x="5536473" y="0"/>
+            <a:ext cx="4235503" cy="336233"/>
           </a:xfrm>
           <a:prstGeom prst="rect">
             <a:avLst/>
@@ -246,7 +284,7 @@
             <a:fld id="{33F2956A-3F06-4D42-B2C6-B694A4913167}" type="datetimeFigureOut">
               <a:rPr lang="en-US" smtClean="0"/>
               <a:pPr/>
-              <a:t>6/29/2014</a:t>
+              <a:t>6/30/2014</a:t>
             </a:fld>
             <a:endParaRPr lang="en-US"/>
           </a:p>
@@ -264,8 +302,8 @@
         </p:nvSpPr>
         <p:spPr>
           <a:xfrm>
-            <a:off x="0" y="8685213"/>
-            <a:ext cx="2971800" cy="457200"/>
+            <a:off x="0" y="6387250"/>
+            <a:ext cx="4235503" cy="336233"/>
           </a:xfrm>
           <a:prstGeom prst="rect">
             <a:avLst/>
@@ -295,8 +333,8 @@
         </p:nvSpPr>
         <p:spPr>
           <a:xfrm>
-            <a:off x="3884613" y="8685213"/>
-            <a:ext cx="2971800" cy="457200"/>
+            <a:off x="5536473" y="6387250"/>
+            <a:ext cx="4235503" cy="336233"/>
           </a:xfrm>
           <a:prstGeom prst="rect">
             <a:avLst/>
@@ -313,7 +351,7 @@
             <a:fld id="{C2C7D710-EBA2-4934-B63D-B4AA6E5B9341}" type="slidenum">
               <a:rPr lang="en-US" smtClean="0"/>
               <a:pPr/>
-              <a:t>‹nr.›</a:t>
+              <a:t>‹#›</a:t>
             </a:fld>
             <a:endParaRPr lang="en-US"/>
           </a:p>
@@ -365,7 +403,7 @@
         <p:spPr>
           <a:xfrm>
             <a:off x="0" y="0"/>
-            <a:ext cx="2971800" cy="457200"/>
+            <a:ext cx="4235503" cy="336233"/>
           </a:xfrm>
           <a:prstGeom prst="rect">
             <a:avLst/>
@@ -395,8 +433,8 @@
         </p:nvSpPr>
         <p:spPr>
           <a:xfrm>
-            <a:off x="3884613" y="0"/>
-            <a:ext cx="2971800" cy="457200"/>
+            <a:off x="5536473" y="0"/>
+            <a:ext cx="4235503" cy="336233"/>
           </a:xfrm>
           <a:prstGeom prst="rect">
             <a:avLst/>
@@ -413,7 +451,7 @@
             <a:fld id="{4EA6A4AE-6FAC-4420-9485-A57254806E09}" type="datetimeFigureOut">
               <a:rPr lang="en-US" smtClean="0"/>
               <a:pPr/>
-              <a:t>6/29/2014</a:t>
+              <a:t>6/30/2014</a:t>
             </a:fld>
             <a:endParaRPr lang="en-US"/>
           </a:p>
@@ -431,8 +469,8 @@
         </p:nvSpPr>
         <p:spPr>
           <a:xfrm>
-            <a:off x="381000" y="685800"/>
-            <a:ext cx="6096000" cy="3429000"/>
+            <a:off x="2646363" y="504825"/>
+            <a:ext cx="4481512" cy="2520950"/>
           </a:xfrm>
           <a:prstGeom prst="rect">
             <a:avLst/>
@@ -464,8 +502,8 @@
         </p:nvSpPr>
         <p:spPr>
           <a:xfrm>
-            <a:off x="685800" y="4343400"/>
-            <a:ext cx="5486400" cy="4114800"/>
+            <a:off x="977424" y="3194209"/>
+            <a:ext cx="7819390" cy="3026093"/>
           </a:xfrm>
           <a:prstGeom prst="rect">
             <a:avLst/>
@@ -526,8 +564,8 @@
         </p:nvSpPr>
         <p:spPr>
           <a:xfrm>
-            <a:off x="0" y="8685213"/>
-            <a:ext cx="2971800" cy="457200"/>
+            <a:off x="0" y="6387250"/>
+            <a:ext cx="4235503" cy="336233"/>
           </a:xfrm>
           <a:prstGeom prst="rect">
             <a:avLst/>
@@ -557,8 +595,8 @@
         </p:nvSpPr>
         <p:spPr>
           <a:xfrm>
-            <a:off x="3884613" y="8685213"/>
-            <a:ext cx="2971800" cy="457200"/>
+            <a:off x="5536473" y="6387250"/>
+            <a:ext cx="4235503" cy="336233"/>
           </a:xfrm>
           <a:prstGeom prst="rect">
             <a:avLst/>
@@ -575,7 +613,7 @@
             <a:fld id="{559C4A52-4ACF-44E6-B7A9-3756997F58DA}" type="slidenum">
               <a:rPr lang="en-US" smtClean="0"/>
               <a:pPr/>
-              <a:t>‹nr.›</a:t>
+              <a:t>‹#›</a:t>
             </a:fld>
             <a:endParaRPr lang="en-US"/>
           </a:p>
@@ -769,7 +807,7 @@
             <a:fld id="{559C4A52-4ACF-44E6-B7A9-3756997F58DA}" type="slidenum">
               <a:rPr lang="en-US" smtClean="0"/>
               <a:pPr/>
-              <a:t>4</a:t>
+              <a:t>6</a:t>
             </a:fld>
             <a:endParaRPr lang="en-US"/>
           </a:p>
@@ -889,7 +927,7 @@
             <a:fld id="{559C4A52-4ACF-44E6-B7A9-3756997F58DA}" type="slidenum">
               <a:rPr lang="en-US" smtClean="0"/>
               <a:pPr/>
-              <a:t>5</a:t>
+              <a:t>7</a:t>
             </a:fld>
             <a:endParaRPr lang="en-US"/>
           </a:p>
@@ -949,6 +987,91 @@
         </p:nvSpPr>
         <p:spPr/>
         <p:txBody>
+          <a:bodyPr/>
+          <a:lstStyle/>
+          <a:p>
+            <a:endParaRPr lang="nl-BE" dirty="0"/>
+          </a:p>
+        </p:txBody>
+      </p:sp>
+      <p:sp>
+        <p:nvSpPr>
+          <p:cNvPr id="4" name="Slide Number Placeholder 3"/>
+          <p:cNvSpPr>
+            <a:spLocks noGrp="1"/>
+          </p:cNvSpPr>
+          <p:nvPr>
+            <p:ph type="sldNum" sz="quarter" idx="10"/>
+          </p:nvPr>
+        </p:nvSpPr>
+        <p:spPr/>
+        <p:txBody>
+          <a:bodyPr/>
+          <a:lstStyle/>
+          <a:p>
+            <a:fld id="{559C4A52-4ACF-44E6-B7A9-3756997F58DA}" type="slidenum">
+              <a:rPr lang="en-US" smtClean="0"/>
+              <a:pPr/>
+              <a:t>21</a:t>
+            </a:fld>
+            <a:endParaRPr lang="en-US"/>
+          </a:p>
+        </p:txBody>
+      </p:sp>
+    </p:spTree>
+    <p:extLst>
+      <p:ext uri="{BB962C8B-B14F-4D97-AF65-F5344CB8AC3E}">
+        <p14:creationId xmlns:p14="http://schemas.microsoft.com/office/powerpoint/2010/main" val="2417488784"/>
+      </p:ext>
+    </p:extLst>
+  </p:cSld>
+  <p:clrMapOvr>
+    <a:masterClrMapping/>
+  </p:clrMapOvr>
+</p:notes>
+</file>
+
+<file path=ppt/notesSlides/notesSlide4.xml><?xml version="1.0" encoding="utf-8"?>
+<p:notes xmlns:a="http://schemas.openxmlformats.org/drawingml/2006/main" xmlns:r="http://schemas.openxmlformats.org/officeDocument/2006/relationships" xmlns:p="http://schemas.openxmlformats.org/presentationml/2006/main">
+  <p:cSld>
+    <p:spTree>
+      <p:nvGrpSpPr>
+        <p:cNvPr id="1" name=""/>
+        <p:cNvGrpSpPr/>
+        <p:nvPr/>
+      </p:nvGrpSpPr>
+      <p:grpSpPr>
+        <a:xfrm>
+          <a:off x="0" y="0"/>
+          <a:ext cx="0" cy="0"/>
+          <a:chOff x="0" y="0"/>
+          <a:chExt cx="0" cy="0"/>
+        </a:xfrm>
+      </p:grpSpPr>
+      <p:sp>
+        <p:nvSpPr>
+          <p:cNvPr id="2" name="Slide Image Placeholder 1"/>
+          <p:cNvSpPr>
+            <a:spLocks noGrp="1" noRot="1" noChangeAspect="1"/>
+          </p:cNvSpPr>
+          <p:nvPr>
+            <p:ph type="sldImg"/>
+          </p:nvPr>
+        </p:nvSpPr>
+        <p:spPr/>
+      </p:sp>
+      <p:sp>
+        <p:nvSpPr>
+          <p:cNvPr id="3" name="Notes Placeholder 2"/>
+          <p:cNvSpPr>
+            <a:spLocks noGrp="1"/>
+          </p:cNvSpPr>
+          <p:nvPr>
+            <p:ph type="body" idx="1"/>
+          </p:nvPr>
+        </p:nvSpPr>
+        <p:spPr/>
+        <p:txBody>
           <a:bodyPr>
             <a:normAutofit/>
           </a:bodyPr>
@@ -976,13 +1099,18 @@
             <a:fld id="{559C4A52-4ACF-44E6-B7A9-3756997F58DA}" type="slidenum">
               <a:rPr lang="en-US" smtClean="0"/>
               <a:pPr/>
-              <a:t>17</a:t>
+              <a:t>22</a:t>
             </a:fld>
             <a:endParaRPr lang="en-US"/>
           </a:p>
         </p:txBody>
       </p:sp>
     </p:spTree>
+    <p:extLst>
+      <p:ext uri="{BB962C8B-B14F-4D97-AF65-F5344CB8AC3E}">
+        <p14:creationId xmlns:p14="http://schemas.microsoft.com/office/powerpoint/2010/main" val="1599864626"/>
+      </p:ext>
+    </p:extLst>
   </p:cSld>
   <p:clrMapOvr>
     <a:masterClrMapping/>
@@ -1207,7 +1335,7 @@
           <a:p>
             <a:fld id="{A2F54870-87CF-4469-8CD0-8CD470DEE959}" type="datetime1">
               <a:rPr lang="nl-NL" smtClean="0"/>
-              <a:t>29-6-2014</a:t>
+              <a:t>30-6-2014</a:t>
             </a:fld>
             <a:endParaRPr lang="en-US" dirty="0"/>
           </a:p>
@@ -1244,7 +1372,7 @@
             <a:fld id="{B60E6772-B9F1-4672-903F-323A7A0E6EBD}" type="slidenum">
               <a:rPr lang="en-US" smtClean="0"/>
               <a:pPr/>
-              <a:t>‹nr.›</a:t>
+              <a:t>‹#›</a:t>
             </a:fld>
             <a:endParaRPr lang="en-US" dirty="0"/>
           </a:p>
@@ -1607,7 +1735,7 @@
           <a:p>
             <a:fld id="{7B029FA6-1447-4153-9C82-46E7F8F8B89C}" type="datetime1">
               <a:rPr lang="nl-NL" smtClean="0"/>
-              <a:t>29-6-2014</a:t>
+              <a:t>30-6-2014</a:t>
             </a:fld>
             <a:endParaRPr lang="en-US"/>
           </a:p>
@@ -1654,7 +1782,7 @@
             <a:fld id="{B60E6772-B9F1-4672-903F-323A7A0E6EBD}" type="slidenum">
               <a:rPr lang="en-US" smtClean="0"/>
               <a:pPr/>
-              <a:t>‹nr.›</a:t>
+              <a:t>‹#›</a:t>
             </a:fld>
             <a:endParaRPr lang="en-US"/>
           </a:p>
@@ -1777,7 +1905,7 @@
           <a:p>
             <a:fld id="{8B2C21F0-D111-4BBD-8623-848AB053C0B5}" type="datetime1">
               <a:rPr lang="nl-NL" smtClean="0"/>
-              <a:t>29-6-2014</a:t>
+              <a:t>30-6-2014</a:t>
             </a:fld>
             <a:endParaRPr lang="en-US"/>
           </a:p>
@@ -1824,7 +1952,7 @@
             <a:fld id="{B60E6772-B9F1-4672-903F-323A7A0E6EBD}" type="slidenum">
               <a:rPr lang="en-US" smtClean="0"/>
               <a:pPr/>
-              <a:t>‹nr.›</a:t>
+              <a:t>‹#›</a:t>
             </a:fld>
             <a:endParaRPr lang="en-US"/>
           </a:p>
@@ -1965,7 +2093,7 @@
           <a:p>
             <a:fld id="{0415E0CA-8F05-43B0-AC5C-A4C2CAF4C6B2}" type="datetime1">
               <a:rPr lang="nl-NL" smtClean="0"/>
-              <a:t>29-6-2014</a:t>
+              <a:t>30-6-2014</a:t>
             </a:fld>
             <a:endParaRPr lang="en-US"/>
           </a:p>
@@ -2012,7 +2140,7 @@
             <a:fld id="{B60E6772-B9F1-4672-903F-323A7A0E6EBD}" type="slidenum">
               <a:rPr lang="en-US" smtClean="0"/>
               <a:pPr/>
-              <a:t>‹nr.›</a:t>
+              <a:t>‹#›</a:t>
             </a:fld>
             <a:endParaRPr lang="en-US"/>
           </a:p>
@@ -2084,7 +2212,7 @@
           <a:p>
             <a:fld id="{7B38BF40-9FE8-486C-B78C-098A5BC017A4}" type="datetime1">
               <a:rPr lang="nl-NL" smtClean="0"/>
-              <a:t>29-6-2014</a:t>
+              <a:t>30-6-2014</a:t>
             </a:fld>
             <a:endParaRPr lang="en-US" dirty="0"/>
           </a:p>
@@ -2121,7 +2249,7 @@
             <a:fld id="{B60E6772-B9F1-4672-903F-323A7A0E6EBD}" type="slidenum">
               <a:rPr lang="en-US" smtClean="0"/>
               <a:pPr/>
-              <a:t>‹nr.›</a:t>
+              <a:t>‹#›</a:t>
             </a:fld>
             <a:endParaRPr lang="en-US" dirty="0"/>
           </a:p>
@@ -2421,7 +2549,7 @@
           <a:p>
             <a:fld id="{2F71A602-EDE5-427A-9AEE-A7874C612705}" type="datetime1">
               <a:rPr lang="nl-NL" smtClean="0"/>
-              <a:t>29-6-2014</a:t>
+              <a:t>30-6-2014</a:t>
             </a:fld>
             <a:endParaRPr lang="en-US"/>
           </a:p>
@@ -2468,7 +2596,7 @@
             <a:fld id="{B60E6772-B9F1-4672-903F-323A7A0E6EBD}" type="slidenum">
               <a:rPr lang="en-US" smtClean="0"/>
               <a:pPr/>
-              <a:t>‹nr.›</a:t>
+              <a:t>‹#›</a:t>
             </a:fld>
             <a:endParaRPr lang="en-US"/>
           </a:p>
@@ -2667,7 +2795,7 @@
           <a:p>
             <a:fld id="{DC28C3C2-402D-47D0-AC93-A6F0FF3F5D95}" type="datetime1">
               <a:rPr lang="nl-NL" smtClean="0"/>
-              <a:t>29-6-2014</a:t>
+              <a:t>30-6-2014</a:t>
             </a:fld>
             <a:endParaRPr lang="en-US"/>
           </a:p>
@@ -2714,7 +2842,7 @@
             <a:fld id="{B60E6772-B9F1-4672-903F-323A7A0E6EBD}" type="slidenum">
               <a:rPr lang="en-US" smtClean="0"/>
               <a:pPr/>
-              <a:t>‹nr.›</a:t>
+              <a:t>‹#›</a:t>
             </a:fld>
             <a:endParaRPr lang="en-US"/>
           </a:p>
@@ -2955,7 +3083,7 @@
           <a:p>
             <a:fld id="{A6FE0C5C-EE5B-4C22-9880-06E381D0A66B}" type="datetime1">
               <a:rPr lang="nl-NL" smtClean="0"/>
-              <a:t>29-6-2014</a:t>
+              <a:t>30-6-2014</a:t>
             </a:fld>
             <a:endParaRPr lang="en-US"/>
           </a:p>
@@ -3002,7 +3130,7 @@
             <a:fld id="{B60E6772-B9F1-4672-903F-323A7A0E6EBD}" type="slidenum">
               <a:rPr lang="en-US" smtClean="0"/>
               <a:pPr/>
-              <a:t>‹nr.›</a:t>
+              <a:t>‹#›</a:t>
             </a:fld>
             <a:endParaRPr lang="en-US"/>
           </a:p>
@@ -3377,7 +3505,7 @@
           <a:p>
             <a:fld id="{81E1889D-237A-484F-BA72-0715C176C3B9}" type="datetime1">
               <a:rPr lang="nl-NL" smtClean="0"/>
-              <a:t>29-6-2014</a:t>
+              <a:t>30-6-2014</a:t>
             </a:fld>
             <a:endParaRPr lang="en-US"/>
           </a:p>
@@ -3424,7 +3552,7 @@
             <a:fld id="{B60E6772-B9F1-4672-903F-323A7A0E6EBD}" type="slidenum">
               <a:rPr lang="en-US" smtClean="0"/>
               <a:pPr/>
-              <a:t>‹nr.›</a:t>
+              <a:t>‹#›</a:t>
             </a:fld>
             <a:endParaRPr lang="en-US"/>
           </a:p>
@@ -3495,7 +3623,7 @@
           <a:p>
             <a:fld id="{FB2A5C3D-6CB3-4B1F-85F9-9EB448F4D34D}" type="datetime1">
               <a:rPr lang="nl-NL" smtClean="0"/>
-              <a:t>29-6-2014</a:t>
+              <a:t>30-6-2014</a:t>
             </a:fld>
             <a:endParaRPr lang="en-US"/>
           </a:p>
@@ -3542,7 +3670,7 @@
             <a:fld id="{B60E6772-B9F1-4672-903F-323A7A0E6EBD}" type="slidenum">
               <a:rPr lang="en-US" smtClean="0"/>
               <a:pPr/>
-              <a:t>‹nr.›</a:t>
+              <a:t>‹#›</a:t>
             </a:fld>
             <a:endParaRPr lang="en-US"/>
           </a:p>
@@ -3590,7 +3718,7 @@
           <a:p>
             <a:fld id="{4A80D17D-E57A-463C-A47A-BC83B91D4921}" type="datetime1">
               <a:rPr lang="nl-NL" smtClean="0"/>
-              <a:t>29-6-2014</a:t>
+              <a:t>30-6-2014</a:t>
             </a:fld>
             <a:endParaRPr lang="en-US"/>
           </a:p>
@@ -3637,7 +3765,7 @@
             <a:fld id="{B60E6772-B9F1-4672-903F-323A7A0E6EBD}" type="slidenum">
               <a:rPr lang="en-US" smtClean="0"/>
               <a:pPr/>
-              <a:t>‹nr.›</a:t>
+              <a:t>‹#›</a:t>
             </a:fld>
             <a:endParaRPr lang="en-US"/>
           </a:p>
@@ -3873,7 +4001,7 @@
           <a:p>
             <a:fld id="{6180DB96-6CAE-4319-B5F4-3BF322EA84E7}" type="datetime1">
               <a:rPr lang="nl-NL" smtClean="0"/>
-              <a:t>29-6-2014</a:t>
+              <a:t>30-6-2014</a:t>
             </a:fld>
             <a:endParaRPr lang="en-US"/>
           </a:p>
@@ -3920,7 +4048,7 @@
             <a:fld id="{B60E6772-B9F1-4672-903F-323A7A0E6EBD}" type="slidenum">
               <a:rPr lang="en-US" smtClean="0"/>
               <a:pPr/>
-              <a:t>‹nr.›</a:t>
+              <a:t>‹#›</a:t>
             </a:fld>
             <a:endParaRPr lang="en-US"/>
           </a:p>
@@ -4110,7 +4238,7 @@
           <a:p>
             <a:fld id="{4C43C174-F020-4F1C-A13D-28CE719462E4}" type="datetime1">
               <a:rPr lang="nl-NL" smtClean="0"/>
-              <a:t>29-6-2014</a:t>
+              <a:t>30-6-2014</a:t>
             </a:fld>
             <a:endParaRPr lang="en-US"/>
           </a:p>
@@ -4189,7 +4317,7 @@
             <a:fld id="{B60E6772-B9F1-4672-903F-323A7A0E6EBD}" type="slidenum">
               <a:rPr lang="en-US" smtClean="0"/>
               <a:pPr/>
-              <a:t>‹nr.›</a:t>
+              <a:t>‹#›</a:t>
             </a:fld>
             <a:endParaRPr lang="en-US" dirty="0"/>
           </a:p>
@@ -4669,7 +4797,7 @@
           <a:p>
             <a:r>
               <a:rPr lang="en-US" dirty="0" smtClean="0"/>
-              <a:t>Dissecting a dissector</a:t>
+              <a:t>Dissector Architecture</a:t>
             </a:r>
             <a:endParaRPr lang="en-US" dirty="0"/>
           </a:p>
@@ -4691,32 +4819,101 @@
           <a:lstStyle/>
           <a:p>
             <a:r>
+              <a:rPr lang="en-US" dirty="0"/>
+              <a:t>Entry </a:t>
+            </a:r>
+            <a:r>
               <a:rPr lang="en-US" dirty="0" smtClean="0"/>
-              <a:t>Declare the protocol</a:t>
-            </a:r>
+              <a:t>points (</a:t>
+            </a:r>
+            <a:r>
+              <a:rPr lang="en-US" dirty="0" smtClean="0">
+                <a:hlinkClick r:id="rId2"/>
+              </a:rPr>
+              <a:t>link</a:t>
+            </a:r>
+            <a:r>
+              <a:rPr lang="en-US" dirty="0" smtClean="0"/>
+              <a:t>)</a:t>
+            </a:r>
+            <a:endParaRPr lang="en-US" dirty="0"/>
           </a:p>
           <a:p>
             <a:pPr lvl="1"/>
-            <a:endParaRPr lang="en-US" dirty="0" smtClean="0"/>
-          </a:p>
-          <a:p>
+            <a:r>
+              <a:rPr lang="en-US" i="1" dirty="0"/>
+              <a:t>&lt;personal </a:t>
+            </a:r>
+            <a:r>
+              <a:rPr lang="en-US" i="1" dirty="0" err="1"/>
+              <a:t>config</a:t>
+            </a:r>
+            <a:r>
+              <a:rPr lang="en-US" i="1" dirty="0"/>
+              <a:t> </a:t>
+            </a:r>
+            <a:r>
+              <a:rPr lang="en-US" i="1" dirty="0" err="1"/>
+              <a:t>dir</a:t>
+            </a:r>
+            <a:r>
+              <a:rPr lang="en-US" i="1" dirty="0"/>
+              <a:t>&gt;</a:t>
+            </a:r>
+            <a:r>
+              <a:rPr lang="en-US" dirty="0"/>
+              <a:t>/</a:t>
+            </a:r>
+            <a:r>
+              <a:rPr lang="en-US" dirty="0" err="1" smtClean="0"/>
+              <a:t>init.lua</a:t>
+            </a:r>
+            <a:endParaRPr lang="en-US" dirty="0"/>
+          </a:p>
+          <a:p>
+            <a:pPr lvl="1"/>
+            <a:r>
+              <a:rPr lang="en-US" dirty="0" err="1" smtClean="0"/>
+              <a:t>Wireshark</a:t>
+            </a:r>
             <a:r>
               <a:rPr lang="en-US" dirty="0" smtClean="0"/>
-              <a:t>Declare the dissector function</a:t>
-            </a:r>
-          </a:p>
-          <a:p>
-            <a:endParaRPr lang="en-US" dirty="0"/>
-          </a:p>
-          <a:p>
+              <a:t>/plugins</a:t>
+            </a:r>
+          </a:p>
+          <a:p>
+            <a:pPr lvl="1"/>
+            <a:r>
+              <a:rPr lang="en-US" dirty="0" err="1" smtClean="0"/>
+              <a:t>cmdline</a:t>
+            </a:r>
             <a:r>
               <a:rPr lang="en-US" dirty="0" smtClean="0"/>
-              <a:t>Bind to a dissector table</a:t>
-            </a:r>
-          </a:p>
-          <a:p>
-            <a:pPr lvl="1"/>
-            <a:endParaRPr lang="en-US" dirty="0"/>
+              <a:t>:</a:t>
+            </a:r>
+            <a:r>
+              <a:rPr lang="en-US" dirty="0"/>
+              <a:t> </a:t>
+            </a:r>
+            <a:r>
+              <a:rPr lang="en-US" b="1" dirty="0"/>
+              <a:t>-</a:t>
+            </a:r>
+            <a:r>
+              <a:rPr lang="en-US" b="1"/>
+              <a:t>X </a:t>
+            </a:r>
+            <a:r>
+              <a:rPr lang="en-US" b="1" smtClean="0"/>
+              <a:t>lua_script:</a:t>
+            </a:r>
+            <a:r>
+              <a:rPr lang="en-US" i="1" smtClean="0"/>
+              <a:t>xxx.lua</a:t>
+            </a:r>
+          </a:p>
+          <a:p>
+            <a:endParaRPr lang="en-US" smtClean="0"/>
           </a:p>
         </p:txBody>
       </p:sp>
@@ -4762,6 +4959,546 @@
               <a:rPr lang="en-US" smtClean="0"/>
               <a:pPr/>
               <a:t>10</a:t>
+            </a:fld>
+            <a:endParaRPr lang="en-US"/>
+          </a:p>
+        </p:txBody>
+      </p:sp>
+    </p:spTree>
+    <p:extLst>
+      <p:ext uri="{BB962C8B-B14F-4D97-AF65-F5344CB8AC3E}">
+        <p14:creationId xmlns:p14="http://schemas.microsoft.com/office/powerpoint/2010/main" val="731832516"/>
+      </p:ext>
+    </p:extLst>
+  </p:cSld>
+  <p:clrMapOvr>
+    <a:masterClrMapping/>
+  </p:clrMapOvr>
+</p:sld>
+</file>
+
+<file path=ppt/slides/slide11.xml><?xml version="1.0" encoding="utf-8"?>
+<p:sld xmlns:a="http://schemas.openxmlformats.org/drawingml/2006/main" xmlns:r="http://schemas.openxmlformats.org/officeDocument/2006/relationships" xmlns:p="http://schemas.openxmlformats.org/presentationml/2006/main">
+  <p:cSld>
+    <p:spTree>
+      <p:nvGrpSpPr>
+        <p:cNvPr id="1" name=""/>
+        <p:cNvGrpSpPr/>
+        <p:nvPr/>
+      </p:nvGrpSpPr>
+      <p:grpSpPr>
+        <a:xfrm>
+          <a:off x="0" y="0"/>
+          <a:ext cx="0" cy="0"/>
+          <a:chOff x="0" y="0"/>
+          <a:chExt cx="0" cy="0"/>
+        </a:xfrm>
+      </p:grpSpPr>
+      <p:sp>
+        <p:nvSpPr>
+          <p:cNvPr id="2" name="Titel 1"/>
+          <p:cNvSpPr>
+            <a:spLocks noGrp="1"/>
+          </p:cNvSpPr>
+          <p:nvPr>
+            <p:ph type="title"/>
+          </p:nvPr>
+        </p:nvSpPr>
+        <p:spPr/>
+        <p:txBody>
+          <a:bodyPr/>
+          <a:lstStyle/>
+          <a:p>
+            <a:r>
+              <a:rPr lang="en-US" dirty="0" smtClean="0"/>
+              <a:t>Dissector Architecture</a:t>
+            </a:r>
+            <a:endParaRPr lang="en-US" dirty="0"/>
+          </a:p>
+        </p:txBody>
+      </p:sp>
+      <p:sp>
+        <p:nvSpPr>
+          <p:cNvPr id="3" name="Tijdelijke aanduiding voor inhoud 2"/>
+          <p:cNvSpPr>
+            <a:spLocks noGrp="1"/>
+          </p:cNvSpPr>
+          <p:nvPr>
+            <p:ph idx="1"/>
+          </p:nvPr>
+        </p:nvSpPr>
+        <p:spPr/>
+        <p:txBody>
+          <a:bodyPr/>
+          <a:lstStyle/>
+          <a:p>
+            <a:r>
+              <a:rPr lang="en-US" dirty="0" smtClean="0"/>
+              <a:t>Finding your entry point</a:t>
+            </a:r>
+          </a:p>
+        </p:txBody>
+      </p:sp>
+      <p:sp>
+        <p:nvSpPr>
+          <p:cNvPr id="4" name="Tijdelijke aanduiding voor voettekst 3"/>
+          <p:cNvSpPr>
+            <a:spLocks noGrp="1"/>
+          </p:cNvSpPr>
+          <p:nvPr>
+            <p:ph type="ftr" sz="quarter" idx="11"/>
+          </p:nvPr>
+        </p:nvSpPr>
+        <p:spPr/>
+        <p:txBody>
+          <a:bodyPr/>
+          <a:lstStyle/>
+          <a:p>
+            <a:r>
+              <a:rPr lang="en-US" smtClean="0"/>
+              <a:t>© Sioux 2013 | Confidential | </a:t>
+            </a:r>
+            <a:endParaRPr lang="en-US"/>
+          </a:p>
+        </p:txBody>
+      </p:sp>
+      <p:sp>
+        <p:nvSpPr>
+          <p:cNvPr id="5" name="Tijdelijke aanduiding voor dianummer 4"/>
+          <p:cNvSpPr>
+            <a:spLocks noGrp="1"/>
+          </p:cNvSpPr>
+          <p:nvPr>
+            <p:ph type="sldNum" sz="quarter" idx="12"/>
+          </p:nvPr>
+        </p:nvSpPr>
+        <p:spPr/>
+        <p:txBody>
+          <a:bodyPr/>
+          <a:lstStyle/>
+          <a:p>
+            <a:fld id="{B60E6772-B9F1-4672-903F-323A7A0E6EBD}" type="slidenum">
+              <a:rPr lang="en-US" smtClean="0"/>
+              <a:pPr/>
+              <a:t>11</a:t>
+            </a:fld>
+            <a:endParaRPr lang="en-US"/>
+          </a:p>
+        </p:txBody>
+      </p:sp>
+      <p:pic>
+        <p:nvPicPr>
+          <p:cNvPr id="1026" name="Picture 2"/>
+          <p:cNvPicPr>
+            <a:picLocks noChangeAspect="1" noChangeArrowheads="1"/>
+          </p:cNvPicPr>
+          <p:nvPr/>
+        </p:nvPicPr>
+        <p:blipFill>
+          <a:blip r:embed="rId2">
+            <a:extLst>
+              <a:ext uri="{28A0092B-C50C-407E-A947-70E740481C1C}">
+                <a14:useLocalDpi xmlns:a14="http://schemas.microsoft.com/office/drawing/2010/main" val="0"/>
+              </a:ext>
+            </a:extLst>
+          </a:blip>
+          <a:srcRect/>
+          <a:stretch>
+            <a:fillRect/>
+          </a:stretch>
+        </p:blipFill>
+        <p:spPr bwMode="auto">
+          <a:xfrm>
+            <a:off x="609600" y="1809750"/>
+            <a:ext cx="2590800" cy="2886075"/>
+          </a:xfrm>
+          <a:prstGeom prst="rect">
+            <a:avLst/>
+          </a:prstGeom>
+          <a:noFill/>
+          <a:ln>
+            <a:noFill/>
+          </a:ln>
+          <a:extLst>
+            <a:ext uri="{909E8E84-426E-40DD-AFC4-6F175D3DCCD1}">
+              <a14:hiddenFill xmlns:a14="http://schemas.microsoft.com/office/drawing/2010/main">
+                <a:solidFill>
+                  <a:schemeClr val="accent1"/>
+                </a:solidFill>
+              </a14:hiddenFill>
+            </a:ext>
+            <a:ext uri="{91240B29-F687-4F45-9708-019B960494DF}">
+              <a14:hiddenLine xmlns:a14="http://schemas.microsoft.com/office/drawing/2010/main" w="9525">
+                <a:solidFill>
+                  <a:schemeClr val="tx1"/>
+                </a:solidFill>
+                <a:miter lim="800000"/>
+                <a:headEnd/>
+                <a:tailEnd/>
+              </a14:hiddenLine>
+            </a:ext>
+          </a:extLst>
+        </p:spPr>
+      </p:pic>
+      <p:pic>
+        <p:nvPicPr>
+          <p:cNvPr id="1027" name="Picture 3"/>
+          <p:cNvPicPr>
+            <a:picLocks noChangeAspect="1" noChangeArrowheads="1"/>
+          </p:cNvPicPr>
+          <p:nvPr/>
+        </p:nvPicPr>
+        <p:blipFill>
+          <a:blip r:embed="rId3">
+            <a:extLst>
+              <a:ext uri="{28A0092B-C50C-407E-A947-70E740481C1C}">
+                <a14:useLocalDpi xmlns:a14="http://schemas.microsoft.com/office/drawing/2010/main" val="0"/>
+              </a:ext>
+            </a:extLst>
+          </a:blip>
+          <a:srcRect/>
+          <a:stretch>
+            <a:fillRect/>
+          </a:stretch>
+        </p:blipFill>
+        <p:spPr bwMode="auto">
+          <a:xfrm>
+            <a:off x="3621074" y="1885948"/>
+            <a:ext cx="5114925" cy="2505075"/>
+          </a:xfrm>
+          <a:prstGeom prst="rect">
+            <a:avLst/>
+          </a:prstGeom>
+          <a:noFill/>
+          <a:ln>
+            <a:noFill/>
+          </a:ln>
+          <a:extLst>
+            <a:ext uri="{909E8E84-426E-40DD-AFC4-6F175D3DCCD1}">
+              <a14:hiddenFill xmlns:a14="http://schemas.microsoft.com/office/drawing/2010/main">
+                <a:solidFill>
+                  <a:schemeClr val="accent1"/>
+                </a:solidFill>
+              </a14:hiddenFill>
+            </a:ext>
+            <a:ext uri="{91240B29-F687-4F45-9708-019B960494DF}">
+              <a14:hiddenLine xmlns:a14="http://schemas.microsoft.com/office/drawing/2010/main" w="9525">
+                <a:solidFill>
+                  <a:schemeClr val="tx1"/>
+                </a:solidFill>
+                <a:miter lim="800000"/>
+                <a:headEnd/>
+                <a:tailEnd/>
+              </a14:hiddenLine>
+            </a:ext>
+          </a:extLst>
+        </p:spPr>
+      </p:pic>
+    </p:spTree>
+    <p:extLst>
+      <p:ext uri="{BB962C8B-B14F-4D97-AF65-F5344CB8AC3E}">
+        <p14:creationId xmlns:p14="http://schemas.microsoft.com/office/powerpoint/2010/main" val="1390328558"/>
+      </p:ext>
+    </p:extLst>
+  </p:cSld>
+  <p:clrMapOvr>
+    <a:masterClrMapping/>
+  </p:clrMapOvr>
+</p:sld>
+</file>
+
+<file path=ppt/slides/slide12.xml><?xml version="1.0" encoding="utf-8"?>
+<p:sld xmlns:a="http://schemas.openxmlformats.org/drawingml/2006/main" xmlns:r="http://schemas.openxmlformats.org/officeDocument/2006/relationships" xmlns:p="http://schemas.openxmlformats.org/presentationml/2006/main">
+  <p:cSld>
+    <p:spTree>
+      <p:nvGrpSpPr>
+        <p:cNvPr id="1" name=""/>
+        <p:cNvGrpSpPr/>
+        <p:nvPr/>
+      </p:nvGrpSpPr>
+      <p:grpSpPr>
+        <a:xfrm>
+          <a:off x="0" y="0"/>
+          <a:ext cx="0" cy="0"/>
+          <a:chOff x="0" y="0"/>
+          <a:chExt cx="0" cy="0"/>
+        </a:xfrm>
+      </p:grpSpPr>
+      <p:sp>
+        <p:nvSpPr>
+          <p:cNvPr id="2" name="Title 1"/>
+          <p:cNvSpPr>
+            <a:spLocks noGrp="1"/>
+          </p:cNvSpPr>
+          <p:nvPr>
+            <p:ph type="title"/>
+          </p:nvPr>
+        </p:nvSpPr>
+        <p:spPr/>
+        <p:txBody>
+          <a:bodyPr/>
+          <a:lstStyle/>
+          <a:p>
+            <a:r>
+              <a:rPr lang="en-GB" dirty="0" smtClean="0"/>
+              <a:t>Overview</a:t>
+            </a:r>
+            <a:endParaRPr lang="en-GB" dirty="0"/>
+          </a:p>
+        </p:txBody>
+      </p:sp>
+      <p:sp>
+        <p:nvSpPr>
+          <p:cNvPr id="3" name="Content Placeholder 2"/>
+          <p:cNvSpPr>
+            <a:spLocks noGrp="1"/>
+          </p:cNvSpPr>
+          <p:nvPr>
+            <p:ph idx="1"/>
+          </p:nvPr>
+        </p:nvSpPr>
+        <p:spPr/>
+        <p:txBody>
+          <a:bodyPr>
+            <a:normAutofit/>
+          </a:bodyPr>
+          <a:lstStyle/>
+          <a:p>
+            <a:r>
+              <a:rPr lang="en-GB" dirty="0" smtClean="0"/>
+              <a:t>Why and when</a:t>
+            </a:r>
+          </a:p>
+          <a:p>
+            <a:r>
+              <a:rPr lang="en-GB" dirty="0" smtClean="0"/>
+              <a:t>Dissector architecture</a:t>
+            </a:r>
+          </a:p>
+          <a:p>
+            <a:r>
+              <a:rPr lang="en-GB" dirty="0" smtClean="0">
+                <a:solidFill>
+                  <a:srgbClr val="FF0000"/>
+                </a:solidFill>
+              </a:rPr>
+              <a:t>Example dissector dissected</a:t>
+            </a:r>
+          </a:p>
+          <a:p>
+            <a:r>
+              <a:rPr lang="en-GB" dirty="0" smtClean="0"/>
+              <a:t>What </a:t>
+            </a:r>
+            <a:r>
+              <a:rPr lang="en-GB" dirty="0"/>
+              <a:t>wasn’t covered</a:t>
+            </a:r>
+          </a:p>
+          <a:p>
+            <a:r>
+              <a:rPr lang="en-GB" dirty="0" smtClean="0"/>
+              <a:t>Demo</a:t>
+            </a:r>
+          </a:p>
+          <a:p>
+            <a:r>
+              <a:rPr lang="en-GB" dirty="0" smtClean="0"/>
+              <a:t>Links</a:t>
+            </a:r>
+            <a:endParaRPr lang="en-GB" dirty="0"/>
+          </a:p>
+          <a:p>
+            <a:endParaRPr lang="en-GB" dirty="0" smtClean="0"/>
+          </a:p>
+        </p:txBody>
+      </p:sp>
+      <p:sp>
+        <p:nvSpPr>
+          <p:cNvPr id="4" name="Footer Placeholder 3"/>
+          <p:cNvSpPr>
+            <a:spLocks noGrp="1"/>
+          </p:cNvSpPr>
+          <p:nvPr>
+            <p:ph type="ftr" sz="quarter" idx="11"/>
+          </p:nvPr>
+        </p:nvSpPr>
+        <p:spPr/>
+        <p:txBody>
+          <a:bodyPr/>
+          <a:lstStyle/>
+          <a:p>
+            <a:r>
+              <a:rPr lang="en-GB" smtClean="0"/>
+              <a:t>© Sioux 2013 | Confidential | </a:t>
+            </a:r>
+            <a:endParaRPr lang="en-GB"/>
+          </a:p>
+        </p:txBody>
+      </p:sp>
+      <p:sp>
+        <p:nvSpPr>
+          <p:cNvPr id="5" name="Slide Number Placeholder 4"/>
+          <p:cNvSpPr>
+            <a:spLocks noGrp="1"/>
+          </p:cNvSpPr>
+          <p:nvPr>
+            <p:ph type="sldNum" sz="quarter" idx="12"/>
+          </p:nvPr>
+        </p:nvSpPr>
+        <p:spPr/>
+        <p:txBody>
+          <a:bodyPr/>
+          <a:lstStyle/>
+          <a:p>
+            <a:fld id="{B60E6772-B9F1-4672-903F-323A7A0E6EBD}" type="slidenum">
+              <a:rPr lang="en-GB" smtClean="0"/>
+              <a:pPr/>
+              <a:t>12</a:t>
+            </a:fld>
+            <a:endParaRPr lang="en-GB"/>
+          </a:p>
+        </p:txBody>
+      </p:sp>
+    </p:spTree>
+    <p:extLst>
+      <p:ext uri="{BB962C8B-B14F-4D97-AF65-F5344CB8AC3E}">
+        <p14:creationId xmlns:p14="http://schemas.microsoft.com/office/powerpoint/2010/main" val="2407215130"/>
+      </p:ext>
+    </p:extLst>
+  </p:cSld>
+  <p:clrMapOvr>
+    <a:masterClrMapping/>
+  </p:clrMapOvr>
+</p:sld>
+</file>
+
+<file path=ppt/slides/slide13.xml><?xml version="1.0" encoding="utf-8"?>
+<p:sld xmlns:a="http://schemas.openxmlformats.org/drawingml/2006/main" xmlns:r="http://schemas.openxmlformats.org/officeDocument/2006/relationships" xmlns:p="http://schemas.openxmlformats.org/presentationml/2006/main">
+  <p:cSld>
+    <p:spTree>
+      <p:nvGrpSpPr>
+        <p:cNvPr id="1" name=""/>
+        <p:cNvGrpSpPr/>
+        <p:nvPr/>
+      </p:nvGrpSpPr>
+      <p:grpSpPr>
+        <a:xfrm>
+          <a:off x="0" y="0"/>
+          <a:ext cx="0" cy="0"/>
+          <a:chOff x="0" y="0"/>
+          <a:chExt cx="0" cy="0"/>
+        </a:xfrm>
+      </p:grpSpPr>
+      <p:sp>
+        <p:nvSpPr>
+          <p:cNvPr id="2" name="Titel 1"/>
+          <p:cNvSpPr>
+            <a:spLocks noGrp="1"/>
+          </p:cNvSpPr>
+          <p:nvPr>
+            <p:ph type="title"/>
+          </p:nvPr>
+        </p:nvSpPr>
+        <p:spPr/>
+        <p:txBody>
+          <a:bodyPr/>
+          <a:lstStyle/>
+          <a:p>
+            <a:r>
+              <a:rPr lang="en-GB" dirty="0"/>
+              <a:t>Example dissector dissected</a:t>
+            </a:r>
+          </a:p>
+        </p:txBody>
+      </p:sp>
+      <p:sp>
+        <p:nvSpPr>
+          <p:cNvPr id="3" name="Tijdelijke aanduiding voor inhoud 2"/>
+          <p:cNvSpPr>
+            <a:spLocks noGrp="1"/>
+          </p:cNvSpPr>
+          <p:nvPr>
+            <p:ph idx="1"/>
+          </p:nvPr>
+        </p:nvSpPr>
+        <p:spPr/>
+        <p:txBody>
+          <a:bodyPr/>
+          <a:lstStyle/>
+          <a:p>
+            <a:r>
+              <a:rPr lang="en-US" dirty="0" smtClean="0"/>
+              <a:t>Declare the protocol</a:t>
+            </a:r>
+          </a:p>
+          <a:p>
+            <a:pPr lvl="1"/>
+            <a:endParaRPr lang="en-US" dirty="0" smtClean="0"/>
+          </a:p>
+          <a:p>
+            <a:r>
+              <a:rPr lang="en-US" dirty="0" smtClean="0"/>
+              <a:t>Declare the dissector function</a:t>
+            </a:r>
+          </a:p>
+          <a:p>
+            <a:endParaRPr lang="en-US" dirty="0"/>
+          </a:p>
+          <a:p>
+            <a:r>
+              <a:rPr lang="en-US" dirty="0" smtClean="0"/>
+              <a:t>Bind to a dissector table</a:t>
+            </a:r>
+          </a:p>
+          <a:p>
+            <a:pPr lvl="1"/>
+            <a:endParaRPr lang="en-US" dirty="0"/>
+          </a:p>
+        </p:txBody>
+      </p:sp>
+      <p:sp>
+        <p:nvSpPr>
+          <p:cNvPr id="4" name="Tijdelijke aanduiding voor voettekst 3"/>
+          <p:cNvSpPr>
+            <a:spLocks noGrp="1"/>
+          </p:cNvSpPr>
+          <p:nvPr>
+            <p:ph type="ftr" sz="quarter" idx="11"/>
+          </p:nvPr>
+        </p:nvSpPr>
+        <p:spPr/>
+        <p:txBody>
+          <a:bodyPr/>
+          <a:lstStyle/>
+          <a:p>
+            <a:r>
+              <a:rPr lang="en-US" smtClean="0"/>
+              <a:t>© Sioux 2013 | Confidential | </a:t>
+            </a:r>
+            <a:endParaRPr lang="en-US"/>
+          </a:p>
+        </p:txBody>
+      </p:sp>
+      <p:sp>
+        <p:nvSpPr>
+          <p:cNvPr id="5" name="Tijdelijke aanduiding voor dianummer 4"/>
+          <p:cNvSpPr>
+            <a:spLocks noGrp="1"/>
+          </p:cNvSpPr>
+          <p:nvPr>
+            <p:ph type="sldNum" sz="quarter" idx="12"/>
+          </p:nvPr>
+        </p:nvSpPr>
+        <p:spPr/>
+        <p:txBody>
+          <a:bodyPr/>
+          <a:lstStyle/>
+          <a:p>
+            <a:fld id="{B60E6772-B9F1-4672-903F-323A7A0E6EBD}" type="slidenum">
+              <a:rPr lang="en-US" smtClean="0"/>
+              <a:pPr/>
+              <a:t>13</a:t>
             </a:fld>
             <a:endParaRPr lang="en-US"/>
           </a:p>
@@ -4942,7 +5679,7 @@
 </p:sld>
 </file>
 
-<file path=ppt/slides/slide11.xml><?xml version="1.0" encoding="utf-8"?>
+<file path=ppt/slides/slide14.xml><?xml version="1.0" encoding="utf-8"?>
 <p:sld xmlns:a="http://schemas.openxmlformats.org/drawingml/2006/main" xmlns:r="http://schemas.openxmlformats.org/officeDocument/2006/relationships" xmlns:p="http://schemas.openxmlformats.org/presentationml/2006/main">
   <p:cSld>
     <p:spTree>
@@ -4975,8 +5712,8 @@
           <a:lstStyle/>
           <a:p>
             <a:r>
-              <a:rPr lang="en-US" dirty="0" smtClean="0"/>
-              <a:t>Dissecting a dissector</a:t>
+              <a:rPr lang="en-GB" dirty="0"/>
+              <a:t>Example dissector dissected</a:t>
             </a:r>
             <a:endParaRPr lang="en-US" dirty="0"/>
           </a:p>
@@ -5062,7 +5799,7 @@
             <a:fld id="{B60E6772-B9F1-4672-903F-323A7A0E6EBD}" type="slidenum">
               <a:rPr lang="en-US" smtClean="0"/>
               <a:pPr/>
-              <a:t>11</a:t>
+              <a:t>14</a:t>
             </a:fld>
             <a:endParaRPr lang="en-US"/>
           </a:p>
@@ -5189,7 +5926,7 @@
 </p:sld>
 </file>
 
-<file path=ppt/slides/slide12.xml><?xml version="1.0" encoding="utf-8"?>
+<file path=ppt/slides/slide15.xml><?xml version="1.0" encoding="utf-8"?>
 <p:sld xmlns:a="http://schemas.openxmlformats.org/drawingml/2006/main" xmlns:r="http://schemas.openxmlformats.org/officeDocument/2006/relationships" xmlns:p="http://schemas.openxmlformats.org/presentationml/2006/main">
   <p:cSld>
     <p:spTree>
@@ -5222,8 +5959,8 @@
           <a:lstStyle/>
           <a:p>
             <a:r>
-              <a:rPr lang="en-US" dirty="0" smtClean="0"/>
-              <a:t>Dissecting a dissector</a:t>
+              <a:rPr lang="en-GB" dirty="0"/>
+              <a:t>Example dissector dissected</a:t>
             </a:r>
             <a:endParaRPr lang="en-US" dirty="0"/>
           </a:p>
@@ -5309,7 +6046,7 @@
             <a:fld id="{B60E6772-B9F1-4672-903F-323A7A0E6EBD}" type="slidenum">
               <a:rPr lang="en-US" smtClean="0"/>
               <a:pPr/>
-              <a:t>12</a:t>
+              <a:t>15</a:t>
             </a:fld>
             <a:endParaRPr lang="en-US"/>
           </a:p>
@@ -5382,7 +6119,7 @@
 </p:sld>
 </file>
 
-<file path=ppt/slides/slide13.xml><?xml version="1.0" encoding="utf-8"?>
+<file path=ppt/slides/slide16.xml><?xml version="1.0" encoding="utf-8"?>
 <p:sld xmlns:a="http://schemas.openxmlformats.org/drawingml/2006/main" xmlns:r="http://schemas.openxmlformats.org/officeDocument/2006/relationships" xmlns:p="http://schemas.openxmlformats.org/presentationml/2006/main">
   <p:cSld>
     <p:spTree>
@@ -5415,9 +6152,10 @@
           <a:lstStyle/>
           <a:p>
             <a:r>
-              <a:rPr lang="en-US" dirty="0"/>
-              <a:t>Dissecting a dissector</a:t>
-            </a:r>
+              <a:rPr lang="en-GB" dirty="0"/>
+              <a:t>Example dissector dissected</a:t>
+            </a:r>
+            <a:endParaRPr lang="en-US" dirty="0"/>
           </a:p>
         </p:txBody>
       </p:sp>
@@ -5510,7 +6248,7 @@
             <a:fld id="{B60E6772-B9F1-4672-903F-323A7A0E6EBD}" type="slidenum">
               <a:rPr lang="en-US" smtClean="0"/>
               <a:pPr/>
-              <a:t>13</a:t>
+              <a:t>16</a:t>
             </a:fld>
             <a:endParaRPr lang="en-US"/>
           </a:p>
@@ -5691,453 +6429,6 @@
 </p:sld>
 </file>
 
-<file path=ppt/slides/slide14.xml><?xml version="1.0" encoding="utf-8"?>
-<p:sld xmlns:a="http://schemas.openxmlformats.org/drawingml/2006/main" xmlns:r="http://schemas.openxmlformats.org/officeDocument/2006/relationships" xmlns:p="http://schemas.openxmlformats.org/presentationml/2006/main">
-  <p:cSld>
-    <p:spTree>
-      <p:nvGrpSpPr>
-        <p:cNvPr id="1" name=""/>
-        <p:cNvGrpSpPr/>
-        <p:nvPr/>
-      </p:nvGrpSpPr>
-      <p:grpSpPr>
-        <a:xfrm>
-          <a:off x="0" y="0"/>
-          <a:ext cx="0" cy="0"/>
-          <a:chOff x="0" y="0"/>
-          <a:chExt cx="0" cy="0"/>
-        </a:xfrm>
-      </p:grpSpPr>
-      <p:sp>
-        <p:nvSpPr>
-          <p:cNvPr id="2" name="Titel 1"/>
-          <p:cNvSpPr>
-            <a:spLocks noGrp="1"/>
-          </p:cNvSpPr>
-          <p:nvPr>
-            <p:ph type="title"/>
-          </p:nvPr>
-        </p:nvSpPr>
-        <p:spPr/>
-        <p:txBody>
-          <a:bodyPr/>
-          <a:lstStyle/>
-          <a:p>
-            <a:r>
-              <a:rPr lang="en-US" dirty="0" smtClean="0"/>
-              <a:t>What wasn’t covered</a:t>
-            </a:r>
-            <a:endParaRPr lang="en-US" dirty="0"/>
-          </a:p>
-        </p:txBody>
-      </p:sp>
-      <p:sp>
-        <p:nvSpPr>
-          <p:cNvPr id="3" name="Tijdelijke aanduiding voor inhoud 2"/>
-          <p:cNvSpPr>
-            <a:spLocks noGrp="1"/>
-          </p:cNvSpPr>
-          <p:nvPr>
-            <p:ph idx="1"/>
-          </p:nvPr>
-        </p:nvSpPr>
-        <p:spPr/>
-        <p:txBody>
-          <a:bodyPr/>
-          <a:lstStyle/>
-          <a:p>
-            <a:r>
-              <a:rPr lang="en-US" dirty="0" smtClean="0"/>
-              <a:t>Loopback on windows: </a:t>
-            </a:r>
-            <a:r>
-              <a:rPr lang="en-US" dirty="0" err="1" smtClean="0"/>
-              <a:t>rawcap</a:t>
-            </a:r>
-            <a:r>
-              <a:rPr lang="en-US" dirty="0" smtClean="0"/>
-              <a:t> needed</a:t>
-            </a:r>
-          </a:p>
-          <a:p>
-            <a:r>
-              <a:rPr lang="en-US" dirty="0" err="1" smtClean="0"/>
-              <a:t>Endianness</a:t>
-            </a:r>
-            <a:endParaRPr lang="en-US" dirty="0" smtClean="0"/>
-          </a:p>
-          <a:p>
-            <a:r>
-              <a:rPr lang="en-US" dirty="0" smtClean="0"/>
-              <a:t>Conversations, multi-packet messages, …</a:t>
-            </a:r>
-          </a:p>
-          <a:p>
-            <a:endParaRPr lang="en-US" dirty="0"/>
-          </a:p>
-        </p:txBody>
-      </p:sp>
-      <p:sp>
-        <p:nvSpPr>
-          <p:cNvPr id="4" name="Tijdelijke aanduiding voor voettekst 3"/>
-          <p:cNvSpPr>
-            <a:spLocks noGrp="1"/>
-          </p:cNvSpPr>
-          <p:nvPr>
-            <p:ph type="ftr" sz="quarter" idx="11"/>
-          </p:nvPr>
-        </p:nvSpPr>
-        <p:spPr/>
-        <p:txBody>
-          <a:bodyPr/>
-          <a:lstStyle/>
-          <a:p>
-            <a:r>
-              <a:rPr lang="en-US" smtClean="0"/>
-              <a:t>© Sioux 2013 | Confidential | </a:t>
-            </a:r>
-            <a:endParaRPr lang="en-US"/>
-          </a:p>
-        </p:txBody>
-      </p:sp>
-      <p:sp>
-        <p:nvSpPr>
-          <p:cNvPr id="5" name="Tijdelijke aanduiding voor dianummer 4"/>
-          <p:cNvSpPr>
-            <a:spLocks noGrp="1"/>
-          </p:cNvSpPr>
-          <p:nvPr>
-            <p:ph type="sldNum" sz="quarter" idx="12"/>
-          </p:nvPr>
-        </p:nvSpPr>
-        <p:spPr/>
-        <p:txBody>
-          <a:bodyPr/>
-          <a:lstStyle/>
-          <a:p>
-            <a:fld id="{B60E6772-B9F1-4672-903F-323A7A0E6EBD}" type="slidenum">
-              <a:rPr lang="en-US" smtClean="0"/>
-              <a:pPr/>
-              <a:t>14</a:t>
-            </a:fld>
-            <a:endParaRPr lang="en-US"/>
-          </a:p>
-        </p:txBody>
-      </p:sp>
-    </p:spTree>
-    <p:extLst>
-      <p:ext uri="{BB962C8B-B14F-4D97-AF65-F5344CB8AC3E}">
-        <p14:creationId xmlns:p14="http://schemas.microsoft.com/office/powerpoint/2010/main" val="1586431957"/>
-      </p:ext>
-    </p:extLst>
-  </p:cSld>
-  <p:clrMapOvr>
-    <a:masterClrMapping/>
-  </p:clrMapOvr>
-</p:sld>
-</file>
-
-<file path=ppt/slides/slide15.xml><?xml version="1.0" encoding="utf-8"?>
-<p:sld xmlns:a="http://schemas.openxmlformats.org/drawingml/2006/main" xmlns:r="http://schemas.openxmlformats.org/officeDocument/2006/relationships" xmlns:p="http://schemas.openxmlformats.org/presentationml/2006/main">
-  <p:cSld>
-    <p:spTree>
-      <p:nvGrpSpPr>
-        <p:cNvPr id="1" name=""/>
-        <p:cNvGrpSpPr/>
-        <p:nvPr/>
-      </p:nvGrpSpPr>
-      <p:grpSpPr>
-        <a:xfrm>
-          <a:off x="0" y="0"/>
-          <a:ext cx="0" cy="0"/>
-          <a:chOff x="0" y="0"/>
-          <a:chExt cx="0" cy="0"/>
-        </a:xfrm>
-      </p:grpSpPr>
-      <p:sp>
-        <p:nvSpPr>
-          <p:cNvPr id="2" name="Titel 1"/>
-          <p:cNvSpPr>
-            <a:spLocks noGrp="1"/>
-          </p:cNvSpPr>
-          <p:nvPr>
-            <p:ph type="title"/>
-          </p:nvPr>
-        </p:nvSpPr>
-        <p:spPr/>
-        <p:txBody>
-          <a:bodyPr/>
-          <a:lstStyle/>
-          <a:p>
-            <a:r>
-              <a:rPr lang="en-US" dirty="0" smtClean="0"/>
-              <a:t>Demo</a:t>
-            </a:r>
-            <a:endParaRPr lang="en-US" dirty="0"/>
-          </a:p>
-        </p:txBody>
-      </p:sp>
-      <p:sp>
-        <p:nvSpPr>
-          <p:cNvPr id="3" name="Tijdelijke aanduiding voor inhoud 2"/>
-          <p:cNvSpPr>
-            <a:spLocks noGrp="1"/>
-          </p:cNvSpPr>
-          <p:nvPr>
-            <p:ph idx="1"/>
-          </p:nvPr>
-        </p:nvSpPr>
-        <p:spPr/>
-        <p:txBody>
-          <a:bodyPr/>
-          <a:lstStyle/>
-          <a:p>
-            <a:r>
-              <a:rPr lang="en-US" dirty="0" smtClean="0"/>
-              <a:t>… all goes well</a:t>
-            </a:r>
-            <a:endParaRPr lang="en-US" dirty="0"/>
-          </a:p>
-        </p:txBody>
-      </p:sp>
-      <p:sp>
-        <p:nvSpPr>
-          <p:cNvPr id="4" name="Tijdelijke aanduiding voor voettekst 3"/>
-          <p:cNvSpPr>
-            <a:spLocks noGrp="1"/>
-          </p:cNvSpPr>
-          <p:nvPr>
-            <p:ph type="ftr" sz="quarter" idx="11"/>
-          </p:nvPr>
-        </p:nvSpPr>
-        <p:spPr/>
-        <p:txBody>
-          <a:bodyPr/>
-          <a:lstStyle/>
-          <a:p>
-            <a:r>
-              <a:rPr lang="en-US" smtClean="0"/>
-              <a:t>© Sioux 2013 | Confidential | </a:t>
-            </a:r>
-            <a:endParaRPr lang="en-US"/>
-          </a:p>
-        </p:txBody>
-      </p:sp>
-      <p:sp>
-        <p:nvSpPr>
-          <p:cNvPr id="5" name="Tijdelijke aanduiding voor dianummer 4"/>
-          <p:cNvSpPr>
-            <a:spLocks noGrp="1"/>
-          </p:cNvSpPr>
-          <p:nvPr>
-            <p:ph type="sldNum" sz="quarter" idx="12"/>
-          </p:nvPr>
-        </p:nvSpPr>
-        <p:spPr/>
-        <p:txBody>
-          <a:bodyPr/>
-          <a:lstStyle/>
-          <a:p>
-            <a:fld id="{B60E6772-B9F1-4672-903F-323A7A0E6EBD}" type="slidenum">
-              <a:rPr lang="en-US" smtClean="0"/>
-              <a:pPr/>
-              <a:t>15</a:t>
-            </a:fld>
-            <a:endParaRPr lang="en-US"/>
-          </a:p>
-        </p:txBody>
-      </p:sp>
-    </p:spTree>
-    <p:extLst>
-      <p:ext uri="{BB962C8B-B14F-4D97-AF65-F5344CB8AC3E}">
-        <p14:creationId xmlns:p14="http://schemas.microsoft.com/office/powerpoint/2010/main" val="1688658753"/>
-      </p:ext>
-    </p:extLst>
-  </p:cSld>
-  <p:clrMapOvr>
-    <a:masterClrMapping/>
-  </p:clrMapOvr>
-</p:sld>
-</file>
-
-<file path=ppt/slides/slide16.xml><?xml version="1.0" encoding="utf-8"?>
-<p:sld xmlns:a="http://schemas.openxmlformats.org/drawingml/2006/main" xmlns:r="http://schemas.openxmlformats.org/officeDocument/2006/relationships" xmlns:p="http://schemas.openxmlformats.org/presentationml/2006/main">
-  <p:cSld>
-    <p:spTree>
-      <p:nvGrpSpPr>
-        <p:cNvPr id="1" name=""/>
-        <p:cNvGrpSpPr/>
-        <p:nvPr/>
-      </p:nvGrpSpPr>
-      <p:grpSpPr>
-        <a:xfrm>
-          <a:off x="0" y="0"/>
-          <a:ext cx="0" cy="0"/>
-          <a:chOff x="0" y="0"/>
-          <a:chExt cx="0" cy="0"/>
-        </a:xfrm>
-      </p:grpSpPr>
-      <p:sp>
-        <p:nvSpPr>
-          <p:cNvPr id="2" name="Titel 1"/>
-          <p:cNvSpPr>
-            <a:spLocks noGrp="1"/>
-          </p:cNvSpPr>
-          <p:nvPr>
-            <p:ph type="title"/>
-          </p:nvPr>
-        </p:nvSpPr>
-        <p:spPr/>
-        <p:txBody>
-          <a:bodyPr/>
-          <a:lstStyle/>
-          <a:p>
-            <a:r>
-              <a:rPr lang="en-US" dirty="0" smtClean="0"/>
-              <a:t>Links</a:t>
-            </a:r>
-            <a:endParaRPr lang="en-US" dirty="0"/>
-          </a:p>
-        </p:txBody>
-      </p:sp>
-      <p:sp>
-        <p:nvSpPr>
-          <p:cNvPr id="3" name="Tijdelijke aanduiding voor inhoud 2"/>
-          <p:cNvSpPr>
-            <a:spLocks noGrp="1"/>
-          </p:cNvSpPr>
-          <p:nvPr>
-            <p:ph idx="1"/>
-          </p:nvPr>
-        </p:nvSpPr>
-        <p:spPr/>
-        <p:txBody>
-          <a:bodyPr/>
-          <a:lstStyle/>
-          <a:p>
-            <a:r>
-              <a:rPr lang="en-US" dirty="0"/>
-              <a:t>Getting started: </a:t>
-            </a:r>
-            <a:endParaRPr lang="en-US" dirty="0" smtClean="0"/>
-          </a:p>
-          <a:p>
-            <a:pPr marL="704850" lvl="2" indent="-342900"/>
-            <a:r>
-              <a:rPr lang="en-US" dirty="0">
-                <a:hlinkClick r:id="rId2"/>
-              </a:rPr>
-              <a:t>http://</a:t>
-            </a:r>
-            <a:r>
-              <a:rPr lang="en-US" dirty="0" smtClean="0">
-                <a:hlinkClick r:id="rId2"/>
-              </a:rPr>
-              <a:t>wiki.wireshark.org/Lua</a:t>
-            </a:r>
-            <a:endParaRPr lang="en-US" dirty="0"/>
-          </a:p>
-          <a:p>
-            <a:r>
-              <a:rPr lang="en-US" dirty="0" smtClean="0"/>
-              <a:t>Details</a:t>
-            </a:r>
-          </a:p>
-          <a:p>
-            <a:pPr lvl="1"/>
-            <a:r>
-              <a:rPr lang="en-US" dirty="0" smtClean="0">
-                <a:hlinkClick r:id="rId3"/>
-              </a:rPr>
-              <a:t>http</a:t>
-            </a:r>
-            <a:r>
-              <a:rPr lang="en-US" dirty="0">
-                <a:hlinkClick r:id="rId3"/>
-              </a:rPr>
-              <a:t>://ask.wireshark.org/</a:t>
-            </a:r>
-            <a:endParaRPr lang="en-US" dirty="0"/>
-          </a:p>
-          <a:p>
-            <a:pPr lvl="1"/>
-            <a:r>
-              <a:rPr lang="en-US" dirty="0">
-                <a:hlinkClick r:id="rId4"/>
-              </a:rPr>
-              <a:t>http://stackoverflow.com/</a:t>
-            </a:r>
-            <a:endParaRPr lang="en-US" dirty="0"/>
-          </a:p>
-          <a:p>
-            <a:endParaRPr lang="en-US" dirty="0" smtClean="0"/>
-          </a:p>
-          <a:p>
-            <a:pPr lvl="1"/>
-            <a:endParaRPr lang="en-US" dirty="0"/>
-          </a:p>
-        </p:txBody>
-      </p:sp>
-      <p:sp>
-        <p:nvSpPr>
-          <p:cNvPr id="4" name="Tijdelijke aanduiding voor voettekst 3"/>
-          <p:cNvSpPr>
-            <a:spLocks noGrp="1"/>
-          </p:cNvSpPr>
-          <p:nvPr>
-            <p:ph type="ftr" sz="quarter" idx="11"/>
-          </p:nvPr>
-        </p:nvSpPr>
-        <p:spPr/>
-        <p:txBody>
-          <a:bodyPr/>
-          <a:lstStyle/>
-          <a:p>
-            <a:r>
-              <a:rPr lang="en-US" smtClean="0"/>
-              <a:t>© Sioux 2013 | Confidential | </a:t>
-            </a:r>
-            <a:endParaRPr lang="en-US"/>
-          </a:p>
-        </p:txBody>
-      </p:sp>
-      <p:sp>
-        <p:nvSpPr>
-          <p:cNvPr id="5" name="Tijdelijke aanduiding voor dianummer 4"/>
-          <p:cNvSpPr>
-            <a:spLocks noGrp="1"/>
-          </p:cNvSpPr>
-          <p:nvPr>
-            <p:ph type="sldNum" sz="quarter" idx="12"/>
-          </p:nvPr>
-        </p:nvSpPr>
-        <p:spPr/>
-        <p:txBody>
-          <a:bodyPr/>
-          <a:lstStyle/>
-          <a:p>
-            <a:fld id="{B60E6772-B9F1-4672-903F-323A7A0E6EBD}" type="slidenum">
-              <a:rPr lang="en-US" smtClean="0"/>
-              <a:pPr/>
-              <a:t>16</a:t>
-            </a:fld>
-            <a:endParaRPr lang="en-US"/>
-          </a:p>
-        </p:txBody>
-      </p:sp>
-    </p:spTree>
-    <p:extLst>
-      <p:ext uri="{BB962C8B-B14F-4D97-AF65-F5344CB8AC3E}">
-        <p14:creationId xmlns:p14="http://schemas.microsoft.com/office/powerpoint/2010/main" val="2861604159"/>
-      </p:ext>
-    </p:extLst>
-  </p:cSld>
-  <p:clrMapOvr>
-    <a:masterClrMapping/>
-  </p:clrMapOvr>
-</p:sld>
-</file>
-
 <file path=ppt/slides/slide17.xml><?xml version="1.0" encoding="utf-8"?>
 <p:sld xmlns:a="http://schemas.openxmlformats.org/drawingml/2006/main" xmlns:r="http://schemas.openxmlformats.org/officeDocument/2006/relationships" xmlns:p="http://schemas.openxmlformats.org/presentationml/2006/main">
   <p:cSld>
@@ -6157,12 +6448,128 @@
       </p:grpSpPr>
       <p:sp>
         <p:nvSpPr>
-          <p:cNvPr id="2" name="Slide Number Placeholder 1"/>
-          <p:cNvSpPr>
-            <a:spLocks noGrp="1"/>
-          </p:cNvSpPr>
-          <p:nvPr>
-            <p:ph type="sldNum" sz="quarter" idx="11"/>
+          <p:cNvPr id="2" name="Title 1"/>
+          <p:cNvSpPr>
+            <a:spLocks noGrp="1"/>
+          </p:cNvSpPr>
+          <p:nvPr>
+            <p:ph type="title"/>
+          </p:nvPr>
+        </p:nvSpPr>
+        <p:spPr/>
+        <p:txBody>
+          <a:bodyPr/>
+          <a:lstStyle/>
+          <a:p>
+            <a:r>
+              <a:rPr lang="en-GB" dirty="0" smtClean="0"/>
+              <a:t>Overview</a:t>
+            </a:r>
+            <a:endParaRPr lang="en-GB" dirty="0"/>
+          </a:p>
+        </p:txBody>
+      </p:sp>
+      <p:sp>
+        <p:nvSpPr>
+          <p:cNvPr id="3" name="Content Placeholder 2"/>
+          <p:cNvSpPr>
+            <a:spLocks noGrp="1"/>
+          </p:cNvSpPr>
+          <p:nvPr>
+            <p:ph idx="1"/>
+          </p:nvPr>
+        </p:nvSpPr>
+        <p:spPr/>
+        <p:txBody>
+          <a:bodyPr>
+            <a:normAutofit/>
+          </a:bodyPr>
+          <a:lstStyle/>
+          <a:p>
+            <a:r>
+              <a:rPr lang="en-GB" dirty="0" smtClean="0"/>
+              <a:t>Why and when</a:t>
+            </a:r>
+          </a:p>
+          <a:p>
+            <a:r>
+              <a:rPr lang="en-GB" dirty="0" smtClean="0"/>
+              <a:t>Dissector architecture</a:t>
+            </a:r>
+          </a:p>
+          <a:p>
+            <a:r>
+              <a:rPr lang="en-GB" dirty="0" smtClean="0"/>
+              <a:t>Example dissector dissected</a:t>
+            </a:r>
+          </a:p>
+          <a:p>
+            <a:r>
+              <a:rPr lang="en-GB" dirty="0" smtClean="0">
+                <a:solidFill>
+                  <a:srgbClr val="FF0000"/>
+                </a:solidFill>
+              </a:rPr>
+              <a:t>What </a:t>
+            </a:r>
+            <a:r>
+              <a:rPr lang="en-GB" dirty="0">
+                <a:solidFill>
+                  <a:srgbClr val="FF0000"/>
+                </a:solidFill>
+              </a:rPr>
+              <a:t>wasn’t covered</a:t>
+            </a:r>
+          </a:p>
+          <a:p>
+            <a:r>
+              <a:rPr lang="en-GB" dirty="0" smtClean="0"/>
+              <a:t>Demo</a:t>
+            </a:r>
+          </a:p>
+          <a:p>
+            <a:r>
+              <a:rPr lang="en-GB" dirty="0" smtClean="0"/>
+              <a:t>Links</a:t>
+            </a:r>
+            <a:endParaRPr lang="en-GB" dirty="0"/>
+          </a:p>
+          <a:p>
+            <a:endParaRPr lang="en-GB" dirty="0" smtClean="0"/>
+          </a:p>
+        </p:txBody>
+      </p:sp>
+      <p:sp>
+        <p:nvSpPr>
+          <p:cNvPr id="4" name="Footer Placeholder 3"/>
+          <p:cNvSpPr>
+            <a:spLocks noGrp="1"/>
+          </p:cNvSpPr>
+          <p:nvPr>
+            <p:ph type="ftr" sz="quarter" idx="11"/>
+          </p:nvPr>
+        </p:nvSpPr>
+        <p:spPr/>
+        <p:txBody>
+          <a:bodyPr/>
+          <a:lstStyle/>
+          <a:p>
+            <a:r>
+              <a:rPr lang="en-GB" smtClean="0"/>
+              <a:t>© Sioux 2013 | Confidential | </a:t>
+            </a:r>
+            <a:endParaRPr lang="en-GB"/>
+          </a:p>
+        </p:txBody>
+      </p:sp>
+      <p:sp>
+        <p:nvSpPr>
+          <p:cNvPr id="5" name="Slide Number Placeholder 4"/>
+          <p:cNvSpPr>
+            <a:spLocks noGrp="1"/>
+          </p:cNvSpPr>
+          <p:nvPr>
+            <p:ph type="sldNum" sz="quarter" idx="12"/>
           </p:nvPr>
         </p:nvSpPr>
         <p:spPr/>
@@ -6174,6 +6581,830 @@
               <a:rPr lang="en-GB" smtClean="0"/>
               <a:pPr/>
               <a:t>17</a:t>
+            </a:fld>
+            <a:endParaRPr lang="en-GB"/>
+          </a:p>
+        </p:txBody>
+      </p:sp>
+    </p:spTree>
+    <p:extLst>
+      <p:ext uri="{BB962C8B-B14F-4D97-AF65-F5344CB8AC3E}">
+        <p14:creationId xmlns:p14="http://schemas.microsoft.com/office/powerpoint/2010/main" val="15548334"/>
+      </p:ext>
+    </p:extLst>
+  </p:cSld>
+  <p:clrMapOvr>
+    <a:masterClrMapping/>
+  </p:clrMapOvr>
+</p:sld>
+</file>
+
+<file path=ppt/slides/slide18.xml><?xml version="1.0" encoding="utf-8"?>
+<p:sld xmlns:a="http://schemas.openxmlformats.org/drawingml/2006/main" xmlns:r="http://schemas.openxmlformats.org/officeDocument/2006/relationships" xmlns:p="http://schemas.openxmlformats.org/presentationml/2006/main">
+  <p:cSld>
+    <p:spTree>
+      <p:nvGrpSpPr>
+        <p:cNvPr id="1" name=""/>
+        <p:cNvGrpSpPr/>
+        <p:nvPr/>
+      </p:nvGrpSpPr>
+      <p:grpSpPr>
+        <a:xfrm>
+          <a:off x="0" y="0"/>
+          <a:ext cx="0" cy="0"/>
+          <a:chOff x="0" y="0"/>
+          <a:chExt cx="0" cy="0"/>
+        </a:xfrm>
+      </p:grpSpPr>
+      <p:sp>
+        <p:nvSpPr>
+          <p:cNvPr id="2" name="Titel 1"/>
+          <p:cNvSpPr>
+            <a:spLocks noGrp="1"/>
+          </p:cNvSpPr>
+          <p:nvPr>
+            <p:ph type="title"/>
+          </p:nvPr>
+        </p:nvSpPr>
+        <p:spPr/>
+        <p:txBody>
+          <a:bodyPr/>
+          <a:lstStyle/>
+          <a:p>
+            <a:r>
+              <a:rPr lang="en-US" dirty="0" smtClean="0"/>
+              <a:t>What wasn’t covered</a:t>
+            </a:r>
+            <a:endParaRPr lang="en-US" dirty="0"/>
+          </a:p>
+        </p:txBody>
+      </p:sp>
+      <p:sp>
+        <p:nvSpPr>
+          <p:cNvPr id="3" name="Tijdelijke aanduiding voor inhoud 2"/>
+          <p:cNvSpPr>
+            <a:spLocks noGrp="1"/>
+          </p:cNvSpPr>
+          <p:nvPr>
+            <p:ph idx="1"/>
+          </p:nvPr>
+        </p:nvSpPr>
+        <p:spPr/>
+        <p:txBody>
+          <a:bodyPr/>
+          <a:lstStyle/>
+          <a:p>
+            <a:r>
+              <a:rPr lang="en-US" dirty="0" smtClean="0"/>
+              <a:t>Loopback on windows: </a:t>
+            </a:r>
+            <a:r>
+              <a:rPr lang="en-US" dirty="0" err="1" smtClean="0"/>
+              <a:t>rawcap</a:t>
+            </a:r>
+            <a:r>
+              <a:rPr lang="en-US" dirty="0" smtClean="0"/>
+              <a:t> needed</a:t>
+            </a:r>
+          </a:p>
+          <a:p>
+            <a:r>
+              <a:rPr lang="en-US" dirty="0" err="1" smtClean="0"/>
+              <a:t>Endianness</a:t>
+            </a:r>
+            <a:endParaRPr lang="en-US" dirty="0" smtClean="0"/>
+          </a:p>
+          <a:p>
+            <a:r>
+              <a:rPr lang="en-US" dirty="0" smtClean="0"/>
+              <a:t>Conversations, multi-packet messages, …</a:t>
+            </a:r>
+          </a:p>
+          <a:p>
+            <a:endParaRPr lang="en-US" dirty="0"/>
+          </a:p>
+        </p:txBody>
+      </p:sp>
+      <p:sp>
+        <p:nvSpPr>
+          <p:cNvPr id="4" name="Tijdelijke aanduiding voor voettekst 3"/>
+          <p:cNvSpPr>
+            <a:spLocks noGrp="1"/>
+          </p:cNvSpPr>
+          <p:nvPr>
+            <p:ph type="ftr" sz="quarter" idx="11"/>
+          </p:nvPr>
+        </p:nvSpPr>
+        <p:spPr/>
+        <p:txBody>
+          <a:bodyPr/>
+          <a:lstStyle/>
+          <a:p>
+            <a:r>
+              <a:rPr lang="en-US" smtClean="0"/>
+              <a:t>© Sioux 2013 | Confidential | </a:t>
+            </a:r>
+            <a:endParaRPr lang="en-US"/>
+          </a:p>
+        </p:txBody>
+      </p:sp>
+      <p:sp>
+        <p:nvSpPr>
+          <p:cNvPr id="5" name="Tijdelijke aanduiding voor dianummer 4"/>
+          <p:cNvSpPr>
+            <a:spLocks noGrp="1"/>
+          </p:cNvSpPr>
+          <p:nvPr>
+            <p:ph type="sldNum" sz="quarter" idx="12"/>
+          </p:nvPr>
+        </p:nvSpPr>
+        <p:spPr/>
+        <p:txBody>
+          <a:bodyPr/>
+          <a:lstStyle/>
+          <a:p>
+            <a:fld id="{B60E6772-B9F1-4672-903F-323A7A0E6EBD}" type="slidenum">
+              <a:rPr lang="en-US" smtClean="0"/>
+              <a:pPr/>
+              <a:t>18</a:t>
+            </a:fld>
+            <a:endParaRPr lang="en-US"/>
+          </a:p>
+        </p:txBody>
+      </p:sp>
+    </p:spTree>
+    <p:extLst>
+      <p:ext uri="{BB962C8B-B14F-4D97-AF65-F5344CB8AC3E}">
+        <p14:creationId xmlns:p14="http://schemas.microsoft.com/office/powerpoint/2010/main" val="1586431957"/>
+      </p:ext>
+    </p:extLst>
+  </p:cSld>
+  <p:clrMapOvr>
+    <a:masterClrMapping/>
+  </p:clrMapOvr>
+</p:sld>
+</file>
+
+<file path=ppt/slides/slide19.xml><?xml version="1.0" encoding="utf-8"?>
+<p:sld xmlns:a="http://schemas.openxmlformats.org/drawingml/2006/main" xmlns:r="http://schemas.openxmlformats.org/officeDocument/2006/relationships" xmlns:p="http://schemas.openxmlformats.org/presentationml/2006/main">
+  <p:cSld>
+    <p:spTree>
+      <p:nvGrpSpPr>
+        <p:cNvPr id="1" name=""/>
+        <p:cNvGrpSpPr/>
+        <p:nvPr/>
+      </p:nvGrpSpPr>
+      <p:grpSpPr>
+        <a:xfrm>
+          <a:off x="0" y="0"/>
+          <a:ext cx="0" cy="0"/>
+          <a:chOff x="0" y="0"/>
+          <a:chExt cx="0" cy="0"/>
+        </a:xfrm>
+      </p:grpSpPr>
+      <p:sp>
+        <p:nvSpPr>
+          <p:cNvPr id="2" name="Title 1"/>
+          <p:cNvSpPr>
+            <a:spLocks noGrp="1"/>
+          </p:cNvSpPr>
+          <p:nvPr>
+            <p:ph type="title"/>
+          </p:nvPr>
+        </p:nvSpPr>
+        <p:spPr/>
+        <p:txBody>
+          <a:bodyPr/>
+          <a:lstStyle/>
+          <a:p>
+            <a:r>
+              <a:rPr lang="en-GB" dirty="0" smtClean="0"/>
+              <a:t>Overview</a:t>
+            </a:r>
+            <a:endParaRPr lang="en-GB" dirty="0"/>
+          </a:p>
+        </p:txBody>
+      </p:sp>
+      <p:sp>
+        <p:nvSpPr>
+          <p:cNvPr id="3" name="Content Placeholder 2"/>
+          <p:cNvSpPr>
+            <a:spLocks noGrp="1"/>
+          </p:cNvSpPr>
+          <p:nvPr>
+            <p:ph idx="1"/>
+          </p:nvPr>
+        </p:nvSpPr>
+        <p:spPr/>
+        <p:txBody>
+          <a:bodyPr>
+            <a:normAutofit/>
+          </a:bodyPr>
+          <a:lstStyle/>
+          <a:p>
+            <a:r>
+              <a:rPr lang="en-GB" dirty="0" smtClean="0"/>
+              <a:t>Why and when</a:t>
+            </a:r>
+          </a:p>
+          <a:p>
+            <a:r>
+              <a:rPr lang="en-GB" dirty="0" smtClean="0"/>
+              <a:t>Dissector architecture</a:t>
+            </a:r>
+          </a:p>
+          <a:p>
+            <a:r>
+              <a:rPr lang="en-GB" dirty="0" smtClean="0"/>
+              <a:t>Example dissector dissected</a:t>
+            </a:r>
+          </a:p>
+          <a:p>
+            <a:r>
+              <a:rPr lang="en-GB" dirty="0" smtClean="0"/>
+              <a:t>What </a:t>
+            </a:r>
+            <a:r>
+              <a:rPr lang="en-GB" dirty="0"/>
+              <a:t>wasn’t covered</a:t>
+            </a:r>
+          </a:p>
+          <a:p>
+            <a:r>
+              <a:rPr lang="en-GB" dirty="0" smtClean="0">
+                <a:solidFill>
+                  <a:srgbClr val="FF0000"/>
+                </a:solidFill>
+              </a:rPr>
+              <a:t>Demo</a:t>
+            </a:r>
+          </a:p>
+          <a:p>
+            <a:r>
+              <a:rPr lang="en-GB" dirty="0" smtClean="0"/>
+              <a:t>Links</a:t>
+            </a:r>
+            <a:endParaRPr lang="en-GB" dirty="0"/>
+          </a:p>
+          <a:p>
+            <a:endParaRPr lang="en-GB" dirty="0" smtClean="0"/>
+          </a:p>
+        </p:txBody>
+      </p:sp>
+      <p:sp>
+        <p:nvSpPr>
+          <p:cNvPr id="4" name="Footer Placeholder 3"/>
+          <p:cNvSpPr>
+            <a:spLocks noGrp="1"/>
+          </p:cNvSpPr>
+          <p:nvPr>
+            <p:ph type="ftr" sz="quarter" idx="11"/>
+          </p:nvPr>
+        </p:nvSpPr>
+        <p:spPr/>
+        <p:txBody>
+          <a:bodyPr/>
+          <a:lstStyle/>
+          <a:p>
+            <a:r>
+              <a:rPr lang="en-GB" smtClean="0"/>
+              <a:t>© Sioux 2013 | Confidential | </a:t>
+            </a:r>
+            <a:endParaRPr lang="en-GB"/>
+          </a:p>
+        </p:txBody>
+      </p:sp>
+      <p:sp>
+        <p:nvSpPr>
+          <p:cNvPr id="5" name="Slide Number Placeholder 4"/>
+          <p:cNvSpPr>
+            <a:spLocks noGrp="1"/>
+          </p:cNvSpPr>
+          <p:nvPr>
+            <p:ph type="sldNum" sz="quarter" idx="12"/>
+          </p:nvPr>
+        </p:nvSpPr>
+        <p:spPr/>
+        <p:txBody>
+          <a:bodyPr/>
+          <a:lstStyle/>
+          <a:p>
+            <a:fld id="{B60E6772-B9F1-4672-903F-323A7A0E6EBD}" type="slidenum">
+              <a:rPr lang="en-GB" smtClean="0"/>
+              <a:pPr/>
+              <a:t>19</a:t>
+            </a:fld>
+            <a:endParaRPr lang="en-GB"/>
+          </a:p>
+        </p:txBody>
+      </p:sp>
+    </p:spTree>
+    <p:extLst>
+      <p:ext uri="{BB962C8B-B14F-4D97-AF65-F5344CB8AC3E}">
+        <p14:creationId xmlns:p14="http://schemas.microsoft.com/office/powerpoint/2010/main" val="2917357159"/>
+      </p:ext>
+    </p:extLst>
+  </p:cSld>
+  <p:clrMapOvr>
+    <a:masterClrMapping/>
+  </p:clrMapOvr>
+</p:sld>
+</file>
+
+<file path=ppt/slides/slide2.xml><?xml version="1.0" encoding="utf-8"?>
+<p:sld xmlns:a="http://schemas.openxmlformats.org/drawingml/2006/main" xmlns:r="http://schemas.openxmlformats.org/officeDocument/2006/relationships" xmlns:p="http://schemas.openxmlformats.org/presentationml/2006/main">
+  <p:cSld>
+    <p:spTree>
+      <p:nvGrpSpPr>
+        <p:cNvPr id="1" name=""/>
+        <p:cNvGrpSpPr/>
+        <p:nvPr/>
+      </p:nvGrpSpPr>
+      <p:grpSpPr>
+        <a:xfrm>
+          <a:off x="0" y="0"/>
+          <a:ext cx="0" cy="0"/>
+          <a:chOff x="0" y="0"/>
+          <a:chExt cx="0" cy="0"/>
+        </a:xfrm>
+      </p:grpSpPr>
+      <p:sp>
+        <p:nvSpPr>
+          <p:cNvPr id="2" name="Title 1"/>
+          <p:cNvSpPr>
+            <a:spLocks noGrp="1"/>
+          </p:cNvSpPr>
+          <p:nvPr>
+            <p:ph type="title"/>
+          </p:nvPr>
+        </p:nvSpPr>
+        <p:spPr/>
+        <p:txBody>
+          <a:bodyPr/>
+          <a:lstStyle/>
+          <a:p>
+            <a:r>
+              <a:rPr lang="en-GB" dirty="0" smtClean="0"/>
+              <a:t>Overview</a:t>
+            </a:r>
+            <a:endParaRPr lang="en-GB" dirty="0"/>
+          </a:p>
+        </p:txBody>
+      </p:sp>
+      <p:sp>
+        <p:nvSpPr>
+          <p:cNvPr id="3" name="Content Placeholder 2"/>
+          <p:cNvSpPr>
+            <a:spLocks noGrp="1"/>
+          </p:cNvSpPr>
+          <p:nvPr>
+            <p:ph idx="1"/>
+          </p:nvPr>
+        </p:nvSpPr>
+        <p:spPr/>
+        <p:txBody>
+          <a:bodyPr>
+            <a:normAutofit/>
+          </a:bodyPr>
+          <a:lstStyle/>
+          <a:p>
+            <a:r>
+              <a:rPr lang="en-GB" dirty="0" smtClean="0"/>
+              <a:t>Why and when</a:t>
+            </a:r>
+          </a:p>
+          <a:p>
+            <a:r>
+              <a:rPr lang="en-GB" dirty="0" smtClean="0"/>
+              <a:t>Dissector architecture</a:t>
+            </a:r>
+          </a:p>
+          <a:p>
+            <a:r>
+              <a:rPr lang="en-GB" dirty="0" smtClean="0"/>
+              <a:t>Example dissector dissected</a:t>
+            </a:r>
+          </a:p>
+          <a:p>
+            <a:r>
+              <a:rPr lang="en-GB" dirty="0" smtClean="0"/>
+              <a:t>What </a:t>
+            </a:r>
+            <a:r>
+              <a:rPr lang="en-GB" dirty="0"/>
+              <a:t>wasn’t covered</a:t>
+            </a:r>
+          </a:p>
+          <a:p>
+            <a:r>
+              <a:rPr lang="en-GB" dirty="0" smtClean="0"/>
+              <a:t>Demo</a:t>
+            </a:r>
+          </a:p>
+          <a:p>
+            <a:r>
+              <a:rPr lang="en-GB" dirty="0" smtClean="0"/>
+              <a:t>Links</a:t>
+            </a:r>
+            <a:endParaRPr lang="en-GB" dirty="0"/>
+          </a:p>
+          <a:p>
+            <a:endParaRPr lang="en-GB" dirty="0" smtClean="0"/>
+          </a:p>
+        </p:txBody>
+      </p:sp>
+      <p:sp>
+        <p:nvSpPr>
+          <p:cNvPr id="4" name="Footer Placeholder 3"/>
+          <p:cNvSpPr>
+            <a:spLocks noGrp="1"/>
+          </p:cNvSpPr>
+          <p:nvPr>
+            <p:ph type="ftr" sz="quarter" idx="11"/>
+          </p:nvPr>
+        </p:nvSpPr>
+        <p:spPr/>
+        <p:txBody>
+          <a:bodyPr/>
+          <a:lstStyle/>
+          <a:p>
+            <a:r>
+              <a:rPr lang="en-GB" smtClean="0"/>
+              <a:t>© Sioux 2013 | Confidential | </a:t>
+            </a:r>
+            <a:endParaRPr lang="en-GB"/>
+          </a:p>
+        </p:txBody>
+      </p:sp>
+      <p:sp>
+        <p:nvSpPr>
+          <p:cNvPr id="5" name="Slide Number Placeholder 4"/>
+          <p:cNvSpPr>
+            <a:spLocks noGrp="1"/>
+          </p:cNvSpPr>
+          <p:nvPr>
+            <p:ph type="sldNum" sz="quarter" idx="12"/>
+          </p:nvPr>
+        </p:nvSpPr>
+        <p:spPr/>
+        <p:txBody>
+          <a:bodyPr/>
+          <a:lstStyle/>
+          <a:p>
+            <a:fld id="{B60E6772-B9F1-4672-903F-323A7A0E6EBD}" type="slidenum">
+              <a:rPr lang="en-GB" smtClean="0"/>
+              <a:pPr/>
+              <a:t>2</a:t>
+            </a:fld>
+            <a:endParaRPr lang="en-GB"/>
+          </a:p>
+        </p:txBody>
+      </p:sp>
+    </p:spTree>
+  </p:cSld>
+  <p:clrMapOvr>
+    <a:masterClrMapping/>
+  </p:clrMapOvr>
+</p:sld>
+</file>
+
+<file path=ppt/slides/slide20.xml><?xml version="1.0" encoding="utf-8"?>
+<p:sld xmlns:a="http://schemas.openxmlformats.org/drawingml/2006/main" xmlns:r="http://schemas.openxmlformats.org/officeDocument/2006/relationships" xmlns:p="http://schemas.openxmlformats.org/presentationml/2006/main">
+  <p:cSld>
+    <p:spTree>
+      <p:nvGrpSpPr>
+        <p:cNvPr id="1" name=""/>
+        <p:cNvGrpSpPr/>
+        <p:nvPr/>
+      </p:nvGrpSpPr>
+      <p:grpSpPr>
+        <a:xfrm>
+          <a:off x="0" y="0"/>
+          <a:ext cx="0" cy="0"/>
+          <a:chOff x="0" y="0"/>
+          <a:chExt cx="0" cy="0"/>
+        </a:xfrm>
+      </p:grpSpPr>
+      <p:sp>
+        <p:nvSpPr>
+          <p:cNvPr id="2" name="Titel 1"/>
+          <p:cNvSpPr>
+            <a:spLocks noGrp="1"/>
+          </p:cNvSpPr>
+          <p:nvPr>
+            <p:ph type="title"/>
+          </p:nvPr>
+        </p:nvSpPr>
+        <p:spPr/>
+        <p:txBody>
+          <a:bodyPr/>
+          <a:lstStyle/>
+          <a:p>
+            <a:r>
+              <a:rPr lang="en-US" dirty="0" smtClean="0"/>
+              <a:t>Demo</a:t>
+            </a:r>
+            <a:endParaRPr lang="en-US" dirty="0"/>
+          </a:p>
+        </p:txBody>
+      </p:sp>
+      <p:sp>
+        <p:nvSpPr>
+          <p:cNvPr id="3" name="Tijdelijke aanduiding voor inhoud 2"/>
+          <p:cNvSpPr>
+            <a:spLocks noGrp="1"/>
+          </p:cNvSpPr>
+          <p:nvPr>
+            <p:ph idx="1"/>
+          </p:nvPr>
+        </p:nvSpPr>
+        <p:spPr/>
+        <p:txBody>
+          <a:bodyPr/>
+          <a:lstStyle/>
+          <a:p>
+            <a:r>
+              <a:rPr lang="en-US" dirty="0" smtClean="0"/>
+              <a:t>… all goes well</a:t>
+            </a:r>
+            <a:endParaRPr lang="en-US" dirty="0"/>
+          </a:p>
+        </p:txBody>
+      </p:sp>
+      <p:sp>
+        <p:nvSpPr>
+          <p:cNvPr id="4" name="Tijdelijke aanduiding voor voettekst 3"/>
+          <p:cNvSpPr>
+            <a:spLocks noGrp="1"/>
+          </p:cNvSpPr>
+          <p:nvPr>
+            <p:ph type="ftr" sz="quarter" idx="11"/>
+          </p:nvPr>
+        </p:nvSpPr>
+        <p:spPr/>
+        <p:txBody>
+          <a:bodyPr/>
+          <a:lstStyle/>
+          <a:p>
+            <a:r>
+              <a:rPr lang="en-US" smtClean="0"/>
+              <a:t>© Sioux 2013 | Confidential | </a:t>
+            </a:r>
+            <a:endParaRPr lang="en-US"/>
+          </a:p>
+        </p:txBody>
+      </p:sp>
+      <p:sp>
+        <p:nvSpPr>
+          <p:cNvPr id="5" name="Tijdelijke aanduiding voor dianummer 4"/>
+          <p:cNvSpPr>
+            <a:spLocks noGrp="1"/>
+          </p:cNvSpPr>
+          <p:nvPr>
+            <p:ph type="sldNum" sz="quarter" idx="12"/>
+          </p:nvPr>
+        </p:nvSpPr>
+        <p:spPr/>
+        <p:txBody>
+          <a:bodyPr/>
+          <a:lstStyle/>
+          <a:p>
+            <a:fld id="{B60E6772-B9F1-4672-903F-323A7A0E6EBD}" type="slidenum">
+              <a:rPr lang="en-US" smtClean="0"/>
+              <a:pPr/>
+              <a:t>20</a:t>
+            </a:fld>
+            <a:endParaRPr lang="en-US"/>
+          </a:p>
+        </p:txBody>
+      </p:sp>
+    </p:spTree>
+    <p:extLst>
+      <p:ext uri="{BB962C8B-B14F-4D97-AF65-F5344CB8AC3E}">
+        <p14:creationId xmlns:p14="http://schemas.microsoft.com/office/powerpoint/2010/main" val="1688658753"/>
+      </p:ext>
+    </p:extLst>
+  </p:cSld>
+  <p:clrMapOvr>
+    <a:masterClrMapping/>
+  </p:clrMapOvr>
+</p:sld>
+</file>
+
+<file path=ppt/slides/slide21.xml><?xml version="1.0" encoding="utf-8"?>
+<p:sld xmlns:a="http://schemas.openxmlformats.org/drawingml/2006/main" xmlns:r="http://schemas.openxmlformats.org/officeDocument/2006/relationships" xmlns:p="http://schemas.openxmlformats.org/presentationml/2006/main">
+  <p:cSld>
+    <p:spTree>
+      <p:nvGrpSpPr>
+        <p:cNvPr id="1" name=""/>
+        <p:cNvGrpSpPr/>
+        <p:nvPr/>
+      </p:nvGrpSpPr>
+      <p:grpSpPr>
+        <a:xfrm>
+          <a:off x="0" y="0"/>
+          <a:ext cx="0" cy="0"/>
+          <a:chOff x="0" y="0"/>
+          <a:chExt cx="0" cy="0"/>
+        </a:xfrm>
+      </p:grpSpPr>
+      <p:sp>
+        <p:nvSpPr>
+          <p:cNvPr id="2" name="Titel 1"/>
+          <p:cNvSpPr>
+            <a:spLocks noGrp="1"/>
+          </p:cNvSpPr>
+          <p:nvPr>
+            <p:ph type="title"/>
+          </p:nvPr>
+        </p:nvSpPr>
+        <p:spPr/>
+        <p:txBody>
+          <a:bodyPr/>
+          <a:lstStyle/>
+          <a:p>
+            <a:r>
+              <a:rPr lang="en-US" dirty="0" smtClean="0"/>
+              <a:t>Links</a:t>
+            </a:r>
+            <a:endParaRPr lang="en-US" dirty="0"/>
+          </a:p>
+        </p:txBody>
+      </p:sp>
+      <p:sp>
+        <p:nvSpPr>
+          <p:cNvPr id="3" name="Tijdelijke aanduiding voor inhoud 2"/>
+          <p:cNvSpPr>
+            <a:spLocks noGrp="1"/>
+          </p:cNvSpPr>
+          <p:nvPr>
+            <p:ph idx="1"/>
+          </p:nvPr>
+        </p:nvSpPr>
+        <p:spPr/>
+        <p:txBody>
+          <a:bodyPr/>
+          <a:lstStyle/>
+          <a:p>
+            <a:r>
+              <a:rPr lang="en-US" dirty="0"/>
+              <a:t>Getting started: </a:t>
+            </a:r>
+            <a:endParaRPr lang="en-US" dirty="0" smtClean="0"/>
+          </a:p>
+          <a:p>
+            <a:pPr marL="704850" lvl="2" indent="-342900"/>
+            <a:r>
+              <a:rPr lang="en-US" dirty="0">
+                <a:hlinkClick r:id="rId3"/>
+              </a:rPr>
+              <a:t>http://</a:t>
+            </a:r>
+            <a:r>
+              <a:rPr lang="en-US" dirty="0" smtClean="0">
+                <a:hlinkClick r:id="rId3"/>
+              </a:rPr>
+              <a:t>wiki.wireshark.org/Lua</a:t>
+            </a:r>
+            <a:endParaRPr lang="en-US" dirty="0"/>
+          </a:p>
+          <a:p>
+            <a:r>
+              <a:rPr lang="en-US" dirty="0" smtClean="0"/>
+              <a:t>Details</a:t>
+            </a:r>
+          </a:p>
+          <a:p>
+            <a:pPr lvl="1"/>
+            <a:r>
+              <a:rPr lang="en-US" dirty="0" smtClean="0">
+                <a:hlinkClick r:id="rId4"/>
+              </a:rPr>
+              <a:t>http</a:t>
+            </a:r>
+            <a:r>
+              <a:rPr lang="en-US" dirty="0">
+                <a:hlinkClick r:id="rId4"/>
+              </a:rPr>
+              <a:t>://ask.wireshark.org/</a:t>
+            </a:r>
+            <a:endParaRPr lang="en-US" dirty="0"/>
+          </a:p>
+          <a:p>
+            <a:pPr lvl="1"/>
+            <a:r>
+              <a:rPr lang="en-US" dirty="0">
+                <a:hlinkClick r:id="rId5"/>
+              </a:rPr>
+              <a:t>http://stackoverflow.com/</a:t>
+            </a:r>
+            <a:endParaRPr lang="en-US" dirty="0"/>
+          </a:p>
+          <a:p>
+            <a:endParaRPr lang="en-US" dirty="0" smtClean="0"/>
+          </a:p>
+          <a:p>
+            <a:pPr lvl="1"/>
+            <a:endParaRPr lang="en-US" dirty="0"/>
+          </a:p>
+        </p:txBody>
+      </p:sp>
+      <p:sp>
+        <p:nvSpPr>
+          <p:cNvPr id="4" name="Tijdelijke aanduiding voor voettekst 3"/>
+          <p:cNvSpPr>
+            <a:spLocks noGrp="1"/>
+          </p:cNvSpPr>
+          <p:nvPr>
+            <p:ph type="ftr" sz="quarter" idx="11"/>
+          </p:nvPr>
+        </p:nvSpPr>
+        <p:spPr/>
+        <p:txBody>
+          <a:bodyPr/>
+          <a:lstStyle/>
+          <a:p>
+            <a:r>
+              <a:rPr lang="en-US" smtClean="0"/>
+              <a:t>© Sioux 2013 | Confidential | </a:t>
+            </a:r>
+            <a:endParaRPr lang="en-US"/>
+          </a:p>
+        </p:txBody>
+      </p:sp>
+      <p:sp>
+        <p:nvSpPr>
+          <p:cNvPr id="5" name="Tijdelijke aanduiding voor dianummer 4"/>
+          <p:cNvSpPr>
+            <a:spLocks noGrp="1"/>
+          </p:cNvSpPr>
+          <p:nvPr>
+            <p:ph type="sldNum" sz="quarter" idx="12"/>
+          </p:nvPr>
+        </p:nvSpPr>
+        <p:spPr/>
+        <p:txBody>
+          <a:bodyPr/>
+          <a:lstStyle/>
+          <a:p>
+            <a:fld id="{B60E6772-B9F1-4672-903F-323A7A0E6EBD}" type="slidenum">
+              <a:rPr lang="en-US" smtClean="0"/>
+              <a:pPr/>
+              <a:t>21</a:t>
+            </a:fld>
+            <a:endParaRPr lang="en-US"/>
+          </a:p>
+        </p:txBody>
+      </p:sp>
+    </p:spTree>
+    <p:extLst>
+      <p:ext uri="{BB962C8B-B14F-4D97-AF65-F5344CB8AC3E}">
+        <p14:creationId xmlns:p14="http://schemas.microsoft.com/office/powerpoint/2010/main" val="2861604159"/>
+      </p:ext>
+    </p:extLst>
+  </p:cSld>
+  <p:clrMapOvr>
+    <a:masterClrMapping/>
+  </p:clrMapOvr>
+</p:sld>
+</file>
+
+<file path=ppt/slides/slide22.xml><?xml version="1.0" encoding="utf-8"?>
+<p:sld xmlns:a="http://schemas.openxmlformats.org/drawingml/2006/main" xmlns:r="http://schemas.openxmlformats.org/officeDocument/2006/relationships" xmlns:p="http://schemas.openxmlformats.org/presentationml/2006/main">
+  <p:cSld>
+    <p:spTree>
+      <p:nvGrpSpPr>
+        <p:cNvPr id="1" name=""/>
+        <p:cNvGrpSpPr/>
+        <p:nvPr/>
+      </p:nvGrpSpPr>
+      <p:grpSpPr>
+        <a:xfrm>
+          <a:off x="0" y="0"/>
+          <a:ext cx="0" cy="0"/>
+          <a:chOff x="0" y="0"/>
+          <a:chExt cx="0" cy="0"/>
+        </a:xfrm>
+      </p:grpSpPr>
+      <p:sp>
+        <p:nvSpPr>
+          <p:cNvPr id="2" name="Slide Number Placeholder 1"/>
+          <p:cNvSpPr>
+            <a:spLocks noGrp="1"/>
+          </p:cNvSpPr>
+          <p:nvPr>
+            <p:ph type="sldNum" sz="quarter" idx="11"/>
+          </p:nvPr>
+        </p:nvSpPr>
+        <p:spPr/>
+        <p:txBody>
+          <a:bodyPr/>
+          <a:lstStyle/>
+          <a:p>
+            <a:fld id="{B60E6772-B9F1-4672-903F-323A7A0E6EBD}" type="slidenum">
+              <a:rPr lang="en-GB" smtClean="0"/>
+              <a:pPr/>
+              <a:t>22</a:t>
             </a:fld>
             <a:endParaRPr lang="en-GB"/>
           </a:p>
@@ -6375,158 +7606,6 @@
 </p:sld>
 </file>
 
-<file path=ppt/slides/slide2.xml><?xml version="1.0" encoding="utf-8"?>
-<p:sld xmlns:a="http://schemas.openxmlformats.org/drawingml/2006/main" xmlns:r="http://schemas.openxmlformats.org/officeDocument/2006/relationships" xmlns:p="http://schemas.openxmlformats.org/presentationml/2006/main">
-  <p:cSld>
-    <p:spTree>
-      <p:nvGrpSpPr>
-        <p:cNvPr id="1" name=""/>
-        <p:cNvGrpSpPr/>
-        <p:nvPr/>
-      </p:nvGrpSpPr>
-      <p:grpSpPr>
-        <a:xfrm>
-          <a:off x="0" y="0"/>
-          <a:ext cx="0" cy="0"/>
-          <a:chOff x="0" y="0"/>
-          <a:chExt cx="0" cy="0"/>
-        </a:xfrm>
-      </p:grpSpPr>
-      <p:sp>
-        <p:nvSpPr>
-          <p:cNvPr id="2" name="Title 1"/>
-          <p:cNvSpPr>
-            <a:spLocks noGrp="1"/>
-          </p:cNvSpPr>
-          <p:nvPr>
-            <p:ph type="title"/>
-          </p:nvPr>
-        </p:nvSpPr>
-        <p:spPr/>
-        <p:txBody>
-          <a:bodyPr/>
-          <a:lstStyle/>
-          <a:p>
-            <a:r>
-              <a:rPr lang="en-GB" dirty="0" smtClean="0"/>
-              <a:t>Overview</a:t>
-            </a:r>
-            <a:endParaRPr lang="en-GB" dirty="0"/>
-          </a:p>
-        </p:txBody>
-      </p:sp>
-      <p:sp>
-        <p:nvSpPr>
-          <p:cNvPr id="3" name="Content Placeholder 2"/>
-          <p:cNvSpPr>
-            <a:spLocks noGrp="1"/>
-          </p:cNvSpPr>
-          <p:nvPr>
-            <p:ph idx="1"/>
-          </p:nvPr>
-        </p:nvSpPr>
-        <p:spPr/>
-        <p:txBody>
-          <a:bodyPr/>
-          <a:lstStyle/>
-          <a:p>
-            <a:r>
-              <a:rPr lang="en-GB" dirty="0" smtClean="0"/>
-              <a:t>Why and when</a:t>
-            </a:r>
-          </a:p>
-          <a:p>
-            <a:r>
-              <a:rPr lang="en-GB" dirty="0" smtClean="0"/>
-              <a:t>Dissector architecture</a:t>
-            </a:r>
-          </a:p>
-          <a:p>
-            <a:r>
-              <a:rPr lang="en-GB" dirty="0" smtClean="0"/>
-              <a:t>Example dissector dissected</a:t>
-            </a:r>
-          </a:p>
-          <a:p>
-            <a:r>
-              <a:rPr lang="en-GB" dirty="0" smtClean="0"/>
-              <a:t>Demo</a:t>
-            </a:r>
-          </a:p>
-          <a:p>
-            <a:r>
-              <a:rPr lang="en-GB" smtClean="0"/>
-              <a:t>What wasn’t covered</a:t>
-            </a:r>
-            <a:endParaRPr lang="en-GB" dirty="0" smtClean="0"/>
-          </a:p>
-          <a:p>
-            <a:r>
-              <a:rPr lang="en-GB" dirty="0" smtClean="0"/>
-              <a:t>Links</a:t>
-            </a:r>
-            <a:endParaRPr lang="en-GB" dirty="0"/>
-          </a:p>
-          <a:p>
-            <a:endParaRPr lang="en-GB" dirty="0" smtClean="0"/>
-          </a:p>
-        </p:txBody>
-      </p:sp>
-      <p:sp>
-        <p:nvSpPr>
-          <p:cNvPr id="4" name="Footer Placeholder 3"/>
-          <p:cNvSpPr>
-            <a:spLocks noGrp="1"/>
-          </p:cNvSpPr>
-          <p:nvPr>
-            <p:ph type="ftr" sz="quarter" idx="11"/>
-          </p:nvPr>
-        </p:nvSpPr>
-        <p:spPr/>
-        <p:txBody>
-          <a:bodyPr/>
-          <a:lstStyle/>
-          <a:p>
-            <a:r>
-              <a:rPr lang="en-GB" smtClean="0"/>
-              <a:t>© Sioux 2013 | Confidential | </a:t>
-            </a:r>
-            <a:endParaRPr lang="en-GB"/>
-          </a:p>
-        </p:txBody>
-      </p:sp>
-      <p:sp>
-        <p:nvSpPr>
-          <p:cNvPr id="5" name="Slide Number Placeholder 4"/>
-          <p:cNvSpPr>
-            <a:spLocks noGrp="1"/>
-          </p:cNvSpPr>
-          <p:nvPr>
-            <p:ph type="sldNum" sz="quarter" idx="12"/>
-          </p:nvPr>
-        </p:nvSpPr>
-        <p:spPr/>
-        <p:txBody>
-          <a:bodyPr/>
-          <a:lstStyle/>
-          <a:p>
-            <a:fld id="{B60E6772-B9F1-4672-903F-323A7A0E6EBD}" type="slidenum">
-              <a:rPr lang="en-GB" smtClean="0"/>
-              <a:pPr/>
-              <a:t>2</a:t>
-            </a:fld>
-            <a:endParaRPr lang="en-GB"/>
-          </a:p>
-        </p:txBody>
-      </p:sp>
-    </p:spTree>
-  </p:cSld>
-  <p:clrMapOvr>
-    <a:masterClrMapping/>
-  </p:clrMapOvr>
-</p:sld>
-</file>
-
 <file path=ppt/slides/slide3.xml><?xml version="1.0" encoding="utf-8"?>
 <p:sld xmlns:a="http://schemas.openxmlformats.org/drawingml/2006/main" xmlns:r="http://schemas.openxmlformats.org/officeDocument/2006/relationships" xmlns:p="http://schemas.openxmlformats.org/presentationml/2006/main">
   <p:cSld>
@@ -6546,7 +7625,7 @@
       </p:grpSpPr>
       <p:sp>
         <p:nvSpPr>
-          <p:cNvPr id="2" name="Titel 1"/>
+          <p:cNvPr id="2" name="Title 1"/>
           <p:cNvSpPr>
             <a:spLocks noGrp="1"/>
           </p:cNvSpPr>
@@ -6560,73 +7639,82 @@
           <a:lstStyle/>
           <a:p>
             <a:r>
-              <a:rPr lang="en-US" dirty="0" smtClean="0"/>
+              <a:rPr lang="en-GB" dirty="0" smtClean="0"/>
+              <a:t>Overview</a:t>
+            </a:r>
+            <a:endParaRPr lang="en-GB" dirty="0"/>
+          </a:p>
+        </p:txBody>
+      </p:sp>
+      <p:sp>
+        <p:nvSpPr>
+          <p:cNvPr id="3" name="Content Placeholder 2"/>
+          <p:cNvSpPr>
+            <a:spLocks noGrp="1"/>
+          </p:cNvSpPr>
+          <p:nvPr>
+            <p:ph idx="1"/>
+          </p:nvPr>
+        </p:nvSpPr>
+        <p:spPr/>
+        <p:txBody>
+          <a:bodyPr>
+            <a:normAutofit/>
+          </a:bodyPr>
+          <a:lstStyle/>
+          <a:p>
+            <a:r>
+              <a:rPr lang="en-GB" dirty="0" smtClean="0">
+                <a:solidFill>
+                  <a:srgbClr val="FF0000"/>
+                </a:solidFill>
+              </a:rPr>
               <a:t>Why and when</a:t>
             </a:r>
-            <a:endParaRPr lang="en-US" dirty="0"/>
-          </a:p>
-        </p:txBody>
-      </p:sp>
-      <p:sp>
-        <p:nvSpPr>
-          <p:cNvPr id="3" name="Tijdelijke aanduiding voor inhoud 2"/>
-          <p:cNvSpPr>
-            <a:spLocks noGrp="1"/>
-          </p:cNvSpPr>
-          <p:nvPr>
-            <p:ph idx="1"/>
-          </p:nvPr>
-        </p:nvSpPr>
-        <p:spPr/>
-        <p:txBody>
-          <a:bodyPr/>
-          <a:lstStyle/>
-          <a:p>
-            <a:r>
-              <a:rPr lang="en-US" dirty="0" smtClean="0"/>
-              <a:t>Network packet decoding</a:t>
-            </a:r>
-          </a:p>
-          <a:p>
-            <a:r>
-              <a:rPr lang="en-US" dirty="0" smtClean="0"/>
-              <a:t>Recorded session</a:t>
-            </a:r>
-          </a:p>
-          <a:p>
-            <a:r>
-              <a:rPr lang="en-US" dirty="0" smtClean="0"/>
-              <a:t>Use case: new protocol, new implementations</a:t>
-            </a:r>
-          </a:p>
-          <a:p>
-            <a:r>
-              <a:rPr lang="en-US" dirty="0" err="1" smtClean="0"/>
-              <a:t>Lua</a:t>
-            </a:r>
-            <a:r>
-              <a:rPr lang="en-US" dirty="0" smtClean="0"/>
-              <a:t> =&gt; </a:t>
-            </a:r>
-            <a:r>
-              <a:rPr lang="en-US" dirty="0" smtClean="0"/>
-              <a:t>no performance</a:t>
-            </a:r>
-            <a:endParaRPr lang="en-US" dirty="0" smtClean="0"/>
-          </a:p>
-          <a:p>
-            <a:pPr lvl="1"/>
-            <a:r>
-              <a:rPr lang="en-US" dirty="0" smtClean="0"/>
-              <a:t>&lt; 100k packets, &lt; 10MB recording</a:t>
-            </a:r>
-            <a:endParaRPr lang="en-US" dirty="0"/>
-          </a:p>
-        </p:txBody>
-      </p:sp>
-      <p:sp>
-        <p:nvSpPr>
-          <p:cNvPr id="4" name="Tijdelijke aanduiding voor voettekst 3"/>
+          </a:p>
+          <a:p>
+            <a:r>
+              <a:rPr lang="en-GB" dirty="0" smtClean="0"/>
+              <a:t>Dissector architecture</a:t>
+            </a:r>
+          </a:p>
+          <a:p>
+            <a:r>
+              <a:rPr lang="en-GB" dirty="0" smtClean="0"/>
+              <a:t>Example dissector dissected</a:t>
+            </a:r>
+          </a:p>
+          <a:p>
+            <a:r>
+              <a:rPr lang="en-GB" dirty="0" smtClean="0"/>
+              <a:t>What </a:t>
+            </a:r>
+            <a:r>
+              <a:rPr lang="en-GB" dirty="0"/>
+              <a:t>wasn’t covered</a:t>
+            </a:r>
+          </a:p>
+          <a:p>
+            <a:r>
+              <a:rPr lang="en-GB" dirty="0" smtClean="0"/>
+              <a:t>Demo</a:t>
+            </a:r>
+          </a:p>
+          <a:p>
+            <a:r>
+              <a:rPr lang="en-GB" dirty="0" smtClean="0"/>
+              <a:t>Links</a:t>
+            </a:r>
+            <a:endParaRPr lang="en-GB" dirty="0"/>
+          </a:p>
+          <a:p>
+            <a:endParaRPr lang="en-GB" dirty="0" smtClean="0"/>
+          </a:p>
+        </p:txBody>
+      </p:sp>
+      <p:sp>
+        <p:nvSpPr>
+          <p:cNvPr id="4" name="Footer Placeholder 3"/>
           <p:cNvSpPr>
             <a:spLocks noGrp="1"/>
           </p:cNvSpPr>
@@ -6640,16 +7728,16 @@
           <a:lstStyle/>
           <a:p>
             <a:r>
-              <a:rPr lang="en-US" smtClean="0"/>
+              <a:rPr lang="en-GB" smtClean="0"/>
               <a:t>© Sioux 2013 | Confidential | </a:t>
             </a:r>
-            <a:endParaRPr lang="en-US"/>
-          </a:p>
-        </p:txBody>
-      </p:sp>
-      <p:sp>
-        <p:nvSpPr>
-          <p:cNvPr id="5" name="Tijdelijke aanduiding voor dianummer 4"/>
+            <a:endParaRPr lang="en-GB"/>
+          </a:p>
+        </p:txBody>
+      </p:sp>
+      <p:sp>
+        <p:nvSpPr>
+          <p:cNvPr id="5" name="Slide Number Placeholder 4"/>
           <p:cNvSpPr>
             <a:spLocks noGrp="1"/>
           </p:cNvSpPr>
@@ -6663,18 +7751,18 @@
           <a:lstStyle/>
           <a:p>
             <a:fld id="{B60E6772-B9F1-4672-903F-323A7A0E6EBD}" type="slidenum">
-              <a:rPr lang="en-US" smtClean="0"/>
+              <a:rPr lang="en-GB" smtClean="0"/>
               <a:pPr/>
               <a:t>3</a:t>
             </a:fld>
-            <a:endParaRPr lang="en-US"/>
+            <a:endParaRPr lang="en-GB"/>
           </a:p>
         </p:txBody>
       </p:sp>
     </p:spTree>
     <p:extLst>
       <p:ext uri="{BB962C8B-B14F-4D97-AF65-F5344CB8AC3E}">
-        <p14:creationId xmlns:p14="http://schemas.microsoft.com/office/powerpoint/2010/main" val="1155739123"/>
+        <p14:creationId xmlns:p14="http://schemas.microsoft.com/office/powerpoint/2010/main" val="883702928"/>
       </p:ext>
     </p:extLst>
   </p:cSld>
@@ -6718,49 +7806,61 @@
           <a:p>
             <a:r>
               <a:rPr lang="en-US" dirty="0" smtClean="0"/>
-              <a:t>Dissector </a:t>
-            </a:r>
+              <a:t>Why and when</a:t>
+            </a:r>
+            <a:endParaRPr lang="en-US" dirty="0"/>
+          </a:p>
+        </p:txBody>
+      </p:sp>
+      <p:sp>
+        <p:nvSpPr>
+          <p:cNvPr id="3" name="Tijdelijke aanduiding voor inhoud 2"/>
+          <p:cNvSpPr>
+            <a:spLocks noGrp="1"/>
+          </p:cNvSpPr>
+          <p:nvPr>
+            <p:ph idx="1"/>
+          </p:nvPr>
+        </p:nvSpPr>
+        <p:spPr/>
+        <p:txBody>
+          <a:bodyPr/>
+          <a:lstStyle/>
+          <a:p>
             <a:r>
               <a:rPr lang="en-US" dirty="0" smtClean="0"/>
-              <a:t>Architecture</a:t>
+              <a:t>Network packet decoding</a:t>
+            </a:r>
+          </a:p>
+          <a:p>
+            <a:r>
+              <a:rPr lang="en-US" dirty="0" smtClean="0"/>
+              <a:t>Recorded session</a:t>
+            </a:r>
+          </a:p>
+          <a:p>
+            <a:r>
+              <a:rPr lang="en-US" dirty="0" smtClean="0"/>
+              <a:t>Use case: new protocol, new implementations</a:t>
+            </a:r>
+          </a:p>
+          <a:p>
+            <a:r>
+              <a:rPr lang="en-US" dirty="0" err="1" smtClean="0"/>
+              <a:t>Lua</a:t>
+            </a:r>
+            <a:r>
+              <a:rPr lang="en-US" dirty="0" smtClean="0"/>
+              <a:t> =&gt; no performance</a:t>
+            </a:r>
+          </a:p>
+          <a:p>
+            <a:pPr lvl="1"/>
+            <a:r>
+              <a:rPr lang="en-US" dirty="0" smtClean="0"/>
+              <a:t>&lt; 100k packets, &lt; 10MB recording</a:t>
             </a:r>
             <a:endParaRPr lang="en-US" dirty="0"/>
-          </a:p>
-        </p:txBody>
-      </p:sp>
-      <p:sp>
-        <p:nvSpPr>
-          <p:cNvPr id="3" name="Tijdelijke aanduiding voor inhoud 2"/>
-          <p:cNvSpPr>
-            <a:spLocks noGrp="1"/>
-          </p:cNvSpPr>
-          <p:nvPr>
-            <p:ph idx="1"/>
-          </p:nvPr>
-        </p:nvSpPr>
-        <p:spPr/>
-        <p:txBody>
-          <a:bodyPr/>
-          <a:lstStyle/>
-          <a:p>
-            <a:r>
-              <a:rPr lang="en-US" dirty="0" smtClean="0"/>
-              <a:t>Table-driven delegation</a:t>
-            </a:r>
-          </a:p>
-          <a:p>
-            <a:pPr lvl="1"/>
-            <a:r>
-              <a:rPr lang="en-US" dirty="0" smtClean="0"/>
-              <a:t>Key -&gt; Dissector</a:t>
-            </a:r>
-          </a:p>
-          <a:p>
-            <a:pPr lvl="1"/>
-            <a:r>
-              <a:rPr lang="en-US" dirty="0" smtClean="0"/>
-              <a:t>Dissector -&gt; Table</a:t>
-            </a:r>
           </a:p>
         </p:txBody>
       </p:sp>
@@ -6806,6 +7906,304 @@
               <a:rPr lang="en-US" smtClean="0"/>
               <a:pPr/>
               <a:t>4</a:t>
+            </a:fld>
+            <a:endParaRPr lang="en-US"/>
+          </a:p>
+        </p:txBody>
+      </p:sp>
+    </p:spTree>
+    <p:extLst>
+      <p:ext uri="{BB962C8B-B14F-4D97-AF65-F5344CB8AC3E}">
+        <p14:creationId xmlns:p14="http://schemas.microsoft.com/office/powerpoint/2010/main" val="1155739123"/>
+      </p:ext>
+    </p:extLst>
+  </p:cSld>
+  <p:clrMapOvr>
+    <a:masterClrMapping/>
+  </p:clrMapOvr>
+</p:sld>
+</file>
+
+<file path=ppt/slides/slide5.xml><?xml version="1.0" encoding="utf-8"?>
+<p:sld xmlns:a="http://schemas.openxmlformats.org/drawingml/2006/main" xmlns:r="http://schemas.openxmlformats.org/officeDocument/2006/relationships" xmlns:p="http://schemas.openxmlformats.org/presentationml/2006/main">
+  <p:cSld>
+    <p:spTree>
+      <p:nvGrpSpPr>
+        <p:cNvPr id="1" name=""/>
+        <p:cNvGrpSpPr/>
+        <p:nvPr/>
+      </p:nvGrpSpPr>
+      <p:grpSpPr>
+        <a:xfrm>
+          <a:off x="0" y="0"/>
+          <a:ext cx="0" cy="0"/>
+          <a:chOff x="0" y="0"/>
+          <a:chExt cx="0" cy="0"/>
+        </a:xfrm>
+      </p:grpSpPr>
+      <p:sp>
+        <p:nvSpPr>
+          <p:cNvPr id="2" name="Title 1"/>
+          <p:cNvSpPr>
+            <a:spLocks noGrp="1"/>
+          </p:cNvSpPr>
+          <p:nvPr>
+            <p:ph type="title"/>
+          </p:nvPr>
+        </p:nvSpPr>
+        <p:spPr/>
+        <p:txBody>
+          <a:bodyPr/>
+          <a:lstStyle/>
+          <a:p>
+            <a:r>
+              <a:rPr lang="en-GB" dirty="0" smtClean="0"/>
+              <a:t>Overview</a:t>
+            </a:r>
+            <a:endParaRPr lang="en-GB" dirty="0"/>
+          </a:p>
+        </p:txBody>
+      </p:sp>
+      <p:sp>
+        <p:nvSpPr>
+          <p:cNvPr id="3" name="Content Placeholder 2"/>
+          <p:cNvSpPr>
+            <a:spLocks noGrp="1"/>
+          </p:cNvSpPr>
+          <p:nvPr>
+            <p:ph idx="1"/>
+          </p:nvPr>
+        </p:nvSpPr>
+        <p:spPr/>
+        <p:txBody>
+          <a:bodyPr>
+            <a:normAutofit/>
+          </a:bodyPr>
+          <a:lstStyle/>
+          <a:p>
+            <a:r>
+              <a:rPr lang="en-GB" dirty="0" smtClean="0"/>
+              <a:t>Why and when</a:t>
+            </a:r>
+          </a:p>
+          <a:p>
+            <a:r>
+              <a:rPr lang="en-GB" dirty="0" smtClean="0"/>
+              <a:t>Dissector architecture</a:t>
+            </a:r>
+          </a:p>
+          <a:p>
+            <a:r>
+              <a:rPr lang="en-GB" dirty="0" smtClean="0"/>
+              <a:t>Example dissector dissected</a:t>
+            </a:r>
+          </a:p>
+          <a:p>
+            <a:r>
+              <a:rPr lang="en-GB" dirty="0" smtClean="0"/>
+              <a:t>What </a:t>
+            </a:r>
+            <a:r>
+              <a:rPr lang="en-GB" dirty="0"/>
+              <a:t>wasn’t covered</a:t>
+            </a:r>
+          </a:p>
+          <a:p>
+            <a:r>
+              <a:rPr lang="en-GB" dirty="0" smtClean="0"/>
+              <a:t>Demo</a:t>
+            </a:r>
+          </a:p>
+          <a:p>
+            <a:r>
+              <a:rPr lang="en-GB" dirty="0" smtClean="0"/>
+              <a:t>Links</a:t>
+            </a:r>
+            <a:endParaRPr lang="en-GB" dirty="0"/>
+          </a:p>
+          <a:p>
+            <a:endParaRPr lang="en-GB" dirty="0" smtClean="0"/>
+          </a:p>
+        </p:txBody>
+      </p:sp>
+      <p:sp>
+        <p:nvSpPr>
+          <p:cNvPr id="4" name="Footer Placeholder 3"/>
+          <p:cNvSpPr>
+            <a:spLocks noGrp="1"/>
+          </p:cNvSpPr>
+          <p:nvPr>
+            <p:ph type="ftr" sz="quarter" idx="11"/>
+          </p:nvPr>
+        </p:nvSpPr>
+        <p:spPr/>
+        <p:txBody>
+          <a:bodyPr/>
+          <a:lstStyle/>
+          <a:p>
+            <a:r>
+              <a:rPr lang="en-GB" smtClean="0"/>
+              <a:t>© Sioux 2013 | Confidential | </a:t>
+            </a:r>
+            <a:endParaRPr lang="en-GB"/>
+          </a:p>
+        </p:txBody>
+      </p:sp>
+      <p:sp>
+        <p:nvSpPr>
+          <p:cNvPr id="5" name="Slide Number Placeholder 4"/>
+          <p:cNvSpPr>
+            <a:spLocks noGrp="1"/>
+          </p:cNvSpPr>
+          <p:nvPr>
+            <p:ph type="sldNum" sz="quarter" idx="12"/>
+          </p:nvPr>
+        </p:nvSpPr>
+        <p:spPr/>
+        <p:txBody>
+          <a:bodyPr/>
+          <a:lstStyle/>
+          <a:p>
+            <a:fld id="{B60E6772-B9F1-4672-903F-323A7A0E6EBD}" type="slidenum">
+              <a:rPr lang="en-GB" smtClean="0"/>
+              <a:pPr/>
+              <a:t>5</a:t>
+            </a:fld>
+            <a:endParaRPr lang="en-GB"/>
+          </a:p>
+        </p:txBody>
+      </p:sp>
+    </p:spTree>
+    <p:extLst>
+      <p:ext uri="{BB962C8B-B14F-4D97-AF65-F5344CB8AC3E}">
+        <p14:creationId xmlns:p14="http://schemas.microsoft.com/office/powerpoint/2010/main" val="3109543430"/>
+      </p:ext>
+    </p:extLst>
+  </p:cSld>
+  <p:clrMapOvr>
+    <a:masterClrMapping/>
+  </p:clrMapOvr>
+</p:sld>
+</file>
+
+<file path=ppt/slides/slide6.xml><?xml version="1.0" encoding="utf-8"?>
+<p:sld xmlns:a="http://schemas.openxmlformats.org/drawingml/2006/main" xmlns:r="http://schemas.openxmlformats.org/officeDocument/2006/relationships" xmlns:p="http://schemas.openxmlformats.org/presentationml/2006/main">
+  <p:cSld>
+    <p:spTree>
+      <p:nvGrpSpPr>
+        <p:cNvPr id="1" name=""/>
+        <p:cNvGrpSpPr/>
+        <p:nvPr/>
+      </p:nvGrpSpPr>
+      <p:grpSpPr>
+        <a:xfrm>
+          <a:off x="0" y="0"/>
+          <a:ext cx="0" cy="0"/>
+          <a:chOff x="0" y="0"/>
+          <a:chExt cx="0" cy="0"/>
+        </a:xfrm>
+      </p:grpSpPr>
+      <p:sp>
+        <p:nvSpPr>
+          <p:cNvPr id="2" name="Titel 1"/>
+          <p:cNvSpPr>
+            <a:spLocks noGrp="1"/>
+          </p:cNvSpPr>
+          <p:nvPr>
+            <p:ph type="title"/>
+          </p:nvPr>
+        </p:nvSpPr>
+        <p:spPr/>
+        <p:txBody>
+          <a:bodyPr/>
+          <a:lstStyle/>
+          <a:p>
+            <a:r>
+              <a:rPr lang="en-US" dirty="0" smtClean="0"/>
+              <a:t>Dissector Architecture</a:t>
+            </a:r>
+            <a:endParaRPr lang="en-US" dirty="0"/>
+          </a:p>
+        </p:txBody>
+      </p:sp>
+      <p:sp>
+        <p:nvSpPr>
+          <p:cNvPr id="3" name="Tijdelijke aanduiding voor inhoud 2"/>
+          <p:cNvSpPr>
+            <a:spLocks noGrp="1"/>
+          </p:cNvSpPr>
+          <p:nvPr>
+            <p:ph idx="1"/>
+          </p:nvPr>
+        </p:nvSpPr>
+        <p:spPr/>
+        <p:txBody>
+          <a:bodyPr/>
+          <a:lstStyle/>
+          <a:p>
+            <a:r>
+              <a:rPr lang="en-US" dirty="0" smtClean="0"/>
+              <a:t>Table-driven delegation</a:t>
+            </a:r>
+          </a:p>
+          <a:p>
+            <a:pPr lvl="1"/>
+            <a:r>
+              <a:rPr lang="en-US" dirty="0" smtClean="0"/>
+              <a:t>Key -&gt; Dissector</a:t>
+            </a:r>
+          </a:p>
+          <a:p>
+            <a:pPr lvl="1"/>
+            <a:r>
+              <a:rPr lang="en-US" dirty="0" smtClean="0"/>
+              <a:t>Dissector -&gt; Table</a:t>
+            </a:r>
+          </a:p>
+        </p:txBody>
+      </p:sp>
+      <p:sp>
+        <p:nvSpPr>
+          <p:cNvPr id="4" name="Tijdelijke aanduiding voor voettekst 3"/>
+          <p:cNvSpPr>
+            <a:spLocks noGrp="1"/>
+          </p:cNvSpPr>
+          <p:nvPr>
+            <p:ph type="ftr" sz="quarter" idx="11"/>
+          </p:nvPr>
+        </p:nvSpPr>
+        <p:spPr/>
+        <p:txBody>
+          <a:bodyPr/>
+          <a:lstStyle/>
+          <a:p>
+            <a:r>
+              <a:rPr lang="en-US" smtClean="0"/>
+              <a:t>© Sioux 2013 | Confidential | </a:t>
+            </a:r>
+            <a:endParaRPr lang="en-US"/>
+          </a:p>
+        </p:txBody>
+      </p:sp>
+      <p:sp>
+        <p:nvSpPr>
+          <p:cNvPr id="5" name="Tijdelijke aanduiding voor dianummer 4"/>
+          <p:cNvSpPr>
+            <a:spLocks noGrp="1"/>
+          </p:cNvSpPr>
+          <p:nvPr>
+            <p:ph type="sldNum" sz="quarter" idx="12"/>
+          </p:nvPr>
+        </p:nvSpPr>
+        <p:spPr/>
+        <p:txBody>
+          <a:bodyPr/>
+          <a:lstStyle/>
+          <a:p>
+            <a:fld id="{B60E6772-B9F1-4672-903F-323A7A0E6EBD}" type="slidenum">
+              <a:rPr lang="en-US" smtClean="0"/>
+              <a:pPr/>
+              <a:t>6</a:t>
             </a:fld>
             <a:endParaRPr lang="en-US"/>
           </a:p>
@@ -6824,7 +8222,7 @@
 </p:sld>
 </file>
 
-<file path=ppt/slides/slide5.xml><?xml version="1.0" encoding="utf-8"?>
+<file path=ppt/slides/slide7.xml><?xml version="1.0" encoding="utf-8"?>
 <p:sld xmlns:a="http://schemas.openxmlformats.org/drawingml/2006/main" xmlns:r="http://schemas.openxmlformats.org/officeDocument/2006/relationships" xmlns:p="http://schemas.openxmlformats.org/presentationml/2006/main">
   <p:cSld>
     <p:spTree>
@@ -6959,7 +8357,7 @@
             <a:fld id="{B60E6772-B9F1-4672-903F-323A7A0E6EBD}" type="slidenum">
               <a:rPr lang="en-US" smtClean="0"/>
               <a:pPr/>
-              <a:t>5</a:t>
+              <a:t>7</a:t>
             </a:fld>
             <a:endParaRPr lang="en-US"/>
           </a:p>
@@ -7952,7 +9350,7 @@
 </p:sld>
 </file>
 
-<file path=ppt/slides/slide6.xml><?xml version="1.0" encoding="utf-8"?>
+<file path=ppt/slides/slide8.xml><?xml version="1.0" encoding="utf-8"?>
 <p:sld xmlns:a="http://schemas.openxmlformats.org/drawingml/2006/main" xmlns:r="http://schemas.openxmlformats.org/officeDocument/2006/relationships" xmlns:p="http://schemas.openxmlformats.org/presentationml/2006/main">
   <p:cSld>
     <p:spTree>
@@ -8057,7 +9455,7 @@
             <a:fld id="{B60E6772-B9F1-4672-903F-323A7A0E6EBD}" type="slidenum">
               <a:rPr lang="en-US" smtClean="0"/>
               <a:pPr/>
-              <a:t>6</a:t>
+              <a:t>8</a:t>
             </a:fld>
             <a:endParaRPr lang="en-US"/>
           </a:p>
@@ -8455,7 +9853,6 @@
                 <a:rPr lang="en-US" sz="1100" dirty="0"/>
                 <a:t>8000</a:t>
               </a:r>
-              <a:endParaRPr lang="en-US" sz="1100" dirty="0"/>
             </a:p>
           </p:txBody>
         </p:sp>
@@ -9080,11 +10477,7 @@
             <a:pPr algn="ctr"/>
             <a:r>
               <a:rPr lang="en-US" dirty="0" err="1" smtClean="0"/>
-              <a:t>d</a:t>
-            </a:r>
-            <a:r>
-              <a:rPr lang="en-US" dirty="0" err="1" smtClean="0"/>
-              <a:t>emo.large</a:t>
+              <a:t>demo.large</a:t>
             </a:r>
             <a:endParaRPr lang="en-US" dirty="0"/>
           </a:p>
@@ -9175,385 +10568,6 @@
 </p:sld>
 </file>
 
-<file path=ppt/slides/slide7.xml><?xml version="1.0" encoding="utf-8"?>
-<p:sld xmlns:a="http://schemas.openxmlformats.org/drawingml/2006/main" xmlns:r="http://schemas.openxmlformats.org/officeDocument/2006/relationships" xmlns:p="http://schemas.openxmlformats.org/presentationml/2006/main">
-  <p:cSld>
-    <p:spTree>
-      <p:nvGrpSpPr>
-        <p:cNvPr id="1" name=""/>
-        <p:cNvGrpSpPr/>
-        <p:nvPr/>
-      </p:nvGrpSpPr>
-      <p:grpSpPr>
-        <a:xfrm>
-          <a:off x="0" y="0"/>
-          <a:ext cx="0" cy="0"/>
-          <a:chOff x="0" y="0"/>
-          <a:chExt cx="0" cy="0"/>
-        </a:xfrm>
-      </p:grpSpPr>
-      <p:sp>
-        <p:nvSpPr>
-          <p:cNvPr id="2" name="Titel 1"/>
-          <p:cNvSpPr>
-            <a:spLocks noGrp="1"/>
-          </p:cNvSpPr>
-          <p:nvPr>
-            <p:ph type="title"/>
-          </p:nvPr>
-        </p:nvSpPr>
-        <p:spPr/>
-        <p:txBody>
-          <a:bodyPr/>
-          <a:lstStyle/>
-          <a:p>
-            <a:r>
-              <a:rPr lang="en-US" dirty="0" smtClean="0"/>
-              <a:t>Dissector </a:t>
-            </a:r>
-            <a:r>
-              <a:rPr lang="en-US" dirty="0" smtClean="0"/>
-              <a:t>Architecture</a:t>
-            </a:r>
-            <a:endParaRPr lang="en-US" dirty="0"/>
-          </a:p>
-        </p:txBody>
-      </p:sp>
-      <p:sp>
-        <p:nvSpPr>
-          <p:cNvPr id="3" name="Tijdelijke aanduiding voor inhoud 2"/>
-          <p:cNvSpPr>
-            <a:spLocks noGrp="1"/>
-          </p:cNvSpPr>
-          <p:nvPr>
-            <p:ph idx="1"/>
-          </p:nvPr>
-        </p:nvSpPr>
-        <p:spPr/>
-        <p:txBody>
-          <a:bodyPr>
-            <a:normAutofit/>
-          </a:bodyPr>
-          <a:lstStyle/>
-          <a:p>
-            <a:r>
-              <a:rPr lang="en-US" smtClean="0"/>
-              <a:t>Plugins</a:t>
-            </a:r>
-          </a:p>
-          <a:p>
-            <a:pPr lvl="1"/>
-            <a:r>
-              <a:rPr lang="en-US" smtClean="0"/>
-              <a:t>Compiled (C)</a:t>
-            </a:r>
-          </a:p>
-          <a:p>
-            <a:pPr lvl="1"/>
-            <a:r>
-              <a:rPr lang="en-US" smtClean="0"/>
-              <a:t>Dynamic (.so, .dll)</a:t>
-            </a:r>
-          </a:p>
-          <a:p>
-            <a:pPr lvl="1"/>
-            <a:r>
-              <a:rPr lang="en-US" smtClean="0"/>
-              <a:t>Python </a:t>
-            </a:r>
-            <a:r>
-              <a:rPr lang="en-US" sz="1600" smtClean="0"/>
-              <a:t>(broken on current windows version)</a:t>
-            </a:r>
-          </a:p>
-          <a:p>
-            <a:pPr lvl="1"/>
-            <a:r>
-              <a:rPr lang="en-US" smtClean="0"/>
-              <a:t>Lua</a:t>
-            </a:r>
-            <a:endParaRPr lang="en-US" smtClean="0"/>
-          </a:p>
-        </p:txBody>
-      </p:sp>
-      <p:sp>
-        <p:nvSpPr>
-          <p:cNvPr id="4" name="Tijdelijke aanduiding voor voettekst 3"/>
-          <p:cNvSpPr>
-            <a:spLocks noGrp="1"/>
-          </p:cNvSpPr>
-          <p:nvPr>
-            <p:ph type="ftr" sz="quarter" idx="11"/>
-          </p:nvPr>
-        </p:nvSpPr>
-        <p:spPr/>
-        <p:txBody>
-          <a:bodyPr/>
-          <a:lstStyle/>
-          <a:p>
-            <a:r>
-              <a:rPr lang="en-US" smtClean="0"/>
-              <a:t>© Sioux 2013 | Confidential | </a:t>
-            </a:r>
-            <a:endParaRPr lang="en-US"/>
-          </a:p>
-        </p:txBody>
-      </p:sp>
-      <p:sp>
-        <p:nvSpPr>
-          <p:cNvPr id="5" name="Tijdelijke aanduiding voor dianummer 4"/>
-          <p:cNvSpPr>
-            <a:spLocks noGrp="1"/>
-          </p:cNvSpPr>
-          <p:nvPr>
-            <p:ph type="sldNum" sz="quarter" idx="12"/>
-          </p:nvPr>
-        </p:nvSpPr>
-        <p:spPr/>
-        <p:txBody>
-          <a:bodyPr/>
-          <a:lstStyle/>
-          <a:p>
-            <a:fld id="{B60E6772-B9F1-4672-903F-323A7A0E6EBD}" type="slidenum">
-              <a:rPr lang="en-US" smtClean="0"/>
-              <a:pPr/>
-              <a:t>7</a:t>
-            </a:fld>
-            <a:endParaRPr lang="en-US"/>
-          </a:p>
-        </p:txBody>
-      </p:sp>
-    </p:spTree>
-    <p:extLst>
-      <p:ext uri="{BB962C8B-B14F-4D97-AF65-F5344CB8AC3E}">
-        <p14:creationId xmlns:p14="http://schemas.microsoft.com/office/powerpoint/2010/main" val="2202936259"/>
-      </p:ext>
-    </p:extLst>
-  </p:cSld>
-  <p:clrMapOvr>
-    <a:masterClrMapping/>
-  </p:clrMapOvr>
-</p:sld>
-</file>
-
-<file path=ppt/slides/slide8.xml><?xml version="1.0" encoding="utf-8"?>
-<p:sld xmlns:a="http://schemas.openxmlformats.org/drawingml/2006/main" xmlns:r="http://schemas.openxmlformats.org/officeDocument/2006/relationships" xmlns:p="http://schemas.openxmlformats.org/presentationml/2006/main">
-  <p:cSld>
-    <p:spTree>
-      <p:nvGrpSpPr>
-        <p:cNvPr id="1" name=""/>
-        <p:cNvGrpSpPr/>
-        <p:nvPr/>
-      </p:nvGrpSpPr>
-      <p:grpSpPr>
-        <a:xfrm>
-          <a:off x="0" y="0"/>
-          <a:ext cx="0" cy="0"/>
-          <a:chOff x="0" y="0"/>
-          <a:chExt cx="0" cy="0"/>
-        </a:xfrm>
-      </p:grpSpPr>
-      <p:sp>
-        <p:nvSpPr>
-          <p:cNvPr id="2" name="Titel 1"/>
-          <p:cNvSpPr>
-            <a:spLocks noGrp="1"/>
-          </p:cNvSpPr>
-          <p:nvPr>
-            <p:ph type="title"/>
-          </p:nvPr>
-        </p:nvSpPr>
-        <p:spPr/>
-        <p:txBody>
-          <a:bodyPr/>
-          <a:lstStyle/>
-          <a:p>
-            <a:r>
-              <a:rPr lang="en-US" dirty="0" smtClean="0"/>
-              <a:t>Dissector </a:t>
-            </a:r>
-            <a:r>
-              <a:rPr lang="en-US" dirty="0" smtClean="0"/>
-              <a:t>Architecture</a:t>
-            </a:r>
-            <a:endParaRPr lang="en-US" dirty="0"/>
-          </a:p>
-        </p:txBody>
-      </p:sp>
-      <p:sp>
-        <p:nvSpPr>
-          <p:cNvPr id="3" name="Tijdelijke aanduiding voor inhoud 2"/>
-          <p:cNvSpPr>
-            <a:spLocks noGrp="1"/>
-          </p:cNvSpPr>
-          <p:nvPr>
-            <p:ph idx="1"/>
-          </p:nvPr>
-        </p:nvSpPr>
-        <p:spPr/>
-        <p:txBody>
-          <a:bodyPr/>
-          <a:lstStyle/>
-          <a:p>
-            <a:r>
-              <a:rPr lang="en-US" dirty="0"/>
-              <a:t>Entry </a:t>
-            </a:r>
-            <a:r>
-              <a:rPr lang="en-US" dirty="0" smtClean="0"/>
-              <a:t>points (</a:t>
-            </a:r>
-            <a:r>
-              <a:rPr lang="en-US" dirty="0" smtClean="0">
-                <a:hlinkClick r:id="rId2"/>
-              </a:rPr>
-              <a:t>link</a:t>
-            </a:r>
-            <a:r>
-              <a:rPr lang="en-US" dirty="0" smtClean="0"/>
-              <a:t>)</a:t>
-            </a:r>
-            <a:endParaRPr lang="en-US" dirty="0"/>
-          </a:p>
-          <a:p>
-            <a:pPr lvl="1"/>
-            <a:r>
-              <a:rPr lang="en-US" i="1" dirty="0"/>
-              <a:t>&lt;personal </a:t>
-            </a:r>
-            <a:r>
-              <a:rPr lang="en-US" i="1" dirty="0" err="1"/>
-              <a:t>config</a:t>
-            </a:r>
-            <a:r>
-              <a:rPr lang="en-US" i="1" dirty="0"/>
-              <a:t> </a:t>
-            </a:r>
-            <a:r>
-              <a:rPr lang="en-US" i="1" dirty="0" err="1"/>
-              <a:t>dir</a:t>
-            </a:r>
-            <a:r>
-              <a:rPr lang="en-US" i="1" dirty="0"/>
-              <a:t>&gt;</a:t>
-            </a:r>
-            <a:r>
-              <a:rPr lang="en-US" dirty="0"/>
-              <a:t>/</a:t>
-            </a:r>
-            <a:r>
-              <a:rPr lang="en-US" dirty="0" err="1" smtClean="0"/>
-              <a:t>init.lua</a:t>
-            </a:r>
-            <a:endParaRPr lang="en-US" dirty="0"/>
-          </a:p>
-          <a:p>
-            <a:pPr lvl="1"/>
-            <a:r>
-              <a:rPr lang="en-US" dirty="0" err="1" smtClean="0"/>
-              <a:t>Wireshark</a:t>
-            </a:r>
-            <a:r>
-              <a:rPr lang="en-US" dirty="0" smtClean="0"/>
-              <a:t>/plugins</a:t>
-            </a:r>
-          </a:p>
-          <a:p>
-            <a:pPr lvl="1"/>
-            <a:r>
-              <a:rPr lang="en-US" dirty="0" err="1" smtClean="0"/>
-              <a:t>cmdline</a:t>
-            </a:r>
-            <a:r>
-              <a:rPr lang="en-US" dirty="0" smtClean="0"/>
-              <a:t>:</a:t>
-            </a:r>
-            <a:r>
-              <a:rPr lang="en-US" dirty="0"/>
-              <a:t> </a:t>
-            </a:r>
-            <a:r>
-              <a:rPr lang="en-US" b="1" dirty="0"/>
-              <a:t>-</a:t>
-            </a:r>
-            <a:r>
-              <a:rPr lang="en-US" b="1"/>
-              <a:t>X </a:t>
-            </a:r>
-            <a:r>
-              <a:rPr lang="en-US" b="1" smtClean="0"/>
-              <a:t>lua_script:</a:t>
-            </a:r>
-            <a:r>
-              <a:rPr lang="en-US" i="1" smtClean="0"/>
-              <a:t>xxx.lua</a:t>
-            </a:r>
-          </a:p>
-          <a:p>
-            <a:endParaRPr lang="en-US" smtClean="0"/>
-          </a:p>
-        </p:txBody>
-      </p:sp>
-      <p:sp>
-        <p:nvSpPr>
-          <p:cNvPr id="4" name="Tijdelijke aanduiding voor voettekst 3"/>
-          <p:cNvSpPr>
-            <a:spLocks noGrp="1"/>
-          </p:cNvSpPr>
-          <p:nvPr>
-            <p:ph type="ftr" sz="quarter" idx="11"/>
-          </p:nvPr>
-        </p:nvSpPr>
-        <p:spPr/>
-        <p:txBody>
-          <a:bodyPr/>
-          <a:lstStyle/>
-          <a:p>
-            <a:r>
-              <a:rPr lang="en-US" smtClean="0"/>
-              <a:t>© Sioux 2013 | Confidential | </a:t>
-            </a:r>
-            <a:endParaRPr lang="en-US"/>
-          </a:p>
-        </p:txBody>
-      </p:sp>
-      <p:sp>
-        <p:nvSpPr>
-          <p:cNvPr id="5" name="Tijdelijke aanduiding voor dianummer 4"/>
-          <p:cNvSpPr>
-            <a:spLocks noGrp="1"/>
-          </p:cNvSpPr>
-          <p:nvPr>
-            <p:ph type="sldNum" sz="quarter" idx="12"/>
-          </p:nvPr>
-        </p:nvSpPr>
-        <p:spPr/>
-        <p:txBody>
-          <a:bodyPr/>
-          <a:lstStyle/>
-          <a:p>
-            <a:fld id="{B60E6772-B9F1-4672-903F-323A7A0E6EBD}" type="slidenum">
-              <a:rPr lang="en-US" smtClean="0"/>
-              <a:pPr/>
-              <a:t>8</a:t>
-            </a:fld>
-            <a:endParaRPr lang="en-US"/>
-          </a:p>
-        </p:txBody>
-      </p:sp>
-    </p:spTree>
-    <p:extLst>
-      <p:ext uri="{BB962C8B-B14F-4D97-AF65-F5344CB8AC3E}">
-        <p14:creationId xmlns:p14="http://schemas.microsoft.com/office/powerpoint/2010/main" val="731832516"/>
-      </p:ext>
-    </p:extLst>
-  </p:cSld>
-  <p:clrMapOvr>
-    <a:masterClrMapping/>
-  </p:clrMapOvr>
-</p:sld>
-</file>
-
 <file path=ppt/slides/slide9.xml><?xml version="1.0" encoding="utf-8"?>
 <p:sld xmlns:a="http://schemas.openxmlformats.org/drawingml/2006/main" xmlns:r="http://schemas.openxmlformats.org/officeDocument/2006/relationships" xmlns:p="http://schemas.openxmlformats.org/presentationml/2006/main">
   <p:cSld>
@@ -9606,16 +10620,55 @@
         </p:nvSpPr>
         <p:spPr/>
         <p:txBody>
-          <a:bodyPr/>
+          <a:bodyPr>
+            <a:normAutofit/>
+          </a:bodyPr>
           <a:lstStyle/>
           <a:p>
             <a:r>
               <a:rPr lang="en-US" dirty="0" smtClean="0"/>
-              <a:t>Finding your entry </a:t>
-            </a:r>
+              <a:t>Plugins</a:t>
+            </a:r>
+          </a:p>
+          <a:p>
+            <a:pPr lvl="1"/>
             <a:r>
               <a:rPr lang="en-US" dirty="0" smtClean="0"/>
-              <a:t>point</a:t>
+              <a:t>Statically linked (C)</a:t>
+            </a:r>
+            <a:endParaRPr lang="en-US" dirty="0" smtClean="0"/>
+          </a:p>
+          <a:p>
+            <a:pPr lvl="1"/>
+            <a:r>
+              <a:rPr lang="en-US" dirty="0" smtClean="0"/>
+              <a:t>Dynamic (.so, .</a:t>
+            </a:r>
+            <a:r>
+              <a:rPr lang="en-US" dirty="0" err="1" smtClean="0"/>
+              <a:t>dll</a:t>
+            </a:r>
+            <a:r>
+              <a:rPr lang="en-US" dirty="0" smtClean="0"/>
+              <a:t>)</a:t>
+            </a:r>
+          </a:p>
+          <a:p>
+            <a:pPr lvl="1"/>
+            <a:r>
+              <a:rPr lang="en-US" dirty="0" smtClean="0"/>
+              <a:t>Python </a:t>
+            </a:r>
+            <a:r>
+              <a:rPr lang="en-US" sz="1600" dirty="0" smtClean="0"/>
+              <a:t>(broken on current windows version)</a:t>
+            </a:r>
+          </a:p>
+          <a:p>
+            <a:pPr lvl="1"/>
+            <a:r>
+              <a:rPr lang="en-US" dirty="0" err="1" smtClean="0"/>
+              <a:t>Lua</a:t>
             </a:r>
             <a:endParaRPr lang="en-US" dirty="0" smtClean="0"/>
           </a:p>
@@ -9668,118 +10721,10 @@
           </a:p>
         </p:txBody>
       </p:sp>
-      <p:pic>
-        <p:nvPicPr>
-          <p:cNvPr id="1026" name="Picture 2"/>
-          <p:cNvPicPr>
-            <a:picLocks noChangeAspect="1" noChangeArrowheads="1"/>
-          </p:cNvPicPr>
-          <p:nvPr/>
-        </p:nvPicPr>
-        <p:blipFill>
-          <a:blip r:embed="rId2">
-            <a:extLst>
-              <a:ext uri="{28A0092B-C50C-407E-A947-70E740481C1C}">
-                <a14:useLocalDpi xmlns:a14="http://schemas.microsoft.com/office/drawing/2010/main" val="0"/>
-              </a:ext>
-            </a:extLst>
-          </a:blip>
-          <a:srcRect/>
-          <a:stretch>
-            <a:fillRect/>
-          </a:stretch>
-        </p:blipFill>
-        <p:spPr bwMode="auto">
-          <a:xfrm>
-            <a:off x="609600" y="1809750"/>
-            <a:ext cx="2590800" cy="2886075"/>
-          </a:xfrm>
-          <a:prstGeom prst="rect">
-            <a:avLst/>
-          </a:prstGeom>
-          <a:noFill/>
-          <a:ln>
-            <a:noFill/>
-          </a:ln>
-          <a:extLst>
-            <a:ext uri="{909E8E84-426E-40DD-AFC4-6F175D3DCCD1}">
-              <a14:hiddenFill xmlns:a14="http://schemas.microsoft.com/office/drawing/2010/main">
-                <a:solidFill>
-                  <a:schemeClr val="accent1"/>
-                </a:solidFill>
-              </a14:hiddenFill>
-            </a:ext>
-            <a:ext uri="{91240B29-F687-4F45-9708-019B960494DF}">
-              <a14:hiddenLine xmlns:a14="http://schemas.microsoft.com/office/drawing/2010/main" w="9525">
-                <a:solidFill>
-                  <a:schemeClr val="tx1"/>
-                </a:solidFill>
-                <a:miter lim="800000"/>
-                <a:headEnd/>
-                <a:tailEnd/>
-              </a14:hiddenLine>
-            </a:ext>
-          </a:extLst>
-        </p:spPr>
-      </p:pic>
-      <p:pic>
-        <p:nvPicPr>
-          <p:cNvPr id="1027" name="Picture 3"/>
-          <p:cNvPicPr>
-            <a:picLocks noChangeAspect="1" noChangeArrowheads="1"/>
-          </p:cNvPicPr>
-          <p:nvPr/>
-        </p:nvPicPr>
-        <p:blipFill>
-          <a:blip r:embed="rId3">
-            <a:extLst>
-              <a:ext uri="{28A0092B-C50C-407E-A947-70E740481C1C}">
-                <a14:useLocalDpi xmlns:a14="http://schemas.microsoft.com/office/drawing/2010/main" val="0"/>
-              </a:ext>
-            </a:extLst>
-          </a:blip>
-          <a:srcRect/>
-          <a:stretch>
-            <a:fillRect/>
-          </a:stretch>
-        </p:blipFill>
-        <p:spPr bwMode="auto">
-          <a:xfrm>
-            <a:off x="3621074" y="1885948"/>
-            <a:ext cx="5114925" cy="2505075"/>
-          </a:xfrm>
-          <a:prstGeom prst="rect">
-            <a:avLst/>
-          </a:prstGeom>
-          <a:noFill/>
-          <a:ln>
-            <a:noFill/>
-          </a:ln>
-          <a:extLst>
-            <a:ext uri="{909E8E84-426E-40DD-AFC4-6F175D3DCCD1}">
-              <a14:hiddenFill xmlns:a14="http://schemas.microsoft.com/office/drawing/2010/main">
-                <a:solidFill>
-                  <a:schemeClr val="accent1"/>
-                </a:solidFill>
-              </a14:hiddenFill>
-            </a:ext>
-            <a:ext uri="{91240B29-F687-4F45-9708-019B960494DF}">
-              <a14:hiddenLine xmlns:a14="http://schemas.microsoft.com/office/drawing/2010/main" w="9525">
-                <a:solidFill>
-                  <a:schemeClr val="tx1"/>
-                </a:solidFill>
-                <a:miter lim="800000"/>
-                <a:headEnd/>
-                <a:tailEnd/>
-              </a14:hiddenLine>
-            </a:ext>
-          </a:extLst>
-        </p:spPr>
-      </p:pic>
     </p:spTree>
     <p:extLst>
       <p:ext uri="{BB962C8B-B14F-4D97-AF65-F5344CB8AC3E}">
-        <p14:creationId xmlns:p14="http://schemas.microsoft.com/office/powerpoint/2010/main" val="1390328558"/>
+        <p14:creationId xmlns:p14="http://schemas.microsoft.com/office/powerpoint/2010/main" val="2202936259"/>
       </p:ext>
     </p:extLst>
   </p:cSld>

</xml_diff>

<commit_message>
[impl] add basic bitfield
</commit_message>
<xml_diff>
--- a/Lua Wireshark Dissectors.pptx
+++ b/Lua Wireshark Dissectors.pptx
@@ -6671,6 +6671,14 @@
             <a:r>
               <a:rPr lang="en-US" dirty="0" err="1" smtClean="0"/>
               <a:t>Endianness</a:t>
+            </a:r>
+            <a:r>
+              <a:rPr lang="en-US" dirty="0" smtClean="0"/>
+              <a:t>, </a:t>
+            </a:r>
+            <a:r>
+              <a:rPr lang="en-US" smtClean="0"/>
+              <a:t>bitfields</a:t>
             </a:r>
             <a:endParaRPr lang="en-US" dirty="0" smtClean="0"/>
           </a:p>

</xml_diff>

<commit_message>
[doc] add link to github project
</commit_message>
<xml_diff>
--- a/Lua Wireshark Dissectors.pptx
+++ b/Lua Wireshark Dissectors.pptx
@@ -170,7 +170,7 @@
       </p14:sectionLst>
     </p:ext>
     <p:ext uri="{EFAFB233-063F-42B5-8137-9DF3F51BA10A}">
-      <p15:sldGuideLst xmlns:p15="http://schemas.microsoft.com/office/powerpoint/2012/main">
+      <p15:sldGuideLst xmlns:p15="http://schemas.microsoft.com/office/powerpoint/2012/main" xmlns="">
         <p15:guide id="1" orient="horz" pos="1620">
           <p15:clr>
             <a:srgbClr val="A4A3A4"/>
@@ -184,7 +184,7 @@
       </p15:sldGuideLst>
     </p:ext>
     <p:ext uri="{2D200454-40CA-4A62-9FC3-DE9A4176ACB9}">
-      <p15:notesGuideLst xmlns:p15="http://schemas.microsoft.com/office/powerpoint/2012/main">
+      <p15:notesGuideLst xmlns:p15="http://schemas.microsoft.com/office/powerpoint/2012/main" xmlns="">
         <p15:guide id="1" orient="horz" pos="2118" userDrawn="1">
           <p15:clr>
             <a:srgbClr val="A4A3A4"/>
@@ -284,7 +284,7 @@
             <a:fld id="{33F2956A-3F06-4D42-B2C6-B694A4913167}" type="datetimeFigureOut">
               <a:rPr lang="en-US" smtClean="0"/>
               <a:pPr/>
-              <a:t>6/30/2014</a:t>
+              <a:t>7/1/2014</a:t>
             </a:fld>
             <a:endParaRPr lang="en-US"/>
           </a:p>
@@ -351,7 +351,7 @@
             <a:fld id="{C2C7D710-EBA2-4934-B63D-B4AA6E5B9341}" type="slidenum">
               <a:rPr lang="en-US" smtClean="0"/>
               <a:pPr/>
-              <a:t>‹#›</a:t>
+              <a:t>‹nr.›</a:t>
             </a:fld>
             <a:endParaRPr lang="en-US"/>
           </a:p>
@@ -451,7 +451,7 @@
             <a:fld id="{4EA6A4AE-6FAC-4420-9485-A57254806E09}" type="datetimeFigureOut">
               <a:rPr lang="en-US" smtClean="0"/>
               <a:pPr/>
-              <a:t>6/30/2014</a:t>
+              <a:t>7/1/2014</a:t>
             </a:fld>
             <a:endParaRPr lang="en-US"/>
           </a:p>
@@ -613,7 +613,7 @@
             <a:fld id="{559C4A52-4ACF-44E6-B7A9-3756997F58DA}" type="slidenum">
               <a:rPr lang="en-US" smtClean="0"/>
               <a:pPr/>
-              <a:t>‹#›</a:t>
+              <a:t>‹nr.›</a:t>
             </a:fld>
             <a:endParaRPr lang="en-US"/>
           </a:p>
@@ -1335,7 +1335,7 @@
           <a:p>
             <a:fld id="{A2F54870-87CF-4469-8CD0-8CD470DEE959}" type="datetime1">
               <a:rPr lang="nl-NL" smtClean="0"/>
-              <a:t>30-6-2014</a:t>
+              <a:t>1-7-2014</a:t>
             </a:fld>
             <a:endParaRPr lang="en-US" dirty="0"/>
           </a:p>
@@ -1372,7 +1372,7 @@
             <a:fld id="{B60E6772-B9F1-4672-903F-323A7A0E6EBD}" type="slidenum">
               <a:rPr lang="en-US" smtClean="0"/>
               <a:pPr/>
-              <a:t>‹#›</a:t>
+              <a:t>‹nr.›</a:t>
             </a:fld>
             <a:endParaRPr lang="en-US" dirty="0"/>
           </a:p>
@@ -1735,7 +1735,7 @@
           <a:p>
             <a:fld id="{7B029FA6-1447-4153-9C82-46E7F8F8B89C}" type="datetime1">
               <a:rPr lang="nl-NL" smtClean="0"/>
-              <a:t>30-6-2014</a:t>
+              <a:t>1-7-2014</a:t>
             </a:fld>
             <a:endParaRPr lang="en-US"/>
           </a:p>
@@ -1782,7 +1782,7 @@
             <a:fld id="{B60E6772-B9F1-4672-903F-323A7A0E6EBD}" type="slidenum">
               <a:rPr lang="en-US" smtClean="0"/>
               <a:pPr/>
-              <a:t>‹#›</a:t>
+              <a:t>‹nr.›</a:t>
             </a:fld>
             <a:endParaRPr lang="en-US"/>
           </a:p>
@@ -1905,7 +1905,7 @@
           <a:p>
             <a:fld id="{8B2C21F0-D111-4BBD-8623-848AB053C0B5}" type="datetime1">
               <a:rPr lang="nl-NL" smtClean="0"/>
-              <a:t>30-6-2014</a:t>
+              <a:t>1-7-2014</a:t>
             </a:fld>
             <a:endParaRPr lang="en-US"/>
           </a:p>
@@ -1952,7 +1952,7 @@
             <a:fld id="{B60E6772-B9F1-4672-903F-323A7A0E6EBD}" type="slidenum">
               <a:rPr lang="en-US" smtClean="0"/>
               <a:pPr/>
-              <a:t>‹#›</a:t>
+              <a:t>‹nr.›</a:t>
             </a:fld>
             <a:endParaRPr lang="en-US"/>
           </a:p>
@@ -2093,7 +2093,7 @@
           <a:p>
             <a:fld id="{0415E0CA-8F05-43B0-AC5C-A4C2CAF4C6B2}" type="datetime1">
               <a:rPr lang="nl-NL" smtClean="0"/>
-              <a:t>30-6-2014</a:t>
+              <a:t>1-7-2014</a:t>
             </a:fld>
             <a:endParaRPr lang="en-US"/>
           </a:p>
@@ -2140,7 +2140,7 @@
             <a:fld id="{B60E6772-B9F1-4672-903F-323A7A0E6EBD}" type="slidenum">
               <a:rPr lang="en-US" smtClean="0"/>
               <a:pPr/>
-              <a:t>‹#›</a:t>
+              <a:t>‹nr.›</a:t>
             </a:fld>
             <a:endParaRPr lang="en-US"/>
           </a:p>
@@ -2212,7 +2212,7 @@
           <a:p>
             <a:fld id="{7B38BF40-9FE8-486C-B78C-098A5BC017A4}" type="datetime1">
               <a:rPr lang="nl-NL" smtClean="0"/>
-              <a:t>30-6-2014</a:t>
+              <a:t>1-7-2014</a:t>
             </a:fld>
             <a:endParaRPr lang="en-US" dirty="0"/>
           </a:p>
@@ -2249,7 +2249,7 @@
             <a:fld id="{B60E6772-B9F1-4672-903F-323A7A0E6EBD}" type="slidenum">
               <a:rPr lang="en-US" smtClean="0"/>
               <a:pPr/>
-              <a:t>‹#›</a:t>
+              <a:t>‹nr.›</a:t>
             </a:fld>
             <a:endParaRPr lang="en-US" dirty="0"/>
           </a:p>
@@ -2549,7 +2549,7 @@
           <a:p>
             <a:fld id="{2F71A602-EDE5-427A-9AEE-A7874C612705}" type="datetime1">
               <a:rPr lang="nl-NL" smtClean="0"/>
-              <a:t>30-6-2014</a:t>
+              <a:t>1-7-2014</a:t>
             </a:fld>
             <a:endParaRPr lang="en-US"/>
           </a:p>
@@ -2596,7 +2596,7 @@
             <a:fld id="{B60E6772-B9F1-4672-903F-323A7A0E6EBD}" type="slidenum">
               <a:rPr lang="en-US" smtClean="0"/>
               <a:pPr/>
-              <a:t>‹#›</a:t>
+              <a:t>‹nr.›</a:t>
             </a:fld>
             <a:endParaRPr lang="en-US"/>
           </a:p>
@@ -2795,7 +2795,7 @@
           <a:p>
             <a:fld id="{DC28C3C2-402D-47D0-AC93-A6F0FF3F5D95}" type="datetime1">
               <a:rPr lang="nl-NL" smtClean="0"/>
-              <a:t>30-6-2014</a:t>
+              <a:t>1-7-2014</a:t>
             </a:fld>
             <a:endParaRPr lang="en-US"/>
           </a:p>
@@ -2842,7 +2842,7 @@
             <a:fld id="{B60E6772-B9F1-4672-903F-323A7A0E6EBD}" type="slidenum">
               <a:rPr lang="en-US" smtClean="0"/>
               <a:pPr/>
-              <a:t>‹#›</a:t>
+              <a:t>‹nr.›</a:t>
             </a:fld>
             <a:endParaRPr lang="en-US"/>
           </a:p>
@@ -3083,7 +3083,7 @@
           <a:p>
             <a:fld id="{A6FE0C5C-EE5B-4C22-9880-06E381D0A66B}" type="datetime1">
               <a:rPr lang="nl-NL" smtClean="0"/>
-              <a:t>30-6-2014</a:t>
+              <a:t>1-7-2014</a:t>
             </a:fld>
             <a:endParaRPr lang="en-US"/>
           </a:p>
@@ -3130,7 +3130,7 @@
             <a:fld id="{B60E6772-B9F1-4672-903F-323A7A0E6EBD}" type="slidenum">
               <a:rPr lang="en-US" smtClean="0"/>
               <a:pPr/>
-              <a:t>‹#›</a:t>
+              <a:t>‹nr.›</a:t>
             </a:fld>
             <a:endParaRPr lang="en-US"/>
           </a:p>
@@ -3505,7 +3505,7 @@
           <a:p>
             <a:fld id="{81E1889D-237A-484F-BA72-0715C176C3B9}" type="datetime1">
               <a:rPr lang="nl-NL" smtClean="0"/>
-              <a:t>30-6-2014</a:t>
+              <a:t>1-7-2014</a:t>
             </a:fld>
             <a:endParaRPr lang="en-US"/>
           </a:p>
@@ -3552,7 +3552,7 @@
             <a:fld id="{B60E6772-B9F1-4672-903F-323A7A0E6EBD}" type="slidenum">
               <a:rPr lang="en-US" smtClean="0"/>
               <a:pPr/>
-              <a:t>‹#›</a:t>
+              <a:t>‹nr.›</a:t>
             </a:fld>
             <a:endParaRPr lang="en-US"/>
           </a:p>
@@ -3623,7 +3623,7 @@
           <a:p>
             <a:fld id="{FB2A5C3D-6CB3-4B1F-85F9-9EB448F4D34D}" type="datetime1">
               <a:rPr lang="nl-NL" smtClean="0"/>
-              <a:t>30-6-2014</a:t>
+              <a:t>1-7-2014</a:t>
             </a:fld>
             <a:endParaRPr lang="en-US"/>
           </a:p>
@@ -3670,7 +3670,7 @@
             <a:fld id="{B60E6772-B9F1-4672-903F-323A7A0E6EBD}" type="slidenum">
               <a:rPr lang="en-US" smtClean="0"/>
               <a:pPr/>
-              <a:t>‹#›</a:t>
+              <a:t>‹nr.›</a:t>
             </a:fld>
             <a:endParaRPr lang="en-US"/>
           </a:p>
@@ -3718,7 +3718,7 @@
           <a:p>
             <a:fld id="{4A80D17D-E57A-463C-A47A-BC83B91D4921}" type="datetime1">
               <a:rPr lang="nl-NL" smtClean="0"/>
-              <a:t>30-6-2014</a:t>
+              <a:t>1-7-2014</a:t>
             </a:fld>
             <a:endParaRPr lang="en-US"/>
           </a:p>
@@ -3765,7 +3765,7 @@
             <a:fld id="{B60E6772-B9F1-4672-903F-323A7A0E6EBD}" type="slidenum">
               <a:rPr lang="en-US" smtClean="0"/>
               <a:pPr/>
-              <a:t>‹#›</a:t>
+              <a:t>‹nr.›</a:t>
             </a:fld>
             <a:endParaRPr lang="en-US"/>
           </a:p>
@@ -4001,7 +4001,7 @@
           <a:p>
             <a:fld id="{6180DB96-6CAE-4319-B5F4-3BF322EA84E7}" type="datetime1">
               <a:rPr lang="nl-NL" smtClean="0"/>
-              <a:t>30-6-2014</a:t>
+              <a:t>1-7-2014</a:t>
             </a:fld>
             <a:endParaRPr lang="en-US"/>
           </a:p>
@@ -4048,7 +4048,7 @@
             <a:fld id="{B60E6772-B9F1-4672-903F-323A7A0E6EBD}" type="slidenum">
               <a:rPr lang="en-US" smtClean="0"/>
               <a:pPr/>
-              <a:t>‹#›</a:t>
+              <a:t>‹nr.›</a:t>
             </a:fld>
             <a:endParaRPr lang="en-US"/>
           </a:p>
@@ -4238,7 +4238,7 @@
           <a:p>
             <a:fld id="{4C43C174-F020-4F1C-A13D-28CE719462E4}" type="datetime1">
               <a:rPr lang="nl-NL" smtClean="0"/>
-              <a:t>30-6-2014</a:t>
+              <a:t>1-7-2014</a:t>
             </a:fld>
             <a:endParaRPr lang="en-US"/>
           </a:p>
@@ -4317,7 +4317,7 @@
             <a:fld id="{B60E6772-B9F1-4672-903F-323A7A0E6EBD}" type="slidenum">
               <a:rPr lang="en-US" smtClean="0"/>
               <a:pPr/>
-              <a:t>‹#›</a:t>
+              <a:t>‹nr.›</a:t>
             </a:fld>
             <a:endParaRPr lang="en-US" dirty="0"/>
           </a:p>
@@ -4974,6 +4974,13 @@
   <p:clrMapOvr>
     <a:masterClrMapping/>
   </p:clrMapOvr>
+  <p:timing>
+    <p:tnLst>
+      <p:par>
+        <p:cTn id="1" dur="indefinite" restart="never" nodeType="tmRoot"/>
+      </p:par>
+    </p:tnLst>
+  </p:timing>
 </p:sld>
 </file>
 
@@ -5204,6 +5211,13 @@
   <p:clrMapOvr>
     <a:masterClrMapping/>
   </p:clrMapOvr>
+  <p:timing>
+    <p:tnLst>
+      <p:par>
+        <p:cTn id="1" dur="indefinite" restart="never" nodeType="tmRoot"/>
+      </p:par>
+    </p:tnLst>
+  </p:timing>
 </p:sld>
 </file>
 
@@ -5370,6 +5384,13 @@
   <p:clrMapOvr>
     <a:masterClrMapping/>
   </p:clrMapOvr>
+  <p:timing>
+    <p:tnLst>
+      <p:par>
+        <p:cTn id="1" dur="indefinite" restart="never" nodeType="tmRoot"/>
+      </p:par>
+    </p:tnLst>
+  </p:timing>
 </p:sld>
 </file>
 
@@ -5676,6 +5697,13 @@
   <p:clrMapOvr>
     <a:masterClrMapping/>
   </p:clrMapOvr>
+  <p:timing>
+    <p:tnLst>
+      <p:par>
+        <p:cTn id="1" dur="indefinite" restart="never" nodeType="tmRoot"/>
+      </p:par>
+    </p:tnLst>
+  </p:timing>
 </p:sld>
 </file>
 
@@ -5923,6 +5951,13 @@
   <p:clrMapOvr>
     <a:masterClrMapping/>
   </p:clrMapOvr>
+  <p:timing>
+    <p:tnLst>
+      <p:par>
+        <p:cTn id="1" dur="indefinite" restart="never" nodeType="tmRoot"/>
+      </p:par>
+    </p:tnLst>
+  </p:timing>
 </p:sld>
 </file>
 
@@ -6116,6 +6151,13 @@
   <p:clrMapOvr>
     <a:masterClrMapping/>
   </p:clrMapOvr>
+  <p:timing>
+    <p:tnLst>
+      <p:par>
+        <p:cTn id="1" dur="indefinite" restart="never" nodeType="tmRoot"/>
+      </p:par>
+    </p:tnLst>
+  </p:timing>
 </p:sld>
 </file>
 
@@ -6426,6 +6468,13 @@
   <p:clrMapOvr>
     <a:masterClrMapping/>
   </p:clrMapOvr>
+  <p:timing>
+    <p:tnLst>
+      <p:par>
+        <p:cTn id="1" dur="indefinite" restart="never" nodeType="tmRoot"/>
+      </p:par>
+    </p:tnLst>
+  </p:timing>
 </p:sld>
 </file>
 
@@ -6596,6 +6645,13 @@
   <p:clrMapOvr>
     <a:masterClrMapping/>
   </p:clrMapOvr>
+  <p:timing>
+    <p:tnLst>
+      <p:par>
+        <p:cTn id="1" dur="indefinite" restart="never" nodeType="tmRoot"/>
+      </p:par>
+    </p:tnLst>
+  </p:timing>
 </p:sld>
 </file>
 
@@ -6750,6 +6806,13 @@
   <p:clrMapOvr>
     <a:masterClrMapping/>
   </p:clrMapOvr>
+  <p:timing>
+    <p:tnLst>
+      <p:par>
+        <p:cTn id="1" dur="indefinite" restart="never" nodeType="tmRoot"/>
+      </p:par>
+    </p:tnLst>
+  </p:timing>
 </p:sld>
 </file>
 
@@ -6916,6 +6979,13 @@
   <p:clrMapOvr>
     <a:masterClrMapping/>
   </p:clrMapOvr>
+  <p:timing>
+    <p:tnLst>
+      <p:par>
+        <p:cTn id="1" dur="indefinite" restart="never" nodeType="tmRoot"/>
+      </p:par>
+    </p:tnLst>
+  </p:timing>
 </p:sld>
 </file>
 
@@ -7037,10 +7107,10 @@
           <a:lstStyle/>
           <a:p>
             <a:r>
-              <a:rPr lang="en-GB" smtClean="0"/>
+              <a:rPr lang="en-GB" dirty="0" smtClean="0"/>
               <a:t>© Sioux 2013 | Confidential | </a:t>
             </a:r>
-            <a:endParaRPr lang="en-GB"/>
+            <a:endParaRPr lang="en-GB" dirty="0"/>
           </a:p>
         </p:txBody>
       </p:sp>
@@ -7073,6 +7143,13 @@
   <p:clrMapOvr>
     <a:masterClrMapping/>
   </p:clrMapOvr>
+  <p:timing>
+    <p:tnLst>
+      <p:par>
+        <p:cTn id="1" dur="indefinite" restart="never" nodeType="tmRoot"/>
+      </p:par>
+    </p:tnLst>
+  </p:timing>
 </p:sld>
 </file>
 
@@ -7196,6 +7273,13 @@
   <p:clrMapOvr>
     <a:masterClrMapping/>
   </p:clrMapOvr>
+  <p:timing>
+    <p:tnLst>
+      <p:par>
+        <p:cTn id="1" dur="indefinite" restart="never" nodeType="tmRoot"/>
+      </p:par>
+    </p:tnLst>
+  </p:timing>
 </p:sld>
 </file>
 
@@ -7281,6 +7365,7 @@
               <a:rPr lang="en-US" dirty="0" smtClean="0"/>
               <a:t>Details</a:t>
             </a:r>
+            <a:endParaRPr lang="en-US" dirty="0" smtClean="0"/>
           </a:p>
           <a:p>
             <a:pPr lvl="1"/>
@@ -7304,7 +7389,28 @@
               <a:rPr lang="en-US" dirty="0">
                 <a:hlinkClick r:id="rId5"/>
               </a:rPr>
-              <a:t>http://stackoverflow.com/</a:t>
+              <a:t>http://stackoverflow.com</a:t>
+            </a:r>
+            <a:r>
+              <a:rPr lang="en-US" dirty="0" smtClean="0">
+                <a:hlinkClick r:id="rId5"/>
+              </a:rPr>
+              <a:t>/</a:t>
+            </a:r>
+            <a:endParaRPr lang="en-US" dirty="0" smtClean="0"/>
+          </a:p>
+          <a:p>
+            <a:r>
+              <a:rPr lang="en-US" dirty="0"/>
+              <a:t>Demo</a:t>
+            </a:r>
+            <a:r>
+              <a:rPr lang="en-US"/>
+              <a:t>: </a:t>
+            </a:r>
+            <a:r>
+              <a:rPr lang="en-US"/>
+              <a:t>https://github.com/xtofl/wiresharkdemo</a:t>
             </a:r>
             <a:endParaRPr lang="en-US" dirty="0"/>
           </a:p>
@@ -7374,6 +7480,13 @@
   <p:clrMapOvr>
     <a:masterClrMapping/>
   </p:clrMapOvr>
+  <p:timing>
+    <p:tnLst>
+      <p:par>
+        <p:cTn id="1" dur="indefinite" restart="never" nodeType="tmRoot"/>
+      </p:par>
+    </p:tnLst>
+  </p:timing>
 </p:sld>
 </file>
 
@@ -7777,6 +7890,13 @@
   <p:clrMapOvr>
     <a:masterClrMapping/>
   </p:clrMapOvr>
+  <p:timing>
+    <p:tnLst>
+      <p:par>
+        <p:cTn id="1" dur="indefinite" restart="never" nodeType="tmRoot"/>
+      </p:par>
+    </p:tnLst>
+  </p:timing>
 </p:sld>
 </file>
 
@@ -7929,6 +8049,13 @@
   <p:clrMapOvr>
     <a:masterClrMapping/>
   </p:clrMapOvr>
+  <p:timing>
+    <p:tnLst>
+      <p:par>
+        <p:cTn id="1" dur="indefinite" restart="never" nodeType="tmRoot"/>
+      </p:par>
+    </p:tnLst>
+  </p:timing>
 </p:sld>
 </file>
 
@@ -8091,6 +8218,13 @@
   <p:clrMapOvr>
     <a:masterClrMapping/>
   </p:clrMapOvr>
+  <p:timing>
+    <p:tnLst>
+      <p:par>
+        <p:cTn id="1" dur="indefinite" restart="never" nodeType="tmRoot"/>
+      </p:par>
+    </p:tnLst>
+  </p:timing>
 </p:sld>
 </file>
 
@@ -8227,6 +8361,13 @@
   <p:clrMapOvr>
     <a:masterClrMapping/>
   </p:clrMapOvr>
+  <p:timing>
+    <p:tnLst>
+      <p:par>
+        <p:cTn id="1" dur="indefinite" restart="never" nodeType="tmRoot"/>
+      </p:par>
+    </p:tnLst>
+  </p:timing>
 </p:sld>
 </file>
 
@@ -9355,6 +9496,13 @@
   <p:clrMapOvr>
     <a:masterClrMapping/>
   </p:clrMapOvr>
+  <p:timing>
+    <p:tnLst>
+      <p:par>
+        <p:cTn id="1" dur="indefinite" restart="never" nodeType="tmRoot"/>
+      </p:par>
+    </p:tnLst>
+  </p:timing>
 </p:sld>
 </file>
 
@@ -10573,6 +10721,13 @@
   <p:clrMapOvr>
     <a:masterClrMapping/>
   </p:clrMapOvr>
+  <p:timing>
+    <p:tnLst>
+      <p:par>
+        <p:cTn id="1" dur="indefinite" restart="never" nodeType="tmRoot"/>
+      </p:par>
+    </p:tnLst>
+  </p:timing>
 </p:sld>
 </file>
 
@@ -10644,7 +10799,6 @@
               <a:rPr lang="en-US" dirty="0" smtClean="0"/>
               <a:t>Statically linked (C)</a:t>
             </a:r>
-            <a:endParaRPr lang="en-US" dirty="0" smtClean="0"/>
           </a:p>
           <a:p>
             <a:pPr lvl="1"/>
@@ -10739,6 +10893,13 @@
   <p:clrMapOvr>
     <a:masterClrMapping/>
   </p:clrMapOvr>
+  <p:timing>
+    <p:tnLst>
+      <p:par>
+        <p:cTn id="1" dur="indefinite" restart="never" nodeType="tmRoot"/>
+      </p:par>
+    </p:tnLst>
+  </p:timing>
 </p:sld>
 </file>
 

</xml_diff>